<commit_message>
- Storage class 정리 중.     * TagBase > Tag > PLCTag > {ActionTag, PlanTag}  ==> TagBase > Tag > {ActionTag, PlanTag}     * 기존 Tag 는 TagBase 로 병합, PLCTag 를 Tag 로 변경
</commit_message>
<xml_diff>
--- a/DsDotNet/src/Doc/Hierachies.pptx
+++ b/DsDotNet/src/Doc/Hierachies.pptx
@@ -264,7 +264,7 @@
           <a:p>
             <a:fld id="{EA4CFCB8-2150-4D86-B261-B3D299AF0C48}" type="datetimeFigureOut">
               <a:rPr lang="ko-KR" altLang="en-US" smtClean="0"/>
-              <a:t>2023-01-18</a:t>
+              <a:t>2023-01-25</a:t>
             </a:fld>
             <a:endParaRPr lang="ko-KR" altLang="en-US" dirty="0"/>
           </a:p>
@@ -462,7 +462,7 @@
           <a:p>
             <a:fld id="{EA4CFCB8-2150-4D86-B261-B3D299AF0C48}" type="datetimeFigureOut">
               <a:rPr lang="ko-KR" altLang="en-US" smtClean="0"/>
-              <a:t>2023-01-18</a:t>
+              <a:t>2023-01-25</a:t>
             </a:fld>
             <a:endParaRPr lang="ko-KR" altLang="en-US" dirty="0"/>
           </a:p>
@@ -670,7 +670,7 @@
           <a:p>
             <a:fld id="{EA4CFCB8-2150-4D86-B261-B3D299AF0C48}" type="datetimeFigureOut">
               <a:rPr lang="ko-KR" altLang="en-US" smtClean="0"/>
-              <a:t>2023-01-18</a:t>
+              <a:t>2023-01-25</a:t>
             </a:fld>
             <a:endParaRPr lang="ko-KR" altLang="en-US" dirty="0"/>
           </a:p>
@@ -868,7 +868,7 @@
           <a:p>
             <a:fld id="{EA4CFCB8-2150-4D86-B261-B3D299AF0C48}" type="datetimeFigureOut">
               <a:rPr lang="ko-KR" altLang="en-US" smtClean="0"/>
-              <a:t>2023-01-18</a:t>
+              <a:t>2023-01-25</a:t>
             </a:fld>
             <a:endParaRPr lang="ko-KR" altLang="en-US" dirty="0"/>
           </a:p>
@@ -1143,7 +1143,7 @@
           <a:p>
             <a:fld id="{EA4CFCB8-2150-4D86-B261-B3D299AF0C48}" type="datetimeFigureOut">
               <a:rPr lang="ko-KR" altLang="en-US" smtClean="0"/>
-              <a:t>2023-01-18</a:t>
+              <a:t>2023-01-25</a:t>
             </a:fld>
             <a:endParaRPr lang="ko-KR" altLang="en-US" dirty="0"/>
           </a:p>
@@ -1408,7 +1408,7 @@
           <a:p>
             <a:fld id="{EA4CFCB8-2150-4D86-B261-B3D299AF0C48}" type="datetimeFigureOut">
               <a:rPr lang="ko-KR" altLang="en-US" smtClean="0"/>
-              <a:t>2023-01-18</a:t>
+              <a:t>2023-01-25</a:t>
             </a:fld>
             <a:endParaRPr lang="ko-KR" altLang="en-US" dirty="0"/>
           </a:p>
@@ -1820,7 +1820,7 @@
           <a:p>
             <a:fld id="{EA4CFCB8-2150-4D86-B261-B3D299AF0C48}" type="datetimeFigureOut">
               <a:rPr lang="ko-KR" altLang="en-US" smtClean="0"/>
-              <a:t>2023-01-18</a:t>
+              <a:t>2023-01-25</a:t>
             </a:fld>
             <a:endParaRPr lang="ko-KR" altLang="en-US" dirty="0"/>
           </a:p>
@@ -1961,7 +1961,7 @@
           <a:p>
             <a:fld id="{EA4CFCB8-2150-4D86-B261-B3D299AF0C48}" type="datetimeFigureOut">
               <a:rPr lang="ko-KR" altLang="en-US" smtClean="0"/>
-              <a:t>2023-01-18</a:t>
+              <a:t>2023-01-25</a:t>
             </a:fld>
             <a:endParaRPr lang="ko-KR" altLang="en-US" dirty="0"/>
           </a:p>
@@ -2074,7 +2074,7 @@
           <a:p>
             <a:fld id="{EA4CFCB8-2150-4D86-B261-B3D299AF0C48}" type="datetimeFigureOut">
               <a:rPr lang="ko-KR" altLang="en-US" smtClean="0"/>
-              <a:t>2023-01-18</a:t>
+              <a:t>2023-01-25</a:t>
             </a:fld>
             <a:endParaRPr lang="ko-KR" altLang="en-US" dirty="0"/>
           </a:p>
@@ -2385,7 +2385,7 @@
           <a:p>
             <a:fld id="{EA4CFCB8-2150-4D86-B261-B3D299AF0C48}" type="datetimeFigureOut">
               <a:rPr lang="ko-KR" altLang="en-US" smtClean="0"/>
-              <a:t>2023-01-18</a:t>
+              <a:t>2023-01-25</a:t>
             </a:fld>
             <a:endParaRPr lang="ko-KR" altLang="en-US" dirty="0"/>
           </a:p>
@@ -2673,7 +2673,7 @@
           <a:p>
             <a:fld id="{EA4CFCB8-2150-4D86-B261-B3D299AF0C48}" type="datetimeFigureOut">
               <a:rPr lang="ko-KR" altLang="en-US" smtClean="0"/>
-              <a:t>2023-01-18</a:t>
+              <a:t>2023-01-25</a:t>
             </a:fld>
             <a:endParaRPr lang="ko-KR" altLang="en-US" dirty="0"/>
           </a:p>
@@ -2914,7 +2914,7 @@
           <a:p>
             <a:fld id="{EA4CFCB8-2150-4D86-B261-B3D299AF0C48}" type="datetimeFigureOut">
               <a:rPr lang="ko-KR" altLang="en-US" smtClean="0"/>
-              <a:t>2023-01-18</a:t>
+              <a:t>2023-01-25</a:t>
             </a:fld>
             <a:endParaRPr lang="ko-KR" altLang="en-US" dirty="0"/>
           </a:p>
@@ -8604,10 +8604,10 @@
       </p:cxnSp>
       <p:sp>
         <p:nvSpPr>
-          <p:cNvPr id="67" name="TextBox 66">
-            <a:extLst>
-              <a:ext uri="{FF2B5EF4-FFF2-40B4-BE49-F238E27FC236}">
-                <a16:creationId xmlns:a16="http://schemas.microsoft.com/office/drawing/2014/main" id="{72142CA8-6FE7-EBD2-3EAC-4CDBD99E5F0C}"/>
+          <p:cNvPr id="68" name="TextBox 67">
+            <a:extLst>
+              <a:ext uri="{FF2B5EF4-FFF2-40B4-BE49-F238E27FC236}">
+                <a16:creationId xmlns:a16="http://schemas.microsoft.com/office/drawing/2014/main" id="{7932BBC8-60DE-74E2-5F28-931E0EDE0D90}"/>
               </a:ext>
             </a:extLst>
           </p:cNvPr>
@@ -8616,8 +8616,8 @@
         </p:nvSpPr>
         <p:spPr>
           <a:xfrm>
-            <a:off x="3080706" y="5593473"/>
-            <a:ext cx="712054" cy="246221"/>
+            <a:off x="2932264" y="4776824"/>
+            <a:ext cx="1013419" cy="246221"/>
           </a:xfrm>
           <a:prstGeom prst="rect">
             <a:avLst/>
@@ -8642,7 +8642,7 @@
                 </a:solidFill>
                 <a:latin typeface="Cascadia Mono" panose="020B0609020000020004" pitchFamily="49" charset="0"/>
               </a:rPr>
-              <a:t>Tag</a:t>
+              <a:t>TagBase</a:t>
             </a:r>
             <a:r>
               <a:rPr lang="en-US" altLang="ko-KR" sz="1000" dirty="0">
@@ -8661,12 +8661,55 @@
           </a:p>
         </p:txBody>
       </p:sp>
-      <p:sp>
-        <p:nvSpPr>
-          <p:cNvPr id="68" name="TextBox 67">
-            <a:extLst>
-              <a:ext uri="{FF2B5EF4-FFF2-40B4-BE49-F238E27FC236}">
-                <a16:creationId xmlns:a16="http://schemas.microsoft.com/office/drawing/2014/main" id="{7932BBC8-60DE-74E2-5F28-931E0EDE0D90}"/>
+      <p:cxnSp>
+        <p:nvCxnSpPr>
+          <p:cNvPr id="69" name="직선 화살표 연결선 68">
+            <a:extLst>
+              <a:ext uri="{FF2B5EF4-FFF2-40B4-BE49-F238E27FC236}">
+                <a16:creationId xmlns:a16="http://schemas.microsoft.com/office/drawing/2014/main" id="{63C171F0-7128-EF09-DE03-DEBEC8B446E6}"/>
+              </a:ext>
+            </a:extLst>
+          </p:cNvPr>
+          <p:cNvCxnSpPr>
+            <a:cxnSpLocks/>
+            <a:stCxn id="68" idx="2"/>
+            <a:endCxn id="77" idx="0"/>
+          </p:cNvCxnSpPr>
+          <p:nvPr/>
+        </p:nvCxnSpPr>
+        <p:spPr>
+          <a:xfrm flipH="1">
+            <a:off x="3438973" y="5023045"/>
+            <a:ext cx="1" cy="444291"/>
+          </a:xfrm>
+          <a:prstGeom prst="straightConnector1">
+            <a:avLst/>
+          </a:prstGeom>
+          <a:ln>
+            <a:tailEnd type="triangle"/>
+          </a:ln>
+        </p:spPr>
+        <p:style>
+          <a:lnRef idx="1">
+            <a:schemeClr val="accent1"/>
+          </a:lnRef>
+          <a:fillRef idx="0">
+            <a:schemeClr val="accent1"/>
+          </a:fillRef>
+          <a:effectRef idx="0">
+            <a:schemeClr val="accent1"/>
+          </a:effectRef>
+          <a:fontRef idx="minor">
+            <a:schemeClr val="tx1"/>
+          </a:fontRef>
+        </p:style>
+      </p:cxnSp>
+      <p:sp>
+        <p:nvSpPr>
+          <p:cNvPr id="71" name="TextBox 70">
+            <a:extLst>
+              <a:ext uri="{FF2B5EF4-FFF2-40B4-BE49-F238E27FC236}">
+                <a16:creationId xmlns:a16="http://schemas.microsoft.com/office/drawing/2014/main" id="{6794E372-350F-EDB8-AF1E-95FC5E851FB5}"/>
               </a:ext>
             </a:extLst>
           </p:cNvPr>
@@ -8675,8 +8718,8 @@
         </p:nvSpPr>
         <p:spPr>
           <a:xfrm>
-            <a:off x="2932264" y="4957692"/>
-            <a:ext cx="1013419" cy="246221"/>
+            <a:off x="600093" y="5289655"/>
+            <a:ext cx="1088760" cy="246221"/>
           </a:xfrm>
           <a:prstGeom prst="rect">
             <a:avLst/>
@@ -8701,7 +8744,7 @@
                 </a:solidFill>
                 <a:latin typeface="Cascadia Mono" panose="020B0609020000020004" pitchFamily="49" charset="0"/>
               </a:rPr>
-              <a:t>TagBase</a:t>
+              <a:t>Variable</a:t>
             </a:r>
             <a:r>
               <a:rPr lang="en-US" altLang="ko-KR" sz="1000" dirty="0">
@@ -8722,23 +8765,24 @@
       </p:sp>
       <p:cxnSp>
         <p:nvCxnSpPr>
-          <p:cNvPr id="69" name="직선 화살표 연결선 68">
-            <a:extLst>
-              <a:ext uri="{FF2B5EF4-FFF2-40B4-BE49-F238E27FC236}">
-                <a16:creationId xmlns:a16="http://schemas.microsoft.com/office/drawing/2014/main" id="{63C171F0-7128-EF09-DE03-DEBEC8B446E6}"/>
+          <p:cNvPr id="72" name="직선 화살표 연결선 71">
+            <a:extLst>
+              <a:ext uri="{FF2B5EF4-FFF2-40B4-BE49-F238E27FC236}">
+                <a16:creationId xmlns:a16="http://schemas.microsoft.com/office/drawing/2014/main" id="{928930EF-EA35-098E-A247-759F0856EA35}"/>
               </a:ext>
             </a:extLst>
           </p:cNvPr>
           <p:cNvCxnSpPr>
-            <a:stCxn id="68" idx="2"/>
-            <a:endCxn id="67" idx="0"/>
+            <a:cxnSpLocks/>
+            <a:stCxn id="73" idx="2"/>
+            <a:endCxn id="71" idx="0"/>
           </p:cNvCxnSpPr>
           <p:nvPr/>
         </p:nvCxnSpPr>
         <p:spPr>
-          <a:xfrm flipH="1">
-            <a:off x="3436733" y="5203913"/>
-            <a:ext cx="2241" cy="389560"/>
+          <a:xfrm>
+            <a:off x="1144473" y="4757322"/>
+            <a:ext cx="0" cy="532333"/>
           </a:xfrm>
           <a:prstGeom prst="straightConnector1">
             <a:avLst/>
@@ -8764,10 +8808,10 @@
       </p:cxnSp>
       <p:sp>
         <p:nvSpPr>
-          <p:cNvPr id="71" name="TextBox 70">
-            <a:extLst>
-              <a:ext uri="{FF2B5EF4-FFF2-40B4-BE49-F238E27FC236}">
-                <a16:creationId xmlns:a16="http://schemas.microsoft.com/office/drawing/2014/main" id="{6794E372-350F-EDB8-AF1E-95FC5E851FB5}"/>
+          <p:cNvPr id="73" name="TextBox 72">
+            <a:extLst>
+              <a:ext uri="{FF2B5EF4-FFF2-40B4-BE49-F238E27FC236}">
+                <a16:creationId xmlns:a16="http://schemas.microsoft.com/office/drawing/2014/main" id="{023B7543-0D1E-935E-8C4B-43BCE9778FA6}"/>
               </a:ext>
             </a:extLst>
           </p:cNvPr>
@@ -8776,8 +8820,8 @@
         </p:nvSpPr>
         <p:spPr>
           <a:xfrm>
-            <a:off x="600093" y="5289655"/>
-            <a:ext cx="1088760" cy="246221"/>
+            <a:off x="449411" y="4511101"/>
+            <a:ext cx="1390124" cy="246221"/>
           </a:xfrm>
           <a:prstGeom prst="rect">
             <a:avLst/>
@@ -8802,7 +8846,7 @@
                 </a:solidFill>
                 <a:latin typeface="Cascadia Mono" panose="020B0609020000020004" pitchFamily="49" charset="0"/>
               </a:rPr>
-              <a:t>Variable</a:t>
+              <a:t>VariableBase</a:t>
             </a:r>
             <a:r>
               <a:rPr lang="en-US" altLang="ko-KR" sz="1000" dirty="0">
@@ -8821,26 +8865,85 @@
           </a:p>
         </p:txBody>
       </p:sp>
+      <p:sp>
+        <p:nvSpPr>
+          <p:cNvPr id="77" name="TextBox 76">
+            <a:extLst>
+              <a:ext uri="{FF2B5EF4-FFF2-40B4-BE49-F238E27FC236}">
+                <a16:creationId xmlns:a16="http://schemas.microsoft.com/office/drawing/2014/main" id="{2F398354-4D67-0290-0FBC-6D3AEDEF7E80}"/>
+              </a:ext>
+            </a:extLst>
+          </p:cNvPr>
+          <p:cNvSpPr txBox="1"/>
+          <p:nvPr/>
+        </p:nvSpPr>
+        <p:spPr>
+          <a:xfrm>
+            <a:off x="3082946" y="5467336"/>
+            <a:ext cx="712054" cy="246221"/>
+          </a:xfrm>
+          <a:prstGeom prst="rect">
+            <a:avLst/>
+          </a:prstGeom>
+          <a:noFill/>
+          <a:ln w="19050">
+            <a:solidFill>
+              <a:srgbClr val="00B050"/>
+            </a:solidFill>
+          </a:ln>
+        </p:spPr>
+        <p:txBody>
+          <a:bodyPr wrap="none" rtlCol="0">
+            <a:spAutoFit/>
+          </a:bodyPr>
+          <a:lstStyle/>
+          <a:p>
+            <a:r>
+              <a:rPr lang="en-US" altLang="ko-KR" sz="1000" dirty="0">
+                <a:solidFill>
+                  <a:srgbClr val="000000"/>
+                </a:solidFill>
+                <a:latin typeface="Cascadia Mono" panose="020B0609020000020004" pitchFamily="49" charset="0"/>
+              </a:rPr>
+              <a:t>Tag</a:t>
+            </a:r>
+            <a:r>
+              <a:rPr lang="en-US" altLang="ko-KR" sz="1000" dirty="0">
+                <a:solidFill>
+                  <a:srgbClr val="00B0F0"/>
+                </a:solidFill>
+                <a:latin typeface="Cascadia Mono" panose="020B0609020000020004" pitchFamily="49" charset="0"/>
+              </a:rPr>
+              <a:t>&lt;'T&gt;</a:t>
+            </a:r>
+            <a:endParaRPr lang="ko-KR" altLang="en-US" sz="1000" dirty="0">
+              <a:solidFill>
+                <a:srgbClr val="00B0F0"/>
+              </a:solidFill>
+            </a:endParaRPr>
+          </a:p>
+        </p:txBody>
+      </p:sp>
       <p:cxnSp>
         <p:nvCxnSpPr>
-          <p:cNvPr id="72" name="직선 화살표 연결선 71">
-            <a:extLst>
-              <a:ext uri="{FF2B5EF4-FFF2-40B4-BE49-F238E27FC236}">
-                <a16:creationId xmlns:a16="http://schemas.microsoft.com/office/drawing/2014/main" id="{928930EF-EA35-098E-A247-759F0856EA35}"/>
+          <p:cNvPr id="81" name="직선 화살표 연결선 80">
+            <a:extLst>
+              <a:ext uri="{FF2B5EF4-FFF2-40B4-BE49-F238E27FC236}">
+                <a16:creationId xmlns:a16="http://schemas.microsoft.com/office/drawing/2014/main" id="{CDB45B25-D6AF-FB74-A034-BE98422A3408}"/>
               </a:ext>
             </a:extLst>
           </p:cNvPr>
           <p:cNvCxnSpPr>
             <a:cxnSpLocks/>
-            <a:stCxn id="73" idx="2"/>
-            <a:endCxn id="71" idx="0"/>
+            <a:stCxn id="82" idx="2"/>
+            <a:endCxn id="73" idx="0"/>
           </p:cNvCxnSpPr>
           <p:nvPr/>
         </p:nvCxnSpPr>
         <p:spPr>
-          <a:xfrm>
-            <a:off x="1144473" y="4757322"/>
-            <a:ext cx="0" cy="532333"/>
+          <a:xfrm flipH="1">
+            <a:off x="1144473" y="3556013"/>
+            <a:ext cx="37671" cy="955088"/>
           </a:xfrm>
           <a:prstGeom prst="straightConnector1">
             <a:avLst/>
@@ -8866,10 +8969,10 @@
       </p:cxnSp>
       <p:sp>
         <p:nvSpPr>
-          <p:cNvPr id="73" name="TextBox 72">
-            <a:extLst>
-              <a:ext uri="{FF2B5EF4-FFF2-40B4-BE49-F238E27FC236}">
-                <a16:creationId xmlns:a16="http://schemas.microsoft.com/office/drawing/2014/main" id="{023B7543-0D1E-935E-8C4B-43BCE9778FA6}"/>
+          <p:cNvPr id="82" name="TextBox 81">
+            <a:extLst>
+              <a:ext uri="{FF2B5EF4-FFF2-40B4-BE49-F238E27FC236}">
+                <a16:creationId xmlns:a16="http://schemas.microsoft.com/office/drawing/2014/main" id="{A5E9CDBE-9501-CCF6-B1B6-9347D786801C}"/>
               </a:ext>
             </a:extLst>
           </p:cNvPr>
@@ -8878,8 +8981,8 @@
         </p:nvSpPr>
         <p:spPr>
           <a:xfrm>
-            <a:off x="449411" y="4511101"/>
-            <a:ext cx="1390124" cy="246221"/>
+            <a:off x="298729" y="3309792"/>
+            <a:ext cx="1766830" cy="246221"/>
           </a:xfrm>
           <a:prstGeom prst="rect">
             <a:avLst/>
@@ -8904,7 +9007,7 @@
                 </a:solidFill>
                 <a:latin typeface="Cascadia Mono" panose="020B0609020000020004" pitchFamily="49" charset="0"/>
               </a:rPr>
-              <a:t>VariableBase</a:t>
+              <a:t>TypedValueStorage</a:t>
             </a:r>
             <a:r>
               <a:rPr lang="en-US" altLang="ko-KR" sz="1000" dirty="0">
@@ -8923,210 +9026,6 @@
           </a:p>
         </p:txBody>
       </p:sp>
-      <p:sp>
-        <p:nvSpPr>
-          <p:cNvPr id="77" name="TextBox 76">
-            <a:extLst>
-              <a:ext uri="{FF2B5EF4-FFF2-40B4-BE49-F238E27FC236}">
-                <a16:creationId xmlns:a16="http://schemas.microsoft.com/office/drawing/2014/main" id="{2F398354-4D67-0290-0FBC-6D3AEDEF7E80}"/>
-              </a:ext>
-            </a:extLst>
-          </p:cNvPr>
-          <p:cNvSpPr txBox="1"/>
-          <p:nvPr/>
-        </p:nvSpPr>
-        <p:spPr>
-          <a:xfrm>
-            <a:off x="1847053" y="6170532"/>
-            <a:ext cx="938077" cy="246221"/>
-          </a:xfrm>
-          <a:prstGeom prst="rect">
-            <a:avLst/>
-          </a:prstGeom>
-          <a:noFill/>
-          <a:ln w="19050">
-            <a:solidFill>
-              <a:srgbClr val="00B050"/>
-            </a:solidFill>
-          </a:ln>
-        </p:spPr>
-        <p:txBody>
-          <a:bodyPr wrap="none" rtlCol="0">
-            <a:spAutoFit/>
-          </a:bodyPr>
-          <a:lstStyle/>
-          <a:p>
-            <a:r>
-              <a:rPr lang="en-US" altLang="ko-KR" sz="1000" dirty="0">
-                <a:solidFill>
-                  <a:srgbClr val="000000"/>
-                </a:solidFill>
-                <a:latin typeface="Cascadia Mono" panose="020B0609020000020004" pitchFamily="49" charset="0"/>
-              </a:rPr>
-              <a:t>PlcTag</a:t>
-            </a:r>
-            <a:r>
-              <a:rPr lang="en-US" altLang="ko-KR" sz="1000" dirty="0">
-                <a:solidFill>
-                  <a:srgbClr val="00B0F0"/>
-                </a:solidFill>
-                <a:latin typeface="Cascadia Mono" panose="020B0609020000020004" pitchFamily="49" charset="0"/>
-              </a:rPr>
-              <a:t>&lt;'T&gt;</a:t>
-            </a:r>
-            <a:endParaRPr lang="ko-KR" altLang="en-US" sz="1000" dirty="0">
-              <a:solidFill>
-                <a:srgbClr val="00B0F0"/>
-              </a:solidFill>
-            </a:endParaRPr>
-          </a:p>
-        </p:txBody>
-      </p:sp>
-      <p:cxnSp>
-        <p:nvCxnSpPr>
-          <p:cNvPr id="78" name="직선 화살표 연결선 77">
-            <a:extLst>
-              <a:ext uri="{FF2B5EF4-FFF2-40B4-BE49-F238E27FC236}">
-                <a16:creationId xmlns:a16="http://schemas.microsoft.com/office/drawing/2014/main" id="{410F0AAE-65E9-76F9-585F-422391B1CF44}"/>
-              </a:ext>
-            </a:extLst>
-          </p:cNvPr>
-          <p:cNvCxnSpPr>
-            <a:cxnSpLocks/>
-            <a:stCxn id="67" idx="2"/>
-            <a:endCxn id="77" idx="0"/>
-          </p:cNvCxnSpPr>
-          <p:nvPr/>
-        </p:nvCxnSpPr>
-        <p:spPr>
-          <a:xfrm flipH="1">
-            <a:off x="2316092" y="5839694"/>
-            <a:ext cx="1120641" cy="330838"/>
-          </a:xfrm>
-          <a:prstGeom prst="straightConnector1">
-            <a:avLst/>
-          </a:prstGeom>
-          <a:ln>
-            <a:tailEnd type="triangle"/>
-          </a:ln>
-        </p:spPr>
-        <p:style>
-          <a:lnRef idx="1">
-            <a:schemeClr val="accent1"/>
-          </a:lnRef>
-          <a:fillRef idx="0">
-            <a:schemeClr val="accent1"/>
-          </a:fillRef>
-          <a:effectRef idx="0">
-            <a:schemeClr val="accent1"/>
-          </a:effectRef>
-          <a:fontRef idx="minor">
-            <a:schemeClr val="tx1"/>
-          </a:fontRef>
-        </p:style>
-      </p:cxnSp>
-      <p:cxnSp>
-        <p:nvCxnSpPr>
-          <p:cNvPr id="81" name="직선 화살표 연결선 80">
-            <a:extLst>
-              <a:ext uri="{FF2B5EF4-FFF2-40B4-BE49-F238E27FC236}">
-                <a16:creationId xmlns:a16="http://schemas.microsoft.com/office/drawing/2014/main" id="{CDB45B25-D6AF-FB74-A034-BE98422A3408}"/>
-              </a:ext>
-            </a:extLst>
-          </p:cNvPr>
-          <p:cNvCxnSpPr>
-            <a:cxnSpLocks/>
-            <a:stCxn id="82" idx="2"/>
-            <a:endCxn id="73" idx="0"/>
-          </p:cNvCxnSpPr>
-          <p:nvPr/>
-        </p:nvCxnSpPr>
-        <p:spPr>
-          <a:xfrm flipH="1">
-            <a:off x="1144473" y="3556013"/>
-            <a:ext cx="37671" cy="955088"/>
-          </a:xfrm>
-          <a:prstGeom prst="straightConnector1">
-            <a:avLst/>
-          </a:prstGeom>
-          <a:ln>
-            <a:tailEnd type="triangle"/>
-          </a:ln>
-        </p:spPr>
-        <p:style>
-          <a:lnRef idx="1">
-            <a:schemeClr val="accent1"/>
-          </a:lnRef>
-          <a:fillRef idx="0">
-            <a:schemeClr val="accent1"/>
-          </a:fillRef>
-          <a:effectRef idx="0">
-            <a:schemeClr val="accent1"/>
-          </a:effectRef>
-          <a:fontRef idx="minor">
-            <a:schemeClr val="tx1"/>
-          </a:fontRef>
-        </p:style>
-      </p:cxnSp>
-      <p:sp>
-        <p:nvSpPr>
-          <p:cNvPr id="82" name="TextBox 81">
-            <a:extLst>
-              <a:ext uri="{FF2B5EF4-FFF2-40B4-BE49-F238E27FC236}">
-                <a16:creationId xmlns:a16="http://schemas.microsoft.com/office/drawing/2014/main" id="{A5E9CDBE-9501-CCF6-B1B6-9347D786801C}"/>
-              </a:ext>
-            </a:extLst>
-          </p:cNvPr>
-          <p:cNvSpPr txBox="1"/>
-          <p:nvPr/>
-        </p:nvSpPr>
-        <p:spPr>
-          <a:xfrm>
-            <a:off x="298729" y="3309792"/>
-            <a:ext cx="1766830" cy="246221"/>
-          </a:xfrm>
-          <a:prstGeom prst="rect">
-            <a:avLst/>
-          </a:prstGeom>
-          <a:noFill/>
-          <a:ln w="19050">
-            <a:solidFill>
-              <a:srgbClr val="00B050"/>
-            </a:solidFill>
-          </a:ln>
-        </p:spPr>
-        <p:txBody>
-          <a:bodyPr wrap="none" rtlCol="0">
-            <a:spAutoFit/>
-          </a:bodyPr>
-          <a:lstStyle/>
-          <a:p>
-            <a:r>
-              <a:rPr lang="en-US" altLang="ko-KR" sz="1000" dirty="0">
-                <a:solidFill>
-                  <a:srgbClr val="000000"/>
-                </a:solidFill>
-                <a:latin typeface="Cascadia Mono" panose="020B0609020000020004" pitchFamily="49" charset="0"/>
-              </a:rPr>
-              <a:t>TypedValueStorage</a:t>
-            </a:r>
-            <a:r>
-              <a:rPr lang="en-US" altLang="ko-KR" sz="1000" dirty="0">
-                <a:solidFill>
-                  <a:srgbClr val="00B0F0"/>
-                </a:solidFill>
-                <a:latin typeface="Cascadia Mono" panose="020B0609020000020004" pitchFamily="49" charset="0"/>
-              </a:rPr>
-              <a:t>&lt;'T&gt;</a:t>
-            </a:r>
-            <a:endParaRPr lang="ko-KR" altLang="en-US" sz="1000" dirty="0">
-              <a:solidFill>
-                <a:srgbClr val="00B0F0"/>
-              </a:solidFill>
-            </a:endParaRPr>
-          </a:p>
-        </p:txBody>
-      </p:sp>
       <p:cxnSp>
         <p:nvCxnSpPr>
           <p:cNvPr id="84" name="직선 화살표 연결선 83">
@@ -9146,7 +9045,7 @@
         <p:spPr>
           <a:xfrm>
             <a:off x="1182144" y="3556013"/>
-            <a:ext cx="2256830" cy="1401679"/>
+            <a:ext cx="2256830" cy="1220811"/>
           </a:xfrm>
           <a:prstGeom prst="straightConnector1">
             <a:avLst/>
@@ -9242,7 +9141,7 @@
         <p:spPr>
           <a:xfrm>
             <a:off x="1744007" y="2550614"/>
-            <a:ext cx="1694967" cy="2407078"/>
+            <a:ext cx="1694967" cy="2226210"/>
           </a:xfrm>
           <a:prstGeom prst="straightConnector1">
             <a:avLst/>
@@ -9284,12 +9183,12 @@
         </p:nvCxnSpPr>
         <p:spPr>
           <a:xfrm rot="5400000">
-            <a:off x="3364175" y="1554422"/>
-            <a:ext cx="3478070" cy="3328471"/>
+            <a:off x="3454609" y="1463988"/>
+            <a:ext cx="3297202" cy="3328471"/>
           </a:xfrm>
           <a:prstGeom prst="curvedConnector3">
             <a:avLst>
-              <a:gd name="adj1" fmla="val 55306"/>
+              <a:gd name="adj1" fmla="val 50000"/>
             </a:avLst>
           </a:prstGeom>
           <a:ln>
@@ -10376,8 +10275,8 @@
         </p:nvSpPr>
         <p:spPr>
           <a:xfrm>
-            <a:off x="3008596" y="6170532"/>
-            <a:ext cx="862737" cy="246221"/>
+            <a:off x="3622260" y="6172169"/>
+            <a:ext cx="1013419" cy="246221"/>
           </a:xfrm>
           <a:prstGeom prst="rect">
             <a:avLst/>
@@ -10402,7 +10301,7 @@
                 </a:solidFill>
                 <a:latin typeface="Cascadia Mono" panose="020B0609020000020004" pitchFamily="49" charset="0"/>
               </a:rPr>
-              <a:t>DsTag</a:t>
+              <a:t>PlanTag</a:t>
             </a:r>
             <a:r>
               <a:rPr lang="en-US" altLang="ko-KR" sz="1000" dirty="0">
@@ -10432,15 +10331,15 @@
           </p:cNvPr>
           <p:cNvCxnSpPr>
             <a:cxnSpLocks/>
-            <a:stCxn id="67" idx="2"/>
+            <a:stCxn id="77" idx="2"/>
             <a:endCxn id="3" idx="0"/>
           </p:cNvCxnSpPr>
           <p:nvPr/>
         </p:nvCxnSpPr>
         <p:spPr>
           <a:xfrm>
-            <a:off x="3436733" y="5839694"/>
-            <a:ext cx="3232" cy="330838"/>
+            <a:off x="3438973" y="5713557"/>
+            <a:ext cx="689997" cy="458612"/>
           </a:xfrm>
           <a:prstGeom prst="straightConnector1">
             <a:avLst/>
@@ -10466,10 +10365,10 @@
       </p:cxnSp>
       <p:sp>
         <p:nvSpPr>
-          <p:cNvPr id="18" name="TextBox 17">
-            <a:extLst>
-              <a:ext uri="{FF2B5EF4-FFF2-40B4-BE49-F238E27FC236}">
-                <a16:creationId xmlns:a16="http://schemas.microsoft.com/office/drawing/2014/main" id="{D9C3E9C5-8C71-C145-5734-15B698B3CC96}"/>
+          <p:cNvPr id="24" name="TextBox 23">
+            <a:extLst>
+              <a:ext uri="{FF2B5EF4-FFF2-40B4-BE49-F238E27FC236}">
+                <a16:creationId xmlns:a16="http://schemas.microsoft.com/office/drawing/2014/main" id="{3B0DAB34-FC25-C6D9-ABF4-DF4C723DA83A}"/>
               </a:ext>
             </a:extLst>
           </p:cNvPr>
@@ -10478,8 +10377,8 @@
         </p:nvSpPr>
         <p:spPr>
           <a:xfrm>
-            <a:off x="4134947" y="6170531"/>
-            <a:ext cx="561372" cy="246221"/>
+            <a:off x="2391401" y="6172169"/>
+            <a:ext cx="1164101" cy="246221"/>
           </a:xfrm>
           <a:prstGeom prst="rect">
             <a:avLst/>
@@ -10504,7 +10403,16 @@
                 </a:solidFill>
                 <a:latin typeface="Cascadia Mono" panose="020B0609020000020004" pitchFamily="49" charset="0"/>
               </a:rPr>
-              <a:t>DsBit</a:t>
+              <a:t>ActionTag</a:t>
+            </a:r>
+            <a:r>
+              <a:rPr lang="en-US" altLang="ko-KR" sz="1000" dirty="0">
+                <a:solidFill>
+                  <a:srgbClr val="00B0F0"/>
+                </a:solidFill>
+                <a:latin typeface="Cascadia Mono" panose="020B0609020000020004" pitchFamily="49" charset="0"/>
+              </a:rPr>
+              <a:t>&lt;'T&gt;</a:t>
             </a:r>
             <a:endParaRPr lang="ko-KR" altLang="en-US" sz="1000" dirty="0">
               <a:solidFill>
@@ -10516,24 +10424,24 @@
       </p:sp>
       <p:cxnSp>
         <p:nvCxnSpPr>
-          <p:cNvPr id="21" name="직선 화살표 연결선 20">
-            <a:extLst>
-              <a:ext uri="{FF2B5EF4-FFF2-40B4-BE49-F238E27FC236}">
-                <a16:creationId xmlns:a16="http://schemas.microsoft.com/office/drawing/2014/main" id="{20E80B97-E1F7-FF4C-4532-40BEC5DA8ECB}"/>
+          <p:cNvPr id="25" name="직선 화살표 연결선 24">
+            <a:extLst>
+              <a:ext uri="{FF2B5EF4-FFF2-40B4-BE49-F238E27FC236}">
+                <a16:creationId xmlns:a16="http://schemas.microsoft.com/office/drawing/2014/main" id="{68EF93FD-BE1B-6677-AF44-215D7749727A}"/>
               </a:ext>
             </a:extLst>
           </p:cNvPr>
           <p:cNvCxnSpPr>
             <a:cxnSpLocks/>
-            <a:stCxn id="67" idx="2"/>
-            <a:endCxn id="18" idx="0"/>
+            <a:stCxn id="77" idx="2"/>
+            <a:endCxn id="24" idx="0"/>
           </p:cNvCxnSpPr>
           <p:nvPr/>
         </p:nvCxnSpPr>
         <p:spPr>
-          <a:xfrm>
-            <a:off x="3436733" y="5839694"/>
-            <a:ext cx="978900" cy="330837"/>
+          <a:xfrm flipH="1">
+            <a:off x="2973452" y="5713557"/>
+            <a:ext cx="465521" cy="458612"/>
           </a:xfrm>
           <a:prstGeom prst="straightConnector1">
             <a:avLst/>

</xml_diff>

<commit_message>
- ITag, ITagWithAddress 정리
</commit_message>
<xml_diff>
--- a/DsDotNet/src/Doc/Hierachies.pptx
+++ b/DsDotNet/src/Doc/Hierachies.pptx
@@ -264,7 +264,7 @@
           <a:p>
             <a:fld id="{EA4CFCB8-2150-4D86-B261-B3D299AF0C48}" type="datetimeFigureOut">
               <a:rPr lang="ko-KR" altLang="en-US" smtClean="0"/>
-              <a:t>2023-01-25</a:t>
+              <a:t>2023-01-26</a:t>
             </a:fld>
             <a:endParaRPr lang="ko-KR" altLang="en-US" dirty="0"/>
           </a:p>
@@ -462,7 +462,7 @@
           <a:p>
             <a:fld id="{EA4CFCB8-2150-4D86-B261-B3D299AF0C48}" type="datetimeFigureOut">
               <a:rPr lang="ko-KR" altLang="en-US" smtClean="0"/>
-              <a:t>2023-01-25</a:t>
+              <a:t>2023-01-26</a:t>
             </a:fld>
             <a:endParaRPr lang="ko-KR" altLang="en-US" dirty="0"/>
           </a:p>
@@ -670,7 +670,7 @@
           <a:p>
             <a:fld id="{EA4CFCB8-2150-4D86-B261-B3D299AF0C48}" type="datetimeFigureOut">
               <a:rPr lang="ko-KR" altLang="en-US" smtClean="0"/>
-              <a:t>2023-01-25</a:t>
+              <a:t>2023-01-26</a:t>
             </a:fld>
             <a:endParaRPr lang="ko-KR" altLang="en-US" dirty="0"/>
           </a:p>
@@ -868,7 +868,7 @@
           <a:p>
             <a:fld id="{EA4CFCB8-2150-4D86-B261-B3D299AF0C48}" type="datetimeFigureOut">
               <a:rPr lang="ko-KR" altLang="en-US" smtClean="0"/>
-              <a:t>2023-01-25</a:t>
+              <a:t>2023-01-26</a:t>
             </a:fld>
             <a:endParaRPr lang="ko-KR" altLang="en-US" dirty="0"/>
           </a:p>
@@ -1143,7 +1143,7 @@
           <a:p>
             <a:fld id="{EA4CFCB8-2150-4D86-B261-B3D299AF0C48}" type="datetimeFigureOut">
               <a:rPr lang="ko-KR" altLang="en-US" smtClean="0"/>
-              <a:t>2023-01-25</a:t>
+              <a:t>2023-01-26</a:t>
             </a:fld>
             <a:endParaRPr lang="ko-KR" altLang="en-US" dirty="0"/>
           </a:p>
@@ -1408,7 +1408,7 @@
           <a:p>
             <a:fld id="{EA4CFCB8-2150-4D86-B261-B3D299AF0C48}" type="datetimeFigureOut">
               <a:rPr lang="ko-KR" altLang="en-US" smtClean="0"/>
-              <a:t>2023-01-25</a:t>
+              <a:t>2023-01-26</a:t>
             </a:fld>
             <a:endParaRPr lang="ko-KR" altLang="en-US" dirty="0"/>
           </a:p>
@@ -1820,7 +1820,7 @@
           <a:p>
             <a:fld id="{EA4CFCB8-2150-4D86-B261-B3D299AF0C48}" type="datetimeFigureOut">
               <a:rPr lang="ko-KR" altLang="en-US" smtClean="0"/>
-              <a:t>2023-01-25</a:t>
+              <a:t>2023-01-26</a:t>
             </a:fld>
             <a:endParaRPr lang="ko-KR" altLang="en-US" dirty="0"/>
           </a:p>
@@ -1961,7 +1961,7 @@
           <a:p>
             <a:fld id="{EA4CFCB8-2150-4D86-B261-B3D299AF0C48}" type="datetimeFigureOut">
               <a:rPr lang="ko-KR" altLang="en-US" smtClean="0"/>
-              <a:t>2023-01-25</a:t>
+              <a:t>2023-01-26</a:t>
             </a:fld>
             <a:endParaRPr lang="ko-KR" altLang="en-US" dirty="0"/>
           </a:p>
@@ -2074,7 +2074,7 @@
           <a:p>
             <a:fld id="{EA4CFCB8-2150-4D86-B261-B3D299AF0C48}" type="datetimeFigureOut">
               <a:rPr lang="ko-KR" altLang="en-US" smtClean="0"/>
-              <a:t>2023-01-25</a:t>
+              <a:t>2023-01-26</a:t>
             </a:fld>
             <a:endParaRPr lang="ko-KR" altLang="en-US" dirty="0"/>
           </a:p>
@@ -2385,7 +2385,7 @@
           <a:p>
             <a:fld id="{EA4CFCB8-2150-4D86-B261-B3D299AF0C48}" type="datetimeFigureOut">
               <a:rPr lang="ko-KR" altLang="en-US" smtClean="0"/>
-              <a:t>2023-01-25</a:t>
+              <a:t>2023-01-26</a:t>
             </a:fld>
             <a:endParaRPr lang="ko-KR" altLang="en-US" dirty="0"/>
           </a:p>
@@ -2673,7 +2673,7 @@
           <a:p>
             <a:fld id="{EA4CFCB8-2150-4D86-B261-B3D299AF0C48}" type="datetimeFigureOut">
               <a:rPr lang="ko-KR" altLang="en-US" smtClean="0"/>
-              <a:t>2023-01-25</a:t>
+              <a:t>2023-01-26</a:t>
             </a:fld>
             <a:endParaRPr lang="ko-KR" altLang="en-US" dirty="0"/>
           </a:p>
@@ -2914,7 +2914,7 @@
           <a:p>
             <a:fld id="{EA4CFCB8-2150-4D86-B261-B3D299AF0C48}" type="datetimeFigureOut">
               <a:rPr lang="ko-KR" altLang="en-US" smtClean="0"/>
-              <a:t>2023-01-25</a:t>
+              <a:t>2023-01-26</a:t>
             </a:fld>
             <a:endParaRPr lang="ko-KR" altLang="en-US" dirty="0"/>
           </a:p>
@@ -10465,6 +10465,198 @@
           </a:fontRef>
         </p:style>
       </p:cxnSp>
+      <p:sp>
+        <p:nvSpPr>
+          <p:cNvPr id="2" name="TextBox 1">
+            <a:extLst>
+              <a:ext uri="{FF2B5EF4-FFF2-40B4-BE49-F238E27FC236}">
+                <a16:creationId xmlns:a16="http://schemas.microsoft.com/office/drawing/2014/main" id="{39CEB798-1E6A-F703-E5E9-E9E94728DA23}"/>
+              </a:ext>
+            </a:extLst>
+          </p:cNvPr>
+          <p:cNvSpPr txBox="1"/>
+          <p:nvPr/>
+        </p:nvSpPr>
+        <p:spPr>
+          <a:xfrm>
+            <a:off x="4322393" y="4893656"/>
+            <a:ext cx="1314784" cy="246221"/>
+          </a:xfrm>
+          <a:prstGeom prst="rect">
+            <a:avLst/>
+          </a:prstGeom>
+          <a:noFill/>
+          <a:ln>
+            <a:solidFill>
+              <a:schemeClr val="tx1"/>
+            </a:solidFill>
+            <a:prstDash val="dash"/>
+          </a:ln>
+        </p:spPr>
+        <p:txBody>
+          <a:bodyPr wrap="none" rtlCol="0">
+            <a:spAutoFit/>
+          </a:bodyPr>
+          <a:lstStyle>
+            <a:defPPr>
+              <a:defRPr lang="ko-KR"/>
+            </a:defPPr>
+            <a:lvl1pPr>
+              <a:defRPr sz="1000">
+                <a:solidFill>
+                  <a:srgbClr val="000000"/>
+                </a:solidFill>
+                <a:latin typeface="Cascadia Mono" panose="020B0609020000020004" pitchFamily="49" charset="0"/>
+              </a:defRPr>
+            </a:lvl1pPr>
+          </a:lstStyle>
+          <a:p>
+            <a:r>
+              <a:rPr lang="en-US" altLang="ko-KR" dirty="0"/>
+              <a:t>ITagWithAddress</a:t>
+            </a:r>
+            <a:endParaRPr lang="ko-KR" altLang="en-US" dirty="0"/>
+          </a:p>
+        </p:txBody>
+      </p:sp>
+      <p:cxnSp>
+        <p:nvCxnSpPr>
+          <p:cNvPr id="7" name="직선 화살표 연결선 6">
+            <a:extLst>
+              <a:ext uri="{FF2B5EF4-FFF2-40B4-BE49-F238E27FC236}">
+                <a16:creationId xmlns:a16="http://schemas.microsoft.com/office/drawing/2014/main" id="{6F4E375B-F4B6-6561-FCBB-B7EC76C48AA7}"/>
+              </a:ext>
+            </a:extLst>
+          </p:cNvPr>
+          <p:cNvCxnSpPr>
+            <a:cxnSpLocks/>
+            <a:stCxn id="33" idx="2"/>
+            <a:endCxn id="2" idx="0"/>
+          </p:cNvCxnSpPr>
+          <p:nvPr/>
+        </p:nvCxnSpPr>
+        <p:spPr>
+          <a:xfrm>
+            <a:off x="4973360" y="4482455"/>
+            <a:ext cx="6425" cy="411201"/>
+          </a:xfrm>
+          <a:prstGeom prst="straightConnector1">
+            <a:avLst/>
+          </a:prstGeom>
+          <a:ln>
+            <a:tailEnd type="triangle"/>
+          </a:ln>
+        </p:spPr>
+        <p:style>
+          <a:lnRef idx="1">
+            <a:schemeClr val="accent1"/>
+          </a:lnRef>
+          <a:fillRef idx="0">
+            <a:schemeClr val="accent1"/>
+          </a:fillRef>
+          <a:effectRef idx="0">
+            <a:schemeClr val="accent1"/>
+          </a:effectRef>
+          <a:fontRef idx="minor">
+            <a:schemeClr val="tx1"/>
+          </a:fontRef>
+        </p:style>
+      </p:cxnSp>
+      <p:cxnSp>
+        <p:nvCxnSpPr>
+          <p:cNvPr id="12" name="직선 화살표 연결선 11">
+            <a:extLst>
+              <a:ext uri="{FF2B5EF4-FFF2-40B4-BE49-F238E27FC236}">
+                <a16:creationId xmlns:a16="http://schemas.microsoft.com/office/drawing/2014/main" id="{466E37EF-AD93-A1E4-E728-094B9FA5A2B0}"/>
+              </a:ext>
+            </a:extLst>
+          </p:cNvPr>
+          <p:cNvCxnSpPr>
+            <a:cxnSpLocks/>
+            <a:stCxn id="2" idx="2"/>
+            <a:endCxn id="77" idx="0"/>
+          </p:cNvCxnSpPr>
+          <p:nvPr/>
+        </p:nvCxnSpPr>
+        <p:spPr>
+          <a:xfrm flipH="1">
+            <a:off x="3438973" y="5139877"/>
+            <a:ext cx="1540812" cy="327459"/>
+          </a:xfrm>
+          <a:prstGeom prst="straightConnector1">
+            <a:avLst/>
+          </a:prstGeom>
+          <a:ln>
+            <a:tailEnd type="triangle"/>
+          </a:ln>
+        </p:spPr>
+        <p:style>
+          <a:lnRef idx="1">
+            <a:schemeClr val="accent1"/>
+          </a:lnRef>
+          <a:fillRef idx="0">
+            <a:schemeClr val="accent1"/>
+          </a:fillRef>
+          <a:effectRef idx="0">
+            <a:schemeClr val="accent1"/>
+          </a:effectRef>
+          <a:fontRef idx="minor">
+            <a:schemeClr val="tx1"/>
+          </a:fontRef>
+        </p:style>
+      </p:cxnSp>
+      <p:sp>
+        <p:nvSpPr>
+          <p:cNvPr id="33" name="TextBox 32">
+            <a:extLst>
+              <a:ext uri="{FF2B5EF4-FFF2-40B4-BE49-F238E27FC236}">
+                <a16:creationId xmlns:a16="http://schemas.microsoft.com/office/drawing/2014/main" id="{5365CE69-0EBA-9A36-B7CB-04C3DF75F5B0}"/>
+              </a:ext>
+            </a:extLst>
+          </p:cNvPr>
+          <p:cNvSpPr txBox="1"/>
+          <p:nvPr/>
+        </p:nvSpPr>
+        <p:spPr>
+          <a:xfrm>
+            <a:off x="4730345" y="4236234"/>
+            <a:ext cx="486030" cy="246221"/>
+          </a:xfrm>
+          <a:prstGeom prst="rect">
+            <a:avLst/>
+          </a:prstGeom>
+          <a:noFill/>
+          <a:ln>
+            <a:noFill/>
+            <a:prstDash val="dash"/>
+          </a:ln>
+        </p:spPr>
+        <p:txBody>
+          <a:bodyPr wrap="none" rtlCol="0">
+            <a:spAutoFit/>
+          </a:bodyPr>
+          <a:lstStyle>
+            <a:defPPr>
+              <a:defRPr lang="ko-KR"/>
+            </a:defPPr>
+            <a:lvl1pPr>
+              <a:defRPr sz="1000">
+                <a:solidFill>
+                  <a:srgbClr val="000000"/>
+                </a:solidFill>
+                <a:latin typeface="Cascadia Mono" panose="020B0609020000020004" pitchFamily="49" charset="0"/>
+              </a:defRPr>
+            </a:lvl1pPr>
+          </a:lstStyle>
+          <a:p>
+            <a:r>
+              <a:rPr lang="en-US" altLang="ko-KR" dirty="0"/>
+              <a:t>ITag</a:t>
+            </a:r>
+            <a:endParaRPr lang="ko-KR" altLang="en-US" dirty="0"/>
+          </a:p>
+        </p:txBody>
+      </p:sp>
     </p:spTree>
     <p:extLst>
       <p:ext uri="{BB962C8B-B14F-4D97-AF65-F5344CB8AC3E}">

</xml_diff>

<commit_message>
- Rename: ITagWithAddress -> IBridgeTag
</commit_message>
<xml_diff>
--- a/DsDotNet/src/Doc/Hierachies.pptx
+++ b/DsDotNet/src/Doc/Hierachies.pptx
@@ -7506,7 +7506,7 @@
         </p:nvSpPr>
         <p:spPr>
           <a:xfrm>
-            <a:off x="4743473" y="2432332"/>
+            <a:off x="7944343" y="2457905"/>
             <a:ext cx="1088760" cy="246221"/>
           </a:xfrm>
           <a:prstGeom prst="rect">
@@ -7661,7 +7661,7 @@
         </p:nvSpPr>
         <p:spPr>
           <a:xfrm>
-            <a:off x="3801704" y="3008514"/>
+            <a:off x="8831711" y="4069620"/>
             <a:ext cx="1390124" cy="246221"/>
           </a:xfrm>
           <a:prstGeom prst="rect">
@@ -7771,9 +7771,9 @@
           <p:nvPr/>
         </p:nvCxnSpPr>
         <p:spPr>
-          <a:xfrm flipH="1">
-            <a:off x="4496766" y="2678553"/>
-            <a:ext cx="791087" cy="329961"/>
+          <a:xfrm>
+            <a:off x="8488723" y="2704126"/>
+            <a:ext cx="1038050" cy="1365494"/>
           </a:xfrm>
           <a:prstGeom prst="straightConnector1">
             <a:avLst/>
@@ -7816,7 +7816,7 @@
         <p:spPr>
           <a:xfrm>
             <a:off x="3051663" y="2534963"/>
-            <a:ext cx="1445103" cy="473551"/>
+            <a:ext cx="6475110" cy="1534657"/>
           </a:xfrm>
           <a:prstGeom prst="straightConnector1">
             <a:avLst/>
@@ -7902,7 +7902,7 @@
         <p:spPr>
           <a:xfrm>
             <a:off x="3891025" y="1678103"/>
-            <a:ext cx="1396828" cy="754229"/>
+            <a:ext cx="4597698" cy="779802"/>
           </a:xfrm>
           <a:prstGeom prst="straightConnector1">
             <a:avLst/>
@@ -7940,7 +7940,7 @@
         </p:nvSpPr>
         <p:spPr>
           <a:xfrm>
-            <a:off x="6110052" y="5255267"/>
+            <a:off x="8703519" y="5281898"/>
             <a:ext cx="1314784" cy="246221"/>
           </a:xfrm>
           <a:prstGeom prst="rect">
@@ -8062,7 +8062,7 @@
         <p:spPr>
           <a:xfrm>
             <a:off x="3273111" y="4182863"/>
-            <a:ext cx="3494333" cy="1072404"/>
+            <a:ext cx="6087800" cy="1099035"/>
           </a:xfrm>
           <a:prstGeom prst="straightConnector1">
             <a:avLst/>
@@ -8103,9 +8103,9 @@
           <p:nvPr/>
         </p:nvCxnSpPr>
         <p:spPr>
-          <a:xfrm>
-            <a:off x="4496766" y="3254735"/>
-            <a:ext cx="2270678" cy="2000532"/>
+          <a:xfrm flipH="1">
+            <a:off x="9360911" y="4315841"/>
+            <a:ext cx="165862" cy="966057"/>
           </a:xfrm>
           <a:prstGeom prst="straightConnector1">
             <a:avLst/>
@@ -8146,9 +8146,9 @@
           <p:nvPr/>
         </p:nvCxnSpPr>
         <p:spPr>
-          <a:xfrm flipH="1">
-            <a:off x="6767444" y="1479622"/>
-            <a:ext cx="1" cy="3775645"/>
+          <a:xfrm>
+            <a:off x="6767445" y="1479622"/>
+            <a:ext cx="2593466" cy="3802276"/>
           </a:xfrm>
           <a:prstGeom prst="straightConnector1">
             <a:avLst/>
@@ -8243,9 +8243,9 @@
           <p:nvPr/>
         </p:nvCxnSpPr>
         <p:spPr>
-          <a:xfrm flipH="1">
-            <a:off x="5287853" y="1479622"/>
-            <a:ext cx="1479592" cy="952710"/>
+          <a:xfrm>
+            <a:off x="6767445" y="1479622"/>
+            <a:ext cx="1721278" cy="978283"/>
           </a:xfrm>
           <a:prstGeom prst="straightConnector1">
             <a:avLst/>
@@ -8678,9 +8678,9 @@
           <p:nvPr/>
         </p:nvCxnSpPr>
         <p:spPr>
-          <a:xfrm>
-            <a:off x="3438974" y="5023045"/>
-            <a:ext cx="958761" cy="444291"/>
+          <a:xfrm flipH="1">
+            <a:off x="3033243" y="5023045"/>
+            <a:ext cx="405731" cy="476421"/>
           </a:xfrm>
           <a:prstGeom prst="straightConnector1">
             <a:avLst/>
@@ -8879,7 +8879,7 @@
         </p:nvSpPr>
         <p:spPr>
           <a:xfrm>
-            <a:off x="3891025" y="5467336"/>
+            <a:off x="2526533" y="5499466"/>
             <a:ext cx="1013419" cy="246221"/>
           </a:xfrm>
           <a:prstGeom prst="rect">
@@ -8899,7 +8899,7 @@
           <a:lstStyle/>
           <a:p>
             <a:r>
-              <a:rPr lang="en-US" altLang="ko-KR" sz="1000" dirty="0" err="1">
+              <a:rPr lang="en-US" altLang="ko-KR" sz="1000" dirty="0">
                 <a:solidFill>
                   <a:srgbClr val="000000"/>
                 </a:solidFill>
@@ -9816,7 +9816,7 @@
         </p:nvSpPr>
         <p:spPr>
           <a:xfrm>
-            <a:off x="8627078" y="4076413"/>
+            <a:off x="5875535" y="4192730"/>
             <a:ext cx="1239442" cy="246221"/>
           </a:xfrm>
           <a:prstGeom prst="rect">
@@ -9870,7 +9870,7 @@
         </p:nvSpPr>
         <p:spPr>
           <a:xfrm>
-            <a:off x="7973056" y="5245188"/>
+            <a:off x="6643262" y="5272030"/>
             <a:ext cx="1465466" cy="246221"/>
           </a:xfrm>
           <a:prstGeom prst="rect">
@@ -9932,9 +9932,9 @@
           <p:nvPr/>
         </p:nvCxnSpPr>
         <p:spPr>
-          <a:xfrm flipH="1">
-            <a:off x="8705789" y="4322634"/>
-            <a:ext cx="541010" cy="922554"/>
+          <a:xfrm>
+            <a:off x="6495256" y="4438951"/>
+            <a:ext cx="880739" cy="833079"/>
           </a:xfrm>
           <a:prstGeom prst="straightConnector1">
             <a:avLst/>
@@ -9977,7 +9977,7 @@
         <p:spPr>
           <a:xfrm>
             <a:off x="6767445" y="1479622"/>
-            <a:ext cx="1938344" cy="3765566"/>
+            <a:ext cx="608550" cy="3792408"/>
           </a:xfrm>
           <a:prstGeom prst="straightConnector1">
             <a:avLst/>
@@ -10275,7 +10275,7 @@
         </p:nvSpPr>
         <p:spPr>
           <a:xfrm>
-            <a:off x="4430339" y="6172169"/>
+            <a:off x="2522239" y="6168015"/>
             <a:ext cx="1013419" cy="246221"/>
           </a:xfrm>
           <a:prstGeom prst="rect">
@@ -10337,9 +10337,9 @@
           <p:nvPr/>
         </p:nvCxnSpPr>
         <p:spPr>
-          <a:xfrm>
-            <a:off x="4397735" y="5713557"/>
-            <a:ext cx="539314" cy="458612"/>
+          <a:xfrm flipH="1">
+            <a:off x="3028949" y="5745687"/>
+            <a:ext cx="4294" cy="422328"/>
           </a:xfrm>
           <a:prstGeom prst="straightConnector1">
             <a:avLst/>
@@ -10365,10 +10365,10 @@
       </p:cxnSp>
       <p:sp>
         <p:nvSpPr>
-          <p:cNvPr id="24" name="TextBox 23">
-            <a:extLst>
-              <a:ext uri="{FF2B5EF4-FFF2-40B4-BE49-F238E27FC236}">
-                <a16:creationId xmlns:a16="http://schemas.microsoft.com/office/drawing/2014/main" id="{3B0DAB34-FC25-C6D9-ABF4-DF4C723DA83A}"/>
+          <p:cNvPr id="2" name="TextBox 1">
+            <a:extLst>
+              <a:ext uri="{FF2B5EF4-FFF2-40B4-BE49-F238E27FC236}">
+                <a16:creationId xmlns:a16="http://schemas.microsoft.com/office/drawing/2014/main" id="{39CEB798-1E6A-F703-E5E9-E9E94728DA23}"/>
               </a:ext>
             </a:extLst>
           </p:cNvPr>
@@ -10377,110 +10377,8 @@
         </p:nvSpPr>
         <p:spPr>
           <a:xfrm>
-            <a:off x="3199480" y="6172169"/>
-            <a:ext cx="1164101" cy="246221"/>
-          </a:xfrm>
-          <a:prstGeom prst="rect">
-            <a:avLst/>
-          </a:prstGeom>
-          <a:noFill/>
-          <a:ln w="19050">
-            <a:solidFill>
-              <a:srgbClr val="00B050"/>
-            </a:solidFill>
-          </a:ln>
-        </p:spPr>
-        <p:txBody>
-          <a:bodyPr wrap="none" rtlCol="0">
-            <a:spAutoFit/>
-          </a:bodyPr>
-          <a:lstStyle/>
-          <a:p>
-            <a:r>
-              <a:rPr lang="en-US" altLang="ko-KR" sz="1000" dirty="0">
-                <a:solidFill>
-                  <a:srgbClr val="000000"/>
-                </a:solidFill>
-                <a:latin typeface="Cascadia Mono" panose="020B0609020000020004" pitchFamily="49" charset="0"/>
-              </a:rPr>
-              <a:t>ActionTag</a:t>
-            </a:r>
-            <a:r>
-              <a:rPr lang="en-US" altLang="ko-KR" sz="1000" dirty="0">
-                <a:solidFill>
-                  <a:srgbClr val="00B0F0"/>
-                </a:solidFill>
-                <a:latin typeface="Cascadia Mono" panose="020B0609020000020004" pitchFamily="49" charset="0"/>
-              </a:rPr>
-              <a:t>&lt;'T&gt;</a:t>
-            </a:r>
-            <a:endParaRPr lang="ko-KR" altLang="en-US" sz="1000" dirty="0">
-              <a:solidFill>
-                <a:srgbClr val="00B0F0"/>
-              </a:solidFill>
-            </a:endParaRPr>
-          </a:p>
-        </p:txBody>
-      </p:sp>
-      <p:cxnSp>
-        <p:nvCxnSpPr>
-          <p:cNvPr id="25" name="직선 화살표 연결선 24">
-            <a:extLst>
-              <a:ext uri="{FF2B5EF4-FFF2-40B4-BE49-F238E27FC236}">
-                <a16:creationId xmlns:a16="http://schemas.microsoft.com/office/drawing/2014/main" id="{68EF93FD-BE1B-6677-AF44-215D7749727A}"/>
-              </a:ext>
-            </a:extLst>
-          </p:cNvPr>
-          <p:cNvCxnSpPr>
-            <a:cxnSpLocks/>
-            <a:stCxn id="77" idx="2"/>
-            <a:endCxn id="24" idx="0"/>
-          </p:cNvCxnSpPr>
-          <p:nvPr/>
-        </p:nvCxnSpPr>
-        <p:spPr>
-          <a:xfrm flipH="1">
-            <a:off x="3781531" y="5713557"/>
-            <a:ext cx="616204" cy="458612"/>
-          </a:xfrm>
-          <a:prstGeom prst="straightConnector1">
-            <a:avLst/>
-          </a:prstGeom>
-          <a:ln>
-            <a:tailEnd type="triangle"/>
-          </a:ln>
-        </p:spPr>
-        <p:style>
-          <a:lnRef idx="1">
-            <a:schemeClr val="accent1"/>
-          </a:lnRef>
-          <a:fillRef idx="0">
-            <a:schemeClr val="accent1"/>
-          </a:fillRef>
-          <a:effectRef idx="0">
-            <a:schemeClr val="accent1"/>
-          </a:effectRef>
-          <a:fontRef idx="minor">
-            <a:schemeClr val="tx1"/>
-          </a:fontRef>
-        </p:style>
-      </p:cxnSp>
-      <p:sp>
-        <p:nvSpPr>
-          <p:cNvPr id="2" name="TextBox 1">
-            <a:extLst>
-              <a:ext uri="{FF2B5EF4-FFF2-40B4-BE49-F238E27FC236}">
-                <a16:creationId xmlns:a16="http://schemas.microsoft.com/office/drawing/2014/main" id="{39CEB798-1E6A-F703-E5E9-E9E94728DA23}"/>
-              </a:ext>
-            </a:extLst>
-          </p:cNvPr>
-          <p:cNvSpPr txBox="1"/>
-          <p:nvPr/>
-        </p:nvSpPr>
-        <p:spPr>
-          <a:xfrm>
             <a:off x="4322393" y="4893656"/>
-            <a:ext cx="1314784" cy="246221"/>
+            <a:ext cx="938077" cy="246221"/>
           </a:xfrm>
           <a:prstGeom prst="rect">
             <a:avLst/>
@@ -10513,7 +10411,7 @@
           <a:p>
             <a:r>
               <a:rPr lang="en-US" altLang="ko-KR" dirty="0"/>
-              <a:t>ITagWithAddress</a:t>
+              <a:t>IBridgeTag</a:t>
             </a:r>
             <a:endParaRPr lang="ko-KR" altLang="en-US" dirty="0"/>
           </a:p>
@@ -10536,9 +10434,9 @@
           <p:nvPr/>
         </p:nvCxnSpPr>
         <p:spPr>
-          <a:xfrm>
-            <a:off x="4973360" y="4482455"/>
-            <a:ext cx="6425" cy="411201"/>
+          <a:xfrm flipH="1">
+            <a:off x="4791432" y="4482455"/>
+            <a:ext cx="181928" cy="411201"/>
           </a:xfrm>
           <a:prstGeom prst="straightConnector1">
             <a:avLst/>
@@ -10574,14 +10472,14 @@
           <p:cNvCxnSpPr>
             <a:cxnSpLocks/>
             <a:stCxn id="2" idx="2"/>
-            <a:endCxn id="77" idx="0"/>
+            <a:endCxn id="23" idx="0"/>
           </p:cNvCxnSpPr>
           <p:nvPr/>
         </p:nvCxnSpPr>
         <p:spPr>
-          <a:xfrm flipH="1">
-            <a:off x="4397735" y="5139877"/>
-            <a:ext cx="582050" cy="327459"/>
+          <a:xfrm>
+            <a:off x="4791432" y="5139877"/>
+            <a:ext cx="24575" cy="343437"/>
           </a:xfrm>
           <a:prstGeom prst="straightConnector1">
             <a:avLst/>
@@ -10674,9 +10572,9 @@
           <p:nvPr/>
         </p:nvCxnSpPr>
         <p:spPr>
-          <a:xfrm flipH="1">
-            <a:off x="2755929" y="5023045"/>
-            <a:ext cx="683045" cy="458612"/>
+          <a:xfrm>
+            <a:off x="3438974" y="5023045"/>
+            <a:ext cx="1377033" cy="460269"/>
           </a:xfrm>
           <a:prstGeom prst="straightConnector1">
             <a:avLst/>
@@ -10714,7 +10612,7 @@
         </p:nvSpPr>
         <p:spPr>
           <a:xfrm>
-            <a:off x="2173878" y="5481657"/>
+            <a:off x="4233956" y="5483314"/>
             <a:ext cx="1164101" cy="246221"/>
           </a:xfrm>
           <a:prstGeom prst="rect">
@@ -10734,7 +10632,7 @@
           <a:lstStyle/>
           <a:p>
             <a:r>
-              <a:rPr lang="en-US" altLang="ko-KR" sz="1000" dirty="0" err="1">
+              <a:rPr lang="en-US" altLang="ko-KR" sz="1000" dirty="0">
                 <a:solidFill>
                   <a:srgbClr val="000000"/>
                 </a:solidFill>
@@ -10759,6 +10657,108 @@
           </a:p>
         </p:txBody>
       </p:sp>
+      <p:sp>
+        <p:nvSpPr>
+          <p:cNvPr id="36" name="TextBox 35">
+            <a:extLst>
+              <a:ext uri="{FF2B5EF4-FFF2-40B4-BE49-F238E27FC236}">
+                <a16:creationId xmlns:a16="http://schemas.microsoft.com/office/drawing/2014/main" id="{3120CDD0-572C-7AF2-B056-C1B740C93C5D}"/>
+              </a:ext>
+            </a:extLst>
+          </p:cNvPr>
+          <p:cNvSpPr txBox="1"/>
+          <p:nvPr/>
+        </p:nvSpPr>
+        <p:spPr>
+          <a:xfrm>
+            <a:off x="4233956" y="6184487"/>
+            <a:ext cx="1164101" cy="246221"/>
+          </a:xfrm>
+          <a:prstGeom prst="rect">
+            <a:avLst/>
+          </a:prstGeom>
+          <a:noFill/>
+          <a:ln w="19050">
+            <a:solidFill>
+              <a:srgbClr val="00B050"/>
+            </a:solidFill>
+          </a:ln>
+        </p:spPr>
+        <p:txBody>
+          <a:bodyPr wrap="none" rtlCol="0">
+            <a:spAutoFit/>
+          </a:bodyPr>
+          <a:lstStyle/>
+          <a:p>
+            <a:r>
+              <a:rPr lang="en-US" altLang="ko-KR" sz="1000" dirty="0">
+                <a:solidFill>
+                  <a:srgbClr val="000000"/>
+                </a:solidFill>
+                <a:latin typeface="Cascadia Mono" panose="020B0609020000020004" pitchFamily="49" charset="0"/>
+              </a:rPr>
+              <a:t>ActionTag</a:t>
+            </a:r>
+            <a:r>
+              <a:rPr lang="en-US" altLang="ko-KR" sz="1000" dirty="0">
+                <a:solidFill>
+                  <a:srgbClr val="00B0F0"/>
+                </a:solidFill>
+                <a:latin typeface="Cascadia Mono" panose="020B0609020000020004" pitchFamily="49" charset="0"/>
+              </a:rPr>
+              <a:t>&lt;'T&gt;</a:t>
+            </a:r>
+            <a:endParaRPr lang="ko-KR" altLang="en-US" sz="1000" dirty="0">
+              <a:solidFill>
+                <a:srgbClr val="00B0F0"/>
+              </a:solidFill>
+            </a:endParaRPr>
+          </a:p>
+        </p:txBody>
+      </p:sp>
+      <p:cxnSp>
+        <p:nvCxnSpPr>
+          <p:cNvPr id="38" name="직선 화살표 연결선 37">
+            <a:extLst>
+              <a:ext uri="{FF2B5EF4-FFF2-40B4-BE49-F238E27FC236}">
+                <a16:creationId xmlns:a16="http://schemas.microsoft.com/office/drawing/2014/main" id="{72A80515-FF62-42CB-B199-8D561C63008B}"/>
+              </a:ext>
+            </a:extLst>
+          </p:cNvPr>
+          <p:cNvCxnSpPr>
+            <a:cxnSpLocks/>
+            <a:stCxn id="23" idx="2"/>
+            <a:endCxn id="36" idx="0"/>
+          </p:cNvCxnSpPr>
+          <p:nvPr/>
+        </p:nvCxnSpPr>
+        <p:spPr>
+          <a:xfrm>
+            <a:off x="4816007" y="5729535"/>
+            <a:ext cx="0" cy="454952"/>
+          </a:xfrm>
+          <a:prstGeom prst="straightConnector1">
+            <a:avLst/>
+          </a:prstGeom>
+          <a:ln>
+            <a:tailEnd type="triangle"/>
+          </a:ln>
+        </p:spPr>
+        <p:style>
+          <a:lnRef idx="1">
+            <a:schemeClr val="accent1"/>
+          </a:lnRef>
+          <a:fillRef idx="0">
+            <a:schemeClr val="accent1"/>
+          </a:fillRef>
+          <a:effectRef idx="0">
+            <a:schemeClr val="accent1"/>
+          </a:effectRef>
+          <a:fontRef idx="minor">
+            <a:schemeClr val="tx1"/>
+          </a:fontRef>
+        </p:style>
+      </p:cxnSp>
     </p:spTree>
     <p:extLst>
       <p:ext uri="{BB962C8B-B14F-4D97-AF65-F5344CB8AC3E}">

</xml_diff>

<commit_message>
- Tag 정리 중.
</commit_message>
<xml_diff>
--- a/DsDotNet/src/Doc/Hierachies.pptx
+++ b/DsDotNet/src/Doc/Hierachies.pptx
@@ -9219,51 +9219,6 @@
       </p:cxnSp>
       <p:cxnSp>
         <p:nvCxnSpPr>
-          <p:cNvPr id="91" name="연결선: 구부러짐 90">
-            <a:extLst>
-              <a:ext uri="{FF2B5EF4-FFF2-40B4-BE49-F238E27FC236}">
-                <a16:creationId xmlns:a16="http://schemas.microsoft.com/office/drawing/2014/main" id="{C2AFC6C2-2C28-9AA2-7699-1B0593C82058}"/>
-              </a:ext>
-            </a:extLst>
-          </p:cNvPr>
-          <p:cNvCxnSpPr>
-            <a:cxnSpLocks/>
-            <a:stCxn id="9" idx="2"/>
-            <a:endCxn id="68" idx="0"/>
-          </p:cNvCxnSpPr>
-          <p:nvPr/>
-        </p:nvCxnSpPr>
-        <p:spPr>
-          <a:xfrm rot="5400000">
-            <a:off x="3454609" y="1463988"/>
-            <a:ext cx="3297202" cy="3328471"/>
-          </a:xfrm>
-          <a:prstGeom prst="curvedConnector3">
-            <a:avLst>
-              <a:gd name="adj1" fmla="val 50000"/>
-            </a:avLst>
-          </a:prstGeom>
-          <a:ln>
-            <a:tailEnd type="triangle"/>
-          </a:ln>
-        </p:spPr>
-        <p:style>
-          <a:lnRef idx="1">
-            <a:schemeClr val="accent1"/>
-          </a:lnRef>
-          <a:fillRef idx="0">
-            <a:schemeClr val="accent1"/>
-          </a:fillRef>
-          <a:effectRef idx="0">
-            <a:schemeClr val="accent1"/>
-          </a:effectRef>
-          <a:fontRef idx="minor">
-            <a:schemeClr val="tx1"/>
-          </a:fontRef>
-        </p:style>
-      </p:cxnSp>
-      <p:cxnSp>
-        <p:nvCxnSpPr>
           <p:cNvPr id="93" name="직선 화살표 연결선 92">
             <a:extLst>
               <a:ext uri="{FF2B5EF4-FFF2-40B4-BE49-F238E27FC236}">
@@ -10850,6 +10805,92 @@
           </a:p>
         </p:txBody>
       </p:sp>
+      <p:cxnSp>
+        <p:nvCxnSpPr>
+          <p:cNvPr id="18" name="직선 화살표 연결선 17">
+            <a:extLst>
+              <a:ext uri="{FF2B5EF4-FFF2-40B4-BE49-F238E27FC236}">
+                <a16:creationId xmlns:a16="http://schemas.microsoft.com/office/drawing/2014/main" id="{B59F0643-D348-751B-682A-6DFFA5F8730F}"/>
+              </a:ext>
+            </a:extLst>
+          </p:cNvPr>
+          <p:cNvCxnSpPr>
+            <a:cxnSpLocks/>
+            <a:stCxn id="9" idx="2"/>
+            <a:endCxn id="28" idx="0"/>
+          </p:cNvCxnSpPr>
+          <p:nvPr/>
+        </p:nvCxnSpPr>
+        <p:spPr>
+          <a:xfrm flipH="1">
+            <a:off x="3273111" y="1479622"/>
+            <a:ext cx="3494334" cy="2457020"/>
+          </a:xfrm>
+          <a:prstGeom prst="straightConnector1">
+            <a:avLst/>
+          </a:prstGeom>
+          <a:ln>
+            <a:tailEnd type="triangle"/>
+          </a:ln>
+        </p:spPr>
+        <p:style>
+          <a:lnRef idx="1">
+            <a:schemeClr val="accent1"/>
+          </a:lnRef>
+          <a:fillRef idx="0">
+            <a:schemeClr val="accent1"/>
+          </a:fillRef>
+          <a:effectRef idx="0">
+            <a:schemeClr val="accent1"/>
+          </a:effectRef>
+          <a:fontRef idx="minor">
+            <a:schemeClr val="tx1"/>
+          </a:fontRef>
+        </p:style>
+      </p:cxnSp>
+      <p:cxnSp>
+        <p:nvCxnSpPr>
+          <p:cNvPr id="25" name="직선 화살표 연결선 24">
+            <a:extLst>
+              <a:ext uri="{FF2B5EF4-FFF2-40B4-BE49-F238E27FC236}">
+                <a16:creationId xmlns:a16="http://schemas.microsoft.com/office/drawing/2014/main" id="{EABB8326-5794-B1A8-DC72-B172DE7EDD1E}"/>
+              </a:ext>
+            </a:extLst>
+          </p:cNvPr>
+          <p:cNvCxnSpPr>
+            <a:cxnSpLocks/>
+            <a:stCxn id="9" idx="2"/>
+            <a:endCxn id="68" idx="0"/>
+          </p:cNvCxnSpPr>
+          <p:nvPr/>
+        </p:nvCxnSpPr>
+        <p:spPr>
+          <a:xfrm flipH="1">
+            <a:off x="3438974" y="1479622"/>
+            <a:ext cx="3328471" cy="3297202"/>
+          </a:xfrm>
+          <a:prstGeom prst="straightConnector1">
+            <a:avLst/>
+          </a:prstGeom>
+          <a:ln>
+            <a:tailEnd type="triangle"/>
+          </a:ln>
+        </p:spPr>
+        <p:style>
+          <a:lnRef idx="1">
+            <a:schemeClr val="accent1"/>
+          </a:lnRef>
+          <a:fillRef idx="0">
+            <a:schemeClr val="accent1"/>
+          </a:fillRef>
+          <a:effectRef idx="0">
+            <a:schemeClr val="accent1"/>
+          </a:effectRef>
+          <a:fontRef idx="minor">
+            <a:schemeClr val="tx1"/>
+          </a:fontRef>
+        </p:style>
+      </p:cxnSp>
     </p:spTree>
     <p:extLst>
       <p:ext uri="{BB962C8B-B14F-4D97-AF65-F5344CB8AC3E}">

</xml_diff>

<commit_message>
- Tag 정리 중: rename: BridgeTag -> Tag
</commit_message>
<xml_diff>
--- a/DsDotNet/src/Doc/Hierachies.pptx
+++ b/DsDotNet/src/Doc/Hierachies.pptx
@@ -7540,7 +7540,7 @@
           <a:lstStyle/>
           <a:p>
             <a:pPr algn="ctr"/>
-            <a:endParaRPr lang="ko-KR" altLang="en-US"/>
+            <a:endParaRPr lang="ko-KR" altLang="en-US" dirty="0"/>
           </a:p>
         </p:txBody>
       </p:sp>
@@ -7612,7 +7612,7 @@
         </p:nvSpPr>
         <p:spPr>
           <a:xfrm>
-            <a:off x="3459656" y="1431882"/>
+            <a:off x="2109881" y="1455896"/>
             <a:ext cx="862737" cy="246221"/>
           </a:xfrm>
           <a:prstGeom prst="rect">
@@ -7666,7 +7666,7 @@
         </p:nvSpPr>
         <p:spPr>
           <a:xfrm>
-            <a:off x="5544995" y="1233401"/>
+            <a:off x="5558063" y="1472828"/>
             <a:ext cx="2444900" cy="246221"/>
           </a:xfrm>
           <a:prstGeom prst="rect">
@@ -7767,7 +7767,7 @@
         </p:nvSpPr>
         <p:spPr>
           <a:xfrm>
-            <a:off x="1467809" y="2648134"/>
+            <a:off x="295773" y="2825975"/>
             <a:ext cx="1164101" cy="246221"/>
           </a:xfrm>
           <a:prstGeom prst="rect">
@@ -7851,49 +7851,6 @@
       </p:cxnSp>
       <p:cxnSp>
         <p:nvCxnSpPr>
-          <p:cNvPr id="14" name="직선 화살표 연결선 13">
-            <a:extLst>
-              <a:ext uri="{FF2B5EF4-FFF2-40B4-BE49-F238E27FC236}">
-                <a16:creationId xmlns:a16="http://schemas.microsoft.com/office/drawing/2014/main" id="{F92CEBBB-852B-0194-E311-D52F076265EE}"/>
-              </a:ext>
-            </a:extLst>
-          </p:cNvPr>
-          <p:cNvCxnSpPr>
-            <a:cxnSpLocks/>
-            <a:stCxn id="11" idx="2"/>
-            <a:endCxn id="10" idx="0"/>
-          </p:cNvCxnSpPr>
-          <p:nvPr/>
-        </p:nvCxnSpPr>
-        <p:spPr>
-          <a:xfrm>
-            <a:off x="2049860" y="2894355"/>
-            <a:ext cx="7397480" cy="451104"/>
-          </a:xfrm>
-          <a:prstGeom prst="straightConnector1">
-            <a:avLst/>
-          </a:prstGeom>
-          <a:ln>
-            <a:tailEnd type="triangle"/>
-          </a:ln>
-        </p:spPr>
-        <p:style>
-          <a:lnRef idx="1">
-            <a:schemeClr val="accent1"/>
-          </a:lnRef>
-          <a:fillRef idx="0">
-            <a:schemeClr val="accent1"/>
-          </a:fillRef>
-          <a:effectRef idx="0">
-            <a:schemeClr val="accent1"/>
-          </a:effectRef>
-          <a:fontRef idx="minor">
-            <a:schemeClr val="tx1"/>
-          </a:fontRef>
-        </p:style>
-      </p:cxnSp>
-      <p:cxnSp>
-        <p:nvCxnSpPr>
           <p:cNvPr id="17" name="직선 화살표 연결선 16">
             <a:extLst>
               <a:ext uri="{FF2B5EF4-FFF2-40B4-BE49-F238E27FC236}">
@@ -7910,8 +7867,8 @@
         </p:nvCxnSpPr>
         <p:spPr>
           <a:xfrm flipH="1">
-            <a:off x="2049860" y="1678103"/>
-            <a:ext cx="1841165" cy="970031"/>
+            <a:off x="877824" y="1702117"/>
+            <a:ext cx="1663426" cy="1123858"/>
           </a:xfrm>
           <a:prstGeom prst="straightConnector1">
             <a:avLst/>
@@ -7946,15 +7903,15 @@
           </p:cNvPr>
           <p:cNvCxnSpPr>
             <a:cxnSpLocks/>
-            <a:stCxn id="8" idx="2"/>
+            <a:stCxn id="77" idx="2"/>
             <a:endCxn id="6" idx="0"/>
           </p:cNvCxnSpPr>
           <p:nvPr/>
         </p:nvCxnSpPr>
         <p:spPr>
-          <a:xfrm>
-            <a:off x="3891025" y="1678103"/>
-            <a:ext cx="5539446" cy="832719"/>
+          <a:xfrm flipH="1">
+            <a:off x="9430471" y="2060019"/>
+            <a:ext cx="1681516" cy="450803"/>
           </a:xfrm>
           <a:prstGeom prst="straightConnector1">
             <a:avLst/>
@@ -8037,108 +7994,6 @@
           </a:p>
         </p:txBody>
       </p:sp>
-      <p:sp>
-        <p:nvSpPr>
-          <p:cNvPr id="28" name="TextBox 27">
-            <a:extLst>
-              <a:ext uri="{FF2B5EF4-FFF2-40B4-BE49-F238E27FC236}">
-                <a16:creationId xmlns:a16="http://schemas.microsoft.com/office/drawing/2014/main" id="{AAEF26E9-2E6A-5264-53A4-30B28BE263F9}"/>
-              </a:ext>
-            </a:extLst>
-          </p:cNvPr>
-          <p:cNvSpPr txBox="1"/>
-          <p:nvPr/>
-        </p:nvSpPr>
-        <p:spPr>
-          <a:xfrm>
-            <a:off x="2682985" y="3946509"/>
-            <a:ext cx="1390124" cy="246221"/>
-          </a:xfrm>
-          <a:prstGeom prst="rect">
-            <a:avLst/>
-          </a:prstGeom>
-          <a:noFill/>
-          <a:ln w="19050">
-            <a:solidFill>
-              <a:srgbClr val="00B050"/>
-            </a:solidFill>
-          </a:ln>
-        </p:spPr>
-        <p:txBody>
-          <a:bodyPr wrap="none" rtlCol="0">
-            <a:spAutoFit/>
-          </a:bodyPr>
-          <a:lstStyle/>
-          <a:p>
-            <a:r>
-              <a:rPr lang="en-US" altLang="ko-KR" sz="1000" dirty="0">
-                <a:solidFill>
-                  <a:srgbClr val="000000"/>
-                </a:solidFill>
-                <a:latin typeface="Cascadia Mono" panose="020B0609020000020004" pitchFamily="49" charset="0"/>
-              </a:rPr>
-              <a:t>VariableBase</a:t>
-            </a:r>
-            <a:r>
-              <a:rPr lang="en-US" altLang="ko-KR" sz="1000" dirty="0">
-                <a:solidFill>
-                  <a:srgbClr val="00B0F0"/>
-                </a:solidFill>
-                <a:latin typeface="Cascadia Mono" panose="020B0609020000020004" pitchFamily="49" charset="0"/>
-              </a:rPr>
-              <a:t>&lt;'T&gt;</a:t>
-            </a:r>
-            <a:endParaRPr lang="ko-KR" altLang="en-US" sz="1000" dirty="0">
-              <a:solidFill>
-                <a:srgbClr val="00B0F0"/>
-              </a:solidFill>
-            </a:endParaRPr>
-          </a:p>
-        </p:txBody>
-      </p:sp>
-      <p:cxnSp>
-        <p:nvCxnSpPr>
-          <p:cNvPr id="30" name="직선 화살표 연결선 29">
-            <a:extLst>
-              <a:ext uri="{FF2B5EF4-FFF2-40B4-BE49-F238E27FC236}">
-                <a16:creationId xmlns:a16="http://schemas.microsoft.com/office/drawing/2014/main" id="{382EC6D5-E083-CD62-3041-DBBC3126200E}"/>
-              </a:ext>
-            </a:extLst>
-          </p:cNvPr>
-          <p:cNvCxnSpPr>
-            <a:cxnSpLocks/>
-            <a:stCxn id="28" idx="2"/>
-            <a:endCxn id="27" idx="0"/>
-          </p:cNvCxnSpPr>
-          <p:nvPr/>
-        </p:nvCxnSpPr>
-        <p:spPr>
-          <a:xfrm>
-            <a:off x="3378047" y="4192730"/>
-            <a:ext cx="6069293" cy="1089168"/>
-          </a:xfrm>
-          <a:prstGeom prst="straightConnector1">
-            <a:avLst/>
-          </a:prstGeom>
-          <a:ln>
-            <a:tailEnd type="triangle"/>
-          </a:ln>
-        </p:spPr>
-        <p:style>
-          <a:lnRef idx="1">
-            <a:schemeClr val="accent1"/>
-          </a:lnRef>
-          <a:fillRef idx="0">
-            <a:schemeClr val="accent1"/>
-          </a:fillRef>
-          <a:effectRef idx="0">
-            <a:schemeClr val="accent1"/>
-          </a:effectRef>
-          <a:fontRef idx="minor">
-            <a:schemeClr val="tx1"/>
-          </a:fontRef>
-        </p:style>
-      </p:cxnSp>
       <p:cxnSp>
         <p:nvCxnSpPr>
           <p:cNvPr id="31" name="직선 화살표 연결선 30">
@@ -8200,8 +8055,8 @@
         </p:nvCxnSpPr>
         <p:spPr>
           <a:xfrm>
-            <a:off x="6767445" y="1479622"/>
-            <a:ext cx="2679895" cy="3802276"/>
+            <a:off x="6780513" y="1719049"/>
+            <a:ext cx="2666827" cy="3562849"/>
           </a:xfrm>
           <a:prstGeom prst="straightConnector1">
             <a:avLst/>
@@ -8297,8 +8152,8 @@
         </p:nvCxnSpPr>
         <p:spPr>
           <a:xfrm>
-            <a:off x="6767445" y="1479622"/>
-            <a:ext cx="2663026" cy="1031200"/>
+            <a:off x="6780513" y="1719049"/>
+            <a:ext cx="2649958" cy="791773"/>
           </a:xfrm>
           <a:prstGeom prst="straightConnector1">
             <a:avLst/>
@@ -8395,7 +8250,7 @@
         <p:spPr>
           <a:xfrm>
             <a:off x="6767445" y="964303"/>
-            <a:ext cx="0" cy="269098"/>
+            <a:ext cx="13068" cy="508525"/>
           </a:xfrm>
           <a:prstGeom prst="straightConnector1">
             <a:avLst/>
@@ -8669,7 +8524,7 @@
         </p:nvSpPr>
         <p:spPr>
           <a:xfrm>
-            <a:off x="2932264" y="4776824"/>
+            <a:off x="4379605" y="4802944"/>
             <a:ext cx="1013419" cy="246221"/>
           </a:xfrm>
           <a:prstGeom prst="rect">
@@ -8728,7 +8583,7 @@
         </p:nvSpPr>
         <p:spPr>
           <a:xfrm>
-            <a:off x="600093" y="5289655"/>
+            <a:off x="419432" y="5289655"/>
             <a:ext cx="1088760" cy="246221"/>
           </a:xfrm>
           <a:prstGeom prst="rect">
@@ -8791,7 +8646,7 @@
         </p:nvCxnSpPr>
         <p:spPr>
           <a:xfrm>
-            <a:off x="1144473" y="4757322"/>
+            <a:off x="963812" y="4757322"/>
             <a:ext cx="0" cy="532333"/>
           </a:xfrm>
           <a:prstGeom prst="straightConnector1">
@@ -8830,7 +8685,7 @@
         </p:nvSpPr>
         <p:spPr>
           <a:xfrm>
-            <a:off x="449411" y="4511101"/>
+            <a:off x="268750" y="4511101"/>
             <a:ext cx="1390124" cy="246221"/>
           </a:xfrm>
           <a:prstGeom prst="rect">
@@ -8893,8 +8748,8 @@
         </p:nvCxnSpPr>
         <p:spPr>
           <a:xfrm flipH="1">
-            <a:off x="1144473" y="3402893"/>
-            <a:ext cx="2454127" cy="1108208"/>
+            <a:off x="963812" y="3047231"/>
+            <a:ext cx="1712573" cy="1463870"/>
           </a:xfrm>
           <a:prstGeom prst="straightConnector1">
             <a:avLst/>
@@ -8932,7 +8787,7 @@
         </p:nvSpPr>
         <p:spPr>
           <a:xfrm>
-            <a:off x="2715185" y="3156672"/>
+            <a:off x="1792970" y="2801010"/>
             <a:ext cx="1766830" cy="246221"/>
           </a:xfrm>
           <a:prstGeom prst="rect">
@@ -8994,9 +8849,9 @@
           <p:nvPr/>
         </p:nvCxnSpPr>
         <p:spPr>
-          <a:xfrm flipH="1">
-            <a:off x="3438974" y="3402893"/>
-            <a:ext cx="159626" cy="1373931"/>
+          <a:xfrm>
+            <a:off x="2676385" y="3047231"/>
+            <a:ext cx="2209930" cy="1755713"/>
           </a:xfrm>
           <a:prstGeom prst="straightConnector1">
             <a:avLst/>
@@ -9034,7 +8889,7 @@
         </p:nvSpPr>
         <p:spPr>
           <a:xfrm>
-            <a:off x="348506" y="2663785"/>
+            <a:off x="3934520" y="2798685"/>
             <a:ext cx="787395" cy="246221"/>
           </a:xfrm>
           <a:prstGeom prst="rect">
@@ -9091,8 +8946,8 @@
         </p:nvCxnSpPr>
         <p:spPr>
           <a:xfrm>
-            <a:off x="742204" y="2910006"/>
-            <a:ext cx="2696770" cy="1866818"/>
+            <a:off x="4328218" y="3044906"/>
+            <a:ext cx="558097" cy="1758038"/>
           </a:xfrm>
           <a:prstGeom prst="straightConnector1">
             <a:avLst/>
@@ -9132,9 +8987,9 @@
           <p:nvPr/>
         </p:nvCxnSpPr>
         <p:spPr>
-          <a:xfrm flipH="1">
-            <a:off x="1144473" y="2894355"/>
-            <a:ext cx="905387" cy="1616746"/>
+          <a:xfrm>
+            <a:off x="877824" y="3072196"/>
+            <a:ext cx="85988" cy="1438905"/>
           </a:xfrm>
           <a:prstGeom prst="straightConnector1">
             <a:avLst/>
@@ -9176,7 +9031,7 @@
         <p:spPr>
           <a:xfrm>
             <a:off x="1147812" y="1685182"/>
-            <a:ext cx="2450788" cy="1471490"/>
+            <a:ext cx="1528573" cy="1115828"/>
           </a:xfrm>
           <a:prstGeom prst="straightConnector1">
             <a:avLst/>
@@ -9314,9 +9169,9 @@
           <p:nvPr/>
         </p:nvCxnSpPr>
         <p:spPr>
-          <a:xfrm>
-            <a:off x="1147812" y="1685182"/>
-            <a:ext cx="902048" cy="962952"/>
+          <a:xfrm flipH="1">
+            <a:off x="877824" y="1685182"/>
+            <a:ext cx="269988" cy="1140793"/>
           </a:xfrm>
           <a:prstGeom prst="straightConnector1">
             <a:avLst/>
@@ -9354,7 +9209,7 @@
         </p:nvSpPr>
         <p:spPr>
           <a:xfrm>
-            <a:off x="2461592" y="1435333"/>
+            <a:off x="3811045" y="1455897"/>
             <a:ext cx="486030" cy="246221"/>
           </a:xfrm>
           <a:prstGeom prst="rect">
@@ -9411,9 +9266,9 @@
           <p:nvPr/>
         </p:nvCxnSpPr>
         <p:spPr>
-          <a:xfrm flipH="1">
-            <a:off x="742204" y="1681554"/>
-            <a:ext cx="1962403" cy="982231"/>
+          <a:xfrm>
+            <a:off x="4054060" y="1702118"/>
+            <a:ext cx="274158" cy="1096567"/>
           </a:xfrm>
           <a:prstGeom prst="straightConnector1">
             <a:avLst/>
@@ -9454,9 +9309,9 @@
           <p:nvPr/>
         </p:nvCxnSpPr>
         <p:spPr>
-          <a:xfrm flipH="1">
-            <a:off x="742204" y="1685182"/>
-            <a:ext cx="405608" cy="978603"/>
+          <a:xfrm>
+            <a:off x="1147812" y="1685182"/>
+            <a:ext cx="3180406" cy="1113503"/>
           </a:xfrm>
           <a:prstGeom prst="straightConnector1">
             <a:avLst/>
@@ -9499,7 +9354,7 @@
         <p:spPr>
           <a:xfrm>
             <a:off x="2451492" y="964303"/>
-            <a:ext cx="253115" cy="471030"/>
+            <a:ext cx="1602568" cy="491594"/>
           </a:xfrm>
           <a:prstGeom prst="straightConnector1">
             <a:avLst/>
@@ -9542,7 +9397,7 @@
         <p:spPr>
           <a:xfrm>
             <a:off x="2451492" y="964303"/>
-            <a:ext cx="1439533" cy="467579"/>
+            <a:ext cx="89758" cy="491593"/>
           </a:xfrm>
           <a:prstGeom prst="straightConnector1">
             <a:avLst/>
@@ -9663,51 +9518,6 @@
           </a:fontRef>
         </p:style>
       </p:cxnSp>
-      <p:cxnSp>
-        <p:nvCxnSpPr>
-          <p:cNvPr id="153" name="연결선: 구부러짐 152">
-            <a:extLst>
-              <a:ext uri="{FF2B5EF4-FFF2-40B4-BE49-F238E27FC236}">
-                <a16:creationId xmlns:a16="http://schemas.microsoft.com/office/drawing/2014/main" id="{67455454-DB7C-33CA-D163-7606D211E37B}"/>
-              </a:ext>
-            </a:extLst>
-          </p:cNvPr>
-          <p:cNvCxnSpPr>
-            <a:cxnSpLocks/>
-            <a:stCxn id="82" idx="2"/>
-            <a:endCxn id="28" idx="0"/>
-          </p:cNvCxnSpPr>
-          <p:nvPr/>
-        </p:nvCxnSpPr>
-        <p:spPr>
-          <a:xfrm rot="5400000">
-            <a:off x="3216516" y="3564425"/>
-            <a:ext cx="543616" cy="220553"/>
-          </a:xfrm>
-          <a:prstGeom prst="curvedConnector3">
-            <a:avLst>
-              <a:gd name="adj1" fmla="val 50000"/>
-            </a:avLst>
-          </a:prstGeom>
-          <a:ln>
-            <a:tailEnd type="triangle"/>
-          </a:ln>
-        </p:spPr>
-        <p:style>
-          <a:lnRef idx="1">
-            <a:schemeClr val="accent1"/>
-          </a:lnRef>
-          <a:fillRef idx="0">
-            <a:schemeClr val="accent1"/>
-          </a:fillRef>
-          <a:effectRef idx="0">
-            <a:schemeClr val="accent1"/>
-          </a:effectRef>
-          <a:fontRef idx="minor">
-            <a:schemeClr val="tx1"/>
-          </a:fontRef>
-        </p:style>
-      </p:cxnSp>
       <p:sp>
         <p:nvSpPr>
           <p:cNvPr id="221" name="TextBox 220">
@@ -9722,7 +9532,7 @@
         </p:nvSpPr>
         <p:spPr>
           <a:xfrm>
-            <a:off x="5875535" y="4192730"/>
+            <a:off x="5481184" y="2722677"/>
             <a:ext cx="1239442" cy="246221"/>
           </a:xfrm>
           <a:prstGeom prst="rect">
@@ -9776,7 +9586,7 @@
         </p:nvSpPr>
         <p:spPr>
           <a:xfrm>
-            <a:off x="6643262" y="5272030"/>
+            <a:off x="6248911" y="3801977"/>
             <a:ext cx="1465466" cy="246221"/>
           </a:xfrm>
           <a:prstGeom prst="rect">
@@ -9839,7 +9649,7 @@
         </p:nvCxnSpPr>
         <p:spPr>
           <a:xfrm>
-            <a:off x="6495256" y="4438951"/>
+            <a:off x="6100905" y="2968898"/>
             <a:ext cx="880739" cy="833079"/>
           </a:xfrm>
           <a:prstGeom prst="straightConnector1">
@@ -9882,94 +9692,8 @@
         </p:nvCxnSpPr>
         <p:spPr>
           <a:xfrm>
-            <a:off x="6767445" y="1479622"/>
-            <a:ext cx="608550" cy="3792408"/>
-          </a:xfrm>
-          <a:prstGeom prst="straightConnector1">
-            <a:avLst/>
-          </a:prstGeom>
-          <a:ln>
-            <a:tailEnd type="triangle"/>
-          </a:ln>
-        </p:spPr>
-        <p:style>
-          <a:lnRef idx="1">
-            <a:schemeClr val="accent1"/>
-          </a:lnRef>
-          <a:fillRef idx="0">
-            <a:schemeClr val="accent1"/>
-          </a:fillRef>
-          <a:effectRef idx="0">
-            <a:schemeClr val="accent1"/>
-          </a:effectRef>
-          <a:fontRef idx="minor">
-            <a:schemeClr val="tx1"/>
-          </a:fontRef>
-        </p:style>
-      </p:cxnSp>
-      <p:cxnSp>
-        <p:nvCxnSpPr>
-          <p:cNvPr id="231" name="직선 화살표 연결선 230">
-            <a:extLst>
-              <a:ext uri="{FF2B5EF4-FFF2-40B4-BE49-F238E27FC236}">
-                <a16:creationId xmlns:a16="http://schemas.microsoft.com/office/drawing/2014/main" id="{7BA9A8B8-063F-94C6-47B8-6CAF9154A881}"/>
-              </a:ext>
-            </a:extLst>
-          </p:cNvPr>
-          <p:cNvCxnSpPr>
-            <a:cxnSpLocks/>
-            <a:stCxn id="11" idx="2"/>
-            <a:endCxn id="28" idx="0"/>
-          </p:cNvCxnSpPr>
-          <p:nvPr/>
-        </p:nvCxnSpPr>
-        <p:spPr>
-          <a:xfrm>
-            <a:off x="2049860" y="2894355"/>
-            <a:ext cx="1328187" cy="1052154"/>
-          </a:xfrm>
-          <a:prstGeom prst="straightConnector1">
-            <a:avLst/>
-          </a:prstGeom>
-          <a:ln>
-            <a:tailEnd type="triangle"/>
-          </a:ln>
-        </p:spPr>
-        <p:style>
-          <a:lnRef idx="1">
-            <a:schemeClr val="accent1"/>
-          </a:lnRef>
-          <a:fillRef idx="0">
-            <a:schemeClr val="accent1"/>
-          </a:fillRef>
-          <a:effectRef idx="0">
-            <a:schemeClr val="accent1"/>
-          </a:effectRef>
-          <a:fontRef idx="minor">
-            <a:schemeClr val="tx1"/>
-          </a:fontRef>
-        </p:style>
-      </p:cxnSp>
-      <p:cxnSp>
-        <p:nvCxnSpPr>
-          <p:cNvPr id="5" name="직선 화살표 연결선 4">
-            <a:extLst>
-              <a:ext uri="{FF2B5EF4-FFF2-40B4-BE49-F238E27FC236}">
-                <a16:creationId xmlns:a16="http://schemas.microsoft.com/office/drawing/2014/main" id="{F68D8CD6-4A17-924D-2788-02FD9D4DA053}"/>
-              </a:ext>
-            </a:extLst>
-          </p:cNvPr>
-          <p:cNvCxnSpPr>
-            <a:cxnSpLocks/>
-            <a:stCxn id="28" idx="2"/>
-            <a:endCxn id="71" idx="0"/>
-          </p:cNvCxnSpPr>
-          <p:nvPr/>
-        </p:nvCxnSpPr>
-        <p:spPr>
-          <a:xfrm flipH="1">
-            <a:off x="1144473" y="4192730"/>
-            <a:ext cx="2233574" cy="1096925"/>
+            <a:off x="6780513" y="1719049"/>
+            <a:ext cx="201131" cy="2082928"/>
           </a:xfrm>
           <a:prstGeom prst="straightConnector1">
             <a:avLst/>
@@ -10201,7 +9925,7 @@
           <a:lstStyle/>
           <a:p>
             <a:r>
-              <a:rPr lang="en-US" altLang="ko-KR" sz="1000" dirty="0" err="1">
+              <a:rPr lang="en-US" altLang="ko-KR" sz="1000" dirty="0">
                 <a:solidFill>
                   <a:srgbClr val="000000"/>
                 </a:solidFill>
@@ -10244,105 +9968,8 @@
         </p:nvCxnSpPr>
         <p:spPr>
           <a:xfrm>
-            <a:off x="1144473" y="5535876"/>
-            <a:ext cx="1884476" cy="632139"/>
-          </a:xfrm>
-          <a:prstGeom prst="straightConnector1">
-            <a:avLst/>
-          </a:prstGeom>
-          <a:ln>
-            <a:tailEnd type="triangle"/>
-          </a:ln>
-        </p:spPr>
-        <p:style>
-          <a:lnRef idx="1">
-            <a:schemeClr val="accent1"/>
-          </a:lnRef>
-          <a:fillRef idx="0">
-            <a:schemeClr val="accent1"/>
-          </a:fillRef>
-          <a:effectRef idx="0">
-            <a:schemeClr val="accent1"/>
-          </a:effectRef>
-          <a:fontRef idx="minor">
-            <a:schemeClr val="tx1"/>
-          </a:fontRef>
-        </p:style>
-      </p:cxnSp>
-      <p:sp>
-        <p:nvSpPr>
-          <p:cNvPr id="2" name="TextBox 1">
-            <a:extLst>
-              <a:ext uri="{FF2B5EF4-FFF2-40B4-BE49-F238E27FC236}">
-                <a16:creationId xmlns:a16="http://schemas.microsoft.com/office/drawing/2014/main" id="{39CEB798-1E6A-F703-E5E9-E9E94728DA23}"/>
-              </a:ext>
-            </a:extLst>
-          </p:cNvPr>
-          <p:cNvSpPr txBox="1"/>
-          <p:nvPr/>
-        </p:nvSpPr>
-        <p:spPr>
-          <a:xfrm>
-            <a:off x="4322393" y="4893656"/>
-            <a:ext cx="938077" cy="246221"/>
-          </a:xfrm>
-          <a:prstGeom prst="rect">
-            <a:avLst/>
-          </a:prstGeom>
-          <a:noFill/>
-          <a:ln>
-            <a:solidFill>
-              <a:schemeClr val="tx1"/>
-            </a:solidFill>
-            <a:prstDash val="dash"/>
-          </a:ln>
-        </p:spPr>
-        <p:txBody>
-          <a:bodyPr wrap="none" rtlCol="0">
-            <a:spAutoFit/>
-          </a:bodyPr>
-          <a:lstStyle>
-            <a:defPPr>
-              <a:defRPr lang="ko-KR"/>
-            </a:defPPr>
-            <a:lvl1pPr>
-              <a:defRPr sz="1000">
-                <a:solidFill>
-                  <a:srgbClr val="000000"/>
-                </a:solidFill>
-                <a:latin typeface="Cascadia Mono" panose="020B0609020000020004" pitchFamily="49" charset="0"/>
-              </a:defRPr>
-            </a:lvl1pPr>
-          </a:lstStyle>
-          <a:p>
-            <a:r>
-              <a:rPr lang="en-US" altLang="ko-KR" dirty="0"/>
-              <a:t>IBridgeTag</a:t>
-            </a:r>
-            <a:endParaRPr lang="ko-KR" altLang="en-US" dirty="0"/>
-          </a:p>
-        </p:txBody>
-      </p:sp>
-      <p:cxnSp>
-        <p:nvCxnSpPr>
-          <p:cNvPr id="7" name="직선 화살표 연결선 6">
-            <a:extLst>
-              <a:ext uri="{FF2B5EF4-FFF2-40B4-BE49-F238E27FC236}">
-                <a16:creationId xmlns:a16="http://schemas.microsoft.com/office/drawing/2014/main" id="{6F4E375B-F4B6-6561-FCBB-B7EC76C48AA7}"/>
-              </a:ext>
-            </a:extLst>
-          </p:cNvPr>
-          <p:cNvCxnSpPr>
-            <a:cxnSpLocks/>
-            <a:stCxn id="33" idx="2"/>
-            <a:endCxn id="2" idx="0"/>
-          </p:cNvCxnSpPr>
-          <p:nvPr/>
-        </p:nvCxnSpPr>
-        <p:spPr>
-          <a:xfrm flipH="1">
-            <a:off x="4791432" y="4482455"/>
-            <a:ext cx="181928" cy="411201"/>
+            <a:off x="963812" y="5535876"/>
+            <a:ext cx="2065137" cy="632139"/>
           </a:xfrm>
           <a:prstGeom prst="straightConnector1">
             <a:avLst/>
@@ -10368,24 +9995,24 @@
       </p:cxnSp>
       <p:cxnSp>
         <p:nvCxnSpPr>
-          <p:cNvPr id="12" name="직선 화살표 연결선 11">
-            <a:extLst>
-              <a:ext uri="{FF2B5EF4-FFF2-40B4-BE49-F238E27FC236}">
-                <a16:creationId xmlns:a16="http://schemas.microsoft.com/office/drawing/2014/main" id="{466E37EF-AD93-A1E4-E728-094B9FA5A2B0}"/>
+          <p:cNvPr id="22" name="직선 화살표 연결선 21">
+            <a:extLst>
+              <a:ext uri="{FF2B5EF4-FFF2-40B4-BE49-F238E27FC236}">
+                <a16:creationId xmlns:a16="http://schemas.microsoft.com/office/drawing/2014/main" id="{FE06509B-E517-25A2-AE38-E6C65F10B773}"/>
               </a:ext>
             </a:extLst>
           </p:cNvPr>
           <p:cNvCxnSpPr>
             <a:cxnSpLocks/>
-            <a:stCxn id="2" idx="2"/>
+            <a:stCxn id="68" idx="2"/>
             <a:endCxn id="23" idx="0"/>
           </p:cNvCxnSpPr>
           <p:nvPr/>
         </p:nvCxnSpPr>
         <p:spPr>
-          <a:xfrm>
-            <a:off x="4791432" y="5139877"/>
-            <a:ext cx="24575" cy="343437"/>
+          <a:xfrm flipH="1">
+            <a:off x="4886314" y="5049165"/>
+            <a:ext cx="1" cy="434149"/>
           </a:xfrm>
           <a:prstGeom prst="straightConnector1">
             <a:avLst/>
@@ -10411,10 +10038,10 @@
       </p:cxnSp>
       <p:sp>
         <p:nvSpPr>
-          <p:cNvPr id="33" name="TextBox 32">
-            <a:extLst>
-              <a:ext uri="{FF2B5EF4-FFF2-40B4-BE49-F238E27FC236}">
-                <a16:creationId xmlns:a16="http://schemas.microsoft.com/office/drawing/2014/main" id="{5365CE69-0EBA-9A36-B7CB-04C3DF75F5B0}"/>
+          <p:cNvPr id="23" name="TextBox 22">
+            <a:extLst>
+              <a:ext uri="{FF2B5EF4-FFF2-40B4-BE49-F238E27FC236}">
+                <a16:creationId xmlns:a16="http://schemas.microsoft.com/office/drawing/2014/main" id="{6894B3DF-DD31-AC5A-2D30-C30C78FBD591}"/>
               </a:ext>
             </a:extLst>
           </p:cNvPr>
@@ -10423,103 +10050,8 @@
         </p:nvSpPr>
         <p:spPr>
           <a:xfrm>
-            <a:off x="4730345" y="4236234"/>
-            <a:ext cx="486030" cy="246221"/>
-          </a:xfrm>
-          <a:prstGeom prst="rect">
-            <a:avLst/>
-          </a:prstGeom>
-          <a:noFill/>
-          <a:ln>
-            <a:noFill/>
-            <a:prstDash val="dash"/>
-          </a:ln>
-        </p:spPr>
-        <p:txBody>
-          <a:bodyPr wrap="none" rtlCol="0">
-            <a:spAutoFit/>
-          </a:bodyPr>
-          <a:lstStyle>
-            <a:defPPr>
-              <a:defRPr lang="ko-KR"/>
-            </a:defPPr>
-            <a:lvl1pPr>
-              <a:defRPr sz="1000">
-                <a:solidFill>
-                  <a:srgbClr val="000000"/>
-                </a:solidFill>
-                <a:latin typeface="Cascadia Mono" panose="020B0609020000020004" pitchFamily="49" charset="0"/>
-              </a:defRPr>
-            </a:lvl1pPr>
-          </a:lstStyle>
-          <a:p>
-            <a:r>
-              <a:rPr lang="en-US" altLang="ko-KR" dirty="0"/>
-              <a:t>ITag</a:t>
-            </a:r>
-            <a:endParaRPr lang="ko-KR" altLang="en-US" dirty="0"/>
-          </a:p>
-        </p:txBody>
-      </p:sp>
-      <p:cxnSp>
-        <p:nvCxnSpPr>
-          <p:cNvPr id="22" name="직선 화살표 연결선 21">
-            <a:extLst>
-              <a:ext uri="{FF2B5EF4-FFF2-40B4-BE49-F238E27FC236}">
-                <a16:creationId xmlns:a16="http://schemas.microsoft.com/office/drawing/2014/main" id="{FE06509B-E517-25A2-AE38-E6C65F10B773}"/>
-              </a:ext>
-            </a:extLst>
-          </p:cNvPr>
-          <p:cNvCxnSpPr>
-            <a:cxnSpLocks/>
-            <a:stCxn id="68" idx="2"/>
-            <a:endCxn id="23" idx="0"/>
-          </p:cNvCxnSpPr>
-          <p:nvPr/>
-        </p:nvCxnSpPr>
-        <p:spPr>
-          <a:xfrm>
-            <a:off x="3438974" y="5023045"/>
-            <a:ext cx="1377033" cy="460269"/>
-          </a:xfrm>
-          <a:prstGeom prst="straightConnector1">
-            <a:avLst/>
-          </a:prstGeom>
-          <a:ln>
-            <a:tailEnd type="triangle"/>
-          </a:ln>
-        </p:spPr>
-        <p:style>
-          <a:lnRef idx="1">
-            <a:schemeClr val="accent1"/>
-          </a:lnRef>
-          <a:fillRef idx="0">
-            <a:schemeClr val="accent1"/>
-          </a:fillRef>
-          <a:effectRef idx="0">
-            <a:schemeClr val="accent1"/>
-          </a:effectRef>
-          <a:fontRef idx="minor">
-            <a:schemeClr val="tx1"/>
-          </a:fontRef>
-        </p:style>
-      </p:cxnSp>
-      <p:sp>
-        <p:nvSpPr>
-          <p:cNvPr id="23" name="TextBox 22">
-            <a:extLst>
-              <a:ext uri="{FF2B5EF4-FFF2-40B4-BE49-F238E27FC236}">
-                <a16:creationId xmlns:a16="http://schemas.microsoft.com/office/drawing/2014/main" id="{6894B3DF-DD31-AC5A-2D30-C30C78FBD591}"/>
-              </a:ext>
-            </a:extLst>
-          </p:cNvPr>
-          <p:cNvSpPr txBox="1"/>
-          <p:nvPr/>
-        </p:nvSpPr>
-        <p:spPr>
-          <a:xfrm>
-            <a:off x="4233956" y="5483314"/>
-            <a:ext cx="1164101" cy="246221"/>
+            <a:off x="4530287" y="5483314"/>
+            <a:ext cx="712054" cy="246221"/>
           </a:xfrm>
           <a:prstGeom prst="rect">
             <a:avLst/>
@@ -10544,7 +10076,7 @@
                 </a:solidFill>
                 <a:latin typeface="Cascadia Mono" panose="020B0609020000020004" pitchFamily="49" charset="0"/>
               </a:rPr>
-              <a:t>BridgeTag</a:t>
+              <a:t>Tag</a:t>
             </a:r>
             <a:r>
               <a:rPr lang="en-US" altLang="ko-KR" sz="1000" dirty="0">
@@ -10565,108 +10097,6 @@
       </p:sp>
       <p:sp>
         <p:nvSpPr>
-          <p:cNvPr id="36" name="TextBox 35">
-            <a:extLst>
-              <a:ext uri="{FF2B5EF4-FFF2-40B4-BE49-F238E27FC236}">
-                <a16:creationId xmlns:a16="http://schemas.microsoft.com/office/drawing/2014/main" id="{3120CDD0-572C-7AF2-B056-C1B740C93C5D}"/>
-              </a:ext>
-            </a:extLst>
-          </p:cNvPr>
-          <p:cNvSpPr txBox="1"/>
-          <p:nvPr/>
-        </p:nvSpPr>
-        <p:spPr>
-          <a:xfrm>
-            <a:off x="4233956" y="6184487"/>
-            <a:ext cx="1164101" cy="246221"/>
-          </a:xfrm>
-          <a:prstGeom prst="rect">
-            <a:avLst/>
-          </a:prstGeom>
-          <a:noFill/>
-          <a:ln w="19050">
-            <a:solidFill>
-              <a:srgbClr val="00B050"/>
-            </a:solidFill>
-          </a:ln>
-        </p:spPr>
-        <p:txBody>
-          <a:bodyPr wrap="none" rtlCol="0">
-            <a:spAutoFit/>
-          </a:bodyPr>
-          <a:lstStyle/>
-          <a:p>
-            <a:r>
-              <a:rPr lang="en-US" altLang="ko-KR" sz="1000" dirty="0">
-                <a:solidFill>
-                  <a:srgbClr val="000000"/>
-                </a:solidFill>
-                <a:latin typeface="Cascadia Mono" panose="020B0609020000020004" pitchFamily="49" charset="0"/>
-              </a:rPr>
-              <a:t>ActionTag</a:t>
-            </a:r>
-            <a:r>
-              <a:rPr lang="en-US" altLang="ko-KR" sz="1000" dirty="0">
-                <a:solidFill>
-                  <a:srgbClr val="00B0F0"/>
-                </a:solidFill>
-                <a:latin typeface="Cascadia Mono" panose="020B0609020000020004" pitchFamily="49" charset="0"/>
-              </a:rPr>
-              <a:t>&lt;'T&gt;</a:t>
-            </a:r>
-            <a:endParaRPr lang="ko-KR" altLang="en-US" sz="1000" dirty="0">
-              <a:solidFill>
-                <a:srgbClr val="00B0F0"/>
-              </a:solidFill>
-            </a:endParaRPr>
-          </a:p>
-        </p:txBody>
-      </p:sp>
-      <p:cxnSp>
-        <p:nvCxnSpPr>
-          <p:cNvPr id="38" name="직선 화살표 연결선 37">
-            <a:extLst>
-              <a:ext uri="{FF2B5EF4-FFF2-40B4-BE49-F238E27FC236}">
-                <a16:creationId xmlns:a16="http://schemas.microsoft.com/office/drawing/2014/main" id="{72A80515-FF62-42CB-B199-8D561C63008B}"/>
-              </a:ext>
-            </a:extLst>
-          </p:cNvPr>
-          <p:cNvCxnSpPr>
-            <a:cxnSpLocks/>
-            <a:stCxn id="23" idx="2"/>
-            <a:endCxn id="36" idx="0"/>
-          </p:cNvCxnSpPr>
-          <p:nvPr/>
-        </p:nvCxnSpPr>
-        <p:spPr>
-          <a:xfrm>
-            <a:off x="4816007" y="5729535"/>
-            <a:ext cx="0" cy="454952"/>
-          </a:xfrm>
-          <a:prstGeom prst="straightConnector1">
-            <a:avLst/>
-          </a:prstGeom>
-          <a:ln>
-            <a:tailEnd type="triangle"/>
-          </a:ln>
-        </p:spPr>
-        <p:style>
-          <a:lnRef idx="1">
-            <a:schemeClr val="accent1"/>
-          </a:lnRef>
-          <a:fillRef idx="0">
-            <a:schemeClr val="accent1"/>
-          </a:fillRef>
-          <a:effectRef idx="0">
-            <a:schemeClr val="accent1"/>
-          </a:effectRef>
-          <a:fontRef idx="minor">
-            <a:schemeClr val="tx1"/>
-          </a:fontRef>
-        </p:style>
-      </p:cxnSp>
-      <p:sp>
-        <p:nvSpPr>
           <p:cNvPr id="107" name="TextBox 106">
             <a:extLst>
               <a:ext uri="{FF2B5EF4-FFF2-40B4-BE49-F238E27FC236}">
@@ -10722,8 +10152,8 @@
         </p:nvCxnSpPr>
         <p:spPr>
           <a:xfrm flipH="1">
-            <a:off x="3598600" y="1479622"/>
-            <a:ext cx="3168845" cy="1677050"/>
+            <a:off x="2676385" y="1719049"/>
+            <a:ext cx="4104128" cy="1081961"/>
           </a:xfrm>
           <a:prstGeom prst="straightConnector1">
             <a:avLst/>
@@ -10759,14 +10189,13 @@
           <p:cNvCxnSpPr>
             <a:cxnSpLocks/>
             <a:stCxn id="71" idx="2"/>
-            <a:endCxn id="83" idx="0"/>
           </p:cNvCxnSpPr>
           <p:nvPr/>
         </p:nvCxnSpPr>
         <p:spPr>
-          <a:xfrm>
-            <a:off x="1144473" y="5535876"/>
-            <a:ext cx="0" cy="648611"/>
+          <a:xfrm flipH="1">
+            <a:off x="600093" y="5535876"/>
+            <a:ext cx="363719" cy="648611"/>
           </a:xfrm>
           <a:prstGeom prst="straightConnector1">
             <a:avLst/>
@@ -10804,7 +10233,7 @@
         </p:nvSpPr>
         <p:spPr>
           <a:xfrm>
-            <a:off x="374070" y="6184487"/>
+            <a:off x="193409" y="6184487"/>
             <a:ext cx="1540806" cy="246221"/>
           </a:xfrm>
           <a:prstGeom prst="rect">
@@ -10824,7 +10253,7 @@
           <a:lstStyle/>
           <a:p>
             <a:r>
-              <a:rPr lang="en-US" altLang="ko-KR" sz="1000" dirty="0" err="1">
+              <a:rPr lang="en-US" altLang="ko-KR" sz="1000" dirty="0">
                 <a:solidFill>
                   <a:srgbClr val="000000"/>
                 </a:solidFill>
@@ -10849,6 +10278,266 @@
           </a:p>
         </p:txBody>
       </p:sp>
+      <p:sp>
+        <p:nvSpPr>
+          <p:cNvPr id="69" name="TextBox 68">
+            <a:extLst>
+              <a:ext uri="{FF2B5EF4-FFF2-40B4-BE49-F238E27FC236}">
+                <a16:creationId xmlns:a16="http://schemas.microsoft.com/office/drawing/2014/main" id="{957D50FA-9904-7EBF-4C7F-DE6DA0FDDF79}"/>
+              </a:ext>
+            </a:extLst>
+          </p:cNvPr>
+          <p:cNvSpPr txBox="1"/>
+          <p:nvPr/>
+        </p:nvSpPr>
+        <p:spPr>
+          <a:xfrm>
+            <a:off x="10502585" y="2498743"/>
+            <a:ext cx="1164101" cy="246221"/>
+          </a:xfrm>
+          <a:prstGeom prst="rect">
+            <a:avLst/>
+          </a:prstGeom>
+          <a:noFill/>
+          <a:ln>
+            <a:noFill/>
+            <a:prstDash val="dash"/>
+          </a:ln>
+        </p:spPr>
+        <p:txBody>
+          <a:bodyPr wrap="square" rtlCol="0">
+            <a:spAutoFit/>
+          </a:bodyPr>
+          <a:lstStyle>
+            <a:defPPr>
+              <a:defRPr lang="ko-KR"/>
+            </a:defPPr>
+            <a:lvl1pPr>
+              <a:defRPr sz="1000">
+                <a:solidFill>
+                  <a:srgbClr val="000000"/>
+                </a:solidFill>
+                <a:latin typeface="Cascadia Mono" panose="020B0609020000020004" pitchFamily="49" charset="0"/>
+              </a:defRPr>
+            </a:lvl1pPr>
+          </a:lstStyle>
+          <a:p>
+            <a:r>
+              <a:rPr lang="en-US" altLang="ko-KR" dirty="0"/>
+              <a:t>IVariable&lt;'T&gt;</a:t>
+            </a:r>
+            <a:endParaRPr lang="ko-KR" altLang="en-US" dirty="0"/>
+          </a:p>
+        </p:txBody>
+      </p:sp>
+      <p:cxnSp>
+        <p:nvCxnSpPr>
+          <p:cNvPr id="70" name="직선 화살표 연결선 69">
+            <a:extLst>
+              <a:ext uri="{FF2B5EF4-FFF2-40B4-BE49-F238E27FC236}">
+                <a16:creationId xmlns:a16="http://schemas.microsoft.com/office/drawing/2014/main" id="{C4BFA072-7A8B-75CA-B646-C606FC5F0113}"/>
+              </a:ext>
+            </a:extLst>
+          </p:cNvPr>
+          <p:cNvCxnSpPr>
+            <a:cxnSpLocks/>
+            <a:stCxn id="69" idx="2"/>
+            <a:endCxn id="10" idx="0"/>
+          </p:cNvCxnSpPr>
+          <p:nvPr/>
+        </p:nvCxnSpPr>
+        <p:spPr>
+          <a:xfrm flipH="1">
+            <a:off x="9447340" y="2744964"/>
+            <a:ext cx="1637296" cy="600495"/>
+          </a:xfrm>
+          <a:prstGeom prst="straightConnector1">
+            <a:avLst/>
+          </a:prstGeom>
+          <a:ln>
+            <a:tailEnd type="triangle"/>
+          </a:ln>
+        </p:spPr>
+        <p:style>
+          <a:lnRef idx="1">
+            <a:schemeClr val="accent1"/>
+          </a:lnRef>
+          <a:fillRef idx="0">
+            <a:schemeClr val="accent1"/>
+          </a:fillRef>
+          <a:effectRef idx="0">
+            <a:schemeClr val="accent1"/>
+          </a:effectRef>
+          <a:fontRef idx="minor">
+            <a:schemeClr val="tx1"/>
+          </a:fontRef>
+        </p:style>
+      </p:cxnSp>
+      <p:sp>
+        <p:nvSpPr>
+          <p:cNvPr id="77" name="TextBox 76">
+            <a:extLst>
+              <a:ext uri="{FF2B5EF4-FFF2-40B4-BE49-F238E27FC236}">
+                <a16:creationId xmlns:a16="http://schemas.microsoft.com/office/drawing/2014/main" id="{1ED4490C-8AEE-28E4-A8AD-7BD426229006}"/>
+              </a:ext>
+            </a:extLst>
+          </p:cNvPr>
+          <p:cNvSpPr txBox="1"/>
+          <p:nvPr/>
+        </p:nvSpPr>
+        <p:spPr>
+          <a:xfrm>
+            <a:off x="10634052" y="1813798"/>
+            <a:ext cx="955869" cy="246221"/>
+          </a:xfrm>
+          <a:prstGeom prst="rect">
+            <a:avLst/>
+          </a:prstGeom>
+          <a:noFill/>
+          <a:ln>
+            <a:noFill/>
+            <a:prstDash val="dash"/>
+          </a:ln>
+        </p:spPr>
+        <p:txBody>
+          <a:bodyPr wrap="square" rtlCol="0">
+            <a:spAutoFit/>
+          </a:bodyPr>
+          <a:lstStyle>
+            <a:defPPr>
+              <a:defRPr lang="ko-KR"/>
+            </a:defPPr>
+            <a:lvl1pPr>
+              <a:defRPr sz="1000">
+                <a:solidFill>
+                  <a:srgbClr val="000000"/>
+                </a:solidFill>
+                <a:latin typeface="Cascadia Mono" panose="020B0609020000020004" pitchFamily="49" charset="0"/>
+              </a:defRPr>
+            </a:lvl1pPr>
+          </a:lstStyle>
+          <a:p>
+            <a:r>
+              <a:rPr lang="en-US" altLang="ko-KR" dirty="0"/>
+              <a:t>IVariable</a:t>
+            </a:r>
+            <a:endParaRPr lang="ko-KR" altLang="en-US" dirty="0"/>
+          </a:p>
+        </p:txBody>
+      </p:sp>
+      <p:sp>
+        <p:nvSpPr>
+          <p:cNvPr id="136" name="TextBox 135">
+            <a:extLst>
+              <a:ext uri="{FF2B5EF4-FFF2-40B4-BE49-F238E27FC236}">
+                <a16:creationId xmlns:a16="http://schemas.microsoft.com/office/drawing/2014/main" id="{4228D7ED-8C93-13D1-D7C3-D254771B7030}"/>
+              </a:ext>
+            </a:extLst>
+          </p:cNvPr>
+          <p:cNvSpPr txBox="1"/>
+          <p:nvPr/>
+        </p:nvSpPr>
+        <p:spPr>
+          <a:xfrm>
+            <a:off x="10634052" y="4264880"/>
+            <a:ext cx="1383777" cy="246221"/>
+          </a:xfrm>
+          <a:prstGeom prst="rect">
+            <a:avLst/>
+          </a:prstGeom>
+          <a:noFill/>
+          <a:ln>
+            <a:noFill/>
+            <a:prstDash val="dash"/>
+          </a:ln>
+        </p:spPr>
+        <p:txBody>
+          <a:bodyPr wrap="square" rtlCol="0">
+            <a:spAutoFit/>
+          </a:bodyPr>
+          <a:lstStyle>
+            <a:defPPr>
+              <a:defRPr lang="ko-KR"/>
+            </a:defPPr>
+            <a:lvl1pPr>
+              <a:defRPr sz="1000">
+                <a:solidFill>
+                  <a:srgbClr val="000000"/>
+                </a:solidFill>
+                <a:latin typeface="Cascadia Mono" panose="020B0609020000020004" pitchFamily="49" charset="0"/>
+              </a:defRPr>
+            </a:lvl1pPr>
+          </a:lstStyle>
+          <a:p>
+            <a:r>
+              <a:rPr lang="en-US" altLang="ko-KR" sz="1000" dirty="0">
+                <a:solidFill>
+                  <a:srgbClr val="000000"/>
+                </a:solidFill>
+                <a:latin typeface="Cascadia Mono" panose="020B0609020000020004" pitchFamily="49" charset="0"/>
+              </a:rPr>
+              <a:t>VariableBase</a:t>
+            </a:r>
+            <a:r>
+              <a:rPr lang="en-US" altLang="ko-KR" sz="1000" dirty="0">
+                <a:solidFill>
+                  <a:srgbClr val="00B0F0"/>
+                </a:solidFill>
+                <a:latin typeface="Cascadia Mono" panose="020B0609020000020004" pitchFamily="49" charset="0"/>
+              </a:rPr>
+              <a:t>&lt;'T&gt;</a:t>
+            </a:r>
+            <a:endParaRPr lang="ko-KR" altLang="en-US" sz="1000" dirty="0">
+              <a:solidFill>
+                <a:srgbClr val="00B0F0"/>
+              </a:solidFill>
+            </a:endParaRPr>
+          </a:p>
+        </p:txBody>
+      </p:sp>
+      <p:cxnSp>
+        <p:nvCxnSpPr>
+          <p:cNvPr id="137" name="직선 화살표 연결선 136">
+            <a:extLst>
+              <a:ext uri="{FF2B5EF4-FFF2-40B4-BE49-F238E27FC236}">
+                <a16:creationId xmlns:a16="http://schemas.microsoft.com/office/drawing/2014/main" id="{1906D651-9B1C-83C7-3CD4-3CE3325A5002}"/>
+              </a:ext>
+            </a:extLst>
+          </p:cNvPr>
+          <p:cNvCxnSpPr>
+            <a:cxnSpLocks/>
+            <a:stCxn id="136" idx="2"/>
+            <a:endCxn id="27" idx="0"/>
+          </p:cNvCxnSpPr>
+          <p:nvPr/>
+        </p:nvCxnSpPr>
+        <p:spPr>
+          <a:xfrm flipH="1">
+            <a:off x="9447340" y="4511101"/>
+            <a:ext cx="1878601" cy="770797"/>
+          </a:xfrm>
+          <a:prstGeom prst="straightConnector1">
+            <a:avLst/>
+          </a:prstGeom>
+          <a:ln>
+            <a:tailEnd type="triangle"/>
+          </a:ln>
+        </p:spPr>
+        <p:style>
+          <a:lnRef idx="1">
+            <a:schemeClr val="accent1"/>
+          </a:lnRef>
+          <a:fillRef idx="0">
+            <a:schemeClr val="accent1"/>
+          </a:fillRef>
+          <a:effectRef idx="0">
+            <a:schemeClr val="accent1"/>
+          </a:effectRef>
+          <a:fontRef idx="minor">
+            <a:schemeClr val="tx1"/>
+          </a:fontRef>
+        </p:style>
+      </p:cxnSp>
     </p:spTree>
     <p:extLst>
       <p:ext uri="{BB962C8B-B14F-4D97-AF65-F5344CB8AC3E}">

</xml_diff>

<commit_message>
- Rename: XgiLocalVar -> XgiVar
</commit_message>
<xml_diff>
--- a/DsDotNet/src/Doc/Hierachies.pptx
+++ b/DsDotNet/src/Doc/Hierachies.pptx
@@ -264,7 +264,7 @@
           <a:p>
             <a:fld id="{EA4CFCB8-2150-4D86-B261-B3D299AF0C48}" type="datetimeFigureOut">
               <a:rPr lang="ko-KR" altLang="en-US" smtClean="0"/>
-              <a:t>2023-01-26</a:t>
+              <a:t>2023-01-30</a:t>
             </a:fld>
             <a:endParaRPr lang="ko-KR" altLang="en-US" dirty="0"/>
           </a:p>
@@ -462,7 +462,7 @@
           <a:p>
             <a:fld id="{EA4CFCB8-2150-4D86-B261-B3D299AF0C48}" type="datetimeFigureOut">
               <a:rPr lang="ko-KR" altLang="en-US" smtClean="0"/>
-              <a:t>2023-01-26</a:t>
+              <a:t>2023-01-30</a:t>
             </a:fld>
             <a:endParaRPr lang="ko-KR" altLang="en-US" dirty="0"/>
           </a:p>
@@ -670,7 +670,7 @@
           <a:p>
             <a:fld id="{EA4CFCB8-2150-4D86-B261-B3D299AF0C48}" type="datetimeFigureOut">
               <a:rPr lang="ko-KR" altLang="en-US" smtClean="0"/>
-              <a:t>2023-01-26</a:t>
+              <a:t>2023-01-30</a:t>
             </a:fld>
             <a:endParaRPr lang="ko-KR" altLang="en-US" dirty="0"/>
           </a:p>
@@ -868,7 +868,7 @@
           <a:p>
             <a:fld id="{EA4CFCB8-2150-4D86-B261-B3D299AF0C48}" type="datetimeFigureOut">
               <a:rPr lang="ko-KR" altLang="en-US" smtClean="0"/>
-              <a:t>2023-01-26</a:t>
+              <a:t>2023-01-30</a:t>
             </a:fld>
             <a:endParaRPr lang="ko-KR" altLang="en-US" dirty="0"/>
           </a:p>
@@ -1143,7 +1143,7 @@
           <a:p>
             <a:fld id="{EA4CFCB8-2150-4D86-B261-B3D299AF0C48}" type="datetimeFigureOut">
               <a:rPr lang="ko-KR" altLang="en-US" smtClean="0"/>
-              <a:t>2023-01-26</a:t>
+              <a:t>2023-01-30</a:t>
             </a:fld>
             <a:endParaRPr lang="ko-KR" altLang="en-US" dirty="0"/>
           </a:p>
@@ -1408,7 +1408,7 @@
           <a:p>
             <a:fld id="{EA4CFCB8-2150-4D86-B261-B3D299AF0C48}" type="datetimeFigureOut">
               <a:rPr lang="ko-KR" altLang="en-US" smtClean="0"/>
-              <a:t>2023-01-26</a:t>
+              <a:t>2023-01-30</a:t>
             </a:fld>
             <a:endParaRPr lang="ko-KR" altLang="en-US" dirty="0"/>
           </a:p>
@@ -1820,7 +1820,7 @@
           <a:p>
             <a:fld id="{EA4CFCB8-2150-4D86-B261-B3D299AF0C48}" type="datetimeFigureOut">
               <a:rPr lang="ko-KR" altLang="en-US" smtClean="0"/>
-              <a:t>2023-01-26</a:t>
+              <a:t>2023-01-30</a:t>
             </a:fld>
             <a:endParaRPr lang="ko-KR" altLang="en-US" dirty="0"/>
           </a:p>
@@ -1961,7 +1961,7 @@
           <a:p>
             <a:fld id="{EA4CFCB8-2150-4D86-B261-B3D299AF0C48}" type="datetimeFigureOut">
               <a:rPr lang="ko-KR" altLang="en-US" smtClean="0"/>
-              <a:t>2023-01-26</a:t>
+              <a:t>2023-01-30</a:t>
             </a:fld>
             <a:endParaRPr lang="ko-KR" altLang="en-US" dirty="0"/>
           </a:p>
@@ -2074,7 +2074,7 @@
           <a:p>
             <a:fld id="{EA4CFCB8-2150-4D86-B261-B3D299AF0C48}" type="datetimeFigureOut">
               <a:rPr lang="ko-KR" altLang="en-US" smtClean="0"/>
-              <a:t>2023-01-26</a:t>
+              <a:t>2023-01-30</a:t>
             </a:fld>
             <a:endParaRPr lang="ko-KR" altLang="en-US" dirty="0"/>
           </a:p>
@@ -2385,7 +2385,7 @@
           <a:p>
             <a:fld id="{EA4CFCB8-2150-4D86-B261-B3D299AF0C48}" type="datetimeFigureOut">
               <a:rPr lang="ko-KR" altLang="en-US" smtClean="0"/>
-              <a:t>2023-01-26</a:t>
+              <a:t>2023-01-30</a:t>
             </a:fld>
             <a:endParaRPr lang="ko-KR" altLang="en-US" dirty="0"/>
           </a:p>
@@ -2673,7 +2673,7 @@
           <a:p>
             <a:fld id="{EA4CFCB8-2150-4D86-B261-B3D299AF0C48}" type="datetimeFigureOut">
               <a:rPr lang="ko-KR" altLang="en-US" smtClean="0"/>
-              <a:t>2023-01-26</a:t>
+              <a:t>2023-01-30</a:t>
             </a:fld>
             <a:endParaRPr lang="ko-KR" altLang="en-US" dirty="0"/>
           </a:p>
@@ -2914,7 +2914,7 @@
           <a:p>
             <a:fld id="{EA4CFCB8-2150-4D86-B261-B3D299AF0C48}" type="datetimeFigureOut">
               <a:rPr lang="ko-KR" altLang="en-US" smtClean="0"/>
-              <a:t>2023-01-26</a:t>
+              <a:t>2023-01-30</a:t>
             </a:fld>
             <a:endParaRPr lang="ko-KR" altLang="en-US" dirty="0"/>
           </a:p>
@@ -7558,8 +7558,8 @@
         </p:nvSpPr>
         <p:spPr>
           <a:xfrm>
-            <a:off x="8886091" y="2510822"/>
-            <a:ext cx="1088760" cy="246221"/>
+            <a:off x="9071126" y="2523643"/>
+            <a:ext cx="712054" cy="246221"/>
           </a:xfrm>
           <a:prstGeom prst="rect">
             <a:avLst/>
@@ -7592,7 +7592,7 @@
           <a:p>
             <a:r>
               <a:rPr lang="en-US" altLang="ko-KR" dirty="0"/>
-              <a:t>IXgiLocalVar</a:t>
+              <a:t>IXgiVar</a:t>
             </a:r>
             <a:endParaRPr lang="ko-KR" altLang="en-US" dirty="0"/>
           </a:p>
@@ -7713,8 +7713,8 @@
         </p:nvSpPr>
         <p:spPr>
           <a:xfrm>
-            <a:off x="8752278" y="3345459"/>
-            <a:ext cx="1390124" cy="246221"/>
+            <a:off x="8920444" y="3345459"/>
+            <a:ext cx="1013419" cy="246221"/>
           </a:xfrm>
           <a:prstGeom prst="rect">
             <a:avLst/>
@@ -7747,7 +7747,7 @@
           <a:p>
             <a:r>
               <a:rPr lang="en-US" altLang="ko-KR" dirty="0"/>
-              <a:t>IXgiLocalVar&lt;'T&gt;</a:t>
+              <a:t>IXgiVar&lt;'T&gt;</a:t>
             </a:r>
             <a:endParaRPr lang="ko-KR" altLang="en-US" dirty="0"/>
           </a:p>
@@ -7824,8 +7824,8 @@
         </p:nvCxnSpPr>
         <p:spPr>
           <a:xfrm>
-            <a:off x="9430471" y="2757043"/>
-            <a:ext cx="16869" cy="588416"/>
+            <a:off x="9427153" y="2769864"/>
+            <a:ext cx="1" cy="575595"/>
           </a:xfrm>
           <a:prstGeom prst="straightConnector1">
             <a:avLst/>
@@ -7910,8 +7910,8 @@
         </p:nvCxnSpPr>
         <p:spPr>
           <a:xfrm flipH="1">
-            <a:off x="9430471" y="2060019"/>
-            <a:ext cx="1681516" cy="450803"/>
+            <a:off x="9427153" y="2060019"/>
+            <a:ext cx="1684834" cy="463624"/>
           </a:xfrm>
           <a:prstGeom prst="straightConnector1">
             <a:avLst/>
@@ -7949,8 +7949,8 @@
         </p:nvSpPr>
         <p:spPr>
           <a:xfrm>
-            <a:off x="8789948" y="5281898"/>
-            <a:ext cx="1314784" cy="246221"/>
+            <a:off x="8993250" y="5288839"/>
+            <a:ext cx="938077" cy="246221"/>
           </a:xfrm>
           <a:prstGeom prst="rect">
             <a:avLst/>
@@ -7975,7 +7975,7 @@
                 </a:solidFill>
                 <a:latin typeface="Cascadia Mono" panose="020B0609020000020004" pitchFamily="49" charset="0"/>
               </a:rPr>
-              <a:t>XgiLocalVar</a:t>
+              <a:t>XgiVar</a:t>
             </a:r>
             <a:r>
               <a:rPr lang="en-US" altLang="ko-KR" sz="1000" dirty="0">
@@ -8012,8 +8012,8 @@
         </p:nvCxnSpPr>
         <p:spPr>
           <a:xfrm>
-            <a:off x="9447340" y="3591680"/>
-            <a:ext cx="0" cy="1690218"/>
+            <a:off x="9427154" y="3591680"/>
+            <a:ext cx="35135" cy="1697159"/>
           </a:xfrm>
           <a:prstGeom prst="straightConnector1">
             <a:avLst/>
@@ -8056,7 +8056,7 @@
         <p:spPr>
           <a:xfrm>
             <a:off x="6780513" y="1719049"/>
-            <a:ext cx="2666827" cy="3562849"/>
+            <a:ext cx="2681776" cy="3569790"/>
           </a:xfrm>
           <a:prstGeom prst="straightConnector1">
             <a:avLst/>
@@ -8153,7 +8153,7 @@
         <p:spPr>
           <a:xfrm>
             <a:off x="6780513" y="1719049"/>
-            <a:ext cx="2649958" cy="791773"/>
+            <a:ext cx="2646640" cy="804594"/>
           </a:xfrm>
           <a:prstGeom prst="straightConnector1">
             <a:avLst/>
@@ -10348,8 +10348,8 @@
         </p:nvCxnSpPr>
         <p:spPr>
           <a:xfrm flipH="1">
-            <a:off x="9447340" y="2744964"/>
-            <a:ext cx="1637296" cy="600495"/>
+            <a:off x="9427154" y="2744964"/>
+            <a:ext cx="1657482" cy="600495"/>
           </a:xfrm>
           <a:prstGeom prst="straightConnector1">
             <a:avLst/>
@@ -10513,8 +10513,8 @@
         </p:nvCxnSpPr>
         <p:spPr>
           <a:xfrm flipH="1">
-            <a:off x="9447340" y="4511101"/>
-            <a:ext cx="1878601" cy="770797"/>
+            <a:off x="9462289" y="4511101"/>
+            <a:ext cx="1863652" cy="777738"/>
           </a:xfrm>
           <a:prstGeom prst="straightConnector1">
             <a:avLst/>

</xml_diff>

<commit_message>
- XGI PLC : Existing project 분석 작업 중.   * XGI 변수 주소 영역 중복 체크 작업 중.
</commit_message>
<xml_diff>
--- a/DsDotNet/src/Doc/Hierachies.pptx
+++ b/DsDotNet/src/Doc/Hierachies.pptx
@@ -264,7 +264,7 @@
           <a:p>
             <a:fld id="{EA4CFCB8-2150-4D86-B261-B3D299AF0C48}" type="datetimeFigureOut">
               <a:rPr lang="ko-KR" altLang="en-US" smtClean="0"/>
-              <a:t>2023-01-30</a:t>
+              <a:t>2023-02-02</a:t>
             </a:fld>
             <a:endParaRPr lang="ko-KR" altLang="en-US" dirty="0"/>
           </a:p>
@@ -462,7 +462,7 @@
           <a:p>
             <a:fld id="{EA4CFCB8-2150-4D86-B261-B3D299AF0C48}" type="datetimeFigureOut">
               <a:rPr lang="ko-KR" altLang="en-US" smtClean="0"/>
-              <a:t>2023-01-30</a:t>
+              <a:t>2023-02-02</a:t>
             </a:fld>
             <a:endParaRPr lang="ko-KR" altLang="en-US" dirty="0"/>
           </a:p>
@@ -670,7 +670,7 @@
           <a:p>
             <a:fld id="{EA4CFCB8-2150-4D86-B261-B3D299AF0C48}" type="datetimeFigureOut">
               <a:rPr lang="ko-KR" altLang="en-US" smtClean="0"/>
-              <a:t>2023-01-30</a:t>
+              <a:t>2023-02-02</a:t>
             </a:fld>
             <a:endParaRPr lang="ko-KR" altLang="en-US" dirty="0"/>
           </a:p>
@@ -868,7 +868,7 @@
           <a:p>
             <a:fld id="{EA4CFCB8-2150-4D86-B261-B3D299AF0C48}" type="datetimeFigureOut">
               <a:rPr lang="ko-KR" altLang="en-US" smtClean="0"/>
-              <a:t>2023-01-30</a:t>
+              <a:t>2023-02-02</a:t>
             </a:fld>
             <a:endParaRPr lang="ko-KR" altLang="en-US" dirty="0"/>
           </a:p>
@@ -1143,7 +1143,7 @@
           <a:p>
             <a:fld id="{EA4CFCB8-2150-4D86-B261-B3D299AF0C48}" type="datetimeFigureOut">
               <a:rPr lang="ko-KR" altLang="en-US" smtClean="0"/>
-              <a:t>2023-01-30</a:t>
+              <a:t>2023-02-02</a:t>
             </a:fld>
             <a:endParaRPr lang="ko-KR" altLang="en-US" dirty="0"/>
           </a:p>
@@ -1408,7 +1408,7 @@
           <a:p>
             <a:fld id="{EA4CFCB8-2150-4D86-B261-B3D299AF0C48}" type="datetimeFigureOut">
               <a:rPr lang="ko-KR" altLang="en-US" smtClean="0"/>
-              <a:t>2023-01-30</a:t>
+              <a:t>2023-02-02</a:t>
             </a:fld>
             <a:endParaRPr lang="ko-KR" altLang="en-US" dirty="0"/>
           </a:p>
@@ -1820,7 +1820,7 @@
           <a:p>
             <a:fld id="{EA4CFCB8-2150-4D86-B261-B3D299AF0C48}" type="datetimeFigureOut">
               <a:rPr lang="ko-KR" altLang="en-US" smtClean="0"/>
-              <a:t>2023-01-30</a:t>
+              <a:t>2023-02-02</a:t>
             </a:fld>
             <a:endParaRPr lang="ko-KR" altLang="en-US" dirty="0"/>
           </a:p>
@@ -1961,7 +1961,7 @@
           <a:p>
             <a:fld id="{EA4CFCB8-2150-4D86-B261-B3D299AF0C48}" type="datetimeFigureOut">
               <a:rPr lang="ko-KR" altLang="en-US" smtClean="0"/>
-              <a:t>2023-01-30</a:t>
+              <a:t>2023-02-02</a:t>
             </a:fld>
             <a:endParaRPr lang="ko-KR" altLang="en-US" dirty="0"/>
           </a:p>
@@ -2074,7 +2074,7 @@
           <a:p>
             <a:fld id="{EA4CFCB8-2150-4D86-B261-B3D299AF0C48}" type="datetimeFigureOut">
               <a:rPr lang="ko-KR" altLang="en-US" smtClean="0"/>
-              <a:t>2023-01-30</a:t>
+              <a:t>2023-02-02</a:t>
             </a:fld>
             <a:endParaRPr lang="ko-KR" altLang="en-US" dirty="0"/>
           </a:p>
@@ -2385,7 +2385,7 @@
           <a:p>
             <a:fld id="{EA4CFCB8-2150-4D86-B261-B3D299AF0C48}" type="datetimeFigureOut">
               <a:rPr lang="ko-KR" altLang="en-US" smtClean="0"/>
-              <a:t>2023-01-30</a:t>
+              <a:t>2023-02-02</a:t>
             </a:fld>
             <a:endParaRPr lang="ko-KR" altLang="en-US" dirty="0"/>
           </a:p>
@@ -2673,7 +2673,7 @@
           <a:p>
             <a:fld id="{EA4CFCB8-2150-4D86-B261-B3D299AF0C48}" type="datetimeFigureOut">
               <a:rPr lang="ko-KR" altLang="en-US" smtClean="0"/>
-              <a:t>2023-01-30</a:t>
+              <a:t>2023-02-02</a:t>
             </a:fld>
             <a:endParaRPr lang="ko-KR" altLang="en-US" dirty="0"/>
           </a:p>
@@ -2914,7 +2914,7 @@
           <a:p>
             <a:fld id="{EA4CFCB8-2150-4D86-B261-B3D299AF0C48}" type="datetimeFigureOut">
               <a:rPr lang="ko-KR" altLang="en-US" smtClean="0"/>
-              <a:t>2023-01-30</a:t>
+              <a:t>2023-02-02</a:t>
             </a:fld>
             <a:endParaRPr lang="ko-KR" altLang="en-US" dirty="0"/>
           </a:p>
@@ -7506,8 +7506,8 @@
         </p:nvSpPr>
         <p:spPr>
           <a:xfrm>
-            <a:off x="8551147" y="1983422"/>
-            <a:ext cx="1793283" cy="3965202"/>
+            <a:off x="9530332" y="1983422"/>
+            <a:ext cx="1200572" cy="3965202"/>
           </a:xfrm>
           <a:prstGeom prst="rect">
             <a:avLst/>
@@ -7558,7 +7558,7 @@
         </p:nvSpPr>
         <p:spPr>
           <a:xfrm>
-            <a:off x="9071126" y="2523643"/>
+            <a:off x="9756354" y="2523643"/>
             <a:ext cx="712054" cy="246221"/>
           </a:xfrm>
           <a:prstGeom prst="rect">
@@ -7666,7 +7666,7 @@
         </p:nvSpPr>
         <p:spPr>
           <a:xfrm>
-            <a:off x="5558063" y="1472828"/>
+            <a:off x="6534628" y="1472828"/>
             <a:ext cx="2444900" cy="246221"/>
           </a:xfrm>
           <a:prstGeom prst="rect">
@@ -7713,7 +7713,7 @@
         </p:nvSpPr>
         <p:spPr>
           <a:xfrm>
-            <a:off x="8920444" y="3345459"/>
+            <a:off x="9605672" y="3345459"/>
             <a:ext cx="1013419" cy="246221"/>
           </a:xfrm>
           <a:prstGeom prst="rect">
@@ -7824,7 +7824,7 @@
         </p:nvCxnSpPr>
         <p:spPr>
           <a:xfrm>
-            <a:off x="9427153" y="2769864"/>
+            <a:off x="10112381" y="2769864"/>
             <a:ext cx="1" cy="575595"/>
           </a:xfrm>
           <a:prstGeom prst="straightConnector1">
@@ -7910,8 +7910,8 @@
         </p:nvCxnSpPr>
         <p:spPr>
           <a:xfrm flipH="1">
-            <a:off x="9427153" y="2060019"/>
-            <a:ext cx="1684834" cy="463624"/>
+            <a:off x="10112381" y="2060019"/>
+            <a:ext cx="1317325" cy="463624"/>
           </a:xfrm>
           <a:prstGeom prst="straightConnector1">
             <a:avLst/>
@@ -7949,7 +7949,7 @@
         </p:nvSpPr>
         <p:spPr>
           <a:xfrm>
-            <a:off x="8993250" y="5288839"/>
+            <a:off x="9678478" y="5288839"/>
             <a:ext cx="938077" cy="246221"/>
           </a:xfrm>
           <a:prstGeom prst="rect">
@@ -8012,7 +8012,7 @@
         </p:nvCxnSpPr>
         <p:spPr>
           <a:xfrm>
-            <a:off x="9427154" y="3591680"/>
+            <a:off x="10112382" y="3591680"/>
             <a:ext cx="35135" cy="1697159"/>
           </a:xfrm>
           <a:prstGeom prst="straightConnector1">
@@ -8055,8 +8055,8 @@
         </p:nvCxnSpPr>
         <p:spPr>
           <a:xfrm>
-            <a:off x="6780513" y="1719049"/>
-            <a:ext cx="2681776" cy="3569790"/>
+            <a:off x="7757078" y="1719049"/>
+            <a:ext cx="2390439" cy="3569790"/>
           </a:xfrm>
           <a:prstGeom prst="straightConnector1">
             <a:avLst/>
@@ -8152,8 +8152,8 @@
         </p:nvCxnSpPr>
         <p:spPr>
           <a:xfrm>
-            <a:off x="6780513" y="1719049"/>
-            <a:ext cx="2646640" cy="804594"/>
+            <a:off x="7757078" y="1719049"/>
+            <a:ext cx="2355303" cy="804594"/>
           </a:xfrm>
           <a:prstGeom prst="straightConnector1">
             <a:avLst/>
@@ -8191,7 +8191,7 @@
         </p:nvSpPr>
         <p:spPr>
           <a:xfrm>
-            <a:off x="5733347" y="718082"/>
+            <a:off x="6709912" y="718082"/>
             <a:ext cx="2068195" cy="246221"/>
           </a:xfrm>
           <a:prstGeom prst="rect">
@@ -8249,7 +8249,7 @@
         </p:nvCxnSpPr>
         <p:spPr>
           <a:xfrm>
-            <a:off x="6767445" y="964303"/>
+            <a:off x="7744010" y="964303"/>
             <a:ext cx="13068" cy="508525"/>
           </a:xfrm>
           <a:prstGeom prst="straightConnector1">
@@ -8292,7 +8292,7 @@
         <p:spPr>
           <a:xfrm>
             <a:off x="3879286" y="438466"/>
-            <a:ext cx="2888159" cy="279616"/>
+            <a:ext cx="3864724" cy="279616"/>
           </a:xfrm>
           <a:prstGeom prst="straightConnector1">
             <a:avLst/>
@@ -9209,7 +9209,7 @@
         </p:nvSpPr>
         <p:spPr>
           <a:xfrm>
-            <a:off x="3811045" y="1455897"/>
+            <a:off x="3308338" y="1444467"/>
             <a:ext cx="486030" cy="246221"/>
           </a:xfrm>
           <a:prstGeom prst="rect">
@@ -9267,8 +9267,8 @@
         </p:nvCxnSpPr>
         <p:spPr>
           <a:xfrm>
-            <a:off x="4054060" y="1702118"/>
-            <a:ext cx="274158" cy="1096567"/>
+            <a:off x="3551353" y="1690688"/>
+            <a:ext cx="776865" cy="1107997"/>
           </a:xfrm>
           <a:prstGeom prst="straightConnector1">
             <a:avLst/>
@@ -9354,7 +9354,7 @@
         <p:spPr>
           <a:xfrm>
             <a:off x="2451492" y="964303"/>
-            <a:ext cx="1602568" cy="491594"/>
+            <a:ext cx="1099861" cy="480164"/>
           </a:xfrm>
           <a:prstGeom prst="straightConnector1">
             <a:avLst/>
@@ -9532,7 +9532,7 @@
         </p:nvSpPr>
         <p:spPr>
           <a:xfrm>
-            <a:off x="5481184" y="2722677"/>
+            <a:off x="6457749" y="2722677"/>
             <a:ext cx="1239442" cy="246221"/>
           </a:xfrm>
           <a:prstGeom prst="rect">
@@ -9586,7 +9586,7 @@
         </p:nvSpPr>
         <p:spPr>
           <a:xfrm>
-            <a:off x="6248911" y="3801977"/>
+            <a:off x="7225476" y="3801977"/>
             <a:ext cx="1465466" cy="246221"/>
           </a:xfrm>
           <a:prstGeom prst="rect">
@@ -9649,7 +9649,7 @@
         </p:nvCxnSpPr>
         <p:spPr>
           <a:xfrm>
-            <a:off x="6100905" y="2968898"/>
+            <a:off x="7077470" y="2968898"/>
             <a:ext cx="880739" cy="833079"/>
           </a:xfrm>
           <a:prstGeom prst="straightConnector1">
@@ -9692,7 +9692,7 @@
         </p:nvCxnSpPr>
         <p:spPr>
           <a:xfrm>
-            <a:off x="6780513" y="1719049"/>
+            <a:off x="7757078" y="1719049"/>
             <a:ext cx="201131" cy="2082928"/>
           </a:xfrm>
           <a:prstGeom prst="straightConnector1">
@@ -10109,7 +10109,7 @@
         </p:nvSpPr>
         <p:spPr>
           <a:xfrm>
-            <a:off x="8621486" y="1685182"/>
+            <a:off x="9306714" y="1685182"/>
             <a:ext cx="1550809" cy="369332"/>
           </a:xfrm>
           <a:prstGeom prst="rect">
@@ -10153,7 +10153,7 @@
         <p:spPr>
           <a:xfrm flipH="1">
             <a:off x="2676385" y="1719049"/>
-            <a:ext cx="4104128" cy="1081961"/>
+            <a:ext cx="5080693" cy="1081961"/>
           </a:xfrm>
           <a:prstGeom prst="straightConnector1">
             <a:avLst/>
@@ -10292,7 +10292,7 @@
         </p:nvSpPr>
         <p:spPr>
           <a:xfrm>
-            <a:off x="10502585" y="2498743"/>
+            <a:off x="10820304" y="2498743"/>
             <a:ext cx="1164101" cy="246221"/>
           </a:xfrm>
           <a:prstGeom prst="rect">
@@ -10348,8 +10348,8 @@
         </p:nvCxnSpPr>
         <p:spPr>
           <a:xfrm flipH="1">
-            <a:off x="9427154" y="2744964"/>
-            <a:ext cx="1657482" cy="600495"/>
+            <a:off x="10112382" y="2744964"/>
+            <a:ext cx="1289973" cy="600495"/>
           </a:xfrm>
           <a:prstGeom prst="straightConnector1">
             <a:avLst/>
@@ -10387,7 +10387,7 @@
         </p:nvSpPr>
         <p:spPr>
           <a:xfrm>
-            <a:off x="10634052" y="1813798"/>
+            <a:off x="10951771" y="1813798"/>
             <a:ext cx="955869" cy="246221"/>
           </a:xfrm>
           <a:prstGeom prst="rect">
@@ -10439,7 +10439,7 @@
         </p:nvSpPr>
         <p:spPr>
           <a:xfrm>
-            <a:off x="10634052" y="4264880"/>
+            <a:off x="10951771" y="4264880"/>
             <a:ext cx="1383777" cy="246221"/>
           </a:xfrm>
           <a:prstGeom prst="rect">
@@ -10513,8 +10513,110 @@
         </p:nvCxnSpPr>
         <p:spPr>
           <a:xfrm flipH="1">
-            <a:off x="9462289" y="4511101"/>
-            <a:ext cx="1863652" cy="777738"/>
+            <a:off x="10147517" y="4511101"/>
+            <a:ext cx="1496143" cy="777738"/>
+          </a:xfrm>
+          <a:prstGeom prst="straightConnector1">
+            <a:avLst/>
+          </a:prstGeom>
+          <a:ln>
+            <a:tailEnd type="triangle"/>
+          </a:ln>
+        </p:spPr>
+        <p:style>
+          <a:lnRef idx="1">
+            <a:schemeClr val="accent1"/>
+          </a:lnRef>
+          <a:fillRef idx="0">
+            <a:schemeClr val="accent1"/>
+          </a:fillRef>
+          <a:effectRef idx="0">
+            <a:schemeClr val="accent1"/>
+          </a:effectRef>
+          <a:fontRef idx="minor">
+            <a:schemeClr val="tx1"/>
+          </a:fontRef>
+        </p:style>
+      </p:cxnSp>
+      <p:sp>
+        <p:nvSpPr>
+          <p:cNvPr id="14" name="TextBox 13">
+            <a:extLst>
+              <a:ext uri="{FF2B5EF4-FFF2-40B4-BE49-F238E27FC236}">
+                <a16:creationId xmlns:a16="http://schemas.microsoft.com/office/drawing/2014/main" id="{0444A196-AE5D-88AA-13D8-507E32D49419}"/>
+              </a:ext>
+            </a:extLst>
+          </p:cNvPr>
+          <p:cNvSpPr txBox="1"/>
+          <p:nvPr/>
+        </p:nvSpPr>
+        <p:spPr>
+          <a:xfrm>
+            <a:off x="3974639" y="1446604"/>
+            <a:ext cx="2199867" cy="246221"/>
+          </a:xfrm>
+          <a:prstGeom prst="rect">
+            <a:avLst/>
+          </a:prstGeom>
+          <a:noFill/>
+          <a:ln w="19050">
+            <a:solidFill>
+              <a:srgbClr val="00B050"/>
+            </a:solidFill>
+          </a:ln>
+        </p:spPr>
+        <p:txBody>
+          <a:bodyPr wrap="square" rtlCol="0">
+            <a:spAutoFit/>
+          </a:bodyPr>
+          <a:lstStyle/>
+          <a:p>
+            <a:r>
+              <a:rPr lang="en-US" altLang="ko-KR" sz="1000" dirty="0">
+                <a:solidFill>
+                  <a:srgbClr val="000000"/>
+                </a:solidFill>
+                <a:latin typeface="Cascadia Mono" panose="020B0609020000020004" pitchFamily="49" charset="0"/>
+              </a:rPr>
+              <a:t>TimerCounterBaseStruct</a:t>
+            </a:r>
+            <a:r>
+              <a:rPr lang="en-US" altLang="ko-KR" sz="1000" dirty="0">
+                <a:solidFill>
+                  <a:srgbClr val="00B0F0"/>
+                </a:solidFill>
+                <a:latin typeface="Cascadia Mono" panose="020B0609020000020004" pitchFamily="49" charset="0"/>
+              </a:rPr>
+              <a:t>&lt;'T&gt;</a:t>
+            </a:r>
+            <a:endParaRPr lang="ko-KR" altLang="en-US" sz="1000" dirty="0">
+              <a:solidFill>
+                <a:srgbClr val="00B0F0"/>
+              </a:solidFill>
+            </a:endParaRPr>
+          </a:p>
+        </p:txBody>
+      </p:sp>
+      <p:cxnSp>
+        <p:nvCxnSpPr>
+          <p:cNvPr id="21" name="직선 화살표 연결선 20">
+            <a:extLst>
+              <a:ext uri="{FF2B5EF4-FFF2-40B4-BE49-F238E27FC236}">
+                <a16:creationId xmlns:a16="http://schemas.microsoft.com/office/drawing/2014/main" id="{941D5617-8832-C62B-84A5-548EFCAEBBA5}"/>
+              </a:ext>
+            </a:extLst>
+          </p:cNvPr>
+          <p:cNvCxnSpPr>
+            <a:cxnSpLocks/>
+            <a:stCxn id="102" idx="2"/>
+            <a:endCxn id="14" idx="0"/>
+          </p:cNvCxnSpPr>
+          <p:nvPr/>
+        </p:nvCxnSpPr>
+        <p:spPr>
+          <a:xfrm>
+            <a:off x="2451492" y="964303"/>
+            <a:ext cx="2623081" cy="482301"/>
           </a:xfrm>
           <a:prstGeom prst="straightConnector1">
             <a:avLst/>

</xml_diff>

<commit_message>
- PLC 생성: Expression visitor 작업 중
</commit_message>
<xml_diff>
--- a/DsDotNet/src/Doc/Hierachies.pptx
+++ b/DsDotNet/src/Doc/Hierachies.pptx
@@ -11,6 +11,7 @@
     <p:sldId id="258" r:id="rId5"/>
     <p:sldId id="261" r:id="rId6"/>
     <p:sldId id="262" r:id="rId7"/>
+    <p:sldId id="263" r:id="rId8"/>
   </p:sldIdLst>
   <p:sldSz cx="12192000" cy="6858000"/>
   <p:notesSz cx="6858000" cy="9144000"/>
@@ -264,7 +265,7 @@
           <a:p>
             <a:fld id="{EA4CFCB8-2150-4D86-B261-B3D299AF0C48}" type="datetimeFigureOut">
               <a:rPr lang="ko-KR" altLang="en-US" smtClean="0"/>
-              <a:t>2023-02-08</a:t>
+              <a:t>2024-04-26</a:t>
             </a:fld>
             <a:endParaRPr lang="ko-KR" altLang="en-US" dirty="0"/>
           </a:p>
@@ -462,7 +463,7 @@
           <a:p>
             <a:fld id="{EA4CFCB8-2150-4D86-B261-B3D299AF0C48}" type="datetimeFigureOut">
               <a:rPr lang="ko-KR" altLang="en-US" smtClean="0"/>
-              <a:t>2023-02-08</a:t>
+              <a:t>2024-04-26</a:t>
             </a:fld>
             <a:endParaRPr lang="ko-KR" altLang="en-US" dirty="0"/>
           </a:p>
@@ -670,7 +671,7 @@
           <a:p>
             <a:fld id="{EA4CFCB8-2150-4D86-B261-B3D299AF0C48}" type="datetimeFigureOut">
               <a:rPr lang="ko-KR" altLang="en-US" smtClean="0"/>
-              <a:t>2023-02-08</a:t>
+              <a:t>2024-04-26</a:t>
             </a:fld>
             <a:endParaRPr lang="ko-KR" altLang="en-US" dirty="0"/>
           </a:p>
@@ -868,7 +869,7 @@
           <a:p>
             <a:fld id="{EA4CFCB8-2150-4D86-B261-B3D299AF0C48}" type="datetimeFigureOut">
               <a:rPr lang="ko-KR" altLang="en-US" smtClean="0"/>
-              <a:t>2023-02-08</a:t>
+              <a:t>2024-04-26</a:t>
             </a:fld>
             <a:endParaRPr lang="ko-KR" altLang="en-US" dirty="0"/>
           </a:p>
@@ -1143,7 +1144,7 @@
           <a:p>
             <a:fld id="{EA4CFCB8-2150-4D86-B261-B3D299AF0C48}" type="datetimeFigureOut">
               <a:rPr lang="ko-KR" altLang="en-US" smtClean="0"/>
-              <a:t>2023-02-08</a:t>
+              <a:t>2024-04-26</a:t>
             </a:fld>
             <a:endParaRPr lang="ko-KR" altLang="en-US" dirty="0"/>
           </a:p>
@@ -1408,7 +1409,7 @@
           <a:p>
             <a:fld id="{EA4CFCB8-2150-4D86-B261-B3D299AF0C48}" type="datetimeFigureOut">
               <a:rPr lang="ko-KR" altLang="en-US" smtClean="0"/>
-              <a:t>2023-02-08</a:t>
+              <a:t>2024-04-26</a:t>
             </a:fld>
             <a:endParaRPr lang="ko-KR" altLang="en-US" dirty="0"/>
           </a:p>
@@ -1820,7 +1821,7 @@
           <a:p>
             <a:fld id="{EA4CFCB8-2150-4D86-B261-B3D299AF0C48}" type="datetimeFigureOut">
               <a:rPr lang="ko-KR" altLang="en-US" smtClean="0"/>
-              <a:t>2023-02-08</a:t>
+              <a:t>2024-04-26</a:t>
             </a:fld>
             <a:endParaRPr lang="ko-KR" altLang="en-US" dirty="0"/>
           </a:p>
@@ -1961,7 +1962,7 @@
           <a:p>
             <a:fld id="{EA4CFCB8-2150-4D86-B261-B3D299AF0C48}" type="datetimeFigureOut">
               <a:rPr lang="ko-KR" altLang="en-US" smtClean="0"/>
-              <a:t>2023-02-08</a:t>
+              <a:t>2024-04-26</a:t>
             </a:fld>
             <a:endParaRPr lang="ko-KR" altLang="en-US" dirty="0"/>
           </a:p>
@@ -2074,7 +2075,7 @@
           <a:p>
             <a:fld id="{EA4CFCB8-2150-4D86-B261-B3D299AF0C48}" type="datetimeFigureOut">
               <a:rPr lang="ko-KR" altLang="en-US" smtClean="0"/>
-              <a:t>2023-02-08</a:t>
+              <a:t>2024-04-26</a:t>
             </a:fld>
             <a:endParaRPr lang="ko-KR" altLang="en-US" dirty="0"/>
           </a:p>
@@ -2385,7 +2386,7 @@
           <a:p>
             <a:fld id="{EA4CFCB8-2150-4D86-B261-B3D299AF0C48}" type="datetimeFigureOut">
               <a:rPr lang="ko-KR" altLang="en-US" smtClean="0"/>
-              <a:t>2023-02-08</a:t>
+              <a:t>2024-04-26</a:t>
             </a:fld>
             <a:endParaRPr lang="ko-KR" altLang="en-US" dirty="0"/>
           </a:p>
@@ -2673,7 +2674,7 @@
           <a:p>
             <a:fld id="{EA4CFCB8-2150-4D86-B261-B3D299AF0C48}" type="datetimeFigureOut">
               <a:rPr lang="ko-KR" altLang="en-US" smtClean="0"/>
-              <a:t>2023-02-08</a:t>
+              <a:t>2024-04-26</a:t>
             </a:fld>
             <a:endParaRPr lang="ko-KR" altLang="en-US" dirty="0"/>
           </a:p>
@@ -2914,7 +2915,7 @@
           <a:p>
             <a:fld id="{EA4CFCB8-2150-4D86-B261-B3D299AF0C48}" type="datetimeFigureOut">
               <a:rPr lang="ko-KR" altLang="en-US" smtClean="0"/>
-              <a:t>2023-02-08</a:t>
+              <a:t>2024-04-26</a:t>
             </a:fld>
             <a:endParaRPr lang="ko-KR" altLang="en-US" dirty="0"/>
           </a:p>
@@ -7591,8 +7592,8 @@
           </a:lstStyle>
           <a:p>
             <a:r>
-              <a:rPr lang="en-US" altLang="ko-KR" dirty="0"/>
-              <a:t>IXgiVar</a:t>
+              <a:rPr lang="en-US" altLang="ko-KR" dirty="0" err="1"/>
+              <a:t>IXgxVar</a:t>
             </a:r>
             <a:endParaRPr lang="ko-KR" altLang="en-US" dirty="0"/>
           </a:p>
@@ -7746,8 +7747,12 @@
           </a:lstStyle>
           <a:p>
             <a:r>
+              <a:rPr lang="en-US" altLang="ko-KR" dirty="0" err="1"/>
+              <a:t>IXgxVar</a:t>
+            </a:r>
+            <a:r>
               <a:rPr lang="en-US" altLang="ko-KR" dirty="0"/>
-              <a:t>IXgiVar&lt;'T&gt;</a:t>
+              <a:t>&lt;'T&gt;</a:t>
             </a:r>
             <a:endParaRPr lang="ko-KR" altLang="en-US" dirty="0"/>
           </a:p>
@@ -7969,13 +7974,13 @@
           <a:lstStyle/>
           <a:p>
             <a:r>
-              <a:rPr lang="en-US" altLang="ko-KR" sz="1000" dirty="0">
+              <a:rPr lang="en-US" altLang="ko-KR" sz="1000" dirty="0" err="1">
                 <a:solidFill>
                   <a:srgbClr val="000000"/>
                 </a:solidFill>
                 <a:latin typeface="Cascadia Mono" panose="020B0609020000020004" pitchFamily="49" charset="0"/>
               </a:rPr>
-              <a:t>XgiVar</a:t>
+              <a:t>XgxVar</a:t>
             </a:r>
             <a:r>
               <a:rPr lang="en-US" altLang="ko-KR" sz="1000" dirty="0">
@@ -10110,7 +10115,7 @@
         <p:spPr>
           <a:xfrm>
             <a:off x="9306714" y="1685182"/>
-            <a:ext cx="1550809" cy="369332"/>
+            <a:ext cx="1595693" cy="369332"/>
           </a:xfrm>
           <a:prstGeom prst="rect">
             <a:avLst/>
@@ -10124,8 +10129,12 @@
           <a:lstStyle/>
           <a:p>
             <a:r>
+              <a:rPr lang="en-US" altLang="ko-KR" dirty="0" err="1"/>
+              <a:t>XGx</a:t>
+            </a:r>
+            <a:r>
               <a:rPr lang="en-US" altLang="ko-KR" dirty="0"/>
-              <a:t>XGI PLC </a:t>
+              <a:t> PLC </a:t>
             </a:r>
             <a:r>
               <a:rPr lang="ko-KR" altLang="en-US" dirty="0"/>
@@ -10714,6 +10723,108 @@
           <a:xfrm>
             <a:off x="6378668" y="3414445"/>
             <a:ext cx="1579541" cy="387532"/>
+          </a:xfrm>
+          <a:prstGeom prst="straightConnector1">
+            <a:avLst/>
+          </a:prstGeom>
+          <a:ln>
+            <a:tailEnd type="triangle"/>
+          </a:ln>
+        </p:spPr>
+        <p:style>
+          <a:lnRef idx="1">
+            <a:schemeClr val="accent1"/>
+          </a:lnRef>
+          <a:fillRef idx="0">
+            <a:schemeClr val="accent1"/>
+          </a:fillRef>
+          <a:effectRef idx="0">
+            <a:schemeClr val="accent1"/>
+          </a:effectRef>
+          <a:fontRef idx="minor">
+            <a:schemeClr val="tx1"/>
+          </a:fontRef>
+        </p:style>
+      </p:cxnSp>
+      <p:sp>
+        <p:nvSpPr>
+          <p:cNvPr id="7" name="TextBox 6">
+            <a:extLst>
+              <a:ext uri="{FF2B5EF4-FFF2-40B4-BE49-F238E27FC236}">
+                <a16:creationId xmlns:a16="http://schemas.microsoft.com/office/drawing/2014/main" id="{3BE8019A-E6B7-EDF0-3332-6E03FFE8222F}"/>
+              </a:ext>
+            </a:extLst>
+          </p:cNvPr>
+          <p:cNvSpPr txBox="1"/>
+          <p:nvPr/>
+        </p:nvSpPr>
+        <p:spPr>
+          <a:xfrm>
+            <a:off x="2349608" y="5273183"/>
+            <a:ext cx="938077" cy="246221"/>
+          </a:xfrm>
+          <a:prstGeom prst="rect">
+            <a:avLst/>
+          </a:prstGeom>
+          <a:noFill/>
+          <a:ln w="19050">
+            <a:solidFill>
+              <a:srgbClr val="00B050"/>
+            </a:solidFill>
+          </a:ln>
+        </p:spPr>
+        <p:txBody>
+          <a:bodyPr wrap="none" rtlCol="0">
+            <a:spAutoFit/>
+          </a:bodyPr>
+          <a:lstStyle/>
+          <a:p>
+            <a:r>
+              <a:rPr lang="en-US" altLang="ko-KR" sz="1000" dirty="0" err="1">
+                <a:solidFill>
+                  <a:srgbClr val="000000"/>
+                </a:solidFill>
+                <a:latin typeface="Cascadia Mono" panose="020B0609020000020004" pitchFamily="49" charset="0"/>
+              </a:rPr>
+              <a:t>XgxVar</a:t>
+            </a:r>
+            <a:r>
+              <a:rPr lang="en-US" altLang="ko-KR" sz="1000" dirty="0">
+                <a:solidFill>
+                  <a:srgbClr val="00B0F0"/>
+                </a:solidFill>
+                <a:latin typeface="Cascadia Mono" panose="020B0609020000020004" pitchFamily="49" charset="0"/>
+              </a:rPr>
+              <a:t>&lt;'T&gt;</a:t>
+            </a:r>
+            <a:endParaRPr lang="ko-KR" altLang="en-US" sz="1000" dirty="0">
+              <a:solidFill>
+                <a:srgbClr val="00B0F0"/>
+              </a:solidFill>
+            </a:endParaRPr>
+          </a:p>
+        </p:txBody>
+      </p:sp>
+      <p:cxnSp>
+        <p:nvCxnSpPr>
+          <p:cNvPr id="12" name="직선 화살표 연결선 11">
+            <a:extLst>
+              <a:ext uri="{FF2B5EF4-FFF2-40B4-BE49-F238E27FC236}">
+                <a16:creationId xmlns:a16="http://schemas.microsoft.com/office/drawing/2014/main" id="{AD82E811-1818-B603-67F7-A140237DCBBA}"/>
+              </a:ext>
+            </a:extLst>
+          </p:cNvPr>
+          <p:cNvCxnSpPr>
+            <a:cxnSpLocks/>
+            <a:stCxn id="73" idx="2"/>
+            <a:endCxn id="7" idx="0"/>
+          </p:cNvCxnSpPr>
+          <p:nvPr/>
+        </p:nvCxnSpPr>
+        <p:spPr>
+          <a:xfrm>
+            <a:off x="963812" y="4757322"/>
+            <a:ext cx="1854835" cy="515861"/>
           </a:xfrm>
           <a:prstGeom prst="straightConnector1">
             <a:avLst/>
@@ -12048,6 +12159,1448 @@
     <p:extLst>
       <p:ext uri="{BB962C8B-B14F-4D97-AF65-F5344CB8AC3E}">
         <p14:creationId xmlns:p14="http://schemas.microsoft.com/office/powerpoint/2010/main" val="76146624"/>
+      </p:ext>
+    </p:extLst>
+  </p:cSld>
+  <p:clrMapOvr>
+    <a:masterClrMapping/>
+  </p:clrMapOvr>
+</p:sld>
+</file>
+
+<file path=ppt/slides/slide7.xml><?xml version="1.0" encoding="utf-8"?>
+<p:sld xmlns:a="http://schemas.openxmlformats.org/drawingml/2006/main" xmlns:r="http://schemas.openxmlformats.org/officeDocument/2006/relationships" xmlns:p="http://schemas.openxmlformats.org/presentationml/2006/main">
+  <p:cSld>
+    <p:spTree>
+      <p:nvGrpSpPr>
+        <p:cNvPr id="1" name=""/>
+        <p:cNvGrpSpPr/>
+        <p:nvPr/>
+      </p:nvGrpSpPr>
+      <p:grpSpPr>
+        <a:xfrm>
+          <a:off x="0" y="0"/>
+          <a:ext cx="0" cy="0"/>
+          <a:chOff x="0" y="0"/>
+          <a:chExt cx="0" cy="0"/>
+        </a:xfrm>
+      </p:grpSpPr>
+      <p:sp>
+        <p:nvSpPr>
+          <p:cNvPr id="2" name="제목 1">
+            <a:extLst>
+              <a:ext uri="{FF2B5EF4-FFF2-40B4-BE49-F238E27FC236}">
+                <a16:creationId xmlns:a16="http://schemas.microsoft.com/office/drawing/2014/main" id="{AFED7B07-7CDD-4AB5-BC9D-063A9EC0C851}"/>
+              </a:ext>
+            </a:extLst>
+          </p:cNvPr>
+          <p:cNvSpPr>
+            <a:spLocks noGrp="1"/>
+          </p:cNvSpPr>
+          <p:nvPr>
+            <p:ph type="title"/>
+          </p:nvPr>
+        </p:nvSpPr>
+        <p:spPr/>
+        <p:txBody>
+          <a:bodyPr/>
+          <a:lstStyle/>
+          <a:p>
+            <a:r>
+              <a:rPr lang="en-US" altLang="ko-KR" dirty="0"/>
+              <a:t>Expression</a:t>
+            </a:r>
+            <a:endParaRPr lang="ko-KR" altLang="en-US" dirty="0"/>
+          </a:p>
+        </p:txBody>
+      </p:sp>
+      <p:sp>
+        <p:nvSpPr>
+          <p:cNvPr id="6" name="TextBox 5">
+            <a:extLst>
+              <a:ext uri="{FF2B5EF4-FFF2-40B4-BE49-F238E27FC236}">
+                <a16:creationId xmlns:a16="http://schemas.microsoft.com/office/drawing/2014/main" id="{F3CD54B0-FFA9-3AF0-B40D-D21540C1A2E4}"/>
+              </a:ext>
+            </a:extLst>
+          </p:cNvPr>
+          <p:cNvSpPr txBox="1"/>
+          <p:nvPr/>
+        </p:nvSpPr>
+        <p:spPr>
+          <a:xfrm>
+            <a:off x="5061101" y="3244334"/>
+            <a:ext cx="1665841" cy="307777"/>
+          </a:xfrm>
+          <a:prstGeom prst="rect">
+            <a:avLst/>
+          </a:prstGeom>
+          <a:ln>
+            <a:prstDash val="dash"/>
+          </a:ln>
+        </p:spPr>
+        <p:style>
+          <a:lnRef idx="2">
+            <a:schemeClr val="dk1"/>
+          </a:lnRef>
+          <a:fillRef idx="1">
+            <a:schemeClr val="lt1"/>
+          </a:fillRef>
+          <a:effectRef idx="0">
+            <a:schemeClr val="dk1"/>
+          </a:effectRef>
+          <a:fontRef idx="minor">
+            <a:schemeClr val="dk1"/>
+          </a:fontRef>
+        </p:style>
+        <p:txBody>
+          <a:bodyPr wrap="none" rtlCol="0">
+            <a:spAutoFit/>
+          </a:bodyPr>
+          <a:lstStyle>
+            <a:defPPr>
+              <a:defRPr lang="ko-KR"/>
+            </a:defPPr>
+            <a:lvl1pPr>
+              <a:defRPr>
+                <a:solidFill>
+                  <a:srgbClr val="000000"/>
+                </a:solidFill>
+                <a:latin typeface="Cascadia Mono" panose="020B0609020000020004" pitchFamily="49" charset="0"/>
+              </a:defRPr>
+            </a:lvl1pPr>
+            <a:lvl2pPr>
+              <a:defRPr>
+                <a:solidFill>
+                  <a:schemeClr val="dk1"/>
+                </a:solidFill>
+              </a:defRPr>
+            </a:lvl2pPr>
+            <a:lvl3pPr>
+              <a:defRPr>
+                <a:solidFill>
+                  <a:schemeClr val="dk1"/>
+                </a:solidFill>
+              </a:defRPr>
+            </a:lvl3pPr>
+            <a:lvl4pPr>
+              <a:defRPr>
+                <a:solidFill>
+                  <a:schemeClr val="dk1"/>
+                </a:solidFill>
+              </a:defRPr>
+            </a:lvl4pPr>
+            <a:lvl5pPr>
+              <a:defRPr>
+                <a:solidFill>
+                  <a:schemeClr val="dk1"/>
+                </a:solidFill>
+              </a:defRPr>
+            </a:lvl5pPr>
+            <a:lvl6pPr>
+              <a:defRPr>
+                <a:solidFill>
+                  <a:schemeClr val="dk1"/>
+                </a:solidFill>
+              </a:defRPr>
+            </a:lvl6pPr>
+            <a:lvl7pPr>
+              <a:defRPr>
+                <a:solidFill>
+                  <a:schemeClr val="dk1"/>
+                </a:solidFill>
+              </a:defRPr>
+            </a:lvl7pPr>
+            <a:lvl8pPr>
+              <a:defRPr>
+                <a:solidFill>
+                  <a:schemeClr val="dk1"/>
+                </a:solidFill>
+              </a:defRPr>
+            </a:lvl8pPr>
+            <a:lvl9pPr>
+              <a:defRPr>
+                <a:solidFill>
+                  <a:schemeClr val="dk1"/>
+                </a:solidFill>
+              </a:defRPr>
+            </a:lvl9pPr>
+          </a:lstStyle>
+          <a:p>
+            <a:r>
+              <a:rPr lang="en-US" altLang="ko-KR" sz="1400" dirty="0" err="1"/>
+              <a:t>IExpression</a:t>
+            </a:r>
+            <a:r>
+              <a:rPr lang="en-US" altLang="ko-KR" sz="1400" dirty="0"/>
+              <a:t>&lt;T&gt;</a:t>
+            </a:r>
+            <a:endParaRPr lang="ko-KR" altLang="en-US" sz="1400" dirty="0"/>
+          </a:p>
+        </p:txBody>
+      </p:sp>
+      <p:sp>
+        <p:nvSpPr>
+          <p:cNvPr id="3" name="TextBox 2">
+            <a:extLst>
+              <a:ext uri="{FF2B5EF4-FFF2-40B4-BE49-F238E27FC236}">
+                <a16:creationId xmlns:a16="http://schemas.microsoft.com/office/drawing/2014/main" id="{5442C8A6-1B64-294C-EAC8-7D2507CDC60D}"/>
+              </a:ext>
+            </a:extLst>
+          </p:cNvPr>
+          <p:cNvSpPr txBox="1"/>
+          <p:nvPr/>
+        </p:nvSpPr>
+        <p:spPr>
+          <a:xfrm>
+            <a:off x="4771634" y="2027086"/>
+            <a:ext cx="1348446" cy="307777"/>
+          </a:xfrm>
+          <a:prstGeom prst="rect">
+            <a:avLst/>
+          </a:prstGeom>
+          <a:noFill/>
+          <a:ln w="19050">
+            <a:solidFill>
+              <a:srgbClr val="00B050"/>
+            </a:solidFill>
+          </a:ln>
+        </p:spPr>
+        <p:txBody>
+          <a:bodyPr wrap="none" rtlCol="0">
+            <a:spAutoFit/>
+          </a:bodyPr>
+          <a:lstStyle>
+            <a:defPPr>
+              <a:defRPr lang="ko-KR"/>
+            </a:defPPr>
+            <a:lvl1pPr>
+              <a:defRPr>
+                <a:solidFill>
+                  <a:srgbClr val="000000"/>
+                </a:solidFill>
+                <a:latin typeface="Cascadia Mono" panose="020B0609020000020004" pitchFamily="49" charset="0"/>
+              </a:defRPr>
+            </a:lvl1pPr>
+            <a:lvl2pPr>
+              <a:defRPr>
+                <a:solidFill>
+                  <a:schemeClr val="tx1"/>
+                </a:solidFill>
+              </a:defRPr>
+            </a:lvl2pPr>
+            <a:lvl3pPr>
+              <a:defRPr>
+                <a:solidFill>
+                  <a:schemeClr val="tx1"/>
+                </a:solidFill>
+              </a:defRPr>
+            </a:lvl3pPr>
+            <a:lvl4pPr>
+              <a:defRPr>
+                <a:solidFill>
+                  <a:schemeClr val="tx1"/>
+                </a:solidFill>
+              </a:defRPr>
+            </a:lvl4pPr>
+            <a:lvl5pPr>
+              <a:defRPr>
+                <a:solidFill>
+                  <a:schemeClr val="tx1"/>
+                </a:solidFill>
+              </a:defRPr>
+            </a:lvl5pPr>
+            <a:lvl6pPr>
+              <a:defRPr>
+                <a:solidFill>
+                  <a:schemeClr val="tx1"/>
+                </a:solidFill>
+              </a:defRPr>
+            </a:lvl6pPr>
+            <a:lvl7pPr>
+              <a:defRPr>
+                <a:solidFill>
+                  <a:schemeClr val="tx1"/>
+                </a:solidFill>
+              </a:defRPr>
+            </a:lvl7pPr>
+            <a:lvl8pPr>
+              <a:defRPr>
+                <a:solidFill>
+                  <a:schemeClr val="tx1"/>
+                </a:solidFill>
+              </a:defRPr>
+            </a:lvl8pPr>
+            <a:lvl9pPr>
+              <a:defRPr>
+                <a:solidFill>
+                  <a:schemeClr val="tx1"/>
+                </a:solidFill>
+              </a:defRPr>
+            </a:lvl9pPr>
+          </a:lstStyle>
+          <a:p>
+            <a:r>
+              <a:rPr lang="en-US" altLang="ko-KR" sz="1400" dirty="0"/>
+              <a:t>Terminal&lt;T&gt;</a:t>
+            </a:r>
+            <a:endParaRPr lang="ko-KR" altLang="en-US" sz="1400" dirty="0"/>
+          </a:p>
+        </p:txBody>
+      </p:sp>
+      <p:cxnSp>
+        <p:nvCxnSpPr>
+          <p:cNvPr id="9" name="직선 화살표 연결선 8">
+            <a:extLst>
+              <a:ext uri="{FF2B5EF4-FFF2-40B4-BE49-F238E27FC236}">
+                <a16:creationId xmlns:a16="http://schemas.microsoft.com/office/drawing/2014/main" id="{A0DBA294-F3F8-6173-1E13-70283F23306F}"/>
+              </a:ext>
+            </a:extLst>
+          </p:cNvPr>
+          <p:cNvCxnSpPr>
+            <a:cxnSpLocks/>
+            <a:stCxn id="3" idx="2"/>
+            <a:endCxn id="6" idx="0"/>
+          </p:cNvCxnSpPr>
+          <p:nvPr/>
+        </p:nvCxnSpPr>
+        <p:spPr>
+          <a:xfrm>
+            <a:off x="5445857" y="2334863"/>
+            <a:ext cx="448165" cy="909471"/>
+          </a:xfrm>
+          <a:prstGeom prst="straightConnector1">
+            <a:avLst/>
+          </a:prstGeom>
+          <a:ln>
+            <a:tailEnd type="triangle"/>
+          </a:ln>
+        </p:spPr>
+        <p:style>
+          <a:lnRef idx="1">
+            <a:schemeClr val="accent1"/>
+          </a:lnRef>
+          <a:fillRef idx="0">
+            <a:schemeClr val="accent1"/>
+          </a:fillRef>
+          <a:effectRef idx="0">
+            <a:schemeClr val="accent1"/>
+          </a:effectRef>
+          <a:fontRef idx="minor">
+            <a:schemeClr val="tx1"/>
+          </a:fontRef>
+        </p:style>
+      </p:cxnSp>
+      <p:sp>
+        <p:nvSpPr>
+          <p:cNvPr id="13" name="TextBox 12">
+            <a:extLst>
+              <a:ext uri="{FF2B5EF4-FFF2-40B4-BE49-F238E27FC236}">
+                <a16:creationId xmlns:a16="http://schemas.microsoft.com/office/drawing/2014/main" id="{F95C2A95-CC13-4CE5-6F64-E9002B273E53}"/>
+              </a:ext>
+            </a:extLst>
+          </p:cNvPr>
+          <p:cNvSpPr txBox="1"/>
+          <p:nvPr/>
+        </p:nvSpPr>
+        <p:spPr>
+          <a:xfrm>
+            <a:off x="295853" y="1680803"/>
+            <a:ext cx="3781805" cy="307777"/>
+          </a:xfrm>
+          <a:prstGeom prst="rect">
+            <a:avLst/>
+          </a:prstGeom>
+          <a:noFill/>
+          <a:ln w="19050">
+            <a:solidFill>
+              <a:srgbClr val="00B050"/>
+            </a:solidFill>
+          </a:ln>
+        </p:spPr>
+        <p:txBody>
+          <a:bodyPr wrap="none" rtlCol="0">
+            <a:spAutoFit/>
+          </a:bodyPr>
+          <a:lstStyle>
+            <a:defPPr>
+              <a:defRPr lang="ko-KR"/>
+            </a:defPPr>
+            <a:lvl1pPr>
+              <a:defRPr>
+                <a:solidFill>
+                  <a:srgbClr val="000000"/>
+                </a:solidFill>
+                <a:latin typeface="Cascadia Mono" panose="020B0609020000020004" pitchFamily="49" charset="0"/>
+              </a:defRPr>
+            </a:lvl1pPr>
+            <a:lvl2pPr>
+              <a:defRPr>
+                <a:solidFill>
+                  <a:schemeClr val="tx1"/>
+                </a:solidFill>
+              </a:defRPr>
+            </a:lvl2pPr>
+            <a:lvl3pPr>
+              <a:defRPr>
+                <a:solidFill>
+                  <a:schemeClr val="tx1"/>
+                </a:solidFill>
+              </a:defRPr>
+            </a:lvl3pPr>
+            <a:lvl4pPr>
+              <a:defRPr>
+                <a:solidFill>
+                  <a:schemeClr val="tx1"/>
+                </a:solidFill>
+              </a:defRPr>
+            </a:lvl4pPr>
+            <a:lvl5pPr>
+              <a:defRPr>
+                <a:solidFill>
+                  <a:schemeClr val="tx1"/>
+                </a:solidFill>
+              </a:defRPr>
+            </a:lvl5pPr>
+            <a:lvl6pPr>
+              <a:defRPr>
+                <a:solidFill>
+                  <a:schemeClr val="tx1"/>
+                </a:solidFill>
+              </a:defRPr>
+            </a:lvl6pPr>
+            <a:lvl7pPr>
+              <a:defRPr>
+                <a:solidFill>
+                  <a:schemeClr val="tx1"/>
+                </a:solidFill>
+              </a:defRPr>
+            </a:lvl7pPr>
+            <a:lvl8pPr>
+              <a:defRPr>
+                <a:solidFill>
+                  <a:schemeClr val="tx1"/>
+                </a:solidFill>
+              </a:defRPr>
+            </a:lvl8pPr>
+            <a:lvl9pPr>
+              <a:defRPr>
+                <a:solidFill>
+                  <a:schemeClr val="tx1"/>
+                </a:solidFill>
+              </a:defRPr>
+            </a:lvl9pPr>
+          </a:lstStyle>
+          <a:p>
+            <a:r>
+              <a:rPr lang="en-US" altLang="ko-KR" sz="1400" dirty="0" err="1"/>
+              <a:t>DuVariable</a:t>
+            </a:r>
+            <a:r>
+              <a:rPr lang="en-US" altLang="ko-KR" sz="1400" dirty="0"/>
+              <a:t> of </a:t>
+            </a:r>
+            <a:r>
+              <a:rPr lang="en-US" altLang="ko-KR" sz="1400" dirty="0" err="1"/>
+              <a:t>TypedValueStorage</a:t>
+            </a:r>
+            <a:r>
+              <a:rPr lang="en-US" altLang="ko-KR" sz="1400" dirty="0"/>
+              <a:t>&lt;T&gt;</a:t>
+            </a:r>
+            <a:endParaRPr lang="ko-KR" altLang="en-US" sz="1400" dirty="0"/>
+          </a:p>
+        </p:txBody>
+      </p:sp>
+      <p:sp>
+        <p:nvSpPr>
+          <p:cNvPr id="14" name="TextBox 13">
+            <a:extLst>
+              <a:ext uri="{FF2B5EF4-FFF2-40B4-BE49-F238E27FC236}">
+                <a16:creationId xmlns:a16="http://schemas.microsoft.com/office/drawing/2014/main" id="{6EBBF64F-7A95-E8A2-1B6E-6654A9A135FA}"/>
+              </a:ext>
+            </a:extLst>
+          </p:cNvPr>
+          <p:cNvSpPr txBox="1"/>
+          <p:nvPr/>
+        </p:nvSpPr>
+        <p:spPr>
+          <a:xfrm>
+            <a:off x="295853" y="2136528"/>
+            <a:ext cx="3252814" cy="307777"/>
+          </a:xfrm>
+          <a:prstGeom prst="rect">
+            <a:avLst/>
+          </a:prstGeom>
+          <a:noFill/>
+          <a:ln w="19050">
+            <a:solidFill>
+              <a:srgbClr val="00B050"/>
+            </a:solidFill>
+          </a:ln>
+        </p:spPr>
+        <p:txBody>
+          <a:bodyPr wrap="none" rtlCol="0">
+            <a:spAutoFit/>
+          </a:bodyPr>
+          <a:lstStyle>
+            <a:defPPr>
+              <a:defRPr lang="ko-KR"/>
+            </a:defPPr>
+            <a:lvl1pPr>
+              <a:defRPr>
+                <a:solidFill>
+                  <a:srgbClr val="000000"/>
+                </a:solidFill>
+                <a:latin typeface="Cascadia Mono" panose="020B0609020000020004" pitchFamily="49" charset="0"/>
+              </a:defRPr>
+            </a:lvl1pPr>
+            <a:lvl2pPr>
+              <a:defRPr>
+                <a:solidFill>
+                  <a:schemeClr val="tx1"/>
+                </a:solidFill>
+              </a:defRPr>
+            </a:lvl2pPr>
+            <a:lvl3pPr>
+              <a:defRPr>
+                <a:solidFill>
+                  <a:schemeClr val="tx1"/>
+                </a:solidFill>
+              </a:defRPr>
+            </a:lvl3pPr>
+            <a:lvl4pPr>
+              <a:defRPr>
+                <a:solidFill>
+                  <a:schemeClr val="tx1"/>
+                </a:solidFill>
+              </a:defRPr>
+            </a:lvl4pPr>
+            <a:lvl5pPr>
+              <a:defRPr>
+                <a:solidFill>
+                  <a:schemeClr val="tx1"/>
+                </a:solidFill>
+              </a:defRPr>
+            </a:lvl5pPr>
+            <a:lvl6pPr>
+              <a:defRPr>
+                <a:solidFill>
+                  <a:schemeClr val="tx1"/>
+                </a:solidFill>
+              </a:defRPr>
+            </a:lvl6pPr>
+            <a:lvl7pPr>
+              <a:defRPr>
+                <a:solidFill>
+                  <a:schemeClr val="tx1"/>
+                </a:solidFill>
+              </a:defRPr>
+            </a:lvl7pPr>
+            <a:lvl8pPr>
+              <a:defRPr>
+                <a:solidFill>
+                  <a:schemeClr val="tx1"/>
+                </a:solidFill>
+              </a:defRPr>
+            </a:lvl8pPr>
+            <a:lvl9pPr>
+              <a:defRPr>
+                <a:solidFill>
+                  <a:schemeClr val="tx1"/>
+                </a:solidFill>
+              </a:defRPr>
+            </a:lvl9pPr>
+          </a:lstStyle>
+          <a:p>
+            <a:r>
+              <a:rPr lang="en-US" altLang="ko-KR" sz="1400" dirty="0" err="1"/>
+              <a:t>DuLiteral</a:t>
+            </a:r>
+            <a:r>
+              <a:rPr lang="en-US" altLang="ko-KR" sz="1400" dirty="0"/>
+              <a:t> of </a:t>
+            </a:r>
+            <a:r>
+              <a:rPr lang="en-US" altLang="ko-KR" sz="1400" dirty="0" err="1"/>
+              <a:t>LiteralHolder</a:t>
+            </a:r>
+            <a:r>
+              <a:rPr lang="en-US" altLang="ko-KR" sz="1400" dirty="0"/>
+              <a:t>&lt;T&gt;</a:t>
+            </a:r>
+            <a:endParaRPr lang="ko-KR" altLang="en-US" sz="1400" dirty="0"/>
+          </a:p>
+        </p:txBody>
+      </p:sp>
+      <p:sp>
+        <p:nvSpPr>
+          <p:cNvPr id="16" name="TextBox 15">
+            <a:extLst>
+              <a:ext uri="{FF2B5EF4-FFF2-40B4-BE49-F238E27FC236}">
+                <a16:creationId xmlns:a16="http://schemas.microsoft.com/office/drawing/2014/main" id="{0772D853-A497-2B00-EA1A-74E8D97EEDDB}"/>
+              </a:ext>
+            </a:extLst>
+          </p:cNvPr>
+          <p:cNvSpPr txBox="1"/>
+          <p:nvPr/>
+        </p:nvSpPr>
+        <p:spPr>
+          <a:xfrm>
+            <a:off x="3352679" y="3244334"/>
+            <a:ext cx="1136850" cy="307777"/>
+          </a:xfrm>
+          <a:prstGeom prst="rect">
+            <a:avLst/>
+          </a:prstGeom>
+          <a:ln>
+            <a:prstDash val="dash"/>
+          </a:ln>
+        </p:spPr>
+        <p:style>
+          <a:lnRef idx="2">
+            <a:schemeClr val="dk1"/>
+          </a:lnRef>
+          <a:fillRef idx="1">
+            <a:schemeClr val="lt1"/>
+          </a:fillRef>
+          <a:effectRef idx="0">
+            <a:schemeClr val="dk1"/>
+          </a:effectRef>
+          <a:fontRef idx="minor">
+            <a:schemeClr val="dk1"/>
+          </a:fontRef>
+        </p:style>
+        <p:txBody>
+          <a:bodyPr wrap="none" rtlCol="0">
+            <a:spAutoFit/>
+          </a:bodyPr>
+          <a:lstStyle>
+            <a:defPPr>
+              <a:defRPr lang="ko-KR"/>
+            </a:defPPr>
+            <a:lvl1pPr>
+              <a:defRPr>
+                <a:solidFill>
+                  <a:srgbClr val="000000"/>
+                </a:solidFill>
+                <a:latin typeface="Cascadia Mono" panose="020B0609020000020004" pitchFamily="49" charset="0"/>
+              </a:defRPr>
+            </a:lvl1pPr>
+            <a:lvl2pPr>
+              <a:defRPr>
+                <a:solidFill>
+                  <a:schemeClr val="dk1"/>
+                </a:solidFill>
+              </a:defRPr>
+            </a:lvl2pPr>
+            <a:lvl3pPr>
+              <a:defRPr>
+                <a:solidFill>
+                  <a:schemeClr val="dk1"/>
+                </a:solidFill>
+              </a:defRPr>
+            </a:lvl3pPr>
+            <a:lvl4pPr>
+              <a:defRPr>
+                <a:solidFill>
+                  <a:schemeClr val="dk1"/>
+                </a:solidFill>
+              </a:defRPr>
+            </a:lvl4pPr>
+            <a:lvl5pPr>
+              <a:defRPr>
+                <a:solidFill>
+                  <a:schemeClr val="dk1"/>
+                </a:solidFill>
+              </a:defRPr>
+            </a:lvl5pPr>
+            <a:lvl6pPr>
+              <a:defRPr>
+                <a:solidFill>
+                  <a:schemeClr val="dk1"/>
+                </a:solidFill>
+              </a:defRPr>
+            </a:lvl6pPr>
+            <a:lvl7pPr>
+              <a:defRPr>
+                <a:solidFill>
+                  <a:schemeClr val="dk1"/>
+                </a:solidFill>
+              </a:defRPr>
+            </a:lvl7pPr>
+            <a:lvl8pPr>
+              <a:defRPr>
+                <a:solidFill>
+                  <a:schemeClr val="dk1"/>
+                </a:solidFill>
+              </a:defRPr>
+            </a:lvl8pPr>
+            <a:lvl9pPr>
+              <a:defRPr>
+                <a:solidFill>
+                  <a:schemeClr val="dk1"/>
+                </a:solidFill>
+              </a:defRPr>
+            </a:lvl9pPr>
+          </a:lstStyle>
+          <a:p>
+            <a:r>
+              <a:rPr lang="en-US" altLang="ko-KR" sz="1400" dirty="0" err="1"/>
+              <a:t>ITerminal</a:t>
+            </a:r>
+            <a:endParaRPr lang="ko-KR" altLang="en-US" sz="1400" dirty="0"/>
+          </a:p>
+        </p:txBody>
+      </p:sp>
+      <p:cxnSp>
+        <p:nvCxnSpPr>
+          <p:cNvPr id="17" name="직선 화살표 연결선 16">
+            <a:extLst>
+              <a:ext uri="{FF2B5EF4-FFF2-40B4-BE49-F238E27FC236}">
+                <a16:creationId xmlns:a16="http://schemas.microsoft.com/office/drawing/2014/main" id="{0B73EDFE-2779-81A6-91D8-0307DAB4C5BE}"/>
+              </a:ext>
+            </a:extLst>
+          </p:cNvPr>
+          <p:cNvCxnSpPr>
+            <a:cxnSpLocks/>
+            <a:stCxn id="3" idx="2"/>
+            <a:endCxn id="16" idx="0"/>
+          </p:cNvCxnSpPr>
+          <p:nvPr/>
+        </p:nvCxnSpPr>
+        <p:spPr>
+          <a:xfrm flipH="1">
+            <a:off x="3921104" y="2334863"/>
+            <a:ext cx="1524753" cy="909471"/>
+          </a:xfrm>
+          <a:prstGeom prst="straightConnector1">
+            <a:avLst/>
+          </a:prstGeom>
+          <a:ln>
+            <a:tailEnd type="triangle"/>
+          </a:ln>
+        </p:spPr>
+        <p:style>
+          <a:lnRef idx="1">
+            <a:schemeClr val="accent1"/>
+          </a:lnRef>
+          <a:fillRef idx="0">
+            <a:schemeClr val="accent1"/>
+          </a:fillRef>
+          <a:effectRef idx="0">
+            <a:schemeClr val="accent1"/>
+          </a:effectRef>
+          <a:fontRef idx="minor">
+            <a:schemeClr val="tx1"/>
+          </a:fontRef>
+        </p:style>
+      </p:cxnSp>
+      <p:sp>
+        <p:nvSpPr>
+          <p:cNvPr id="19" name="TextBox 18">
+            <a:extLst>
+              <a:ext uri="{FF2B5EF4-FFF2-40B4-BE49-F238E27FC236}">
+                <a16:creationId xmlns:a16="http://schemas.microsoft.com/office/drawing/2014/main" id="{44318D03-B2B7-8B5B-AD9F-19F0551FCA56}"/>
+              </a:ext>
+            </a:extLst>
+          </p:cNvPr>
+          <p:cNvSpPr txBox="1"/>
+          <p:nvPr/>
+        </p:nvSpPr>
+        <p:spPr>
+          <a:xfrm>
+            <a:off x="295853" y="3236150"/>
+            <a:ext cx="1031051" cy="307777"/>
+          </a:xfrm>
+          <a:prstGeom prst="rect">
+            <a:avLst/>
+          </a:prstGeom>
+          <a:ln>
+            <a:prstDash val="dash"/>
+          </a:ln>
+        </p:spPr>
+        <p:style>
+          <a:lnRef idx="2">
+            <a:schemeClr val="dk1"/>
+          </a:lnRef>
+          <a:fillRef idx="1">
+            <a:schemeClr val="lt1"/>
+          </a:fillRef>
+          <a:effectRef idx="0">
+            <a:schemeClr val="dk1"/>
+          </a:effectRef>
+          <a:fontRef idx="minor">
+            <a:schemeClr val="dk1"/>
+          </a:fontRef>
+        </p:style>
+        <p:txBody>
+          <a:bodyPr wrap="none" rtlCol="0">
+            <a:spAutoFit/>
+          </a:bodyPr>
+          <a:lstStyle>
+            <a:defPPr>
+              <a:defRPr lang="ko-KR"/>
+            </a:defPPr>
+            <a:lvl1pPr>
+              <a:defRPr>
+                <a:solidFill>
+                  <a:srgbClr val="000000"/>
+                </a:solidFill>
+                <a:latin typeface="Cascadia Mono" panose="020B0609020000020004" pitchFamily="49" charset="0"/>
+              </a:defRPr>
+            </a:lvl1pPr>
+            <a:lvl2pPr>
+              <a:defRPr>
+                <a:solidFill>
+                  <a:schemeClr val="dk1"/>
+                </a:solidFill>
+              </a:defRPr>
+            </a:lvl2pPr>
+            <a:lvl3pPr>
+              <a:defRPr>
+                <a:solidFill>
+                  <a:schemeClr val="dk1"/>
+                </a:solidFill>
+              </a:defRPr>
+            </a:lvl3pPr>
+            <a:lvl4pPr>
+              <a:defRPr>
+                <a:solidFill>
+                  <a:schemeClr val="dk1"/>
+                </a:solidFill>
+              </a:defRPr>
+            </a:lvl4pPr>
+            <a:lvl5pPr>
+              <a:defRPr>
+                <a:solidFill>
+                  <a:schemeClr val="dk1"/>
+                </a:solidFill>
+              </a:defRPr>
+            </a:lvl5pPr>
+            <a:lvl6pPr>
+              <a:defRPr>
+                <a:solidFill>
+                  <a:schemeClr val="dk1"/>
+                </a:solidFill>
+              </a:defRPr>
+            </a:lvl6pPr>
+            <a:lvl7pPr>
+              <a:defRPr>
+                <a:solidFill>
+                  <a:schemeClr val="dk1"/>
+                </a:solidFill>
+              </a:defRPr>
+            </a:lvl7pPr>
+            <a:lvl8pPr>
+              <a:defRPr>
+                <a:solidFill>
+                  <a:schemeClr val="dk1"/>
+                </a:solidFill>
+              </a:defRPr>
+            </a:lvl8pPr>
+            <a:lvl9pPr>
+              <a:defRPr>
+                <a:solidFill>
+                  <a:schemeClr val="dk1"/>
+                </a:solidFill>
+              </a:defRPr>
+            </a:lvl9pPr>
+          </a:lstStyle>
+          <a:p>
+            <a:r>
+              <a:rPr lang="en-US" altLang="ko-KR" sz="1400" dirty="0" err="1"/>
+              <a:t>IStorage</a:t>
+            </a:r>
+            <a:endParaRPr lang="ko-KR" altLang="en-US" sz="1400" dirty="0"/>
+          </a:p>
+        </p:txBody>
+      </p:sp>
+      <p:sp>
+        <p:nvSpPr>
+          <p:cNvPr id="20" name="TextBox 19">
+            <a:extLst>
+              <a:ext uri="{FF2B5EF4-FFF2-40B4-BE49-F238E27FC236}">
+                <a16:creationId xmlns:a16="http://schemas.microsoft.com/office/drawing/2014/main" id="{D07950CA-EEF2-9165-6A9A-AA53E811CF30}"/>
+              </a:ext>
+            </a:extLst>
+          </p:cNvPr>
+          <p:cNvSpPr txBox="1"/>
+          <p:nvPr/>
+        </p:nvSpPr>
+        <p:spPr>
+          <a:xfrm>
+            <a:off x="295853" y="3673258"/>
+            <a:ext cx="2829621" cy="307777"/>
+          </a:xfrm>
+          <a:prstGeom prst="rect">
+            <a:avLst/>
+          </a:prstGeom>
+          <a:ln>
+            <a:prstDash val="dash"/>
+          </a:ln>
+        </p:spPr>
+        <p:style>
+          <a:lnRef idx="2">
+            <a:schemeClr val="dk1"/>
+          </a:lnRef>
+          <a:fillRef idx="1">
+            <a:schemeClr val="lt1"/>
+          </a:fillRef>
+          <a:effectRef idx="0">
+            <a:schemeClr val="dk1"/>
+          </a:effectRef>
+          <a:fontRef idx="minor">
+            <a:schemeClr val="dk1"/>
+          </a:fontRef>
+        </p:style>
+        <p:txBody>
+          <a:bodyPr wrap="none" rtlCol="0">
+            <a:spAutoFit/>
+          </a:bodyPr>
+          <a:lstStyle>
+            <a:defPPr>
+              <a:defRPr lang="ko-KR"/>
+            </a:defPPr>
+            <a:lvl1pPr>
+              <a:defRPr>
+                <a:solidFill>
+                  <a:srgbClr val="000000"/>
+                </a:solidFill>
+                <a:latin typeface="Cascadia Mono" panose="020B0609020000020004" pitchFamily="49" charset="0"/>
+              </a:defRPr>
+            </a:lvl1pPr>
+            <a:lvl2pPr>
+              <a:defRPr>
+                <a:solidFill>
+                  <a:schemeClr val="dk1"/>
+                </a:solidFill>
+              </a:defRPr>
+            </a:lvl2pPr>
+            <a:lvl3pPr>
+              <a:defRPr>
+                <a:solidFill>
+                  <a:schemeClr val="dk1"/>
+                </a:solidFill>
+              </a:defRPr>
+            </a:lvl3pPr>
+            <a:lvl4pPr>
+              <a:defRPr>
+                <a:solidFill>
+                  <a:schemeClr val="dk1"/>
+                </a:solidFill>
+              </a:defRPr>
+            </a:lvl4pPr>
+            <a:lvl5pPr>
+              <a:defRPr>
+                <a:solidFill>
+                  <a:schemeClr val="dk1"/>
+                </a:solidFill>
+              </a:defRPr>
+            </a:lvl5pPr>
+            <a:lvl6pPr>
+              <a:defRPr>
+                <a:solidFill>
+                  <a:schemeClr val="dk1"/>
+                </a:solidFill>
+              </a:defRPr>
+            </a:lvl6pPr>
+            <a:lvl7pPr>
+              <a:defRPr>
+                <a:solidFill>
+                  <a:schemeClr val="dk1"/>
+                </a:solidFill>
+              </a:defRPr>
+            </a:lvl7pPr>
+            <a:lvl8pPr>
+              <a:defRPr>
+                <a:solidFill>
+                  <a:schemeClr val="dk1"/>
+                </a:solidFill>
+              </a:defRPr>
+            </a:lvl8pPr>
+            <a:lvl9pPr>
+              <a:defRPr>
+                <a:solidFill>
+                  <a:schemeClr val="dk1"/>
+                </a:solidFill>
+              </a:defRPr>
+            </a:lvl9pPr>
+          </a:lstStyle>
+          <a:p>
+            <a:r>
+              <a:rPr lang="en-US" altLang="ko-KR" sz="1400" dirty="0" err="1"/>
+              <a:t>IExpressionizableTerminal</a:t>
+            </a:r>
+            <a:endParaRPr lang="ko-KR" altLang="en-US" sz="1400" dirty="0"/>
+          </a:p>
+        </p:txBody>
+      </p:sp>
+      <p:cxnSp>
+        <p:nvCxnSpPr>
+          <p:cNvPr id="22" name="직선 화살표 연결선 21">
+            <a:extLst>
+              <a:ext uri="{FF2B5EF4-FFF2-40B4-BE49-F238E27FC236}">
+                <a16:creationId xmlns:a16="http://schemas.microsoft.com/office/drawing/2014/main" id="{7AA4C12E-8AA6-2BAC-2E5F-7A6C39AB91C2}"/>
+              </a:ext>
+            </a:extLst>
+          </p:cNvPr>
+          <p:cNvCxnSpPr>
+            <a:cxnSpLocks/>
+            <a:stCxn id="16" idx="1"/>
+            <a:endCxn id="19" idx="3"/>
+          </p:cNvCxnSpPr>
+          <p:nvPr/>
+        </p:nvCxnSpPr>
+        <p:spPr>
+          <a:xfrm flipH="1" flipV="1">
+            <a:off x="1326904" y="3390039"/>
+            <a:ext cx="2025775" cy="8184"/>
+          </a:xfrm>
+          <a:prstGeom prst="straightConnector1">
+            <a:avLst/>
+          </a:prstGeom>
+          <a:ln>
+            <a:prstDash val="lgDash"/>
+            <a:tailEnd type="triangle"/>
+          </a:ln>
+        </p:spPr>
+        <p:style>
+          <a:lnRef idx="1">
+            <a:schemeClr val="accent1"/>
+          </a:lnRef>
+          <a:fillRef idx="0">
+            <a:schemeClr val="accent1"/>
+          </a:fillRef>
+          <a:effectRef idx="0">
+            <a:schemeClr val="accent1"/>
+          </a:effectRef>
+          <a:fontRef idx="minor">
+            <a:schemeClr val="tx1"/>
+          </a:fontRef>
+        </p:style>
+      </p:cxnSp>
+      <p:cxnSp>
+        <p:nvCxnSpPr>
+          <p:cNvPr id="26" name="직선 화살표 연결선 25">
+            <a:extLst>
+              <a:ext uri="{FF2B5EF4-FFF2-40B4-BE49-F238E27FC236}">
+                <a16:creationId xmlns:a16="http://schemas.microsoft.com/office/drawing/2014/main" id="{0D20E34B-4BBE-4F3E-6231-809604039A0E}"/>
+              </a:ext>
+            </a:extLst>
+          </p:cNvPr>
+          <p:cNvCxnSpPr>
+            <a:cxnSpLocks/>
+            <a:stCxn id="16" idx="1"/>
+            <a:endCxn id="20" idx="3"/>
+          </p:cNvCxnSpPr>
+          <p:nvPr/>
+        </p:nvCxnSpPr>
+        <p:spPr>
+          <a:xfrm flipH="1">
+            <a:off x="3125474" y="3398223"/>
+            <a:ext cx="227205" cy="428924"/>
+          </a:xfrm>
+          <a:prstGeom prst="straightConnector1">
+            <a:avLst/>
+          </a:prstGeom>
+          <a:ln>
+            <a:prstDash val="lgDash"/>
+            <a:tailEnd type="triangle"/>
+          </a:ln>
+        </p:spPr>
+        <p:style>
+          <a:lnRef idx="1">
+            <a:schemeClr val="accent1"/>
+          </a:lnRef>
+          <a:fillRef idx="0">
+            <a:schemeClr val="accent1"/>
+          </a:fillRef>
+          <a:effectRef idx="0">
+            <a:schemeClr val="accent1"/>
+          </a:effectRef>
+          <a:fontRef idx="minor">
+            <a:schemeClr val="tx1"/>
+          </a:fontRef>
+        </p:style>
+      </p:cxnSp>
+      <p:sp>
+        <p:nvSpPr>
+          <p:cNvPr id="31" name="TextBox 30">
+            <a:extLst>
+              <a:ext uri="{FF2B5EF4-FFF2-40B4-BE49-F238E27FC236}">
+                <a16:creationId xmlns:a16="http://schemas.microsoft.com/office/drawing/2014/main" id="{FDA20BDB-1C0D-54DB-99EB-539D1C5B774E}"/>
+              </a:ext>
+            </a:extLst>
+          </p:cNvPr>
+          <p:cNvSpPr txBox="1"/>
+          <p:nvPr/>
+        </p:nvSpPr>
+        <p:spPr>
+          <a:xfrm>
+            <a:off x="7274577" y="1988580"/>
+            <a:ext cx="1560042" cy="307777"/>
+          </a:xfrm>
+          <a:prstGeom prst="rect">
+            <a:avLst/>
+          </a:prstGeom>
+          <a:noFill/>
+          <a:ln w="19050">
+            <a:solidFill>
+              <a:srgbClr val="00B050"/>
+            </a:solidFill>
+          </a:ln>
+        </p:spPr>
+        <p:txBody>
+          <a:bodyPr wrap="none" rtlCol="0">
+            <a:spAutoFit/>
+          </a:bodyPr>
+          <a:lstStyle>
+            <a:defPPr>
+              <a:defRPr lang="ko-KR"/>
+            </a:defPPr>
+            <a:lvl1pPr>
+              <a:defRPr>
+                <a:solidFill>
+                  <a:srgbClr val="000000"/>
+                </a:solidFill>
+                <a:latin typeface="Cascadia Mono" panose="020B0609020000020004" pitchFamily="49" charset="0"/>
+              </a:defRPr>
+            </a:lvl1pPr>
+            <a:lvl2pPr>
+              <a:defRPr>
+                <a:solidFill>
+                  <a:schemeClr val="tx1"/>
+                </a:solidFill>
+              </a:defRPr>
+            </a:lvl2pPr>
+            <a:lvl3pPr>
+              <a:defRPr>
+                <a:solidFill>
+                  <a:schemeClr val="tx1"/>
+                </a:solidFill>
+              </a:defRPr>
+            </a:lvl3pPr>
+            <a:lvl4pPr>
+              <a:defRPr>
+                <a:solidFill>
+                  <a:schemeClr val="tx1"/>
+                </a:solidFill>
+              </a:defRPr>
+            </a:lvl4pPr>
+            <a:lvl5pPr>
+              <a:defRPr>
+                <a:solidFill>
+                  <a:schemeClr val="tx1"/>
+                </a:solidFill>
+              </a:defRPr>
+            </a:lvl5pPr>
+            <a:lvl6pPr>
+              <a:defRPr>
+                <a:solidFill>
+                  <a:schemeClr val="tx1"/>
+                </a:solidFill>
+              </a:defRPr>
+            </a:lvl6pPr>
+            <a:lvl7pPr>
+              <a:defRPr>
+                <a:solidFill>
+                  <a:schemeClr val="tx1"/>
+                </a:solidFill>
+              </a:defRPr>
+            </a:lvl7pPr>
+            <a:lvl8pPr>
+              <a:defRPr>
+                <a:solidFill>
+                  <a:schemeClr val="tx1"/>
+                </a:solidFill>
+              </a:defRPr>
+            </a:lvl8pPr>
+            <a:lvl9pPr>
+              <a:defRPr>
+                <a:solidFill>
+                  <a:schemeClr val="tx1"/>
+                </a:solidFill>
+              </a:defRPr>
+            </a:lvl9pPr>
+          </a:lstStyle>
+          <a:p>
+            <a:r>
+              <a:rPr lang="en-US" altLang="ko-KR" sz="1400" dirty="0"/>
+              <a:t>Expression&lt;T&gt;</a:t>
+            </a:r>
+            <a:endParaRPr lang="ko-KR" altLang="en-US" sz="1400" dirty="0"/>
+          </a:p>
+        </p:txBody>
+      </p:sp>
+      <p:cxnSp>
+        <p:nvCxnSpPr>
+          <p:cNvPr id="32" name="직선 화살표 연결선 31">
+            <a:extLst>
+              <a:ext uri="{FF2B5EF4-FFF2-40B4-BE49-F238E27FC236}">
+                <a16:creationId xmlns:a16="http://schemas.microsoft.com/office/drawing/2014/main" id="{C2BB727F-F77D-0BE4-2C01-35DC501DB5B3}"/>
+              </a:ext>
+            </a:extLst>
+          </p:cNvPr>
+          <p:cNvCxnSpPr>
+            <a:cxnSpLocks/>
+            <a:stCxn id="31" idx="2"/>
+            <a:endCxn id="6" idx="0"/>
+          </p:cNvCxnSpPr>
+          <p:nvPr/>
+        </p:nvCxnSpPr>
+        <p:spPr>
+          <a:xfrm flipH="1">
+            <a:off x="5894022" y="2296357"/>
+            <a:ext cx="2160576" cy="947977"/>
+          </a:xfrm>
+          <a:prstGeom prst="straightConnector1">
+            <a:avLst/>
+          </a:prstGeom>
+          <a:ln>
+            <a:tailEnd type="triangle"/>
+          </a:ln>
+        </p:spPr>
+        <p:style>
+          <a:lnRef idx="1">
+            <a:schemeClr val="accent1"/>
+          </a:lnRef>
+          <a:fillRef idx="0">
+            <a:schemeClr val="accent1"/>
+          </a:fillRef>
+          <a:effectRef idx="0">
+            <a:schemeClr val="accent1"/>
+          </a:effectRef>
+          <a:fontRef idx="minor">
+            <a:schemeClr val="tx1"/>
+          </a:fontRef>
+        </p:style>
+      </p:cxnSp>
+      <p:sp>
+        <p:nvSpPr>
+          <p:cNvPr id="34" name="TextBox 33">
+            <a:extLst>
+              <a:ext uri="{FF2B5EF4-FFF2-40B4-BE49-F238E27FC236}">
+                <a16:creationId xmlns:a16="http://schemas.microsoft.com/office/drawing/2014/main" id="{B9615EA3-687A-58FF-07B3-9527F3D20196}"/>
+              </a:ext>
+            </a:extLst>
+          </p:cNvPr>
+          <p:cNvSpPr txBox="1"/>
+          <p:nvPr/>
+        </p:nvSpPr>
+        <p:spPr>
+          <a:xfrm>
+            <a:off x="9681226" y="1711811"/>
+            <a:ext cx="2829621" cy="307777"/>
+          </a:xfrm>
+          <a:prstGeom prst="rect">
+            <a:avLst/>
+          </a:prstGeom>
+          <a:noFill/>
+          <a:ln w="19050">
+            <a:solidFill>
+              <a:srgbClr val="00B050"/>
+            </a:solidFill>
+          </a:ln>
+        </p:spPr>
+        <p:txBody>
+          <a:bodyPr wrap="none" rtlCol="0">
+            <a:spAutoFit/>
+          </a:bodyPr>
+          <a:lstStyle>
+            <a:defPPr>
+              <a:defRPr lang="ko-KR"/>
+            </a:defPPr>
+            <a:lvl1pPr>
+              <a:defRPr>
+                <a:solidFill>
+                  <a:srgbClr val="000000"/>
+                </a:solidFill>
+                <a:latin typeface="Cascadia Mono" panose="020B0609020000020004" pitchFamily="49" charset="0"/>
+              </a:defRPr>
+            </a:lvl1pPr>
+            <a:lvl2pPr>
+              <a:defRPr>
+                <a:solidFill>
+                  <a:schemeClr val="tx1"/>
+                </a:solidFill>
+              </a:defRPr>
+            </a:lvl2pPr>
+            <a:lvl3pPr>
+              <a:defRPr>
+                <a:solidFill>
+                  <a:schemeClr val="tx1"/>
+                </a:solidFill>
+              </a:defRPr>
+            </a:lvl3pPr>
+            <a:lvl4pPr>
+              <a:defRPr>
+                <a:solidFill>
+                  <a:schemeClr val="tx1"/>
+                </a:solidFill>
+              </a:defRPr>
+            </a:lvl4pPr>
+            <a:lvl5pPr>
+              <a:defRPr>
+                <a:solidFill>
+                  <a:schemeClr val="tx1"/>
+                </a:solidFill>
+              </a:defRPr>
+            </a:lvl5pPr>
+            <a:lvl6pPr>
+              <a:defRPr>
+                <a:solidFill>
+                  <a:schemeClr val="tx1"/>
+                </a:solidFill>
+              </a:defRPr>
+            </a:lvl6pPr>
+            <a:lvl7pPr>
+              <a:defRPr>
+                <a:solidFill>
+                  <a:schemeClr val="tx1"/>
+                </a:solidFill>
+              </a:defRPr>
+            </a:lvl7pPr>
+            <a:lvl8pPr>
+              <a:defRPr>
+                <a:solidFill>
+                  <a:schemeClr val="tx1"/>
+                </a:solidFill>
+              </a:defRPr>
+            </a:lvl8pPr>
+            <a:lvl9pPr>
+              <a:defRPr>
+                <a:solidFill>
+                  <a:schemeClr val="tx1"/>
+                </a:solidFill>
+              </a:defRPr>
+            </a:lvl9pPr>
+          </a:lstStyle>
+          <a:p>
+            <a:r>
+              <a:rPr lang="en-US" altLang="ko-KR" sz="1400" dirty="0" err="1"/>
+              <a:t>DuTerminal</a:t>
+            </a:r>
+            <a:r>
+              <a:rPr lang="en-US" altLang="ko-KR" sz="1400" dirty="0"/>
+              <a:t> of Terminal&lt;T&gt;</a:t>
+            </a:r>
+            <a:endParaRPr lang="ko-KR" altLang="en-US" sz="1400" dirty="0"/>
+          </a:p>
+        </p:txBody>
+      </p:sp>
+      <p:sp>
+        <p:nvSpPr>
+          <p:cNvPr id="35" name="TextBox 34">
+            <a:extLst>
+              <a:ext uri="{FF2B5EF4-FFF2-40B4-BE49-F238E27FC236}">
+                <a16:creationId xmlns:a16="http://schemas.microsoft.com/office/drawing/2014/main" id="{48A6A9D1-7D58-C044-BE73-CD44411E272B}"/>
+              </a:ext>
+            </a:extLst>
+          </p:cNvPr>
+          <p:cNvSpPr txBox="1"/>
+          <p:nvPr/>
+        </p:nvSpPr>
+        <p:spPr>
+          <a:xfrm>
+            <a:off x="9681226" y="2167536"/>
+            <a:ext cx="1242648" cy="307777"/>
+          </a:xfrm>
+          <a:prstGeom prst="rect">
+            <a:avLst/>
+          </a:prstGeom>
+          <a:noFill/>
+          <a:ln w="19050">
+            <a:solidFill>
+              <a:srgbClr val="00B050"/>
+            </a:solidFill>
+          </a:ln>
+        </p:spPr>
+        <p:txBody>
+          <a:bodyPr wrap="none" rtlCol="0">
+            <a:spAutoFit/>
+          </a:bodyPr>
+          <a:lstStyle>
+            <a:defPPr>
+              <a:defRPr lang="ko-KR"/>
+            </a:defPPr>
+            <a:lvl1pPr>
+              <a:defRPr>
+                <a:solidFill>
+                  <a:srgbClr val="000000"/>
+                </a:solidFill>
+                <a:latin typeface="Cascadia Mono" panose="020B0609020000020004" pitchFamily="49" charset="0"/>
+              </a:defRPr>
+            </a:lvl1pPr>
+            <a:lvl2pPr>
+              <a:defRPr>
+                <a:solidFill>
+                  <a:schemeClr val="tx1"/>
+                </a:solidFill>
+              </a:defRPr>
+            </a:lvl2pPr>
+            <a:lvl3pPr>
+              <a:defRPr>
+                <a:solidFill>
+                  <a:schemeClr val="tx1"/>
+                </a:solidFill>
+              </a:defRPr>
+            </a:lvl3pPr>
+            <a:lvl4pPr>
+              <a:defRPr>
+                <a:solidFill>
+                  <a:schemeClr val="tx1"/>
+                </a:solidFill>
+              </a:defRPr>
+            </a:lvl4pPr>
+            <a:lvl5pPr>
+              <a:defRPr>
+                <a:solidFill>
+                  <a:schemeClr val="tx1"/>
+                </a:solidFill>
+              </a:defRPr>
+            </a:lvl5pPr>
+            <a:lvl6pPr>
+              <a:defRPr>
+                <a:solidFill>
+                  <a:schemeClr val="tx1"/>
+                </a:solidFill>
+              </a:defRPr>
+            </a:lvl6pPr>
+            <a:lvl7pPr>
+              <a:defRPr>
+                <a:solidFill>
+                  <a:schemeClr val="tx1"/>
+                </a:solidFill>
+              </a:defRPr>
+            </a:lvl7pPr>
+            <a:lvl8pPr>
+              <a:defRPr>
+                <a:solidFill>
+                  <a:schemeClr val="tx1"/>
+                </a:solidFill>
+              </a:defRPr>
+            </a:lvl8pPr>
+            <a:lvl9pPr>
+              <a:defRPr>
+                <a:solidFill>
+                  <a:schemeClr val="tx1"/>
+                </a:solidFill>
+              </a:defRPr>
+            </a:lvl9pPr>
+          </a:lstStyle>
+          <a:p>
+            <a:r>
+              <a:rPr lang="en-US" altLang="ko-KR" sz="1400" dirty="0" err="1"/>
+              <a:t>DuFunction</a:t>
+            </a:r>
+            <a:endParaRPr lang="ko-KR" altLang="en-US" sz="1400" dirty="0"/>
+          </a:p>
+        </p:txBody>
+      </p:sp>
+    </p:spTree>
+    <p:extLst>
+      <p:ext uri="{BB962C8B-B14F-4D97-AF65-F5344CB8AC3E}">
+        <p14:creationId xmlns:p14="http://schemas.microsoft.com/office/powerpoint/2010/main" val="1891761552"/>
       </p:ext>
     </p:extLst>
   </p:cSld>

</xml_diff>

<commit_message>
- DSV2: Dll hierarchy 정리
</commit_message>
<xml_diff>
--- a/DsDotNet/src/Doc/Hierachies.pptx
+++ b/DsDotNet/src/Doc/Hierachies.pptx
@@ -6,7 +6,7 @@
   </p:sldMasterIdLst>
   <p:sldIdLst>
     <p:sldId id="257" r:id="rId2"/>
-    <p:sldId id="256" r:id="rId3"/>
+    <p:sldId id="264" r:id="rId3"/>
     <p:sldId id="260" r:id="rId4"/>
     <p:sldId id="258" r:id="rId5"/>
     <p:sldId id="261" r:id="rId6"/>
@@ -15,6 +15,9 @@
   </p:sldIdLst>
   <p:sldSz cx="12192000" cy="6858000"/>
   <p:notesSz cx="6858000" cy="9144000"/>
+  <p:custDataLst>
+    <p:tags r:id="rId9"/>
+  </p:custDataLst>
   <p:defaultTextStyle>
     <a:defPPr>
       <a:defRPr lang="ko-KR"/>
@@ -265,7 +268,7 @@
           <a:p>
             <a:fld id="{EA4CFCB8-2150-4D86-B261-B3D299AF0C48}" type="datetimeFigureOut">
               <a:rPr lang="ko-KR" altLang="en-US" smtClean="0"/>
-              <a:t>2024-04-26</a:t>
+              <a:t>2025-01-17</a:t>
             </a:fld>
             <a:endParaRPr lang="ko-KR" altLang="en-US" dirty="0"/>
           </a:p>
@@ -463,7 +466,7 @@
           <a:p>
             <a:fld id="{EA4CFCB8-2150-4D86-B261-B3D299AF0C48}" type="datetimeFigureOut">
               <a:rPr lang="ko-KR" altLang="en-US" smtClean="0"/>
-              <a:t>2024-04-26</a:t>
+              <a:t>2025-01-17</a:t>
             </a:fld>
             <a:endParaRPr lang="ko-KR" altLang="en-US" dirty="0"/>
           </a:p>
@@ -671,7 +674,7 @@
           <a:p>
             <a:fld id="{EA4CFCB8-2150-4D86-B261-B3D299AF0C48}" type="datetimeFigureOut">
               <a:rPr lang="ko-KR" altLang="en-US" smtClean="0"/>
-              <a:t>2024-04-26</a:t>
+              <a:t>2025-01-17</a:t>
             </a:fld>
             <a:endParaRPr lang="ko-KR" altLang="en-US" dirty="0"/>
           </a:p>
@@ -869,7 +872,7 @@
           <a:p>
             <a:fld id="{EA4CFCB8-2150-4D86-B261-B3D299AF0C48}" type="datetimeFigureOut">
               <a:rPr lang="ko-KR" altLang="en-US" smtClean="0"/>
-              <a:t>2024-04-26</a:t>
+              <a:t>2025-01-17</a:t>
             </a:fld>
             <a:endParaRPr lang="ko-KR" altLang="en-US" dirty="0"/>
           </a:p>
@@ -1144,7 +1147,7 @@
           <a:p>
             <a:fld id="{EA4CFCB8-2150-4D86-B261-B3D299AF0C48}" type="datetimeFigureOut">
               <a:rPr lang="ko-KR" altLang="en-US" smtClean="0"/>
-              <a:t>2024-04-26</a:t>
+              <a:t>2025-01-17</a:t>
             </a:fld>
             <a:endParaRPr lang="ko-KR" altLang="en-US" dirty="0"/>
           </a:p>
@@ -1409,7 +1412,7 @@
           <a:p>
             <a:fld id="{EA4CFCB8-2150-4D86-B261-B3D299AF0C48}" type="datetimeFigureOut">
               <a:rPr lang="ko-KR" altLang="en-US" smtClean="0"/>
-              <a:t>2024-04-26</a:t>
+              <a:t>2025-01-17</a:t>
             </a:fld>
             <a:endParaRPr lang="ko-KR" altLang="en-US" dirty="0"/>
           </a:p>
@@ -1821,7 +1824,7 @@
           <a:p>
             <a:fld id="{EA4CFCB8-2150-4D86-B261-B3D299AF0C48}" type="datetimeFigureOut">
               <a:rPr lang="ko-KR" altLang="en-US" smtClean="0"/>
-              <a:t>2024-04-26</a:t>
+              <a:t>2025-01-17</a:t>
             </a:fld>
             <a:endParaRPr lang="ko-KR" altLang="en-US" dirty="0"/>
           </a:p>
@@ -1962,7 +1965,7 @@
           <a:p>
             <a:fld id="{EA4CFCB8-2150-4D86-B261-B3D299AF0C48}" type="datetimeFigureOut">
               <a:rPr lang="ko-KR" altLang="en-US" smtClean="0"/>
-              <a:t>2024-04-26</a:t>
+              <a:t>2025-01-17</a:t>
             </a:fld>
             <a:endParaRPr lang="ko-KR" altLang="en-US" dirty="0"/>
           </a:p>
@@ -2075,7 +2078,7 @@
           <a:p>
             <a:fld id="{EA4CFCB8-2150-4D86-B261-B3D299AF0C48}" type="datetimeFigureOut">
               <a:rPr lang="ko-KR" altLang="en-US" smtClean="0"/>
-              <a:t>2024-04-26</a:t>
+              <a:t>2025-01-17</a:t>
             </a:fld>
             <a:endParaRPr lang="ko-KR" altLang="en-US" dirty="0"/>
           </a:p>
@@ -2386,7 +2389,7 @@
           <a:p>
             <a:fld id="{EA4CFCB8-2150-4D86-B261-B3D299AF0C48}" type="datetimeFigureOut">
               <a:rPr lang="ko-KR" altLang="en-US" smtClean="0"/>
-              <a:t>2024-04-26</a:t>
+              <a:t>2025-01-17</a:t>
             </a:fld>
             <a:endParaRPr lang="ko-KR" altLang="en-US" dirty="0"/>
           </a:p>
@@ -2674,7 +2677,7 @@
           <a:p>
             <a:fld id="{EA4CFCB8-2150-4D86-B261-B3D299AF0C48}" type="datetimeFigureOut">
               <a:rPr lang="ko-KR" altLang="en-US" smtClean="0"/>
-              <a:t>2024-04-26</a:t>
+              <a:t>2025-01-17</a:t>
             </a:fld>
             <a:endParaRPr lang="ko-KR" altLang="en-US" dirty="0"/>
           </a:p>
@@ -2915,7 +2918,7 @@
           <a:p>
             <a:fld id="{EA4CFCB8-2150-4D86-B261-B3D299AF0C48}" type="datetimeFigureOut">
               <a:rPr lang="ko-KR" altLang="en-US" smtClean="0"/>
-              <a:t>2024-04-26</a:t>
+              <a:t>2025-01-17</a:t>
             </a:fld>
             <a:endParaRPr lang="ko-KR" altLang="en-US" dirty="0"/>
           </a:p>
@@ -3394,6 +3397,9 @@
         </p:txBody>
       </p:sp>
     </p:spTree>
+    <p:custDataLst>
+      <p:tags r:id="rId1"/>
+    </p:custDataLst>
     <p:extLst>
       <p:ext uri="{BB962C8B-B14F-4D97-AF65-F5344CB8AC3E}">
         <p14:creationId xmlns:p14="http://schemas.microsoft.com/office/powerpoint/2010/main" val="142185688"/>
@@ -3411,7 +3417,13 @@
   <p:cSld>
     <p:spTree>
       <p:nvGrpSpPr>
-        <p:cNvPr id="1" name=""/>
+        <p:cNvPr id="1" name="">
+          <a:extLst>
+            <a:ext uri="{FF2B5EF4-FFF2-40B4-BE49-F238E27FC236}">
+              <a16:creationId xmlns:a16="http://schemas.microsoft.com/office/drawing/2014/main" id="{A19242F4-8508-DDB8-A464-1E2E09F8D368}"/>
+            </a:ext>
+          </a:extLst>
+        </p:cNvPr>
         <p:cNvGrpSpPr/>
         <p:nvPr/>
       </p:nvGrpSpPr>
@@ -3428,7 +3440,7 @@
           <p:cNvPr id="2" name="제목 1">
             <a:extLst>
               <a:ext uri="{FF2B5EF4-FFF2-40B4-BE49-F238E27FC236}">
-                <a16:creationId xmlns:a16="http://schemas.microsoft.com/office/drawing/2014/main" id="{756790C9-AB78-6023-CE1E-968AAB5CC5F8}"/>
+                <a16:creationId xmlns:a16="http://schemas.microsoft.com/office/drawing/2014/main" id="{AA5EBD04-6172-DC84-7B1B-3B77445F5C30}"/>
               </a:ext>
             </a:extLst>
           </p:cNvPr>
@@ -3459,115 +3471,44 @@
       </p:sp>
       <p:sp>
         <p:nvSpPr>
-          <p:cNvPr id="14" name="TextBox 13">
-            <a:extLst>
-              <a:ext uri="{FF2B5EF4-FFF2-40B4-BE49-F238E27FC236}">
-                <a16:creationId xmlns:a16="http://schemas.microsoft.com/office/drawing/2014/main" id="{8B379649-B57D-6354-0ACE-8C3BA7769F98}"/>
+          <p:cNvPr id="3" name="TextBox 2">
+            <a:extLst>
+              <a:ext uri="{FF2B5EF4-FFF2-40B4-BE49-F238E27FC236}">
+                <a16:creationId xmlns:a16="http://schemas.microsoft.com/office/drawing/2014/main" id="{CC7260F3-D021-ADA5-2163-DE4099DC996A}"/>
               </a:ext>
             </a:extLst>
           </p:cNvPr>
           <p:cNvSpPr txBox="1"/>
-          <p:nvPr/>
-        </p:nvSpPr>
-        <p:spPr>
-          <a:xfrm>
-            <a:off x="4610745" y="1171748"/>
-            <a:ext cx="2365969" cy="369332"/>
+          <p:nvPr>
+            <p:custDataLst>
+              <p:tags r:id="rId2"/>
+            </p:custDataLst>
+          </p:nvPr>
+        </p:nvSpPr>
+        <p:spPr>
+          <a:xfrm>
+            <a:off x="6691305" y="3429000"/>
+            <a:ext cx="1253998" cy="369332"/>
           </a:xfrm>
           <a:prstGeom prst="rect">
             <a:avLst/>
           </a:prstGeom>
-        </p:spPr>
-        <p:style>
-          <a:lnRef idx="2">
-            <a:schemeClr val="accent1">
-              <a:shade val="50000"/>
+          <a:solidFill>
+            <a:schemeClr val="accent5">
+              <a:lumMod val="40000"/>
+              <a:lumOff val="60000"/>
             </a:schemeClr>
-          </a:lnRef>
-          <a:fillRef idx="1">
-            <a:schemeClr val="accent1"/>
-          </a:fillRef>
-          <a:effectRef idx="0">
-            <a:schemeClr val="accent1"/>
-          </a:effectRef>
-          <a:fontRef idx="minor">
-            <a:schemeClr val="lt1"/>
-          </a:fontRef>
-        </p:style>
-        <p:txBody>
-          <a:bodyPr rtlCol="0" anchor="ctr"/>
-          <a:lstStyle>
-            <a:defPPr>
-              <a:defRPr lang="ko-KR"/>
-            </a:defPPr>
-            <a:lvl1pPr algn="ctr">
-              <a:defRPr>
-                <a:solidFill>
-                  <a:schemeClr val="lt1"/>
-                </a:solidFill>
-              </a:defRPr>
-            </a:lvl1pPr>
-            <a:lvl2pPr>
-              <a:defRPr>
-                <a:solidFill>
-                  <a:schemeClr val="lt1"/>
-                </a:solidFill>
-              </a:defRPr>
-            </a:lvl2pPr>
-            <a:lvl3pPr>
-              <a:defRPr>
-                <a:solidFill>
-                  <a:schemeClr val="lt1"/>
-                </a:solidFill>
-              </a:defRPr>
-            </a:lvl3pPr>
-            <a:lvl4pPr>
-              <a:defRPr>
-                <a:solidFill>
-                  <a:schemeClr val="lt1"/>
-                </a:solidFill>
-              </a:defRPr>
-            </a:lvl4pPr>
-            <a:lvl5pPr>
-              <a:defRPr>
-                <a:solidFill>
-                  <a:schemeClr val="lt1"/>
-                </a:solidFill>
-              </a:defRPr>
-            </a:lvl5pPr>
-            <a:lvl6pPr>
-              <a:defRPr>
-                <a:solidFill>
-                  <a:schemeClr val="lt1"/>
-                </a:solidFill>
-              </a:defRPr>
-            </a:lvl6pPr>
-            <a:lvl7pPr>
-              <a:defRPr>
-                <a:solidFill>
-                  <a:schemeClr val="lt1"/>
-                </a:solidFill>
-              </a:defRPr>
-            </a:lvl7pPr>
-            <a:lvl8pPr>
-              <a:defRPr>
-                <a:solidFill>
-                  <a:schemeClr val="lt1"/>
-                </a:solidFill>
-              </a:defRPr>
-            </a:lvl8pPr>
-            <a:lvl9pPr>
-              <a:defRPr>
-                <a:solidFill>
-                  <a:schemeClr val="lt1"/>
-                </a:solidFill>
-              </a:defRPr>
-            </a:lvl9pPr>
-          </a:lstStyle>
+          </a:solidFill>
+        </p:spPr>
+        <p:txBody>
+          <a:bodyPr wrap="none" rtlCol="0">
+            <a:spAutoFit/>
+          </a:bodyPr>
+          <a:lstStyle/>
           <a:p>
             <a:r>
               <a:rPr lang="en-US" altLang="ko-KR" dirty="0"/>
-              <a:t>Model.Import.Viewer</a:t>
+              <a:t>E.Parser.FS</a:t>
             </a:r>
             <a:endParaRPr lang="ko-KR" altLang="en-US" dirty="0"/>
           </a:p>
@@ -3575,113 +3516,134 @@
       </p:sp>
       <p:sp>
         <p:nvSpPr>
-          <p:cNvPr id="19" name="TextBox 18">
-            <a:extLst>
-              <a:ext uri="{FF2B5EF4-FFF2-40B4-BE49-F238E27FC236}">
-                <a16:creationId xmlns:a16="http://schemas.microsoft.com/office/drawing/2014/main" id="{D92E246C-594D-8D93-9E59-78ED6E3B1F01}"/>
+          <p:cNvPr id="4" name="TextBox 3">
+            <a:extLst>
+              <a:ext uri="{FF2B5EF4-FFF2-40B4-BE49-F238E27FC236}">
+                <a16:creationId xmlns:a16="http://schemas.microsoft.com/office/drawing/2014/main" id="{99FAB388-D8D2-6C3D-B413-927E30929582}"/>
               </a:ext>
             </a:extLst>
           </p:cNvPr>
           <p:cNvSpPr txBox="1"/>
-          <p:nvPr/>
-        </p:nvSpPr>
-        <p:spPr>
-          <a:xfrm>
-            <a:off x="773908" y="2604806"/>
-            <a:ext cx="2365969" cy="369332"/>
+          <p:nvPr>
+            <p:custDataLst>
+              <p:tags r:id="rId3"/>
+            </p:custDataLst>
+          </p:nvPr>
+        </p:nvSpPr>
+        <p:spPr>
+          <a:xfrm>
+            <a:off x="6883810" y="2056727"/>
+            <a:ext cx="840230" cy="369332"/>
           </a:xfrm>
           <a:prstGeom prst="rect">
             <a:avLst/>
           </a:prstGeom>
-        </p:spPr>
-        <p:style>
-          <a:lnRef idx="1">
-            <a:schemeClr val="accent5"/>
-          </a:lnRef>
-          <a:fillRef idx="2">
-            <a:schemeClr val="accent5"/>
-          </a:fillRef>
-          <a:effectRef idx="1">
-            <a:schemeClr val="accent5"/>
-          </a:effectRef>
-          <a:fontRef idx="minor">
-            <a:schemeClr val="dk1"/>
-          </a:fontRef>
-        </p:style>
-        <p:txBody>
-          <a:bodyPr rtlCol="0" anchor="ctr"/>
-          <a:lstStyle>
-            <a:defPPr>
-              <a:defRPr lang="ko-KR"/>
-            </a:defPPr>
-            <a:lvl1pPr algn="ctr">
-              <a:defRPr>
-                <a:solidFill>
-                  <a:schemeClr val="dk1"/>
-                </a:solidFill>
-              </a:defRPr>
-            </a:lvl1pPr>
-            <a:lvl2pPr>
-              <a:defRPr>
-                <a:solidFill>
-                  <a:schemeClr val="dk1"/>
-                </a:solidFill>
-              </a:defRPr>
-            </a:lvl2pPr>
-            <a:lvl3pPr>
-              <a:defRPr>
-                <a:solidFill>
-                  <a:schemeClr val="dk1"/>
-                </a:solidFill>
-              </a:defRPr>
-            </a:lvl3pPr>
-            <a:lvl4pPr>
-              <a:defRPr>
-                <a:solidFill>
-                  <a:schemeClr val="dk1"/>
-                </a:solidFill>
-              </a:defRPr>
-            </a:lvl4pPr>
-            <a:lvl5pPr>
-              <a:defRPr>
-                <a:solidFill>
-                  <a:schemeClr val="dk1"/>
-                </a:solidFill>
-              </a:defRPr>
-            </a:lvl5pPr>
-            <a:lvl6pPr>
-              <a:defRPr>
-                <a:solidFill>
-                  <a:schemeClr val="dk1"/>
-                </a:solidFill>
-              </a:defRPr>
-            </a:lvl6pPr>
-            <a:lvl7pPr>
-              <a:defRPr>
-                <a:solidFill>
-                  <a:schemeClr val="dk1"/>
-                </a:solidFill>
-              </a:defRPr>
-            </a:lvl7pPr>
-            <a:lvl8pPr>
-              <a:defRPr>
-                <a:solidFill>
-                  <a:schemeClr val="dk1"/>
-                </a:solidFill>
-              </a:defRPr>
-            </a:lvl8pPr>
-            <a:lvl9pPr>
-              <a:defRPr>
-                <a:solidFill>
-                  <a:schemeClr val="dk1"/>
-                </a:solidFill>
-              </a:defRPr>
-            </a:lvl9pPr>
-          </a:lstStyle>
+          <a:solidFill>
+            <a:schemeClr val="accent5">
+              <a:lumMod val="40000"/>
+              <a:lumOff val="60000"/>
+            </a:schemeClr>
+          </a:solidFill>
+        </p:spPr>
+        <p:txBody>
+          <a:bodyPr wrap="none" rtlCol="0">
+            <a:spAutoFit/>
+          </a:bodyPr>
+          <a:lstStyle/>
           <a:p>
             <a:r>
               <a:rPr lang="en-US" altLang="ko-KR" dirty="0"/>
-              <a:t>Model.Import.Office</a:t>
+              <a:t>E.Core</a:t>
+            </a:r>
+            <a:endParaRPr lang="ko-KR" altLang="en-US" dirty="0"/>
+          </a:p>
+        </p:txBody>
+      </p:sp>
+      <p:sp>
+        <p:nvSpPr>
+          <p:cNvPr id="5" name="TextBox 4">
+            <a:extLst>
+              <a:ext uri="{FF2B5EF4-FFF2-40B4-BE49-F238E27FC236}">
+                <a16:creationId xmlns:a16="http://schemas.microsoft.com/office/drawing/2014/main" id="{F0804C3F-1A56-F8C2-1DA7-9EE6B728AE88}"/>
+              </a:ext>
+            </a:extLst>
+          </p:cNvPr>
+          <p:cNvSpPr txBox="1"/>
+          <p:nvPr>
+            <p:custDataLst>
+              <p:tags r:id="rId4"/>
+            </p:custDataLst>
+          </p:nvPr>
+        </p:nvSpPr>
+        <p:spPr>
+          <a:xfrm>
+            <a:off x="6628915" y="1449108"/>
+            <a:ext cx="1316386" cy="369332"/>
+          </a:xfrm>
+          <a:prstGeom prst="rect">
+            <a:avLst/>
+          </a:prstGeom>
+          <a:solidFill>
+            <a:schemeClr val="accent5">
+              <a:lumMod val="40000"/>
+              <a:lumOff val="60000"/>
+            </a:schemeClr>
+          </a:solidFill>
+        </p:spPr>
+        <p:txBody>
+          <a:bodyPr wrap="none" rtlCol="0">
+            <a:spAutoFit/>
+          </a:bodyPr>
+          <a:lstStyle/>
+          <a:p>
+            <a:r>
+              <a:rPr lang="en-US" altLang="ko-KR" dirty="0"/>
+              <a:t>E.Common</a:t>
+            </a:r>
+            <a:endParaRPr lang="ko-KR" altLang="en-US" dirty="0"/>
+          </a:p>
+        </p:txBody>
+      </p:sp>
+      <p:sp>
+        <p:nvSpPr>
+          <p:cNvPr id="6" name="TextBox 5">
+            <a:extLst>
+              <a:ext uri="{FF2B5EF4-FFF2-40B4-BE49-F238E27FC236}">
+                <a16:creationId xmlns:a16="http://schemas.microsoft.com/office/drawing/2014/main" id="{E7A69502-0705-B4D6-A927-38A5A1DDE5A6}"/>
+              </a:ext>
+            </a:extLst>
+          </p:cNvPr>
+          <p:cNvSpPr txBox="1"/>
+          <p:nvPr>
+            <p:custDataLst>
+              <p:tags r:id="rId5"/>
+            </p:custDataLst>
+          </p:nvPr>
+        </p:nvSpPr>
+        <p:spPr>
+          <a:xfrm>
+            <a:off x="6810809" y="2662620"/>
+            <a:ext cx="986232" cy="369332"/>
+          </a:xfrm>
+          <a:prstGeom prst="rect">
+            <a:avLst/>
+          </a:prstGeom>
+          <a:solidFill>
+            <a:schemeClr val="accent5">
+              <a:lumMod val="40000"/>
+              <a:lumOff val="60000"/>
+            </a:schemeClr>
+          </a:solidFill>
+        </p:spPr>
+        <p:txBody>
+          <a:bodyPr wrap="none" rtlCol="0">
+            <a:spAutoFit/>
+          </a:bodyPr>
+          <a:lstStyle/>
+          <a:p>
+            <a:r>
+              <a:rPr lang="en-US" altLang="ko-KR" dirty="0"/>
+              <a:t>E.Parser</a:t>
             </a:r>
             <a:endParaRPr lang="ko-KR" altLang="en-US" dirty="0"/>
           </a:p>
@@ -3689,39 +3651,41 @@
       </p:sp>
       <p:cxnSp>
         <p:nvCxnSpPr>
-          <p:cNvPr id="22" name="직선 화살표 연결선 21">
-            <a:extLst>
-              <a:ext uri="{FF2B5EF4-FFF2-40B4-BE49-F238E27FC236}">
-                <a16:creationId xmlns:a16="http://schemas.microsoft.com/office/drawing/2014/main" id="{CCC72193-1D58-61A4-1C26-26E79018791D}"/>
+          <p:cNvPr id="7" name="직선 화살표 연결선 6">
+            <a:extLst>
+              <a:ext uri="{FF2B5EF4-FFF2-40B4-BE49-F238E27FC236}">
+                <a16:creationId xmlns:a16="http://schemas.microsoft.com/office/drawing/2014/main" id="{0E6A6ED1-97B7-7739-4B74-EBB002C5E58E}"/>
               </a:ext>
             </a:extLst>
           </p:cNvPr>
           <p:cNvCxnSpPr>
-            <a:stCxn id="14" idx="2"/>
-            <a:endCxn id="19" idx="0"/>
+            <a:cxnSpLocks/>
+            <a:stCxn id="5" idx="2"/>
+            <a:endCxn id="4" idx="0"/>
           </p:cNvCxnSpPr>
           <p:nvPr/>
         </p:nvCxnSpPr>
         <p:spPr>
-          <a:xfrm flipH="1">
-            <a:off x="1956893" y="1541080"/>
-            <a:ext cx="3836837" cy="1063726"/>
+          <a:xfrm>
+            <a:off x="7287108" y="1818440"/>
+            <a:ext cx="16817" cy="238287"/>
           </a:xfrm>
           <a:prstGeom prst="straightConnector1">
             <a:avLst/>
           </a:prstGeom>
           <a:ln>
+            <a:headEnd type="none"/>
             <a:tailEnd type="triangle"/>
           </a:ln>
         </p:spPr>
         <p:style>
-          <a:lnRef idx="1">
+          <a:lnRef idx="2">
             <a:schemeClr val="accent1"/>
           </a:lnRef>
           <a:fillRef idx="0">
             <a:schemeClr val="accent1"/>
           </a:fillRef>
-          <a:effectRef idx="0">
+          <a:effectRef idx="1">
             <a:schemeClr val="accent1"/>
           </a:effectRef>
           <a:fontRef idx="minor">
@@ -3731,415 +3695,41 @@
       </p:cxnSp>
       <p:cxnSp>
         <p:nvCxnSpPr>
-          <p:cNvPr id="23" name="직선 화살표 연결선 22">
-            <a:extLst>
-              <a:ext uri="{FF2B5EF4-FFF2-40B4-BE49-F238E27FC236}">
-                <a16:creationId xmlns:a16="http://schemas.microsoft.com/office/drawing/2014/main" id="{548A4D41-8B60-50FC-7957-8BE43AA9268E}"/>
+          <p:cNvPr id="8" name="직선 화살표 연결선 7">
+            <a:extLst>
+              <a:ext uri="{FF2B5EF4-FFF2-40B4-BE49-F238E27FC236}">
+                <a16:creationId xmlns:a16="http://schemas.microsoft.com/office/drawing/2014/main" id="{D582EBEB-E12D-F02C-F45B-769EAA3C71B9}"/>
               </a:ext>
             </a:extLst>
           </p:cNvPr>
           <p:cNvCxnSpPr>
             <a:cxnSpLocks/>
-            <a:stCxn id="19" idx="2"/>
-            <a:endCxn id="32" idx="0"/>
+            <a:stCxn id="4" idx="2"/>
+            <a:endCxn id="6" idx="0"/>
           </p:cNvCxnSpPr>
           <p:nvPr/>
         </p:nvCxnSpPr>
         <p:spPr>
           <a:xfrm>
-            <a:off x="1956893" y="2974138"/>
-            <a:ext cx="5932193" cy="1411967"/>
+            <a:off x="7303925" y="2426059"/>
+            <a:ext cx="0" cy="236561"/>
           </a:xfrm>
           <a:prstGeom prst="straightConnector1">
             <a:avLst/>
           </a:prstGeom>
           <a:ln>
+            <a:headEnd type="none"/>
             <a:tailEnd type="triangle"/>
           </a:ln>
         </p:spPr>
         <p:style>
-          <a:lnRef idx="1">
+          <a:lnRef idx="2">
             <a:schemeClr val="accent1"/>
           </a:lnRef>
           <a:fillRef idx="0">
             <a:schemeClr val="accent1"/>
           </a:fillRef>
-          <a:effectRef idx="0">
-            <a:schemeClr val="accent1"/>
-          </a:effectRef>
-          <a:fontRef idx="minor">
-            <a:schemeClr val="tx1"/>
-          </a:fontRef>
-        </p:style>
-      </p:cxnSp>
-      <p:sp>
-        <p:nvSpPr>
-          <p:cNvPr id="27" name="TextBox 26">
-            <a:extLst>
-              <a:ext uri="{FF2B5EF4-FFF2-40B4-BE49-F238E27FC236}">
-                <a16:creationId xmlns:a16="http://schemas.microsoft.com/office/drawing/2014/main" id="{C188C367-953D-C467-BD4F-4FDC3FA9D428}"/>
-              </a:ext>
-            </a:extLst>
-          </p:cNvPr>
-          <p:cNvSpPr txBox="1"/>
-          <p:nvPr/>
-        </p:nvSpPr>
-        <p:spPr>
-          <a:xfrm>
-            <a:off x="2614723" y="4002861"/>
-            <a:ext cx="1839093" cy="369332"/>
-          </a:xfrm>
-          <a:prstGeom prst="rect">
-            <a:avLst/>
-          </a:prstGeom>
-          <a:solidFill>
-            <a:schemeClr val="accent5">
-              <a:lumMod val="40000"/>
-              <a:lumOff val="60000"/>
-            </a:schemeClr>
-          </a:solidFill>
-        </p:spPr>
-        <p:txBody>
-          <a:bodyPr wrap="none" rtlCol="0">
-            <a:spAutoFit/>
-          </a:bodyPr>
-          <a:lstStyle/>
-          <a:p>
-            <a:r>
-              <a:rPr lang="en-US" altLang="ko-KR" dirty="0"/>
-              <a:t>Engine.Parser.FS</a:t>
-            </a:r>
-            <a:endParaRPr lang="ko-KR" altLang="en-US" dirty="0"/>
-          </a:p>
-        </p:txBody>
-      </p:sp>
-      <p:cxnSp>
-        <p:nvCxnSpPr>
-          <p:cNvPr id="28" name="직선 화살표 연결선 27">
-            <a:extLst>
-              <a:ext uri="{FF2B5EF4-FFF2-40B4-BE49-F238E27FC236}">
-                <a16:creationId xmlns:a16="http://schemas.microsoft.com/office/drawing/2014/main" id="{1725618C-8AE6-7C69-18AC-7C20CB2E1F7F}"/>
-              </a:ext>
-            </a:extLst>
-          </p:cNvPr>
-          <p:cNvCxnSpPr>
-            <a:cxnSpLocks/>
-            <a:stCxn id="19" idx="2"/>
-            <a:endCxn id="27" idx="0"/>
-          </p:cNvCxnSpPr>
-          <p:nvPr/>
-        </p:nvCxnSpPr>
-        <p:spPr>
-          <a:xfrm>
-            <a:off x="1956893" y="2974138"/>
-            <a:ext cx="1577377" cy="1028723"/>
-          </a:xfrm>
-          <a:prstGeom prst="straightConnector1">
-            <a:avLst/>
-          </a:prstGeom>
-          <a:ln>
-            <a:tailEnd type="triangle"/>
-          </a:ln>
-        </p:spPr>
-        <p:style>
-          <a:lnRef idx="1">
-            <a:schemeClr val="accent1"/>
-          </a:lnRef>
-          <a:fillRef idx="0">
-            <a:schemeClr val="accent1"/>
-          </a:fillRef>
-          <a:effectRef idx="0">
-            <a:schemeClr val="accent1"/>
-          </a:effectRef>
-          <a:fontRef idx="minor">
-            <a:schemeClr val="tx1"/>
-          </a:fontRef>
-        </p:style>
-      </p:cxnSp>
-      <p:sp>
-        <p:nvSpPr>
-          <p:cNvPr id="32" name="TextBox 31">
-            <a:extLst>
-              <a:ext uri="{FF2B5EF4-FFF2-40B4-BE49-F238E27FC236}">
-                <a16:creationId xmlns:a16="http://schemas.microsoft.com/office/drawing/2014/main" id="{C4EC5E9B-7D4E-2216-9124-A03376283C6A}"/>
-              </a:ext>
-            </a:extLst>
-          </p:cNvPr>
-          <p:cNvSpPr txBox="1"/>
-          <p:nvPr/>
-        </p:nvSpPr>
-        <p:spPr>
-          <a:xfrm>
-            <a:off x="7176422" y="4386105"/>
-            <a:ext cx="1425327" cy="369332"/>
-          </a:xfrm>
-          <a:prstGeom prst="rect">
-            <a:avLst/>
-          </a:prstGeom>
-          <a:solidFill>
-            <a:schemeClr val="accent5">
-              <a:lumMod val="40000"/>
-              <a:lumOff val="60000"/>
-            </a:schemeClr>
-          </a:solidFill>
-        </p:spPr>
-        <p:txBody>
-          <a:bodyPr wrap="none" rtlCol="0">
-            <a:spAutoFit/>
-          </a:bodyPr>
-          <a:lstStyle/>
-          <a:p>
-            <a:r>
-              <a:rPr lang="en-US" altLang="ko-KR" dirty="0"/>
-              <a:t>Engine.Core</a:t>
-            </a:r>
-            <a:endParaRPr lang="ko-KR" altLang="en-US" dirty="0"/>
-          </a:p>
-        </p:txBody>
-      </p:sp>
-      <p:sp>
-        <p:nvSpPr>
-          <p:cNvPr id="34" name="TextBox 33">
-            <a:extLst>
-              <a:ext uri="{FF2B5EF4-FFF2-40B4-BE49-F238E27FC236}">
-                <a16:creationId xmlns:a16="http://schemas.microsoft.com/office/drawing/2014/main" id="{EDF382AD-031D-8709-8261-F25CAF9B9FDD}"/>
-              </a:ext>
-            </a:extLst>
-          </p:cNvPr>
-          <p:cNvSpPr txBox="1"/>
-          <p:nvPr/>
-        </p:nvSpPr>
-        <p:spPr>
-          <a:xfrm>
-            <a:off x="3569836" y="5513513"/>
-            <a:ext cx="2189958" cy="369332"/>
-          </a:xfrm>
-          <a:prstGeom prst="rect">
-            <a:avLst/>
-          </a:prstGeom>
-          <a:solidFill>
-            <a:schemeClr val="accent5">
-              <a:lumMod val="40000"/>
-              <a:lumOff val="60000"/>
-            </a:schemeClr>
-          </a:solidFill>
-        </p:spPr>
-        <p:txBody>
-          <a:bodyPr wrap="none" rtlCol="0">
-            <a:spAutoFit/>
-          </a:bodyPr>
-          <a:lstStyle/>
-          <a:p>
-            <a:r>
-              <a:rPr lang="en-US" altLang="ko-KR" dirty="0"/>
-              <a:t>Engine.Common.FS</a:t>
-            </a:r>
-            <a:endParaRPr lang="ko-KR" altLang="en-US" dirty="0"/>
-          </a:p>
-        </p:txBody>
-      </p:sp>
-      <p:sp>
-        <p:nvSpPr>
-          <p:cNvPr id="38" name="TextBox 37">
-            <a:extLst>
-              <a:ext uri="{FF2B5EF4-FFF2-40B4-BE49-F238E27FC236}">
-                <a16:creationId xmlns:a16="http://schemas.microsoft.com/office/drawing/2014/main" id="{712B053D-FA9A-B29E-B7D8-40ACEBD3216B}"/>
-              </a:ext>
-            </a:extLst>
-          </p:cNvPr>
-          <p:cNvSpPr txBox="1"/>
-          <p:nvPr/>
-        </p:nvSpPr>
-        <p:spPr>
-          <a:xfrm>
-            <a:off x="3686137" y="2602889"/>
-            <a:ext cx="2343911" cy="369332"/>
-          </a:xfrm>
-          <a:prstGeom prst="rect">
-            <a:avLst/>
-          </a:prstGeom>
-          <a:solidFill>
-            <a:schemeClr val="accent5">
-              <a:lumMod val="40000"/>
-              <a:lumOff val="60000"/>
-            </a:schemeClr>
-          </a:solidFill>
-        </p:spPr>
-        <p:txBody>
-          <a:bodyPr wrap="none" rtlCol="0">
-            <a:spAutoFit/>
-          </a:bodyPr>
-          <a:lstStyle/>
-          <a:p>
-            <a:r>
-              <a:rPr lang="en-US" altLang="ko-KR" dirty="0"/>
-              <a:t>Engine.CodeGenCPU</a:t>
-            </a:r>
-            <a:endParaRPr lang="ko-KR" altLang="en-US" dirty="0"/>
-          </a:p>
-        </p:txBody>
-      </p:sp>
-      <p:cxnSp>
-        <p:nvCxnSpPr>
-          <p:cNvPr id="39" name="직선 화살표 연결선 38">
-            <a:extLst>
-              <a:ext uri="{FF2B5EF4-FFF2-40B4-BE49-F238E27FC236}">
-                <a16:creationId xmlns:a16="http://schemas.microsoft.com/office/drawing/2014/main" id="{501866FA-546D-2911-0B79-654ADD8EE6D7}"/>
-              </a:ext>
-            </a:extLst>
-          </p:cNvPr>
-          <p:cNvCxnSpPr>
-            <a:cxnSpLocks/>
-            <a:stCxn id="14" idx="2"/>
-            <a:endCxn id="38" idx="0"/>
-          </p:cNvCxnSpPr>
-          <p:nvPr/>
-        </p:nvCxnSpPr>
-        <p:spPr>
-          <a:xfrm flipH="1">
-            <a:off x="4858093" y="1541080"/>
-            <a:ext cx="935637" cy="1061809"/>
-          </a:xfrm>
-          <a:prstGeom prst="straightConnector1">
-            <a:avLst/>
-          </a:prstGeom>
-          <a:ln>
-            <a:tailEnd type="triangle"/>
-          </a:ln>
-        </p:spPr>
-        <p:style>
-          <a:lnRef idx="1">
-            <a:schemeClr val="accent1"/>
-          </a:lnRef>
-          <a:fillRef idx="0">
-            <a:schemeClr val="accent1"/>
-          </a:fillRef>
-          <a:effectRef idx="0">
-            <a:schemeClr val="accent1"/>
-          </a:effectRef>
-          <a:fontRef idx="minor">
-            <a:schemeClr val="tx1"/>
-          </a:fontRef>
-        </p:style>
-      </p:cxnSp>
-      <p:sp>
-        <p:nvSpPr>
-          <p:cNvPr id="42" name="TextBox 41">
-            <a:extLst>
-              <a:ext uri="{FF2B5EF4-FFF2-40B4-BE49-F238E27FC236}">
-                <a16:creationId xmlns:a16="http://schemas.microsoft.com/office/drawing/2014/main" id="{82F3A7C2-394F-5E6B-99B6-FC8AB9799E94}"/>
-              </a:ext>
-            </a:extLst>
-          </p:cNvPr>
-          <p:cNvSpPr txBox="1"/>
-          <p:nvPr/>
-        </p:nvSpPr>
-        <p:spPr>
-          <a:xfrm>
-            <a:off x="8969818" y="6119813"/>
-            <a:ext cx="1901483" cy="369332"/>
-          </a:xfrm>
-          <a:prstGeom prst="rect">
-            <a:avLst/>
-          </a:prstGeom>
-          <a:solidFill>
-            <a:schemeClr val="accent5">
-              <a:lumMod val="40000"/>
-              <a:lumOff val="60000"/>
-            </a:schemeClr>
-          </a:solidFill>
-        </p:spPr>
-        <p:txBody>
-          <a:bodyPr wrap="none" rtlCol="0">
-            <a:spAutoFit/>
-          </a:bodyPr>
-          <a:lstStyle/>
-          <a:p>
-            <a:r>
-              <a:rPr lang="en-US" altLang="ko-KR" dirty="0"/>
-              <a:t>Engine.Common</a:t>
-            </a:r>
-            <a:endParaRPr lang="ko-KR" altLang="en-US" dirty="0"/>
-          </a:p>
-        </p:txBody>
-      </p:sp>
-      <p:sp>
-        <p:nvSpPr>
-          <p:cNvPr id="50" name="TextBox 49">
-            <a:extLst>
-              <a:ext uri="{FF2B5EF4-FFF2-40B4-BE49-F238E27FC236}">
-                <a16:creationId xmlns:a16="http://schemas.microsoft.com/office/drawing/2014/main" id="{2BC2F174-19AC-A16D-192C-B3E8DA823A91}"/>
-              </a:ext>
-            </a:extLst>
-          </p:cNvPr>
-          <p:cNvSpPr txBox="1"/>
-          <p:nvPr/>
-        </p:nvSpPr>
-        <p:spPr>
-          <a:xfrm>
-            <a:off x="6576308" y="2594260"/>
-            <a:ext cx="1434231" cy="369332"/>
-          </a:xfrm>
-          <a:prstGeom prst="rect">
-            <a:avLst/>
-          </a:prstGeom>
-          <a:solidFill>
-            <a:schemeClr val="accent5">
-              <a:lumMod val="40000"/>
-              <a:lumOff val="60000"/>
-            </a:schemeClr>
-          </a:solidFill>
-        </p:spPr>
-        <p:txBody>
-          <a:bodyPr wrap="square" rtlCol="0">
-            <a:spAutoFit/>
-          </a:bodyPr>
-          <a:lstStyle/>
-          <a:p>
-            <a:r>
-              <a:rPr lang="en-US" altLang="ko-KR" dirty="0"/>
-              <a:t>Engine.Cpu</a:t>
-            </a:r>
-            <a:endParaRPr lang="ko-KR" altLang="en-US" dirty="0"/>
-          </a:p>
-        </p:txBody>
-      </p:sp>
-      <p:cxnSp>
-        <p:nvCxnSpPr>
-          <p:cNvPr id="51" name="직선 화살표 연결선 50">
-            <a:extLst>
-              <a:ext uri="{FF2B5EF4-FFF2-40B4-BE49-F238E27FC236}">
-                <a16:creationId xmlns:a16="http://schemas.microsoft.com/office/drawing/2014/main" id="{09A8512C-0519-8E40-5180-27B1A870590E}"/>
-              </a:ext>
-            </a:extLst>
-          </p:cNvPr>
-          <p:cNvCxnSpPr>
-            <a:cxnSpLocks/>
-            <a:stCxn id="14" idx="2"/>
-            <a:endCxn id="50" idx="0"/>
-          </p:cNvCxnSpPr>
-          <p:nvPr/>
-        </p:nvCxnSpPr>
-        <p:spPr>
-          <a:xfrm>
-            <a:off x="5793730" y="1541080"/>
-            <a:ext cx="1499694" cy="1053180"/>
-          </a:xfrm>
-          <a:prstGeom prst="straightConnector1">
-            <a:avLst/>
-          </a:prstGeom>
-          <a:ln>
-            <a:tailEnd type="triangle"/>
-          </a:ln>
-        </p:spPr>
-        <p:style>
-          <a:lnRef idx="1">
-            <a:schemeClr val="accent1"/>
-          </a:lnRef>
-          <a:fillRef idx="0">
-            <a:schemeClr val="accent1"/>
-          </a:fillRef>
-          <a:effectRef idx="0">
+          <a:effectRef idx="1">
             <a:schemeClr val="accent1"/>
           </a:effectRef>
           <a:fontRef idx="minor">
@@ -4149,40 +3739,308 @@
       </p:cxnSp>
       <p:cxnSp>
         <p:nvCxnSpPr>
-          <p:cNvPr id="63" name="직선 화살표 연결선 62">
-            <a:extLst>
-              <a:ext uri="{FF2B5EF4-FFF2-40B4-BE49-F238E27FC236}">
-                <a16:creationId xmlns:a16="http://schemas.microsoft.com/office/drawing/2014/main" id="{845519B8-1C7E-5253-9028-32572C5FEE45}"/>
+          <p:cNvPr id="12" name="직선 화살표 연결선 11">
+            <a:extLst>
+              <a:ext uri="{FF2B5EF4-FFF2-40B4-BE49-F238E27FC236}">
+                <a16:creationId xmlns:a16="http://schemas.microsoft.com/office/drawing/2014/main" id="{19825C4B-DA27-06D3-F5BE-F234A8649AB8}"/>
               </a:ext>
             </a:extLst>
           </p:cNvPr>
           <p:cNvCxnSpPr>
             <a:cxnSpLocks/>
-            <a:stCxn id="38" idx="2"/>
-            <a:endCxn id="34" idx="0"/>
+            <a:stCxn id="6" idx="2"/>
+            <a:endCxn id="3" idx="0"/>
           </p:cNvCxnSpPr>
           <p:nvPr/>
         </p:nvCxnSpPr>
         <p:spPr>
-          <a:xfrm flipH="1">
-            <a:off x="4664815" y="2972221"/>
-            <a:ext cx="193278" cy="2541292"/>
+          <a:xfrm>
+            <a:off x="7303925" y="3031952"/>
+            <a:ext cx="14379" cy="397048"/>
           </a:xfrm>
           <a:prstGeom prst="straightConnector1">
             <a:avLst/>
           </a:prstGeom>
           <a:ln>
+            <a:headEnd type="none"/>
             <a:tailEnd type="triangle"/>
           </a:ln>
         </p:spPr>
         <p:style>
-          <a:lnRef idx="1">
+          <a:lnRef idx="2">
             <a:schemeClr val="accent1"/>
           </a:lnRef>
           <a:fillRef idx="0">
             <a:schemeClr val="accent1"/>
           </a:fillRef>
-          <a:effectRef idx="0">
+          <a:effectRef idx="1">
+            <a:schemeClr val="accent1"/>
+          </a:effectRef>
+          <a:fontRef idx="minor">
+            <a:schemeClr val="tx1"/>
+          </a:fontRef>
+        </p:style>
+      </p:cxnSp>
+      <p:sp>
+        <p:nvSpPr>
+          <p:cNvPr id="16" name="TextBox 15">
+            <a:extLst>
+              <a:ext uri="{FF2B5EF4-FFF2-40B4-BE49-F238E27FC236}">
+                <a16:creationId xmlns:a16="http://schemas.microsoft.com/office/drawing/2014/main" id="{4182128C-B02D-A959-6964-C44A71C9F779}"/>
+              </a:ext>
+            </a:extLst>
+          </p:cNvPr>
+          <p:cNvSpPr txBox="1"/>
+          <p:nvPr>
+            <p:custDataLst>
+              <p:tags r:id="rId6"/>
+            </p:custDataLst>
+          </p:nvPr>
+        </p:nvSpPr>
+        <p:spPr>
+          <a:xfrm>
+            <a:off x="4634347" y="4353148"/>
+            <a:ext cx="1758815" cy="369332"/>
+          </a:xfrm>
+          <a:prstGeom prst="rect">
+            <a:avLst/>
+          </a:prstGeom>
+          <a:solidFill>
+            <a:schemeClr val="accent5">
+              <a:lumMod val="40000"/>
+              <a:lumOff val="60000"/>
+            </a:schemeClr>
+          </a:solidFill>
+        </p:spPr>
+        <p:txBody>
+          <a:bodyPr wrap="none" rtlCol="0">
+            <a:spAutoFit/>
+          </a:bodyPr>
+          <a:lstStyle/>
+          <a:p>
+            <a:r>
+              <a:rPr lang="en-US" altLang="ko-KR" dirty="0"/>
+              <a:t>E.CodeGenCPU</a:t>
+            </a:r>
+            <a:endParaRPr lang="ko-KR" altLang="en-US" dirty="0"/>
+          </a:p>
+        </p:txBody>
+      </p:sp>
+      <p:cxnSp>
+        <p:nvCxnSpPr>
+          <p:cNvPr id="17" name="직선 화살표 연결선 16">
+            <a:extLst>
+              <a:ext uri="{FF2B5EF4-FFF2-40B4-BE49-F238E27FC236}">
+                <a16:creationId xmlns:a16="http://schemas.microsoft.com/office/drawing/2014/main" id="{3266C15A-9090-BF9C-79B9-C4C3F5320A89}"/>
+              </a:ext>
+            </a:extLst>
+          </p:cNvPr>
+          <p:cNvCxnSpPr>
+            <a:cxnSpLocks/>
+            <a:stCxn id="3" idx="2"/>
+            <a:endCxn id="16" idx="0"/>
+          </p:cNvCxnSpPr>
+          <p:nvPr/>
+        </p:nvCxnSpPr>
+        <p:spPr>
+          <a:xfrm flipH="1">
+            <a:off x="5513755" y="3798332"/>
+            <a:ext cx="1804549" cy="554816"/>
+          </a:xfrm>
+          <a:prstGeom prst="straightConnector1">
+            <a:avLst/>
+          </a:prstGeom>
+          <a:ln>
+            <a:headEnd type="none"/>
+            <a:tailEnd type="triangle"/>
+          </a:ln>
+        </p:spPr>
+        <p:style>
+          <a:lnRef idx="2">
+            <a:schemeClr val="accent1"/>
+          </a:lnRef>
+          <a:fillRef idx="0">
+            <a:schemeClr val="accent1"/>
+          </a:fillRef>
+          <a:effectRef idx="1">
+            <a:schemeClr val="accent1"/>
+          </a:effectRef>
+          <a:fontRef idx="minor">
+            <a:schemeClr val="tx1"/>
+          </a:fontRef>
+        </p:style>
+      </p:cxnSp>
+      <p:sp>
+        <p:nvSpPr>
+          <p:cNvPr id="21" name="TextBox 20">
+            <a:extLst>
+              <a:ext uri="{FF2B5EF4-FFF2-40B4-BE49-F238E27FC236}">
+                <a16:creationId xmlns:a16="http://schemas.microsoft.com/office/drawing/2014/main" id="{AD4929DE-DFF7-4C4C-0331-57FDAAF57AF8}"/>
+              </a:ext>
+            </a:extLst>
+          </p:cNvPr>
+          <p:cNvSpPr txBox="1"/>
+          <p:nvPr>
+            <p:custDataLst>
+              <p:tags r:id="rId7"/>
+            </p:custDataLst>
+          </p:nvPr>
+        </p:nvSpPr>
+        <p:spPr>
+          <a:xfrm>
+            <a:off x="3909925" y="3429000"/>
+            <a:ext cx="2593980" cy="369332"/>
+          </a:xfrm>
+          <a:prstGeom prst="rect">
+            <a:avLst/>
+          </a:prstGeom>
+          <a:solidFill>
+            <a:schemeClr val="accent5">
+              <a:lumMod val="40000"/>
+              <a:lumOff val="60000"/>
+            </a:schemeClr>
+          </a:solidFill>
+        </p:spPr>
+        <p:txBody>
+          <a:bodyPr wrap="none" rtlCol="0">
+            <a:spAutoFit/>
+          </a:bodyPr>
+          <a:lstStyle/>
+          <a:p>
+            <a:r>
+              <a:rPr lang="en-US" altLang="ko-KR" dirty="0"/>
+              <a:t>PLC.CodeGen.Common</a:t>
+            </a:r>
+            <a:endParaRPr lang="ko-KR" altLang="en-US" dirty="0"/>
+          </a:p>
+        </p:txBody>
+      </p:sp>
+      <p:cxnSp>
+        <p:nvCxnSpPr>
+          <p:cNvPr id="24" name="직선 화살표 연결선 23">
+            <a:extLst>
+              <a:ext uri="{FF2B5EF4-FFF2-40B4-BE49-F238E27FC236}">
+                <a16:creationId xmlns:a16="http://schemas.microsoft.com/office/drawing/2014/main" id="{8F5F1BC2-C086-9ADD-3F6F-B83112BFE12D}"/>
+              </a:ext>
+            </a:extLst>
+          </p:cNvPr>
+          <p:cNvCxnSpPr>
+            <a:cxnSpLocks/>
+            <a:stCxn id="21" idx="2"/>
+            <a:endCxn id="16" idx="0"/>
+          </p:cNvCxnSpPr>
+          <p:nvPr/>
+        </p:nvCxnSpPr>
+        <p:spPr>
+          <a:xfrm>
+            <a:off x="5206915" y="3798332"/>
+            <a:ext cx="306840" cy="554816"/>
+          </a:xfrm>
+          <a:prstGeom prst="straightConnector1">
+            <a:avLst/>
+          </a:prstGeom>
+          <a:ln>
+            <a:headEnd type="none"/>
+            <a:tailEnd type="triangle"/>
+          </a:ln>
+        </p:spPr>
+        <p:style>
+          <a:lnRef idx="2">
+            <a:schemeClr val="accent1"/>
+          </a:lnRef>
+          <a:fillRef idx="0">
+            <a:schemeClr val="accent1"/>
+          </a:fillRef>
+          <a:effectRef idx="1">
+            <a:schemeClr val="accent1"/>
+          </a:effectRef>
+          <a:fontRef idx="minor">
+            <a:schemeClr val="tx1"/>
+          </a:fontRef>
+        </p:style>
+      </p:cxnSp>
+      <p:sp>
+        <p:nvSpPr>
+          <p:cNvPr id="33" name="TextBox 32">
+            <a:extLst>
+              <a:ext uri="{FF2B5EF4-FFF2-40B4-BE49-F238E27FC236}">
+                <a16:creationId xmlns:a16="http://schemas.microsoft.com/office/drawing/2014/main" id="{743D1ACC-5E0A-5326-D9FD-669915A1B81A}"/>
+              </a:ext>
+            </a:extLst>
+          </p:cNvPr>
+          <p:cNvSpPr txBox="1"/>
+          <p:nvPr>
+            <p:custDataLst>
+              <p:tags r:id="rId8"/>
+            </p:custDataLst>
+          </p:nvPr>
+        </p:nvSpPr>
+        <p:spPr>
+          <a:xfrm>
+            <a:off x="7318304" y="4353148"/>
+            <a:ext cx="1760418" cy="369332"/>
+          </a:xfrm>
+          <a:prstGeom prst="rect">
+            <a:avLst/>
+          </a:prstGeom>
+          <a:solidFill>
+            <a:schemeClr val="accent5">
+              <a:lumMod val="40000"/>
+              <a:lumOff val="60000"/>
+            </a:schemeClr>
+          </a:solidFill>
+        </p:spPr>
+        <p:txBody>
+          <a:bodyPr wrap="none" rtlCol="0">
+            <a:spAutoFit/>
+          </a:bodyPr>
+          <a:lstStyle/>
+          <a:p>
+            <a:r>
+              <a:rPr lang="en-US" altLang="ko-KR" dirty="0"/>
+              <a:t>E.CodeGenHMI</a:t>
+            </a:r>
+            <a:endParaRPr lang="ko-KR" altLang="en-US" dirty="0"/>
+          </a:p>
+        </p:txBody>
+      </p:sp>
+      <p:cxnSp>
+        <p:nvCxnSpPr>
+          <p:cNvPr id="36" name="직선 화살표 연결선 35">
+            <a:extLst>
+              <a:ext uri="{FF2B5EF4-FFF2-40B4-BE49-F238E27FC236}">
+                <a16:creationId xmlns:a16="http://schemas.microsoft.com/office/drawing/2014/main" id="{0480DD37-163A-EFE0-81BD-F52D4B6CDADB}"/>
+              </a:ext>
+            </a:extLst>
+          </p:cNvPr>
+          <p:cNvCxnSpPr>
+            <a:cxnSpLocks/>
+            <a:stCxn id="3" idx="2"/>
+            <a:endCxn id="33" idx="0"/>
+          </p:cNvCxnSpPr>
+          <p:nvPr/>
+        </p:nvCxnSpPr>
+        <p:spPr>
+          <a:xfrm>
+            <a:off x="7318304" y="3798332"/>
+            <a:ext cx="880209" cy="554816"/>
+          </a:xfrm>
+          <a:prstGeom prst="straightConnector1">
+            <a:avLst/>
+          </a:prstGeom>
+          <a:ln>
+            <a:headEnd type="none"/>
+            <a:tailEnd type="triangle"/>
+          </a:ln>
+        </p:spPr>
+        <p:style>
+          <a:lnRef idx="2">
+            <a:schemeClr val="accent1"/>
+          </a:lnRef>
+          <a:fillRef idx="0">
+            <a:schemeClr val="accent1"/>
+          </a:fillRef>
+          <a:effectRef idx="1">
             <a:schemeClr val="accent1"/>
           </a:effectRef>
           <a:fontRef idx="minor">
@@ -4192,40 +4050,219 @@
       </p:cxnSp>
       <p:cxnSp>
         <p:nvCxnSpPr>
-          <p:cNvPr id="66" name="직선 화살표 연결선 65">
-            <a:extLst>
-              <a:ext uri="{FF2B5EF4-FFF2-40B4-BE49-F238E27FC236}">
-                <a16:creationId xmlns:a16="http://schemas.microsoft.com/office/drawing/2014/main" id="{5DC6A417-6F84-2A8E-AB3B-3CB71AEE481A}"/>
+          <p:cNvPr id="37" name="직선 화살표 연결선 36">
+            <a:extLst>
+              <a:ext uri="{FF2B5EF4-FFF2-40B4-BE49-F238E27FC236}">
+                <a16:creationId xmlns:a16="http://schemas.microsoft.com/office/drawing/2014/main" id="{71DF43BB-B0B7-EC02-99B6-1EBFB60C1033}"/>
               </a:ext>
             </a:extLst>
           </p:cNvPr>
           <p:cNvCxnSpPr>
             <a:cxnSpLocks/>
-            <a:stCxn id="38" idx="2"/>
-            <a:endCxn id="32" idx="0"/>
+            <a:stCxn id="21" idx="2"/>
+            <a:endCxn id="33" idx="0"/>
           </p:cNvCxnSpPr>
           <p:nvPr/>
         </p:nvCxnSpPr>
         <p:spPr>
           <a:xfrm>
-            <a:off x="4858093" y="2972221"/>
-            <a:ext cx="3030993" cy="1413884"/>
+            <a:off x="5206915" y="3798332"/>
+            <a:ext cx="2991598" cy="554816"/>
           </a:xfrm>
           <a:prstGeom prst="straightConnector1">
             <a:avLst/>
           </a:prstGeom>
           <a:ln>
+            <a:headEnd type="none"/>
             <a:tailEnd type="triangle"/>
           </a:ln>
         </p:spPr>
         <p:style>
-          <a:lnRef idx="1">
+          <a:lnRef idx="2">
             <a:schemeClr val="accent1"/>
           </a:lnRef>
           <a:fillRef idx="0">
             <a:schemeClr val="accent1"/>
           </a:fillRef>
-          <a:effectRef idx="0">
+          <a:effectRef idx="1">
+            <a:schemeClr val="accent1"/>
+          </a:effectRef>
+          <a:fontRef idx="minor">
+            <a:schemeClr val="tx1"/>
+          </a:fontRef>
+        </p:style>
+      </p:cxnSp>
+      <p:sp>
+        <p:nvSpPr>
+          <p:cNvPr id="49" name="TextBox 48">
+            <a:extLst>
+              <a:ext uri="{FF2B5EF4-FFF2-40B4-BE49-F238E27FC236}">
+                <a16:creationId xmlns:a16="http://schemas.microsoft.com/office/drawing/2014/main" id="{4363FA0D-B658-D48E-114B-9679E10A109F}"/>
+              </a:ext>
+            </a:extLst>
+          </p:cNvPr>
+          <p:cNvSpPr txBox="1"/>
+          <p:nvPr>
+            <p:custDataLst>
+              <p:tags r:id="rId9"/>
+            </p:custDataLst>
+          </p:nvPr>
+        </p:nvSpPr>
+        <p:spPr>
+          <a:xfrm>
+            <a:off x="6153459" y="5434676"/>
+            <a:ext cx="1699504" cy="369332"/>
+          </a:xfrm>
+          <a:prstGeom prst="rect">
+            <a:avLst/>
+          </a:prstGeom>
+          <a:solidFill>
+            <a:schemeClr val="accent5">
+              <a:lumMod val="40000"/>
+              <a:lumOff val="60000"/>
+            </a:schemeClr>
+          </a:solidFill>
+        </p:spPr>
+        <p:txBody>
+          <a:bodyPr wrap="none" rtlCol="0">
+            <a:spAutoFit/>
+          </a:bodyPr>
+          <a:lstStyle/>
+          <a:p>
+            <a:r>
+              <a:rPr lang="en-US" altLang="ko-KR" dirty="0"/>
+              <a:t>E.CodeGenPLC</a:t>
+            </a:r>
+            <a:endParaRPr lang="ko-KR" altLang="en-US" dirty="0"/>
+          </a:p>
+        </p:txBody>
+      </p:sp>
+      <p:cxnSp>
+        <p:nvCxnSpPr>
+          <p:cNvPr id="52" name="직선 화살표 연결선 51">
+            <a:extLst>
+              <a:ext uri="{FF2B5EF4-FFF2-40B4-BE49-F238E27FC236}">
+                <a16:creationId xmlns:a16="http://schemas.microsoft.com/office/drawing/2014/main" id="{E08737F8-F734-E757-1A30-5B7BF7EAECF6}"/>
+              </a:ext>
+            </a:extLst>
+          </p:cNvPr>
+          <p:cNvCxnSpPr>
+            <a:cxnSpLocks/>
+            <a:stCxn id="16" idx="2"/>
+            <a:endCxn id="49" idx="0"/>
+          </p:cNvCxnSpPr>
+          <p:nvPr/>
+        </p:nvCxnSpPr>
+        <p:spPr>
+          <a:xfrm>
+            <a:off x="5513755" y="4722480"/>
+            <a:ext cx="1489456" cy="712196"/>
+          </a:xfrm>
+          <a:prstGeom prst="straightConnector1">
+            <a:avLst/>
+          </a:prstGeom>
+          <a:ln>
+            <a:headEnd type="none"/>
+            <a:tailEnd type="triangle"/>
+          </a:ln>
+        </p:spPr>
+        <p:style>
+          <a:lnRef idx="2">
+            <a:schemeClr val="accent1"/>
+          </a:lnRef>
+          <a:fillRef idx="0">
+            <a:schemeClr val="accent1"/>
+          </a:fillRef>
+          <a:effectRef idx="1">
+            <a:schemeClr val="accent1"/>
+          </a:effectRef>
+          <a:fontRef idx="minor">
+            <a:schemeClr val="tx1"/>
+          </a:fontRef>
+        </p:style>
+      </p:cxnSp>
+      <p:sp>
+        <p:nvSpPr>
+          <p:cNvPr id="54" name="TextBox 53">
+            <a:extLst>
+              <a:ext uri="{FF2B5EF4-FFF2-40B4-BE49-F238E27FC236}">
+                <a16:creationId xmlns:a16="http://schemas.microsoft.com/office/drawing/2014/main" id="{D29EFEE1-E11D-CA61-3345-78E551BBB598}"/>
+              </a:ext>
+            </a:extLst>
+          </p:cNvPr>
+          <p:cNvSpPr txBox="1"/>
+          <p:nvPr>
+            <p:custDataLst>
+              <p:tags r:id="rId10"/>
+            </p:custDataLst>
+          </p:nvPr>
+        </p:nvSpPr>
+        <p:spPr>
+          <a:xfrm>
+            <a:off x="2210981" y="4353148"/>
+            <a:ext cx="1867819" cy="369332"/>
+          </a:xfrm>
+          <a:prstGeom prst="rect">
+            <a:avLst/>
+          </a:prstGeom>
+          <a:solidFill>
+            <a:schemeClr val="accent5">
+              <a:lumMod val="40000"/>
+              <a:lumOff val="60000"/>
+            </a:schemeClr>
+          </a:solidFill>
+        </p:spPr>
+        <p:txBody>
+          <a:bodyPr wrap="none" rtlCol="0">
+            <a:spAutoFit/>
+          </a:bodyPr>
+          <a:lstStyle/>
+          <a:p>
+            <a:r>
+              <a:rPr lang="en-US" altLang="ko-KR" dirty="0"/>
+              <a:t>PLC.CodeGen.LS</a:t>
+            </a:r>
+            <a:endParaRPr lang="ko-KR" altLang="en-US" dirty="0"/>
+          </a:p>
+        </p:txBody>
+      </p:sp>
+      <p:cxnSp>
+        <p:nvCxnSpPr>
+          <p:cNvPr id="55" name="직선 화살표 연결선 54">
+            <a:extLst>
+              <a:ext uri="{FF2B5EF4-FFF2-40B4-BE49-F238E27FC236}">
+                <a16:creationId xmlns:a16="http://schemas.microsoft.com/office/drawing/2014/main" id="{10122ABC-4CCF-9D29-954F-F11269215C55}"/>
+              </a:ext>
+            </a:extLst>
+          </p:cNvPr>
+          <p:cNvCxnSpPr>
+            <a:cxnSpLocks/>
+            <a:stCxn id="54" idx="2"/>
+            <a:endCxn id="49" idx="0"/>
+          </p:cNvCxnSpPr>
+          <p:nvPr/>
+        </p:nvCxnSpPr>
+        <p:spPr>
+          <a:xfrm>
+            <a:off x="3144891" y="4722480"/>
+            <a:ext cx="3858320" cy="712196"/>
+          </a:xfrm>
+          <a:prstGeom prst="straightConnector1">
+            <a:avLst/>
+          </a:prstGeom>
+          <a:ln>
+            <a:headEnd type="none"/>
+            <a:tailEnd type="triangle"/>
+          </a:ln>
+        </p:spPr>
+        <p:style>
+          <a:lnRef idx="2">
+            <a:schemeClr val="accent1"/>
+          </a:lnRef>
+          <a:fillRef idx="0">
+            <a:schemeClr val="accent1"/>
+          </a:fillRef>
+          <a:effectRef idx="1">
             <a:schemeClr val="accent1"/>
           </a:effectRef>
           <a:fontRef idx="minor">
@@ -4235,40 +4272,41 @@
       </p:cxnSp>
       <p:cxnSp>
         <p:nvCxnSpPr>
-          <p:cNvPr id="73" name="직선 화살표 연결선 72">
-            <a:extLst>
-              <a:ext uri="{FF2B5EF4-FFF2-40B4-BE49-F238E27FC236}">
-                <a16:creationId xmlns:a16="http://schemas.microsoft.com/office/drawing/2014/main" id="{53424C47-F9A5-0CD7-E9B6-D6A4E97E9380}"/>
+          <p:cNvPr id="62" name="직선 화살표 연결선 61">
+            <a:extLst>
+              <a:ext uri="{FF2B5EF4-FFF2-40B4-BE49-F238E27FC236}">
+                <a16:creationId xmlns:a16="http://schemas.microsoft.com/office/drawing/2014/main" id="{6FF4EFAB-0C69-3800-812D-81069E27D354}"/>
               </a:ext>
             </a:extLst>
           </p:cNvPr>
           <p:cNvCxnSpPr>
             <a:cxnSpLocks/>
-            <a:stCxn id="32" idx="2"/>
-            <a:endCxn id="34" idx="0"/>
+            <a:stCxn id="21" idx="2"/>
+            <a:endCxn id="54" idx="0"/>
           </p:cNvCxnSpPr>
           <p:nvPr/>
         </p:nvCxnSpPr>
         <p:spPr>
           <a:xfrm flipH="1">
-            <a:off x="4664815" y="4755437"/>
-            <a:ext cx="3224271" cy="758076"/>
+            <a:off x="3144891" y="3798332"/>
+            <a:ext cx="2062024" cy="554816"/>
           </a:xfrm>
           <a:prstGeom prst="straightConnector1">
             <a:avLst/>
           </a:prstGeom>
           <a:ln>
+            <a:headEnd type="none"/>
             <a:tailEnd type="triangle"/>
           </a:ln>
         </p:spPr>
         <p:style>
-          <a:lnRef idx="1">
+          <a:lnRef idx="2">
             <a:schemeClr val="accent1"/>
           </a:lnRef>
           <a:fillRef idx="0">
             <a:schemeClr val="accent1"/>
           </a:fillRef>
-          <a:effectRef idx="0">
+          <a:effectRef idx="1">
             <a:schemeClr val="accent1"/>
           </a:effectRef>
           <a:fontRef idx="minor">
@@ -4278,26 +4316,26 @@
       </p:cxnSp>
       <p:cxnSp>
         <p:nvCxnSpPr>
-          <p:cNvPr id="83" name="직선 화살표 연결선 82">
-            <a:extLst>
-              <a:ext uri="{FF2B5EF4-FFF2-40B4-BE49-F238E27FC236}">
-                <a16:creationId xmlns:a16="http://schemas.microsoft.com/office/drawing/2014/main" id="{D7F4FEB4-1F02-E2EF-D0B3-5B78F8C69CD7}"/>
+          <p:cNvPr id="67" name="연결선: 구부러짐 66">
+            <a:extLst>
+              <a:ext uri="{FF2B5EF4-FFF2-40B4-BE49-F238E27FC236}">
+                <a16:creationId xmlns:a16="http://schemas.microsoft.com/office/drawing/2014/main" id="{1CBBA6A9-8599-41AA-644D-02121E282819}"/>
               </a:ext>
             </a:extLst>
           </p:cNvPr>
           <p:cNvCxnSpPr>
             <a:cxnSpLocks/>
-            <a:stCxn id="50" idx="2"/>
-            <a:endCxn id="32" idx="0"/>
+            <a:stCxn id="4" idx="1"/>
+            <a:endCxn id="21" idx="0"/>
           </p:cNvCxnSpPr>
           <p:nvPr/>
         </p:nvCxnSpPr>
         <p:spPr>
-          <a:xfrm>
-            <a:off x="7293424" y="2963592"/>
-            <a:ext cx="595662" cy="1422513"/>
-          </a:xfrm>
-          <a:prstGeom prst="straightConnector1">
+          <a:xfrm rot="10800000" flipV="1">
+            <a:off x="5206916" y="2241392"/>
+            <a:ext cx="1676895" cy="1187607"/>
+          </a:xfrm>
+          <a:prstGeom prst="curvedConnector2">
             <a:avLst/>
           </a:prstGeom>
           <a:ln>
@@ -4305,13 +4343,191 @@
           </a:ln>
         </p:spPr>
         <p:style>
-          <a:lnRef idx="1">
+          <a:lnRef idx="2">
             <a:schemeClr val="accent1"/>
           </a:lnRef>
           <a:fillRef idx="0">
             <a:schemeClr val="accent1"/>
           </a:fillRef>
-          <a:effectRef idx="0">
+          <a:effectRef idx="1">
+            <a:schemeClr val="accent1"/>
+          </a:effectRef>
+          <a:fontRef idx="minor">
+            <a:schemeClr val="tx1"/>
+          </a:fontRef>
+        </p:style>
+      </p:cxnSp>
+      <p:sp>
+        <p:nvSpPr>
+          <p:cNvPr id="71" name="TextBox 70">
+            <a:extLst>
+              <a:ext uri="{FF2B5EF4-FFF2-40B4-BE49-F238E27FC236}">
+                <a16:creationId xmlns:a16="http://schemas.microsoft.com/office/drawing/2014/main" id="{F8477B17-94D3-CB9F-BC00-DF89387D292A}"/>
+              </a:ext>
+            </a:extLst>
+          </p:cNvPr>
+          <p:cNvSpPr txBox="1"/>
+          <p:nvPr>
+            <p:custDataLst>
+              <p:tags r:id="rId11"/>
+            </p:custDataLst>
+          </p:nvPr>
+        </p:nvSpPr>
+        <p:spPr>
+          <a:xfrm>
+            <a:off x="957686" y="4353148"/>
+            <a:ext cx="1002197" cy="369332"/>
+          </a:xfrm>
+          <a:prstGeom prst="rect">
+            <a:avLst/>
+          </a:prstGeom>
+          <a:solidFill>
+            <a:schemeClr val="accent5">
+              <a:lumMod val="40000"/>
+              <a:lumOff val="60000"/>
+            </a:schemeClr>
+          </a:solidFill>
+        </p:spPr>
+        <p:txBody>
+          <a:bodyPr wrap="none" rtlCol="0">
+            <a:spAutoFit/>
+          </a:bodyPr>
+          <a:lstStyle/>
+          <a:p>
+            <a:r>
+              <a:rPr lang="en-US" altLang="ko-KR" dirty="0"/>
+              <a:t>PLC.HW</a:t>
+            </a:r>
+            <a:endParaRPr lang="ko-KR" altLang="en-US" dirty="0"/>
+          </a:p>
+        </p:txBody>
+      </p:sp>
+      <p:cxnSp>
+        <p:nvCxnSpPr>
+          <p:cNvPr id="72" name="직선 화살표 연결선 71">
+            <a:extLst>
+              <a:ext uri="{FF2B5EF4-FFF2-40B4-BE49-F238E27FC236}">
+                <a16:creationId xmlns:a16="http://schemas.microsoft.com/office/drawing/2014/main" id="{A5ABF957-EC5D-C113-732A-C8F87770D2B2}"/>
+              </a:ext>
+            </a:extLst>
+          </p:cNvPr>
+          <p:cNvCxnSpPr>
+            <a:cxnSpLocks/>
+            <a:stCxn id="21" idx="2"/>
+            <a:endCxn id="71" idx="0"/>
+          </p:cNvCxnSpPr>
+          <p:nvPr/>
+        </p:nvCxnSpPr>
+        <p:spPr>
+          <a:xfrm flipH="1">
+            <a:off x="1458785" y="3798332"/>
+            <a:ext cx="3748130" cy="554816"/>
+          </a:xfrm>
+          <a:prstGeom prst="straightConnector1">
+            <a:avLst/>
+          </a:prstGeom>
+          <a:ln>
+            <a:headEnd type="none"/>
+            <a:tailEnd type="triangle"/>
+          </a:ln>
+        </p:spPr>
+        <p:style>
+          <a:lnRef idx="2">
+            <a:schemeClr val="accent1"/>
+          </a:lnRef>
+          <a:fillRef idx="0">
+            <a:schemeClr val="accent1"/>
+          </a:fillRef>
+          <a:effectRef idx="1">
+            <a:schemeClr val="accent1"/>
+          </a:effectRef>
+          <a:fontRef idx="minor">
+            <a:schemeClr val="tx1"/>
+          </a:fontRef>
+        </p:style>
+      </p:cxnSp>
+      <p:sp>
+        <p:nvSpPr>
+          <p:cNvPr id="76" name="TextBox 75">
+            <a:extLst>
+              <a:ext uri="{FF2B5EF4-FFF2-40B4-BE49-F238E27FC236}">
+                <a16:creationId xmlns:a16="http://schemas.microsoft.com/office/drawing/2014/main" id="{929EB512-C5B6-D2DB-D912-1D3824CF99C3}"/>
+              </a:ext>
+            </a:extLst>
+          </p:cNvPr>
+          <p:cNvSpPr txBox="1"/>
+          <p:nvPr>
+            <p:custDataLst>
+              <p:tags r:id="rId12"/>
+            </p:custDataLst>
+          </p:nvPr>
+        </p:nvSpPr>
+        <p:spPr>
+          <a:xfrm>
+            <a:off x="8282619" y="5434676"/>
+            <a:ext cx="793807" cy="369332"/>
+          </a:xfrm>
+          <a:prstGeom prst="rect">
+            <a:avLst/>
+          </a:prstGeom>
+          <a:solidFill>
+            <a:schemeClr val="accent5">
+              <a:lumMod val="40000"/>
+              <a:lumOff val="60000"/>
+            </a:schemeClr>
+          </a:solidFill>
+        </p:spPr>
+        <p:txBody>
+          <a:bodyPr wrap="none" rtlCol="0">
+            <a:spAutoFit/>
+          </a:bodyPr>
+          <a:lstStyle/>
+          <a:p>
+            <a:r>
+              <a:rPr lang="en-US" altLang="ko-KR" dirty="0"/>
+              <a:t>E.CPU</a:t>
+            </a:r>
+            <a:endParaRPr lang="ko-KR" altLang="en-US" dirty="0"/>
+          </a:p>
+        </p:txBody>
+      </p:sp>
+      <p:cxnSp>
+        <p:nvCxnSpPr>
+          <p:cNvPr id="77" name="직선 화살표 연결선 76">
+            <a:extLst>
+              <a:ext uri="{FF2B5EF4-FFF2-40B4-BE49-F238E27FC236}">
+                <a16:creationId xmlns:a16="http://schemas.microsoft.com/office/drawing/2014/main" id="{16A1C4BC-EF74-E2AB-A31F-8BDF26506756}"/>
+              </a:ext>
+            </a:extLst>
+          </p:cNvPr>
+          <p:cNvCxnSpPr>
+            <a:cxnSpLocks/>
+            <a:stCxn id="16" idx="2"/>
+            <a:endCxn id="76" idx="0"/>
+          </p:cNvCxnSpPr>
+          <p:nvPr/>
+        </p:nvCxnSpPr>
+        <p:spPr>
+          <a:xfrm>
+            <a:off x="5513755" y="4722480"/>
+            <a:ext cx="3165768" cy="712196"/>
+          </a:xfrm>
+          <a:prstGeom prst="straightConnector1">
+            <a:avLst/>
+          </a:prstGeom>
+          <a:ln>
+            <a:headEnd type="none"/>
+            <a:tailEnd type="triangle"/>
+          </a:ln>
+        </p:spPr>
+        <p:style>
+          <a:lnRef idx="2">
+            <a:schemeClr val="accent1"/>
+          </a:lnRef>
+          <a:fillRef idx="0">
+            <a:schemeClr val="accent1"/>
+          </a:fillRef>
+          <a:effectRef idx="1">
             <a:schemeClr val="accent1"/>
           </a:effectRef>
           <a:fontRef idx="minor">
@@ -4321,40 +4537,41 @@
       </p:cxnSp>
       <p:cxnSp>
         <p:nvCxnSpPr>
-          <p:cNvPr id="96" name="직선 화살표 연결선 95">
-            <a:extLst>
-              <a:ext uri="{FF2B5EF4-FFF2-40B4-BE49-F238E27FC236}">
-                <a16:creationId xmlns:a16="http://schemas.microsoft.com/office/drawing/2014/main" id="{DC940CDB-B39C-26F5-CFDF-9FE3A10097E7}"/>
+          <p:cNvPr id="79" name="직선 화살표 연결선 78">
+            <a:extLst>
+              <a:ext uri="{FF2B5EF4-FFF2-40B4-BE49-F238E27FC236}">
+                <a16:creationId xmlns:a16="http://schemas.microsoft.com/office/drawing/2014/main" id="{7B890841-DC51-71EF-6939-FB4AB024C663}"/>
               </a:ext>
             </a:extLst>
           </p:cNvPr>
           <p:cNvCxnSpPr>
             <a:cxnSpLocks/>
-            <a:stCxn id="50" idx="2"/>
-            <a:endCxn id="27" idx="0"/>
+            <a:stCxn id="33" idx="2"/>
+            <a:endCxn id="76" idx="0"/>
           </p:cNvCxnSpPr>
           <p:nvPr/>
         </p:nvCxnSpPr>
         <p:spPr>
-          <a:xfrm flipH="1">
-            <a:off x="3534270" y="2963592"/>
-            <a:ext cx="3759154" cy="1039269"/>
+          <a:xfrm>
+            <a:off x="8198513" y="4722480"/>
+            <a:ext cx="481010" cy="712196"/>
           </a:xfrm>
           <a:prstGeom prst="straightConnector1">
             <a:avLst/>
           </a:prstGeom>
           <a:ln>
+            <a:headEnd type="none"/>
             <a:tailEnd type="triangle"/>
           </a:ln>
         </p:spPr>
         <p:style>
-          <a:lnRef idx="1">
+          <a:lnRef idx="2">
             <a:schemeClr val="accent1"/>
           </a:lnRef>
           <a:fillRef idx="0">
             <a:schemeClr val="accent1"/>
           </a:fillRef>
-          <a:effectRef idx="0">
+          <a:effectRef idx="1">
             <a:schemeClr val="accent1"/>
           </a:effectRef>
           <a:fontRef idx="minor">
@@ -4362,41 +4579,88 @@
           </a:fontRef>
         </p:style>
       </p:cxnSp>
+      <p:sp>
+        <p:nvSpPr>
+          <p:cNvPr id="82" name="TextBox 81">
+            <a:extLst>
+              <a:ext uri="{FF2B5EF4-FFF2-40B4-BE49-F238E27FC236}">
+                <a16:creationId xmlns:a16="http://schemas.microsoft.com/office/drawing/2014/main" id="{EF57F543-64CA-72A4-5069-049913F8E8E6}"/>
+              </a:ext>
+            </a:extLst>
+          </p:cNvPr>
+          <p:cNvSpPr txBox="1"/>
+          <p:nvPr>
+            <p:custDataLst>
+              <p:tags r:id="rId13"/>
+            </p:custDataLst>
+          </p:nvPr>
+        </p:nvSpPr>
+        <p:spPr>
+          <a:xfrm>
+            <a:off x="4728747" y="5434676"/>
+            <a:ext cx="761747" cy="369332"/>
+          </a:xfrm>
+          <a:prstGeom prst="rect">
+            <a:avLst/>
+          </a:prstGeom>
+          <a:solidFill>
+            <a:schemeClr val="accent5">
+              <a:lumMod val="40000"/>
+              <a:lumOff val="60000"/>
+            </a:schemeClr>
+          </a:solidFill>
+        </p:spPr>
+        <p:txBody>
+          <a:bodyPr wrap="none" rtlCol="0">
+            <a:spAutoFit/>
+          </a:bodyPr>
+          <a:lstStyle/>
+          <a:p>
+            <a:r>
+              <a:rPr lang="en-US" altLang="ko-KR" dirty="0"/>
+              <a:t>E.Info</a:t>
+            </a:r>
+            <a:endParaRPr lang="ko-KR" altLang="en-US" dirty="0"/>
+          </a:p>
+        </p:txBody>
+      </p:sp>
       <p:cxnSp>
         <p:nvCxnSpPr>
-          <p:cNvPr id="100" name="연결선: 구부러짐 99">
-            <a:extLst>
-              <a:ext uri="{FF2B5EF4-FFF2-40B4-BE49-F238E27FC236}">
-                <a16:creationId xmlns:a16="http://schemas.microsoft.com/office/drawing/2014/main" id="{A513017B-5703-930C-C0BC-43503CB22622}"/>
+          <p:cNvPr id="83" name="직선 화살표 연결선 82">
+            <a:extLst>
+              <a:ext uri="{FF2B5EF4-FFF2-40B4-BE49-F238E27FC236}">
+                <a16:creationId xmlns:a16="http://schemas.microsoft.com/office/drawing/2014/main" id="{98E2FA3E-A889-991E-D44B-D0B9FF446762}"/>
               </a:ext>
             </a:extLst>
           </p:cNvPr>
           <p:cNvCxnSpPr>
-            <a:stCxn id="19" idx="2"/>
-            <a:endCxn id="34" idx="1"/>
+            <a:cxnSpLocks/>
+            <a:stCxn id="16" idx="2"/>
+            <a:endCxn id="82" idx="0"/>
           </p:cNvCxnSpPr>
           <p:nvPr/>
         </p:nvCxnSpPr>
         <p:spPr>
-          <a:xfrm rot="16200000" flipH="1">
-            <a:off x="1401344" y="3529686"/>
-            <a:ext cx="2724041" cy="1612943"/>
-          </a:xfrm>
-          <a:prstGeom prst="curvedConnector2">
+          <a:xfrm flipH="1">
+            <a:off x="5109621" y="4722480"/>
+            <a:ext cx="404134" cy="712196"/>
+          </a:xfrm>
+          <a:prstGeom prst="straightConnector1">
             <a:avLst/>
           </a:prstGeom>
           <a:ln>
+            <a:headEnd type="none"/>
             <a:tailEnd type="triangle"/>
           </a:ln>
         </p:spPr>
         <p:style>
-          <a:lnRef idx="1">
+          <a:lnRef idx="2">
             <a:schemeClr val="accent1"/>
           </a:lnRef>
           <a:fillRef idx="0">
             <a:schemeClr val="accent1"/>
           </a:fillRef>
-          <a:effectRef idx="0">
+          <a:effectRef idx="1">
             <a:schemeClr val="accent1"/>
           </a:effectRef>
           <a:fontRef idx="minor">
@@ -4404,42 +4668,88 @@
           </a:fontRef>
         </p:style>
       </p:cxnSp>
+      <p:sp>
+        <p:nvSpPr>
+          <p:cNvPr id="90" name="TextBox 89">
+            <a:extLst>
+              <a:ext uri="{FF2B5EF4-FFF2-40B4-BE49-F238E27FC236}">
+                <a16:creationId xmlns:a16="http://schemas.microsoft.com/office/drawing/2014/main" id="{5A566D62-8378-D28F-ED7A-522E4C066079}"/>
+              </a:ext>
+            </a:extLst>
+          </p:cNvPr>
+          <p:cNvSpPr txBox="1"/>
+          <p:nvPr>
+            <p:custDataLst>
+              <p:tags r:id="rId14"/>
+            </p:custDataLst>
+          </p:nvPr>
+        </p:nvSpPr>
+        <p:spPr>
+          <a:xfrm>
+            <a:off x="8289850" y="6229517"/>
+            <a:ext cx="1091966" cy="369332"/>
+          </a:xfrm>
+          <a:prstGeom prst="rect">
+            <a:avLst/>
+          </a:prstGeom>
+          <a:solidFill>
+            <a:schemeClr val="accent5">
+              <a:lumMod val="40000"/>
+              <a:lumOff val="60000"/>
+            </a:schemeClr>
+          </a:solidFill>
+        </p:spPr>
+        <p:txBody>
+          <a:bodyPr wrap="none" rtlCol="0">
+            <a:spAutoFit/>
+          </a:bodyPr>
+          <a:lstStyle/>
+          <a:p>
+            <a:r>
+              <a:rPr lang="en-US" altLang="ko-KR" dirty="0"/>
+              <a:t>E.Rutime</a:t>
+            </a:r>
+            <a:endParaRPr lang="ko-KR" altLang="en-US" dirty="0"/>
+          </a:p>
+        </p:txBody>
+      </p:sp>
       <p:cxnSp>
         <p:nvCxnSpPr>
-          <p:cNvPr id="101" name="직선 화살표 연결선 100">
-            <a:extLst>
-              <a:ext uri="{FF2B5EF4-FFF2-40B4-BE49-F238E27FC236}">
-                <a16:creationId xmlns:a16="http://schemas.microsoft.com/office/drawing/2014/main" id="{DF5D13AB-C8DC-F11A-AF62-3C1A20E39119}"/>
+          <p:cNvPr id="91" name="직선 화살표 연결선 90">
+            <a:extLst>
+              <a:ext uri="{FF2B5EF4-FFF2-40B4-BE49-F238E27FC236}">
+                <a16:creationId xmlns:a16="http://schemas.microsoft.com/office/drawing/2014/main" id="{8FF4EE7F-0BFA-15EC-6691-F978FE4387C0}"/>
               </a:ext>
             </a:extLst>
           </p:cNvPr>
           <p:cNvCxnSpPr>
             <a:cxnSpLocks/>
-            <a:stCxn id="27" idx="2"/>
-            <a:endCxn id="34" idx="0"/>
+            <a:stCxn id="76" idx="2"/>
+            <a:endCxn id="90" idx="0"/>
           </p:cNvCxnSpPr>
           <p:nvPr/>
         </p:nvCxnSpPr>
         <p:spPr>
           <a:xfrm>
-            <a:off x="3534270" y="4372193"/>
-            <a:ext cx="1130545" cy="1141320"/>
+            <a:off x="8679523" y="5804008"/>
+            <a:ext cx="156310" cy="425509"/>
           </a:xfrm>
           <a:prstGeom prst="straightConnector1">
             <a:avLst/>
           </a:prstGeom>
           <a:ln>
+            <a:headEnd type="none"/>
             <a:tailEnd type="triangle"/>
           </a:ln>
         </p:spPr>
         <p:style>
-          <a:lnRef idx="1">
+          <a:lnRef idx="2">
             <a:schemeClr val="accent1"/>
           </a:lnRef>
           <a:fillRef idx="0">
             <a:schemeClr val="accent1"/>
           </a:fillRef>
-          <a:effectRef idx="0">
+          <a:effectRef idx="1">
             <a:schemeClr val="accent1"/>
           </a:effectRef>
           <a:fontRef idx="minor">
@@ -4449,31 +4759,44 @@
       </p:cxnSp>
       <p:sp>
         <p:nvSpPr>
-          <p:cNvPr id="104" name="TextBox 103">
-            <a:extLst>
-              <a:ext uri="{FF2B5EF4-FFF2-40B4-BE49-F238E27FC236}">
-                <a16:creationId xmlns:a16="http://schemas.microsoft.com/office/drawing/2014/main" id="{3071F6B9-257C-7BED-DEF0-E18A4A07422D}"/>
+          <p:cNvPr id="94" name="TextBox 93">
+            <a:extLst>
+              <a:ext uri="{FF2B5EF4-FFF2-40B4-BE49-F238E27FC236}">
+                <a16:creationId xmlns:a16="http://schemas.microsoft.com/office/drawing/2014/main" id="{C8BBF963-7402-0B49-F534-FE9FF9802179}"/>
               </a:ext>
             </a:extLst>
           </p:cNvPr>
           <p:cNvSpPr txBox="1"/>
-          <p:nvPr/>
-        </p:nvSpPr>
-        <p:spPr>
-          <a:xfrm>
-            <a:off x="998131" y="5632365"/>
-            <a:ext cx="1571328" cy="369332"/>
+          <p:nvPr>
+            <p:custDataLst>
+              <p:tags r:id="rId15"/>
+            </p:custDataLst>
+          </p:nvPr>
+        </p:nvSpPr>
+        <p:spPr>
+          <a:xfrm>
+            <a:off x="9559732" y="5434676"/>
+            <a:ext cx="620683" cy="246221"/>
           </a:xfrm>
           <a:prstGeom prst="rect">
             <a:avLst/>
           </a:prstGeom>
-          <a:solidFill>
-            <a:schemeClr val="accent5">
-              <a:lumMod val="40000"/>
-              <a:lumOff val="60000"/>
-            </a:schemeClr>
-          </a:solidFill>
-        </p:spPr>
+          <a:noFill/>
+        </p:spPr>
+        <p:style>
+          <a:lnRef idx="1">
+            <a:schemeClr val="accent4"/>
+          </a:lnRef>
+          <a:fillRef idx="2">
+            <a:schemeClr val="accent4"/>
+          </a:fillRef>
+          <a:effectRef idx="1">
+            <a:schemeClr val="accent4"/>
+          </a:effectRef>
+          <a:fontRef idx="minor">
+            <a:schemeClr val="dk1"/>
+          </a:fontRef>
+        </p:style>
         <p:txBody>
           <a:bodyPr wrap="none" rtlCol="0">
             <a:spAutoFit/>
@@ -4481,49 +4804,50 @@
           <a:lstStyle/>
           <a:p>
             <a:r>
-              <a:rPr lang="en-US" altLang="ko-KR" dirty="0"/>
-              <a:t>Engine.Parser</a:t>
-            </a:r>
-            <a:endParaRPr lang="ko-KR" altLang="en-US" dirty="0"/>
+              <a:rPr lang="en-US" altLang="ko-KR" sz="1000" dirty="0"/>
+              <a:t>IO.Core</a:t>
+            </a:r>
+            <a:endParaRPr lang="ko-KR" altLang="en-US" sz="1000" dirty="0"/>
           </a:p>
         </p:txBody>
       </p:sp>
       <p:cxnSp>
         <p:nvCxnSpPr>
-          <p:cNvPr id="105" name="직선 화살표 연결선 104">
-            <a:extLst>
-              <a:ext uri="{FF2B5EF4-FFF2-40B4-BE49-F238E27FC236}">
-                <a16:creationId xmlns:a16="http://schemas.microsoft.com/office/drawing/2014/main" id="{2B18DB00-905B-0291-7E99-E0467273F53F}"/>
+          <p:cNvPr id="95" name="직선 화살표 연결선 94">
+            <a:extLst>
+              <a:ext uri="{FF2B5EF4-FFF2-40B4-BE49-F238E27FC236}">
+                <a16:creationId xmlns:a16="http://schemas.microsoft.com/office/drawing/2014/main" id="{36B0BF3D-F9C6-6B04-A301-9F5BFD521BEE}"/>
               </a:ext>
             </a:extLst>
           </p:cNvPr>
           <p:cNvCxnSpPr>
             <a:cxnSpLocks/>
-            <a:stCxn id="27" idx="2"/>
-            <a:endCxn id="104" idx="0"/>
+            <a:stCxn id="94" idx="2"/>
+            <a:endCxn id="90" idx="0"/>
           </p:cNvCxnSpPr>
           <p:nvPr/>
         </p:nvCxnSpPr>
         <p:spPr>
           <a:xfrm flipH="1">
-            <a:off x="1783795" y="4372193"/>
-            <a:ext cx="1750475" cy="1260172"/>
+            <a:off x="8835833" y="5680897"/>
+            <a:ext cx="1034241" cy="548620"/>
           </a:xfrm>
           <a:prstGeom prst="straightConnector1">
             <a:avLst/>
           </a:prstGeom>
           <a:ln>
+            <a:headEnd type="none"/>
             <a:tailEnd type="triangle"/>
           </a:ln>
         </p:spPr>
         <p:style>
-          <a:lnRef idx="1">
+          <a:lnRef idx="2">
             <a:schemeClr val="accent1"/>
           </a:lnRef>
           <a:fillRef idx="0">
             <a:schemeClr val="accent1"/>
           </a:fillRef>
-          <a:effectRef idx="0">
+          <a:effectRef idx="1">
             <a:schemeClr val="accent1"/>
           </a:effectRef>
           <a:fontRef idx="minor">
@@ -4531,43 +4855,97 @@
           </a:fontRef>
         </p:style>
       </p:cxnSp>
+      <p:sp>
+        <p:nvSpPr>
+          <p:cNvPr id="97" name="TextBox 96">
+            <a:extLst>
+              <a:ext uri="{FF2B5EF4-FFF2-40B4-BE49-F238E27FC236}">
+                <a16:creationId xmlns:a16="http://schemas.microsoft.com/office/drawing/2014/main" id="{1EC777C7-CDB7-5C45-9C71-F6941D466908}"/>
+              </a:ext>
+            </a:extLst>
+          </p:cNvPr>
+          <p:cNvSpPr txBox="1"/>
+          <p:nvPr>
+            <p:custDataLst>
+              <p:tags r:id="rId16"/>
+            </p:custDataLst>
+          </p:nvPr>
+        </p:nvSpPr>
+        <p:spPr>
+          <a:xfrm>
+            <a:off x="1499669" y="4909757"/>
+            <a:ext cx="1207382" cy="246221"/>
+          </a:xfrm>
+          <a:prstGeom prst="rect">
+            <a:avLst/>
+          </a:prstGeom>
+          <a:noFill/>
+        </p:spPr>
+        <p:style>
+          <a:lnRef idx="1">
+            <a:schemeClr val="accent4"/>
+          </a:lnRef>
+          <a:fillRef idx="2">
+            <a:schemeClr val="accent4"/>
+          </a:fillRef>
+          <a:effectRef idx="1">
+            <a:schemeClr val="accent4"/>
+          </a:effectRef>
+          <a:fontRef idx="minor">
+            <a:schemeClr val="dk1"/>
+          </a:fontRef>
+        </p:style>
+        <p:txBody>
+          <a:bodyPr wrap="none" rtlCol="0">
+            <a:spAutoFit/>
+          </a:bodyPr>
+          <a:lstStyle/>
+          <a:p>
+            <a:r>
+              <a:rPr lang="en-US" altLang="ko-KR" sz="1000" dirty="0"/>
+              <a:t>Dual.Common.DB</a:t>
+            </a:r>
+            <a:endParaRPr lang="ko-KR" altLang="en-US" sz="1000" dirty="0"/>
+          </a:p>
+        </p:txBody>
+      </p:sp>
       <p:cxnSp>
         <p:nvCxnSpPr>
-          <p:cNvPr id="112" name="연결선: 구부러짐 111">
-            <a:extLst>
-              <a:ext uri="{FF2B5EF4-FFF2-40B4-BE49-F238E27FC236}">
-                <a16:creationId xmlns:a16="http://schemas.microsoft.com/office/drawing/2014/main" id="{12CCEEEC-D351-0486-0566-F12EA4D63305}"/>
+          <p:cNvPr id="98" name="직선 화살표 연결선 97">
+            <a:extLst>
+              <a:ext uri="{FF2B5EF4-FFF2-40B4-BE49-F238E27FC236}">
+                <a16:creationId xmlns:a16="http://schemas.microsoft.com/office/drawing/2014/main" id="{9AC9517F-C663-66B3-AB58-899A56B829EE}"/>
               </a:ext>
             </a:extLst>
           </p:cNvPr>
           <p:cNvCxnSpPr>
-            <a:stCxn id="104" idx="2"/>
-            <a:endCxn id="32" idx="2"/>
+            <a:cxnSpLocks/>
+            <a:stCxn id="97" idx="3"/>
+            <a:endCxn id="82" idx="1"/>
           </p:cNvCxnSpPr>
           <p:nvPr/>
         </p:nvCxnSpPr>
         <p:spPr>
-          <a:xfrm rot="5400000" flipH="1" flipV="1">
-            <a:off x="4213310" y="2325921"/>
-            <a:ext cx="1246260" cy="6105291"/>
-          </a:xfrm>
-          <a:prstGeom prst="curvedConnector3">
-            <a:avLst>
-              <a:gd name="adj1" fmla="val -18343"/>
-            </a:avLst>
+          <a:xfrm>
+            <a:off x="2707051" y="5032868"/>
+            <a:ext cx="2021696" cy="586474"/>
+          </a:xfrm>
+          <a:prstGeom prst="straightConnector1">
+            <a:avLst/>
           </a:prstGeom>
           <a:ln>
+            <a:headEnd type="none"/>
             <a:tailEnd type="triangle"/>
           </a:ln>
         </p:spPr>
         <p:style>
-          <a:lnRef idx="1">
+          <a:lnRef idx="2">
             <a:schemeClr val="accent1"/>
           </a:lnRef>
           <a:fillRef idx="0">
             <a:schemeClr val="accent1"/>
           </a:fillRef>
-          <a:effectRef idx="0">
+          <a:effectRef idx="1">
             <a:schemeClr val="accent1"/>
           </a:effectRef>
           <a:fontRef idx="minor">
@@ -4575,44 +4953,97 @@
           </a:fontRef>
         </p:style>
       </p:cxnSp>
+      <p:sp>
+        <p:nvSpPr>
+          <p:cNvPr id="107" name="TextBox 106">
+            <a:extLst>
+              <a:ext uri="{FF2B5EF4-FFF2-40B4-BE49-F238E27FC236}">
+                <a16:creationId xmlns:a16="http://schemas.microsoft.com/office/drawing/2014/main" id="{EEA820C8-AC5D-4E21-1B7D-BBD21308954E}"/>
+              </a:ext>
+            </a:extLst>
+          </p:cNvPr>
+          <p:cNvSpPr txBox="1"/>
+          <p:nvPr>
+            <p:custDataLst>
+              <p:tags r:id="rId17"/>
+            </p:custDataLst>
+          </p:nvPr>
+        </p:nvSpPr>
+        <p:spPr>
+          <a:xfrm>
+            <a:off x="3490444" y="1122652"/>
+            <a:ext cx="1475084" cy="246221"/>
+          </a:xfrm>
+          <a:prstGeom prst="rect">
+            <a:avLst/>
+          </a:prstGeom>
+          <a:noFill/>
+        </p:spPr>
+        <p:style>
+          <a:lnRef idx="1">
+            <a:schemeClr val="accent4"/>
+          </a:lnRef>
+          <a:fillRef idx="2">
+            <a:schemeClr val="accent4"/>
+          </a:fillRef>
+          <a:effectRef idx="1">
+            <a:schemeClr val="accent4"/>
+          </a:effectRef>
+          <a:fontRef idx="minor">
+            <a:schemeClr val="dk1"/>
+          </a:fontRef>
+        </p:style>
+        <p:txBody>
+          <a:bodyPr wrap="none" rtlCol="0">
+            <a:spAutoFit/>
+          </a:bodyPr>
+          <a:lstStyle/>
+          <a:p>
+            <a:r>
+              <a:rPr lang="en-US" altLang="ko-KR" sz="1000" dirty="0"/>
+              <a:t>Dual.Common.Core.FS</a:t>
+            </a:r>
+            <a:endParaRPr lang="ko-KR" altLang="en-US" sz="1000" dirty="0"/>
+          </a:p>
+        </p:txBody>
+      </p:sp>
       <p:cxnSp>
         <p:nvCxnSpPr>
-          <p:cNvPr id="113" name="연결선: 구부러짐 112">
-            <a:extLst>
-              <a:ext uri="{FF2B5EF4-FFF2-40B4-BE49-F238E27FC236}">
-                <a16:creationId xmlns:a16="http://schemas.microsoft.com/office/drawing/2014/main" id="{60250A23-75DC-8F2E-AEE0-14F25466E75C}"/>
+          <p:cNvPr id="108" name="직선 화살표 연결선 107">
+            <a:extLst>
+              <a:ext uri="{FF2B5EF4-FFF2-40B4-BE49-F238E27FC236}">
+                <a16:creationId xmlns:a16="http://schemas.microsoft.com/office/drawing/2014/main" id="{37009036-F453-4060-FE4A-EAE3D7A69B00}"/>
               </a:ext>
             </a:extLst>
           </p:cNvPr>
           <p:cNvCxnSpPr>
             <a:cxnSpLocks/>
-            <a:stCxn id="104" idx="2"/>
-            <a:endCxn id="42" idx="2"/>
+            <a:stCxn id="107" idx="3"/>
+            <a:endCxn id="5" idx="1"/>
           </p:cNvCxnSpPr>
           <p:nvPr/>
         </p:nvCxnSpPr>
         <p:spPr>
-          <a:xfrm rot="16200000" flipH="1">
-            <a:off x="5608453" y="2177038"/>
-            <a:ext cx="487448" cy="8136765"/>
-          </a:xfrm>
-          <a:prstGeom prst="curvedConnector3">
-            <a:avLst>
-              <a:gd name="adj1" fmla="val 146897"/>
-            </a:avLst>
+          <a:xfrm>
+            <a:off x="4965528" y="1245763"/>
+            <a:ext cx="1663387" cy="388011"/>
+          </a:xfrm>
+          <a:prstGeom prst="straightConnector1">
+            <a:avLst/>
           </a:prstGeom>
           <a:ln>
+            <a:headEnd type="none"/>
             <a:tailEnd type="triangle"/>
           </a:ln>
         </p:spPr>
         <p:style>
-          <a:lnRef idx="1">
+          <a:lnRef idx="2">
             <a:schemeClr val="accent1"/>
           </a:lnRef>
           <a:fillRef idx="0">
             <a:schemeClr val="accent1"/>
           </a:fillRef>
-          <a:effectRef idx="0">
+          <a:effectRef idx="1">
             <a:schemeClr val="accent1"/>
           </a:effectRef>
           <a:fontRef idx="minor">
@@ -4620,77 +5051,46 @@
           </a:fontRef>
         </p:style>
       </p:cxnSp>
-      <p:cxnSp>
-        <p:nvCxnSpPr>
-          <p:cNvPr id="119" name="연결선: 구부러짐 118">
-            <a:extLst>
-              <a:ext uri="{FF2B5EF4-FFF2-40B4-BE49-F238E27FC236}">
-                <a16:creationId xmlns:a16="http://schemas.microsoft.com/office/drawing/2014/main" id="{9197981C-8F71-5B39-EC49-E7D628319E4A}"/>
-              </a:ext>
-            </a:extLst>
-          </p:cNvPr>
-          <p:cNvCxnSpPr>
-            <a:stCxn id="14" idx="2"/>
-            <a:endCxn id="42" idx="0"/>
-          </p:cNvCxnSpPr>
-          <p:nvPr/>
-        </p:nvCxnSpPr>
-        <p:spPr>
-          <a:xfrm rot="16200000" flipH="1">
-            <a:off x="5567779" y="1767031"/>
-            <a:ext cx="4578733" cy="4126830"/>
-          </a:xfrm>
-          <a:prstGeom prst="curvedConnector3">
-            <a:avLst>
-              <a:gd name="adj1" fmla="val 50000"/>
-            </a:avLst>
-          </a:prstGeom>
-          <a:ln>
-            <a:tailEnd type="triangle"/>
-          </a:ln>
+      <p:sp>
+        <p:nvSpPr>
+          <p:cNvPr id="110" name="TextBox 109">
+            <a:extLst>
+              <a:ext uri="{FF2B5EF4-FFF2-40B4-BE49-F238E27FC236}">
+                <a16:creationId xmlns:a16="http://schemas.microsoft.com/office/drawing/2014/main" id="{BB488778-C9B5-3FEF-FF7A-B9208E2DCBB1}"/>
+              </a:ext>
+            </a:extLst>
+          </p:cNvPr>
+          <p:cNvSpPr txBox="1"/>
+          <p:nvPr>
+            <p:custDataLst>
+              <p:tags r:id="rId18"/>
+            </p:custDataLst>
+          </p:nvPr>
+        </p:nvSpPr>
+        <p:spPr>
+          <a:xfrm>
+            <a:off x="3490444" y="1562879"/>
+            <a:ext cx="1487908" cy="400110"/>
+          </a:xfrm>
+          <a:prstGeom prst="rect">
+            <a:avLst/>
+          </a:prstGeom>
+          <a:noFill/>
         </p:spPr>
         <p:style>
           <a:lnRef idx="1">
-            <a:schemeClr val="accent1"/>
+            <a:schemeClr val="accent4"/>
           </a:lnRef>
-          <a:fillRef idx="0">
-            <a:schemeClr val="accent1"/>
+          <a:fillRef idx="2">
+            <a:schemeClr val="accent4"/>
           </a:fillRef>
-          <a:effectRef idx="0">
-            <a:schemeClr val="accent1"/>
+          <a:effectRef idx="1">
+            <a:schemeClr val="accent4"/>
           </a:effectRef>
           <a:fontRef idx="minor">
-            <a:schemeClr val="tx1"/>
+            <a:schemeClr val="dk1"/>
           </a:fontRef>
         </p:style>
-      </p:cxnSp>
-      <p:sp>
-        <p:nvSpPr>
-          <p:cNvPr id="121" name="TextBox 120">
-            <a:extLst>
-              <a:ext uri="{FF2B5EF4-FFF2-40B4-BE49-F238E27FC236}">
-                <a16:creationId xmlns:a16="http://schemas.microsoft.com/office/drawing/2014/main" id="{E32E3C48-7E30-DA97-0933-DDFEB8E6429A}"/>
-              </a:ext>
-            </a:extLst>
-          </p:cNvPr>
-          <p:cNvSpPr txBox="1"/>
-          <p:nvPr/>
-        </p:nvSpPr>
-        <p:spPr>
-          <a:xfrm>
-            <a:off x="8588778" y="2594260"/>
-            <a:ext cx="2345514" cy="369332"/>
-          </a:xfrm>
-          <a:prstGeom prst="rect">
-            <a:avLst/>
-          </a:prstGeom>
-          <a:solidFill>
-            <a:schemeClr val="accent5">
-              <a:lumMod val="40000"/>
-              <a:lumOff val="60000"/>
-            </a:schemeClr>
-          </a:solidFill>
-        </p:spPr>
         <p:txBody>
           <a:bodyPr wrap="none" rtlCol="0">
             <a:spAutoFit/>
@@ -4698,293 +5098,55 @@
           <a:lstStyle/>
           <a:p>
             <a:r>
-              <a:rPr lang="en-US" altLang="ko-KR" dirty="0"/>
-              <a:t>Engine.CodeGenHMI</a:t>
-            </a:r>
-            <a:endParaRPr lang="ko-KR" altLang="en-US" dirty="0"/>
+              <a:rPr lang="en-US" altLang="ko-KR" sz="1000" dirty="0"/>
+              <a:t>Dual.Common.Base.CS</a:t>
+            </a:r>
+          </a:p>
+          <a:p>
+            <a:r>
+              <a:rPr lang="en-US" altLang="ko-KR" sz="1000" dirty="0"/>
+              <a:t>Dual.Common.Base.FS</a:t>
+            </a:r>
           </a:p>
         </p:txBody>
       </p:sp>
       <p:cxnSp>
         <p:nvCxnSpPr>
-          <p:cNvPr id="122" name="직선 화살표 연결선 121">
-            <a:extLst>
-              <a:ext uri="{FF2B5EF4-FFF2-40B4-BE49-F238E27FC236}">
-                <a16:creationId xmlns:a16="http://schemas.microsoft.com/office/drawing/2014/main" id="{4456ECD6-0738-C20D-00F9-C33AA677003E}"/>
+          <p:cNvPr id="111" name="직선 화살표 연결선 110">
+            <a:extLst>
+              <a:ext uri="{FF2B5EF4-FFF2-40B4-BE49-F238E27FC236}">
+                <a16:creationId xmlns:a16="http://schemas.microsoft.com/office/drawing/2014/main" id="{02720EEF-6217-DA7B-6143-ECF7BFB6ECB1}"/>
               </a:ext>
             </a:extLst>
           </p:cNvPr>
           <p:cNvCxnSpPr>
             <a:cxnSpLocks/>
-            <a:stCxn id="121" idx="2"/>
-            <a:endCxn id="32" idx="0"/>
+            <a:stCxn id="110" idx="3"/>
+            <a:endCxn id="4" idx="1"/>
           </p:cNvCxnSpPr>
           <p:nvPr/>
         </p:nvCxnSpPr>
         <p:spPr>
-          <a:xfrm flipH="1">
-            <a:off x="7889086" y="2963592"/>
-            <a:ext cx="1872449" cy="1422513"/>
+          <a:xfrm>
+            <a:off x="4978352" y="1762934"/>
+            <a:ext cx="1905458" cy="478459"/>
           </a:xfrm>
           <a:prstGeom prst="straightConnector1">
             <a:avLst/>
           </a:prstGeom>
           <a:ln>
+            <a:headEnd type="none"/>
             <a:tailEnd type="triangle"/>
           </a:ln>
         </p:spPr>
         <p:style>
-          <a:lnRef idx="1">
+          <a:lnRef idx="2">
             <a:schemeClr val="accent1"/>
           </a:lnRef>
           <a:fillRef idx="0">
             <a:schemeClr val="accent1"/>
           </a:fillRef>
-          <a:effectRef idx="0">
-            <a:schemeClr val="accent1"/>
-          </a:effectRef>
-          <a:fontRef idx="minor">
-            <a:schemeClr val="tx1"/>
-          </a:fontRef>
-        </p:style>
-      </p:cxnSp>
-      <p:cxnSp>
-        <p:nvCxnSpPr>
-          <p:cNvPr id="126" name="연결선: 구부러짐 125">
-            <a:extLst>
-              <a:ext uri="{FF2B5EF4-FFF2-40B4-BE49-F238E27FC236}">
-                <a16:creationId xmlns:a16="http://schemas.microsoft.com/office/drawing/2014/main" id="{F324785E-3746-7D98-FCE6-528DBEE36199}"/>
-              </a:ext>
-            </a:extLst>
-          </p:cNvPr>
-          <p:cNvCxnSpPr>
-            <a:stCxn id="121" idx="2"/>
-            <a:endCxn id="27" idx="0"/>
-          </p:cNvCxnSpPr>
-          <p:nvPr/>
-        </p:nvCxnSpPr>
-        <p:spPr>
-          <a:xfrm rot="5400000">
-            <a:off x="6128269" y="369594"/>
-            <a:ext cx="1039269" cy="6227265"/>
-          </a:xfrm>
-          <a:prstGeom prst="curvedConnector3">
-            <a:avLst/>
-          </a:prstGeom>
-          <a:ln>
-            <a:tailEnd type="triangle"/>
-          </a:ln>
-        </p:spPr>
-        <p:style>
-          <a:lnRef idx="1">
-            <a:schemeClr val="accent1"/>
-          </a:lnRef>
-          <a:fillRef idx="0">
-            <a:schemeClr val="accent1"/>
-          </a:fillRef>
-          <a:effectRef idx="0">
-            <a:schemeClr val="accent1"/>
-          </a:effectRef>
-          <a:fontRef idx="minor">
-            <a:schemeClr val="tx1"/>
-          </a:fontRef>
-        </p:style>
-      </p:cxnSp>
-      <p:sp>
-        <p:nvSpPr>
-          <p:cNvPr id="127" name="TextBox 126">
-            <a:extLst>
-              <a:ext uri="{FF2B5EF4-FFF2-40B4-BE49-F238E27FC236}">
-                <a16:creationId xmlns:a16="http://schemas.microsoft.com/office/drawing/2014/main" id="{49A63DE2-24E0-BE0C-7E24-F2740F64E69A}"/>
-              </a:ext>
-            </a:extLst>
-          </p:cNvPr>
-          <p:cNvSpPr txBox="1"/>
-          <p:nvPr/>
-        </p:nvSpPr>
-        <p:spPr>
-          <a:xfrm>
-            <a:off x="661539" y="1271522"/>
-            <a:ext cx="2365969" cy="369332"/>
-          </a:xfrm>
-          <a:prstGeom prst="rect">
-            <a:avLst/>
-          </a:prstGeom>
-        </p:spPr>
-        <p:style>
-          <a:lnRef idx="2">
-            <a:schemeClr val="accent1">
-              <a:shade val="50000"/>
-            </a:schemeClr>
-          </a:lnRef>
-          <a:fillRef idx="1">
-            <a:schemeClr val="accent1"/>
-          </a:fillRef>
-          <a:effectRef idx="0">
-            <a:schemeClr val="accent1"/>
-          </a:effectRef>
-          <a:fontRef idx="minor">
-            <a:schemeClr val="lt1"/>
-          </a:fontRef>
-        </p:style>
-        <p:txBody>
-          <a:bodyPr rtlCol="0" anchor="ctr"/>
-          <a:lstStyle>
-            <a:defPPr>
-              <a:defRPr lang="ko-KR"/>
-            </a:defPPr>
-            <a:lvl1pPr algn="ctr">
-              <a:defRPr>
-                <a:solidFill>
-                  <a:schemeClr val="lt1"/>
-                </a:solidFill>
-              </a:defRPr>
-            </a:lvl1pPr>
-            <a:lvl2pPr>
-              <a:defRPr>
-                <a:solidFill>
-                  <a:schemeClr val="lt1"/>
-                </a:solidFill>
-              </a:defRPr>
-            </a:lvl2pPr>
-            <a:lvl3pPr>
-              <a:defRPr>
-                <a:solidFill>
-                  <a:schemeClr val="lt1"/>
-                </a:solidFill>
-              </a:defRPr>
-            </a:lvl3pPr>
-            <a:lvl4pPr>
-              <a:defRPr>
-                <a:solidFill>
-                  <a:schemeClr val="lt1"/>
-                </a:solidFill>
-              </a:defRPr>
-            </a:lvl4pPr>
-            <a:lvl5pPr>
-              <a:defRPr>
-                <a:solidFill>
-                  <a:schemeClr val="lt1"/>
-                </a:solidFill>
-              </a:defRPr>
-            </a:lvl5pPr>
-            <a:lvl6pPr>
-              <a:defRPr>
-                <a:solidFill>
-                  <a:schemeClr val="lt1"/>
-                </a:solidFill>
-              </a:defRPr>
-            </a:lvl6pPr>
-            <a:lvl7pPr>
-              <a:defRPr>
-                <a:solidFill>
-                  <a:schemeClr val="lt1"/>
-                </a:solidFill>
-              </a:defRPr>
-            </a:lvl7pPr>
-            <a:lvl8pPr>
-              <a:defRPr>
-                <a:solidFill>
-                  <a:schemeClr val="lt1"/>
-                </a:solidFill>
-              </a:defRPr>
-            </a:lvl8pPr>
-            <a:lvl9pPr>
-              <a:defRPr>
-                <a:solidFill>
-                  <a:schemeClr val="lt1"/>
-                </a:solidFill>
-              </a:defRPr>
-            </a:lvl9pPr>
-          </a:lstStyle>
-          <a:p>
-            <a:r>
-              <a:rPr lang="en-US" altLang="ko-KR" dirty="0"/>
-              <a:t>Model.DsEditor</a:t>
-            </a:r>
-            <a:endParaRPr lang="ko-KR" altLang="en-US" dirty="0"/>
-          </a:p>
-        </p:txBody>
-      </p:sp>
-      <p:cxnSp>
-        <p:nvCxnSpPr>
-          <p:cNvPr id="128" name="직선 화살표 연결선 127">
-            <a:extLst>
-              <a:ext uri="{FF2B5EF4-FFF2-40B4-BE49-F238E27FC236}">
-                <a16:creationId xmlns:a16="http://schemas.microsoft.com/office/drawing/2014/main" id="{5F89B0B6-AB7A-54B4-B46E-11642B593F16}"/>
-              </a:ext>
-            </a:extLst>
-          </p:cNvPr>
-          <p:cNvCxnSpPr>
-            <a:cxnSpLocks/>
-            <a:stCxn id="127" idx="2"/>
-            <a:endCxn id="19" idx="0"/>
-          </p:cNvCxnSpPr>
-          <p:nvPr/>
-        </p:nvCxnSpPr>
-        <p:spPr>
-          <a:xfrm>
-            <a:off x="1844524" y="1640854"/>
-            <a:ext cx="112369" cy="963952"/>
-          </a:xfrm>
-          <a:prstGeom prst="straightConnector1">
-            <a:avLst/>
-          </a:prstGeom>
-          <a:ln>
-            <a:tailEnd type="triangle"/>
-          </a:ln>
-        </p:spPr>
-        <p:style>
-          <a:lnRef idx="1">
-            <a:schemeClr val="accent1"/>
-          </a:lnRef>
-          <a:fillRef idx="0">
-            <a:schemeClr val="accent1"/>
-          </a:fillRef>
-          <a:effectRef idx="0">
-            <a:schemeClr val="accent1"/>
-          </a:effectRef>
-          <a:fontRef idx="minor">
-            <a:schemeClr val="tx1"/>
-          </a:fontRef>
-        </p:style>
-      </p:cxnSp>
-      <p:cxnSp>
-        <p:nvCxnSpPr>
-          <p:cNvPr id="129" name="직선 화살표 연결선 128">
-            <a:extLst>
-              <a:ext uri="{FF2B5EF4-FFF2-40B4-BE49-F238E27FC236}">
-                <a16:creationId xmlns:a16="http://schemas.microsoft.com/office/drawing/2014/main" id="{F14BC4A5-C75E-77A0-0E75-41F242601C64}"/>
-              </a:ext>
-            </a:extLst>
-          </p:cNvPr>
-          <p:cNvCxnSpPr>
-            <a:cxnSpLocks/>
-            <a:stCxn id="127" idx="2"/>
-            <a:endCxn id="38" idx="0"/>
-          </p:cNvCxnSpPr>
-          <p:nvPr/>
-        </p:nvCxnSpPr>
-        <p:spPr>
-          <a:xfrm>
-            <a:off x="1844524" y="1640854"/>
-            <a:ext cx="3013569" cy="962035"/>
-          </a:xfrm>
-          <a:prstGeom prst="straightConnector1">
-            <a:avLst/>
-          </a:prstGeom>
-          <a:ln>
-            <a:tailEnd type="triangle"/>
-          </a:ln>
-        </p:spPr>
-        <p:style>
-          <a:lnRef idx="1">
-            <a:schemeClr val="accent1"/>
-          </a:lnRef>
-          <a:fillRef idx="0">
-            <a:schemeClr val="accent1"/>
-          </a:fillRef>
-          <a:effectRef idx="0">
+          <a:effectRef idx="1">
             <a:schemeClr val="accent1"/>
           </a:effectRef>
           <a:fontRef idx="minor">
@@ -4993,9 +5155,12 @@
         </p:style>
       </p:cxnSp>
     </p:spTree>
+    <p:custDataLst>
+      <p:tags r:id="rId1"/>
+    </p:custDataLst>
     <p:extLst>
       <p:ext uri="{BB962C8B-B14F-4D97-AF65-F5344CB8AC3E}">
-        <p14:creationId xmlns:p14="http://schemas.microsoft.com/office/powerpoint/2010/main" val="299123505"/>
+        <p14:creationId xmlns:p14="http://schemas.microsoft.com/office/powerpoint/2010/main" val="405968800"/>
       </p:ext>
     </p:extLst>
   </p:cSld>
@@ -5068,7 +5233,11 @@
             </a:extLst>
           </p:cNvPr>
           <p:cNvSpPr txBox="1"/>
-          <p:nvPr/>
+          <p:nvPr>
+            <p:custDataLst>
+              <p:tags r:id="rId2"/>
+            </p:custDataLst>
+          </p:nvPr>
         </p:nvSpPr>
         <p:spPr>
           <a:xfrm>
@@ -5177,7 +5346,11 @@
             </a:extLst>
           </p:cNvPr>
           <p:cNvSpPr txBox="1"/>
-          <p:nvPr/>
+          <p:nvPr>
+            <p:custDataLst>
+              <p:tags r:id="rId3"/>
+            </p:custDataLst>
+          </p:nvPr>
         </p:nvSpPr>
         <p:spPr>
           <a:xfrm>
@@ -5328,7 +5501,11 @@
             </a:extLst>
           </p:cNvPr>
           <p:cNvSpPr txBox="1"/>
-          <p:nvPr/>
+          <p:nvPr>
+            <p:custDataLst>
+              <p:tags r:id="rId4"/>
+            </p:custDataLst>
+          </p:nvPr>
         </p:nvSpPr>
         <p:spPr>
           <a:xfrm>
@@ -5443,7 +5620,11 @@
             </a:extLst>
           </p:cNvPr>
           <p:cNvSpPr txBox="1"/>
-          <p:nvPr/>
+          <p:nvPr>
+            <p:custDataLst>
+              <p:tags r:id="rId5"/>
+            </p:custDataLst>
+          </p:nvPr>
         </p:nvSpPr>
         <p:spPr>
           <a:xfrm>
@@ -5552,7 +5733,11 @@
             </a:extLst>
           </p:cNvPr>
           <p:cNvSpPr txBox="1"/>
-          <p:nvPr/>
+          <p:nvPr>
+            <p:custDataLst>
+              <p:tags r:id="rId6"/>
+            </p:custDataLst>
+          </p:nvPr>
         </p:nvSpPr>
         <p:spPr>
           <a:xfrm>
@@ -5661,7 +5846,11 @@
             </a:extLst>
           </p:cNvPr>
           <p:cNvSpPr txBox="1"/>
-          <p:nvPr/>
+          <p:nvPr>
+            <p:custDataLst>
+              <p:tags r:id="rId7"/>
+            </p:custDataLst>
+          </p:nvPr>
         </p:nvSpPr>
         <p:spPr>
           <a:xfrm>
@@ -5813,7 +6002,11 @@
             </a:extLst>
           </p:cNvPr>
           <p:cNvSpPr txBox="1"/>
-          <p:nvPr/>
+          <p:nvPr>
+            <p:custDataLst>
+              <p:tags r:id="rId8"/>
+            </p:custDataLst>
+          </p:nvPr>
         </p:nvSpPr>
         <p:spPr>
           <a:xfrm>
@@ -6094,7 +6287,11 @@
             </a:extLst>
           </p:cNvPr>
           <p:cNvSpPr txBox="1"/>
-          <p:nvPr/>
+          <p:nvPr>
+            <p:custDataLst>
+              <p:tags r:id="rId9"/>
+            </p:custDataLst>
+          </p:nvPr>
         </p:nvSpPr>
         <p:spPr>
           <a:xfrm>
@@ -6246,7 +6443,11 @@
             </a:extLst>
           </p:cNvPr>
           <p:cNvSpPr txBox="1"/>
-          <p:nvPr/>
+          <p:nvPr>
+            <p:custDataLst>
+              <p:tags r:id="rId10"/>
+            </p:custDataLst>
+          </p:nvPr>
         </p:nvSpPr>
         <p:spPr>
           <a:xfrm>
@@ -6452,7 +6653,11 @@
             </a:extLst>
           </p:cNvPr>
           <p:cNvSpPr txBox="1"/>
-          <p:nvPr/>
+          <p:nvPr>
+            <p:custDataLst>
+              <p:tags r:id="rId11"/>
+            </p:custDataLst>
+          </p:nvPr>
         </p:nvSpPr>
         <p:spPr>
           <a:xfrm>
@@ -6561,7 +6766,11 @@
             </a:extLst>
           </p:cNvPr>
           <p:cNvSpPr txBox="1"/>
-          <p:nvPr/>
+          <p:nvPr>
+            <p:custDataLst>
+              <p:tags r:id="rId12"/>
+            </p:custDataLst>
+          </p:nvPr>
         </p:nvSpPr>
         <p:spPr>
           <a:xfrm>
@@ -6713,7 +6922,11 @@
             </a:extLst>
           </p:cNvPr>
           <p:cNvSpPr txBox="1"/>
-          <p:nvPr/>
+          <p:nvPr>
+            <p:custDataLst>
+              <p:tags r:id="rId13"/>
+            </p:custDataLst>
+          </p:nvPr>
         </p:nvSpPr>
         <p:spPr>
           <a:xfrm>
@@ -6865,7 +7078,11 @@
             </a:extLst>
           </p:cNvPr>
           <p:cNvSpPr txBox="1"/>
-          <p:nvPr/>
+          <p:nvPr>
+            <p:custDataLst>
+              <p:tags r:id="rId14"/>
+            </p:custDataLst>
+          </p:nvPr>
         </p:nvSpPr>
         <p:spPr>
           <a:xfrm>
@@ -7017,7 +7234,11 @@
             </a:extLst>
           </p:cNvPr>
           <p:cNvSpPr txBox="1"/>
-          <p:nvPr/>
+          <p:nvPr>
+            <p:custDataLst>
+              <p:tags r:id="rId15"/>
+            </p:custDataLst>
+          </p:nvPr>
         </p:nvSpPr>
         <p:spPr>
           <a:xfrm>
@@ -7169,7 +7390,11 @@
             </a:extLst>
           </p:cNvPr>
           <p:cNvSpPr txBox="1"/>
-          <p:nvPr/>
+          <p:nvPr>
+            <p:custDataLst>
+              <p:tags r:id="rId16"/>
+            </p:custDataLst>
+          </p:nvPr>
         </p:nvSpPr>
         <p:spPr>
           <a:xfrm>
@@ -7321,7 +7546,11 @@
             </a:extLst>
           </p:cNvPr>
           <p:cNvSpPr txBox="1"/>
-          <p:nvPr/>
+          <p:nvPr>
+            <p:custDataLst>
+              <p:tags r:id="rId17"/>
+            </p:custDataLst>
+          </p:nvPr>
         </p:nvSpPr>
         <p:spPr>
           <a:xfrm>
@@ -7464,6 +7693,9 @@
         </p:style>
       </p:cxnSp>
     </p:spTree>
+    <p:custDataLst>
+      <p:tags r:id="rId1"/>
+    </p:custDataLst>
     <p:extLst>
       <p:ext uri="{BB962C8B-B14F-4D97-AF65-F5344CB8AC3E}">
         <p14:creationId xmlns:p14="http://schemas.microsoft.com/office/powerpoint/2010/main" val="3828553404"/>
@@ -7503,7 +7735,11 @@
             </a:extLst>
           </p:cNvPr>
           <p:cNvSpPr/>
-          <p:nvPr/>
+          <p:nvPr>
+            <p:custDataLst>
+              <p:tags r:id="rId2"/>
+            </p:custDataLst>
+          </p:nvPr>
         </p:nvSpPr>
         <p:spPr>
           <a:xfrm>
@@ -7555,7 +7791,11 @@
             </a:extLst>
           </p:cNvPr>
           <p:cNvSpPr txBox="1"/>
-          <p:nvPr/>
+          <p:nvPr>
+            <p:custDataLst>
+              <p:tags r:id="rId3"/>
+            </p:custDataLst>
+          </p:nvPr>
         </p:nvSpPr>
         <p:spPr>
           <a:xfrm>
@@ -7592,7 +7832,7 @@
           </a:lstStyle>
           <a:p>
             <a:r>
-              <a:rPr lang="en-US" altLang="ko-KR" dirty="0" err="1"/>
+              <a:rPr lang="en-US" altLang="ko-KR" dirty="0"/>
               <a:t>IXgxVar</a:t>
             </a:r>
             <a:endParaRPr lang="ko-KR" altLang="en-US" dirty="0"/>
@@ -7609,7 +7849,11 @@
             </a:extLst>
           </p:cNvPr>
           <p:cNvSpPr txBox="1"/>
-          <p:nvPr/>
+          <p:nvPr>
+            <p:custDataLst>
+              <p:tags r:id="rId4"/>
+            </p:custDataLst>
+          </p:nvPr>
         </p:nvSpPr>
         <p:spPr>
           <a:xfrm>
@@ -7663,7 +7907,11 @@
             </a:extLst>
           </p:cNvPr>
           <p:cNvSpPr txBox="1"/>
-          <p:nvPr/>
+          <p:nvPr>
+            <p:custDataLst>
+              <p:tags r:id="rId5"/>
+            </p:custDataLst>
+          </p:nvPr>
         </p:nvSpPr>
         <p:spPr>
           <a:xfrm>
@@ -7710,7 +7958,11 @@
             </a:extLst>
           </p:cNvPr>
           <p:cNvSpPr txBox="1"/>
-          <p:nvPr/>
+          <p:nvPr>
+            <p:custDataLst>
+              <p:tags r:id="rId6"/>
+            </p:custDataLst>
+          </p:nvPr>
         </p:nvSpPr>
         <p:spPr>
           <a:xfrm>
@@ -7747,12 +7999,8 @@
           </a:lstStyle>
           <a:p>
             <a:r>
-              <a:rPr lang="en-US" altLang="ko-KR" dirty="0" err="1"/>
-              <a:t>IXgxVar</a:t>
-            </a:r>
-            <a:r>
               <a:rPr lang="en-US" altLang="ko-KR" dirty="0"/>
-              <a:t>&lt;'T&gt;</a:t>
+              <a:t>IXgxVar&lt;'T&gt;</a:t>
             </a:r>
             <a:endParaRPr lang="ko-KR" altLang="en-US" dirty="0"/>
           </a:p>
@@ -7768,7 +8016,11 @@
             </a:extLst>
           </p:cNvPr>
           <p:cNvSpPr txBox="1"/>
-          <p:nvPr/>
+          <p:nvPr>
+            <p:custDataLst>
+              <p:tags r:id="rId7"/>
+            </p:custDataLst>
+          </p:nvPr>
         </p:nvSpPr>
         <p:spPr>
           <a:xfrm>
@@ -7950,7 +8202,11 @@
             </a:extLst>
           </p:cNvPr>
           <p:cNvSpPr txBox="1"/>
-          <p:nvPr/>
+          <p:nvPr>
+            <p:custDataLst>
+              <p:tags r:id="rId8"/>
+            </p:custDataLst>
+          </p:nvPr>
         </p:nvSpPr>
         <p:spPr>
           <a:xfrm>
@@ -7974,7 +8230,7 @@
           <a:lstStyle/>
           <a:p>
             <a:r>
-              <a:rPr lang="en-US" altLang="ko-KR" sz="1000" dirty="0" err="1">
+              <a:rPr lang="en-US" altLang="ko-KR" sz="1000" dirty="0">
                 <a:solidFill>
                   <a:srgbClr val="000000"/>
                 </a:solidFill>
@@ -8095,7 +8351,11 @@
             </a:extLst>
           </p:cNvPr>
           <p:cNvSpPr txBox="1"/>
-          <p:nvPr/>
+          <p:nvPr>
+            <p:custDataLst>
+              <p:tags r:id="rId9"/>
+            </p:custDataLst>
+          </p:nvPr>
         </p:nvSpPr>
         <p:spPr>
           <a:xfrm>
@@ -8192,7 +8452,11 @@
             </a:extLst>
           </p:cNvPr>
           <p:cNvSpPr txBox="1"/>
-          <p:nvPr/>
+          <p:nvPr>
+            <p:custDataLst>
+              <p:tags r:id="rId10"/>
+            </p:custDataLst>
+          </p:nvPr>
         </p:nvSpPr>
         <p:spPr>
           <a:xfrm>
@@ -8331,7 +8595,11 @@
             </a:extLst>
           </p:cNvPr>
           <p:cNvSpPr txBox="1"/>
-          <p:nvPr/>
+          <p:nvPr>
+            <p:custDataLst>
+              <p:tags r:id="rId11"/>
+            </p:custDataLst>
+          </p:nvPr>
         </p:nvSpPr>
         <p:spPr>
           <a:xfrm>
@@ -8428,7 +8696,11 @@
             </a:extLst>
           </p:cNvPr>
           <p:cNvSpPr txBox="1"/>
-          <p:nvPr/>
+          <p:nvPr>
+            <p:custDataLst>
+              <p:tags r:id="rId12"/>
+            </p:custDataLst>
+          </p:nvPr>
         </p:nvSpPr>
         <p:spPr>
           <a:xfrm>
@@ -8525,7 +8797,11 @@
             </a:extLst>
           </p:cNvPr>
           <p:cNvSpPr txBox="1"/>
-          <p:nvPr/>
+          <p:nvPr>
+            <p:custDataLst>
+              <p:tags r:id="rId13"/>
+            </p:custDataLst>
+          </p:nvPr>
         </p:nvSpPr>
         <p:spPr>
           <a:xfrm>
@@ -8584,7 +8860,11 @@
             </a:extLst>
           </p:cNvPr>
           <p:cNvSpPr txBox="1"/>
-          <p:nvPr/>
+          <p:nvPr>
+            <p:custDataLst>
+              <p:tags r:id="rId14"/>
+            </p:custDataLst>
+          </p:nvPr>
         </p:nvSpPr>
         <p:spPr>
           <a:xfrm>
@@ -8686,7 +8966,11 @@
             </a:extLst>
           </p:cNvPr>
           <p:cNvSpPr txBox="1"/>
-          <p:nvPr/>
+          <p:nvPr>
+            <p:custDataLst>
+              <p:tags r:id="rId15"/>
+            </p:custDataLst>
+          </p:nvPr>
         </p:nvSpPr>
         <p:spPr>
           <a:xfrm>
@@ -8788,7 +9072,11 @@
             </a:extLst>
           </p:cNvPr>
           <p:cNvSpPr txBox="1"/>
-          <p:nvPr/>
+          <p:nvPr>
+            <p:custDataLst>
+              <p:tags r:id="rId16"/>
+            </p:custDataLst>
+          </p:nvPr>
         </p:nvSpPr>
         <p:spPr>
           <a:xfrm>
@@ -8890,7 +9178,11 @@
             </a:extLst>
           </p:cNvPr>
           <p:cNvSpPr txBox="1"/>
-          <p:nvPr/>
+          <p:nvPr>
+            <p:custDataLst>
+              <p:tags r:id="rId17"/>
+            </p:custDataLst>
+          </p:nvPr>
         </p:nvSpPr>
         <p:spPr>
           <a:xfrm>
@@ -9070,7 +9362,11 @@
             </a:extLst>
           </p:cNvPr>
           <p:cNvSpPr txBox="1"/>
-          <p:nvPr/>
+          <p:nvPr>
+            <p:custDataLst>
+              <p:tags r:id="rId18"/>
+            </p:custDataLst>
+          </p:nvPr>
         </p:nvSpPr>
         <p:spPr>
           <a:xfrm>
@@ -9210,7 +9506,11 @@
             </a:extLst>
           </p:cNvPr>
           <p:cNvSpPr txBox="1"/>
-          <p:nvPr/>
+          <p:nvPr>
+            <p:custDataLst>
+              <p:tags r:id="rId19"/>
+            </p:custDataLst>
+          </p:nvPr>
         </p:nvSpPr>
         <p:spPr>
           <a:xfrm>
@@ -9436,7 +9736,11 @@
             </a:extLst>
           </p:cNvPr>
           <p:cNvSpPr txBox="1"/>
-          <p:nvPr/>
+          <p:nvPr>
+            <p:custDataLst>
+              <p:tags r:id="rId20"/>
+            </p:custDataLst>
+          </p:nvPr>
         </p:nvSpPr>
         <p:spPr>
           <a:xfrm>
@@ -9533,7 +9837,11 @@
             </a:extLst>
           </p:cNvPr>
           <p:cNvSpPr txBox="1"/>
-          <p:nvPr/>
+          <p:nvPr>
+            <p:custDataLst>
+              <p:tags r:id="rId21"/>
+            </p:custDataLst>
+          </p:nvPr>
         </p:nvSpPr>
         <p:spPr>
           <a:xfrm>
@@ -9587,7 +9895,11 @@
             </a:extLst>
           </p:cNvPr>
           <p:cNvSpPr txBox="1"/>
-          <p:nvPr/>
+          <p:nvPr>
+            <p:custDataLst>
+              <p:tags r:id="rId22"/>
+            </p:custDataLst>
+          </p:nvPr>
         </p:nvSpPr>
         <p:spPr>
           <a:xfrm>
@@ -9732,7 +10044,11 @@
             </a:extLst>
           </p:cNvPr>
           <p:cNvSpPr txBox="1"/>
-          <p:nvPr/>
+          <p:nvPr>
+            <p:custDataLst>
+              <p:tags r:id="rId23"/>
+            </p:custDataLst>
+          </p:nvPr>
         </p:nvSpPr>
         <p:spPr>
           <a:xfrm>
@@ -9906,7 +10222,11 @@
             </a:extLst>
           </p:cNvPr>
           <p:cNvSpPr txBox="1"/>
-          <p:nvPr/>
+          <p:nvPr>
+            <p:custDataLst>
+              <p:tags r:id="rId24"/>
+            </p:custDataLst>
+          </p:nvPr>
         </p:nvSpPr>
         <p:spPr>
           <a:xfrm>
@@ -10051,7 +10371,11 @@
             </a:extLst>
           </p:cNvPr>
           <p:cNvSpPr txBox="1"/>
-          <p:nvPr/>
+          <p:nvPr>
+            <p:custDataLst>
+              <p:tags r:id="rId25"/>
+            </p:custDataLst>
+          </p:nvPr>
         </p:nvSpPr>
         <p:spPr>
           <a:xfrm>
@@ -10110,7 +10434,11 @@
             </a:extLst>
           </p:cNvPr>
           <p:cNvSpPr txBox="1"/>
-          <p:nvPr/>
+          <p:nvPr>
+            <p:custDataLst>
+              <p:tags r:id="rId26"/>
+            </p:custDataLst>
+          </p:nvPr>
         </p:nvSpPr>
         <p:spPr>
           <a:xfrm>
@@ -10129,12 +10457,8 @@
           <a:lstStyle/>
           <a:p>
             <a:r>
-              <a:rPr lang="en-US" altLang="ko-KR" dirty="0" err="1"/>
-              <a:t>XGx</a:t>
-            </a:r>
-            <a:r>
               <a:rPr lang="en-US" altLang="ko-KR" dirty="0"/>
-              <a:t> PLC </a:t>
+              <a:t>XGx PLC </a:t>
             </a:r>
             <a:r>
               <a:rPr lang="ko-KR" altLang="en-US" dirty="0"/>
@@ -10238,7 +10562,11 @@
             </a:extLst>
           </p:cNvPr>
           <p:cNvSpPr txBox="1"/>
-          <p:nvPr/>
+          <p:nvPr>
+            <p:custDataLst>
+              <p:tags r:id="rId27"/>
+            </p:custDataLst>
+          </p:nvPr>
         </p:nvSpPr>
         <p:spPr>
           <a:xfrm>
@@ -10297,7 +10625,11 @@
             </a:extLst>
           </p:cNvPr>
           <p:cNvSpPr txBox="1"/>
-          <p:nvPr/>
+          <p:nvPr>
+            <p:custDataLst>
+              <p:tags r:id="rId28"/>
+            </p:custDataLst>
+          </p:nvPr>
         </p:nvSpPr>
         <p:spPr>
           <a:xfrm>
@@ -10392,7 +10724,11 @@
             </a:extLst>
           </p:cNvPr>
           <p:cNvSpPr txBox="1"/>
-          <p:nvPr/>
+          <p:nvPr>
+            <p:custDataLst>
+              <p:tags r:id="rId29"/>
+            </p:custDataLst>
+          </p:nvPr>
         </p:nvSpPr>
         <p:spPr>
           <a:xfrm>
@@ -10444,7 +10780,11 @@
             </a:extLst>
           </p:cNvPr>
           <p:cNvSpPr txBox="1"/>
-          <p:nvPr/>
+          <p:nvPr>
+            <p:custDataLst>
+              <p:tags r:id="rId30"/>
+            </p:custDataLst>
+          </p:nvPr>
         </p:nvSpPr>
         <p:spPr>
           <a:xfrm>
@@ -10557,7 +10897,11 @@
             </a:extLst>
           </p:cNvPr>
           <p:cNvSpPr txBox="1"/>
-          <p:nvPr/>
+          <p:nvPr>
+            <p:custDataLst>
+              <p:tags r:id="rId31"/>
+            </p:custDataLst>
+          </p:nvPr>
         </p:nvSpPr>
         <p:spPr>
           <a:xfrm>
@@ -10659,7 +11003,11 @@
             </a:extLst>
           </p:cNvPr>
           <p:cNvSpPr txBox="1"/>
-          <p:nvPr/>
+          <p:nvPr>
+            <p:custDataLst>
+              <p:tags r:id="rId32"/>
+            </p:custDataLst>
+          </p:nvPr>
         </p:nvSpPr>
         <p:spPr>
           <a:xfrm>
@@ -10756,7 +11104,11 @@
             </a:extLst>
           </p:cNvPr>
           <p:cNvSpPr txBox="1"/>
-          <p:nvPr/>
+          <p:nvPr>
+            <p:custDataLst>
+              <p:tags r:id="rId33"/>
+            </p:custDataLst>
+          </p:nvPr>
         </p:nvSpPr>
         <p:spPr>
           <a:xfrm>
@@ -10780,7 +11132,7 @@
           <a:lstStyle/>
           <a:p>
             <a:r>
-              <a:rPr lang="en-US" altLang="ko-KR" sz="1000" dirty="0" err="1">
+              <a:rPr lang="en-US" altLang="ko-KR" sz="1000" dirty="0">
                 <a:solidFill>
                   <a:srgbClr val="000000"/>
                 </a:solidFill>
@@ -10849,6 +11201,9 @@
         </p:style>
       </p:cxnSp>
     </p:spTree>
+    <p:custDataLst>
+      <p:tags r:id="rId1"/>
+    </p:custDataLst>
     <p:extLst>
       <p:ext uri="{BB962C8B-B14F-4D97-AF65-F5344CB8AC3E}">
         <p14:creationId xmlns:p14="http://schemas.microsoft.com/office/powerpoint/2010/main" val="2530752198"/>
@@ -10917,7 +11272,11 @@
             </a:extLst>
           </p:cNvPr>
           <p:cNvSpPr txBox="1"/>
-          <p:nvPr/>
+          <p:nvPr>
+            <p:custDataLst>
+              <p:tags r:id="rId2"/>
+            </p:custDataLst>
+          </p:nvPr>
         </p:nvSpPr>
         <p:spPr>
           <a:xfrm>
@@ -11026,7 +11385,11 @@
             </a:extLst>
           </p:cNvPr>
           <p:cNvSpPr txBox="1"/>
-          <p:nvPr/>
+          <p:nvPr>
+            <p:custDataLst>
+              <p:tags r:id="rId3"/>
+            </p:custDataLst>
+          </p:nvPr>
         </p:nvSpPr>
         <p:spPr>
           <a:xfrm>
@@ -11135,7 +11498,11 @@
             </a:extLst>
           </p:cNvPr>
           <p:cNvSpPr txBox="1"/>
-          <p:nvPr/>
+          <p:nvPr>
+            <p:custDataLst>
+              <p:tags r:id="rId4"/>
+            </p:custDataLst>
+          </p:nvPr>
         </p:nvSpPr>
         <p:spPr>
           <a:xfrm>
@@ -11255,7 +11622,11 @@
             </a:extLst>
           </p:cNvPr>
           <p:cNvSpPr txBox="1"/>
-          <p:nvPr/>
+          <p:nvPr>
+            <p:custDataLst>
+              <p:tags r:id="rId5"/>
+            </p:custDataLst>
+          </p:nvPr>
         </p:nvSpPr>
         <p:spPr>
           <a:xfrm>
@@ -11484,6 +11855,9 @@
         </p:style>
       </p:cxnSp>
     </p:spTree>
+    <p:custDataLst>
+      <p:tags r:id="rId1"/>
+    </p:custDataLst>
     <p:extLst>
       <p:ext uri="{BB962C8B-B14F-4D97-AF65-F5344CB8AC3E}">
         <p14:creationId xmlns:p14="http://schemas.microsoft.com/office/powerpoint/2010/main" val="944946923"/>
@@ -11552,7 +11926,11 @@
             </a:extLst>
           </p:cNvPr>
           <p:cNvSpPr txBox="1"/>
-          <p:nvPr/>
+          <p:nvPr>
+            <p:custDataLst>
+              <p:tags r:id="rId2"/>
+            </p:custDataLst>
+          </p:nvPr>
         </p:nvSpPr>
         <p:spPr>
           <a:xfrm>
@@ -11680,7 +12058,11 @@
             </a:extLst>
           </p:cNvPr>
           <p:cNvSpPr txBox="1"/>
-          <p:nvPr/>
+          <p:nvPr>
+            <p:custDataLst>
+              <p:tags r:id="rId3"/>
+            </p:custDataLst>
+          </p:nvPr>
         </p:nvSpPr>
         <p:spPr>
           <a:xfrm>
@@ -11808,7 +12190,11 @@
             </a:extLst>
           </p:cNvPr>
           <p:cNvSpPr txBox="1"/>
-          <p:nvPr/>
+          <p:nvPr>
+            <p:custDataLst>
+              <p:tags r:id="rId4"/>
+            </p:custDataLst>
+          </p:nvPr>
         </p:nvSpPr>
         <p:spPr>
           <a:xfrm>
@@ -11929,7 +12315,11 @@
             </a:extLst>
           </p:cNvPr>
           <p:cNvSpPr txBox="1"/>
-          <p:nvPr/>
+          <p:nvPr>
+            <p:custDataLst>
+              <p:tags r:id="rId5"/>
+            </p:custDataLst>
+          </p:nvPr>
         </p:nvSpPr>
         <p:spPr>
           <a:xfrm>
@@ -11992,8 +12382,41 @@
                 </a:solidFill>
                 <a:latin typeface="Cascadia Mono" panose="020B0609020000020004" pitchFamily="49" charset="0"/>
               </a:rPr>
-              <a:t> expression:IExpression * target:IStorage</a:t>
-            </a:r>
+              <a:t> </a:t>
+            </a:r>
+            <a:r>
+              <a:rPr lang="en-US" altLang="ko-KR" sz="1200" dirty="0" err="1">
+                <a:solidFill>
+                  <a:srgbClr val="000000"/>
+                </a:solidFill>
+                <a:latin typeface="Cascadia Mono" panose="020B0609020000020004" pitchFamily="49" charset="0"/>
+              </a:rPr>
+              <a:t>expression:IExpression</a:t>
+            </a:r>
+            <a:r>
+              <a:rPr lang="en-US" altLang="ko-KR" sz="1200" dirty="0">
+                <a:solidFill>
+                  <a:srgbClr val="000000"/>
+                </a:solidFill>
+                <a:latin typeface="Cascadia Mono" panose="020B0609020000020004" pitchFamily="49" charset="0"/>
+              </a:rPr>
+              <a:t> * </a:t>
+            </a:r>
+            <a:r>
+              <a:rPr lang="en-US" altLang="ko-KR" sz="1200" dirty="0" err="1">
+                <a:solidFill>
+                  <a:srgbClr val="000000"/>
+                </a:solidFill>
+                <a:latin typeface="Cascadia Mono" panose="020B0609020000020004" pitchFamily="49" charset="0"/>
+              </a:rPr>
+              <a:t>target:IStorage</a:t>
+            </a:r>
+            <a:endParaRPr lang="en-US" altLang="ko-KR" sz="1200" dirty="0">
+              <a:solidFill>
+                <a:srgbClr val="000000"/>
+              </a:solidFill>
+              <a:latin typeface="Cascadia Mono" panose="020B0609020000020004" pitchFamily="49" charset="0"/>
+            </a:endParaRPr>
           </a:p>
           <a:p>
             <a:r>
@@ -12021,7 +12444,34 @@
                 </a:solidFill>
                 <a:latin typeface="Cascadia Mono" panose="020B0609020000020004" pitchFamily="49" charset="0"/>
               </a:rPr>
-              <a:t> expression:IExpression * variable:IStorage</a:t>
+              <a:t> </a:t>
+            </a:r>
+            <a:r>
+              <a:rPr lang="en-US" altLang="ko-KR" sz="1200" dirty="0" err="1">
+                <a:solidFill>
+                  <a:srgbClr val="000000"/>
+                </a:solidFill>
+                <a:latin typeface="Cascadia Mono" panose="020B0609020000020004" pitchFamily="49" charset="0"/>
+              </a:rPr>
+              <a:t>expression:IExpression</a:t>
+            </a:r>
+            <a:r>
+              <a:rPr lang="en-US" altLang="ko-KR" sz="1200" dirty="0">
+                <a:solidFill>
+                  <a:srgbClr val="000000"/>
+                </a:solidFill>
+                <a:latin typeface="Cascadia Mono" panose="020B0609020000020004" pitchFamily="49" charset="0"/>
+              </a:rPr>
+              <a:t> * </a:t>
+            </a:r>
+            <a:r>
+              <a:rPr lang="en-US" altLang="ko-KR" sz="1200" dirty="0" err="1">
+                <a:solidFill>
+                  <a:srgbClr val="000000"/>
+                </a:solidFill>
+                <a:latin typeface="Cascadia Mono" panose="020B0609020000020004" pitchFamily="49" charset="0"/>
+              </a:rPr>
+              <a:t>variable:IStorage</a:t>
             </a:r>
             <a:endParaRPr lang="ko-KR" altLang="en-US" sz="1200" dirty="0">
               <a:solidFill>
@@ -12156,6 +12606,9 @@
         </p:txBody>
       </p:sp>
     </p:spTree>
+    <p:custDataLst>
+      <p:tags r:id="rId1"/>
+    </p:custDataLst>
     <p:extLst>
       <p:ext uri="{BB962C8B-B14F-4D97-AF65-F5344CB8AC3E}">
         <p14:creationId xmlns:p14="http://schemas.microsoft.com/office/powerpoint/2010/main" val="76146624"/>
@@ -12224,7 +12677,11 @@
             </a:extLst>
           </p:cNvPr>
           <p:cNvSpPr txBox="1"/>
-          <p:nvPr/>
+          <p:nvPr>
+            <p:custDataLst>
+              <p:tags r:id="rId2"/>
+            </p:custDataLst>
+          </p:nvPr>
         </p:nvSpPr>
         <p:spPr>
           <a:xfrm>
@@ -12327,12 +12784,8 @@
           </a:lstStyle>
           <a:p>
             <a:r>
-              <a:rPr lang="en-US" altLang="ko-KR" sz="1400" dirty="0" err="1"/>
-              <a:t>IExpression</a:t>
-            </a:r>
-            <a:r>
               <a:rPr lang="en-US" altLang="ko-KR" sz="1400" dirty="0"/>
-              <a:t>&lt;T&gt;</a:t>
+              <a:t>IExpression&lt;T&gt;</a:t>
             </a:r>
             <a:endParaRPr lang="ko-KR" altLang="en-US" sz="1400" dirty="0"/>
           </a:p>
@@ -12348,7 +12801,11 @@
             </a:extLst>
           </p:cNvPr>
           <p:cNvSpPr txBox="1"/>
-          <p:nvPr/>
+          <p:nvPr>
+            <p:custDataLst>
+              <p:tags r:id="rId3"/>
+            </p:custDataLst>
+          </p:nvPr>
         </p:nvSpPr>
         <p:spPr>
           <a:xfrm>
@@ -12500,7 +12957,11 @@
             </a:extLst>
           </p:cNvPr>
           <p:cNvSpPr txBox="1"/>
-          <p:nvPr/>
+          <p:nvPr>
+            <p:custDataLst>
+              <p:tags r:id="rId4"/>
+            </p:custDataLst>
+          </p:nvPr>
         </p:nvSpPr>
         <p:spPr>
           <a:xfrm>
@@ -12592,20 +13053,8 @@
           </a:lstStyle>
           <a:p>
             <a:r>
-              <a:rPr lang="en-US" altLang="ko-KR" sz="1400" dirty="0" err="1"/>
-              <a:t>DuVariable</a:t>
-            </a:r>
-            <a:r>
               <a:rPr lang="en-US" altLang="ko-KR" sz="1400" dirty="0"/>
-              <a:t> of </a:t>
-            </a:r>
-            <a:r>
-              <a:rPr lang="en-US" altLang="ko-KR" sz="1400" dirty="0" err="1"/>
-              <a:t>TypedValueStorage</a:t>
-            </a:r>
-            <a:r>
-              <a:rPr lang="en-US" altLang="ko-KR" sz="1400" dirty="0"/>
-              <a:t>&lt;T&gt;</a:t>
+              <a:t>DuVariable of TypedValueStorage&lt;T&gt;</a:t>
             </a:r>
             <a:endParaRPr lang="ko-KR" altLang="en-US" sz="1400" dirty="0"/>
           </a:p>
@@ -12621,7 +13070,11 @@
             </a:extLst>
           </p:cNvPr>
           <p:cNvSpPr txBox="1"/>
-          <p:nvPr/>
+          <p:nvPr>
+            <p:custDataLst>
+              <p:tags r:id="rId5"/>
+            </p:custDataLst>
+          </p:nvPr>
         </p:nvSpPr>
         <p:spPr>
           <a:xfrm>
@@ -12713,20 +13166,8 @@
           </a:lstStyle>
           <a:p>
             <a:r>
-              <a:rPr lang="en-US" altLang="ko-KR" sz="1400" dirty="0" err="1"/>
-              <a:t>DuLiteral</a:t>
-            </a:r>
-            <a:r>
               <a:rPr lang="en-US" altLang="ko-KR" sz="1400" dirty="0"/>
-              <a:t> of </a:t>
-            </a:r>
-            <a:r>
-              <a:rPr lang="en-US" altLang="ko-KR" sz="1400" dirty="0" err="1"/>
-              <a:t>LiteralHolder</a:t>
-            </a:r>
-            <a:r>
-              <a:rPr lang="en-US" altLang="ko-KR" sz="1400" dirty="0"/>
-              <a:t>&lt;T&gt;</a:t>
+              <a:t>DuLiteral of LiteralHolder&lt;T&gt;</a:t>
             </a:r>
             <a:endParaRPr lang="ko-KR" altLang="en-US" sz="1400" dirty="0"/>
           </a:p>
@@ -12742,7 +13183,11 @@
             </a:extLst>
           </p:cNvPr>
           <p:cNvSpPr txBox="1"/>
-          <p:nvPr/>
+          <p:nvPr>
+            <p:custDataLst>
+              <p:tags r:id="rId6"/>
+            </p:custDataLst>
+          </p:nvPr>
         </p:nvSpPr>
         <p:spPr>
           <a:xfrm>
@@ -12845,7 +13290,7 @@
           </a:lstStyle>
           <a:p>
             <a:r>
-              <a:rPr lang="en-US" altLang="ko-KR" sz="1400" dirty="0" err="1"/>
+              <a:rPr lang="en-US" altLang="ko-KR" sz="1400" dirty="0"/>
               <a:t>ITerminal</a:t>
             </a:r>
             <a:endParaRPr lang="ko-KR" altLang="en-US" sz="1400" dirty="0"/>
@@ -12905,7 +13350,11 @@
             </a:extLst>
           </p:cNvPr>
           <p:cNvSpPr txBox="1"/>
-          <p:nvPr/>
+          <p:nvPr>
+            <p:custDataLst>
+              <p:tags r:id="rId7"/>
+            </p:custDataLst>
+          </p:nvPr>
         </p:nvSpPr>
         <p:spPr>
           <a:xfrm>
@@ -13008,7 +13457,7 @@
           </a:lstStyle>
           <a:p>
             <a:r>
-              <a:rPr lang="en-US" altLang="ko-KR" sz="1400" dirty="0" err="1"/>
+              <a:rPr lang="en-US" altLang="ko-KR" sz="1400" dirty="0"/>
               <a:t>IStorage</a:t>
             </a:r>
             <a:endParaRPr lang="ko-KR" altLang="en-US" sz="1400" dirty="0"/>
@@ -13025,7 +13474,11 @@
             </a:extLst>
           </p:cNvPr>
           <p:cNvSpPr txBox="1"/>
-          <p:nvPr/>
+          <p:nvPr>
+            <p:custDataLst>
+              <p:tags r:id="rId8"/>
+            </p:custDataLst>
+          </p:nvPr>
         </p:nvSpPr>
         <p:spPr>
           <a:xfrm>
@@ -13128,7 +13581,7 @@
           </a:lstStyle>
           <a:p>
             <a:r>
-              <a:rPr lang="en-US" altLang="ko-KR" sz="1400" dirty="0" err="1"/>
+              <a:rPr lang="en-US" altLang="ko-KR" sz="1400" dirty="0"/>
               <a:t>IExpressionizableTerminal</a:t>
             </a:r>
             <a:endParaRPr lang="ko-KR" altLang="en-US" sz="1400" dirty="0"/>
@@ -13233,7 +13686,11 @@
             </a:extLst>
           </p:cNvPr>
           <p:cNvSpPr txBox="1"/>
-          <p:nvPr/>
+          <p:nvPr>
+            <p:custDataLst>
+              <p:tags r:id="rId9"/>
+            </p:custDataLst>
+          </p:nvPr>
         </p:nvSpPr>
         <p:spPr>
           <a:xfrm>
@@ -13385,7 +13842,11 @@
             </a:extLst>
           </p:cNvPr>
           <p:cNvSpPr txBox="1"/>
-          <p:nvPr/>
+          <p:nvPr>
+            <p:custDataLst>
+              <p:tags r:id="rId10"/>
+            </p:custDataLst>
+          </p:nvPr>
         </p:nvSpPr>
         <p:spPr>
           <a:xfrm>
@@ -13477,12 +13938,8 @@
           </a:lstStyle>
           <a:p>
             <a:r>
-              <a:rPr lang="en-US" altLang="ko-KR" sz="1400" dirty="0" err="1"/>
-              <a:t>DuTerminal</a:t>
-            </a:r>
-            <a:r>
               <a:rPr lang="en-US" altLang="ko-KR" sz="1400" dirty="0"/>
-              <a:t> of Terminal&lt;T&gt;</a:t>
+              <a:t>DuTerminal of Terminal&lt;T&gt;</a:t>
             </a:r>
             <a:endParaRPr lang="ko-KR" altLang="en-US" sz="1400" dirty="0"/>
           </a:p>
@@ -13498,7 +13955,11 @@
             </a:extLst>
           </p:cNvPr>
           <p:cNvSpPr txBox="1"/>
-          <p:nvPr/>
+          <p:nvPr>
+            <p:custDataLst>
+              <p:tags r:id="rId11"/>
+            </p:custDataLst>
+          </p:nvPr>
         </p:nvSpPr>
         <p:spPr>
           <a:xfrm>
@@ -13590,7 +14051,7 @@
           </a:lstStyle>
           <a:p>
             <a:r>
-              <a:rPr lang="en-US" altLang="ko-KR" sz="1400" dirty="0" err="1"/>
+              <a:rPr lang="en-US" altLang="ko-KR" sz="1400" dirty="0"/>
               <a:t>DuFunction</a:t>
             </a:r>
             <a:endParaRPr lang="ko-KR" altLang="en-US" sz="1400" dirty="0"/>
@@ -13598,6 +14059,9 @@
         </p:txBody>
       </p:sp>
     </p:spTree>
+    <p:custDataLst>
+      <p:tags r:id="rId1"/>
+    </p:custDataLst>
     <p:extLst>
       <p:ext uri="{BB962C8B-B14F-4D97-AF65-F5344CB8AC3E}">
         <p14:creationId xmlns:p14="http://schemas.microsoft.com/office/powerpoint/2010/main" val="1891761552"/>
@@ -13608,6 +14072,552 @@
     <a:masterClrMapping/>
   </p:clrMapOvr>
 </p:sld>
+</file>
+
+<file path=ppt/tags/tag1.xml><?xml version="1.0" encoding="utf-8"?>
+<p:tagLst xmlns:a="http://schemas.openxmlformats.org/drawingml/2006/main" xmlns:r="http://schemas.openxmlformats.org/officeDocument/2006/relationships" xmlns:p="http://schemas.openxmlformats.org/presentationml/2006/main">
+  <p:tag name="PROPPRESENTATION" val="{&#10;  &quot;Platform&quot;: {&#10;    &quot;Case&quot;: &quot;XGI&quot;&#10;  },&#10;  &quot;IoPlatform&quot;: {&#10;    &quot;Case&quot;: &quot;XGI&quot;&#10;  },&#10;  &quot;IsSupportExportApi&quot;: false,&#10;  &quot;TranspileInfo&quot;: null,&#10;  &quot;OptPlcHw&quot;: {&#10;    &quot;Case&quot;: &quot;Some&quot;,&#10;    &quot;Fields&quot;: [&#10;      {&#10;        &quot;PLCType&quot;: {&#10;          &quot;Case&quot;: &quot;XGI&quot;&#10;        },&#10;        &quot;Bases&quot;: [&#10;          null,&#10;          null,&#10;          null,&#10;          null,&#10;          null,&#10;          null,&#10;          null,&#10;          null&#10;        ],&#10;        &quot;StartFreeMWord&quot;: 1000,&#10;        &quot;FreeMWordSize&quot;: 1000,&#10;        &quot;IsFixedSlotAllocation&quot;: true,&#10;        &quot;NumTotalUsedSlot&quot;: 0&#10;      }&#10;    ]&#10;  },&#10;  &quot;ButtonLamps&quot;: [],&#10;  &quot;Identifiers&quot;: [],&#10;  &quot;IsUsing3D&quot;: false,&#10;  &quot;IsSaveLog&quot;: false,&#10;  &quot;ActionTimeout&quot;: 2000,&#10;  &quot;SimulationSpeedMultiplier&quot;: 1,&#10;  &quot;XgxGenerationParameters&quot;: {&#10;    &quot;ExistingLSISprj&quot;: &quot;&quot;,&#10;    &quot;StartTimer&quot;: 0,&#10;    &quot;StartCounter&quot;: 0,&#10;    &quot;StartMemory&quot;: 0,&#10;    &quot;EnableXmlComment&quot;: true,&#10;    &quot;MaxPouSplit&quot;: 0&#10;  }&#10;}"/>
+</p:tagLst>
+</file>
+
+<file path=ppt/tags/tag10.xml><?xml version="1.0" encoding="utf-8"?>
+<p:tagLst xmlns:a="http://schemas.openxmlformats.org/drawingml/2006/main" xmlns:r="http://schemas.openxmlformats.org/officeDocument/2006/relationships" xmlns:p="http://schemas.openxmlformats.org/presentationml/2006/main">
+  <p:tag name="PROPREAL" val="{&#10;  &quot;GoingTime&quot;: 0,&#10;  &quot;DelayTime&quot;: 0,&#10;  &quot;Motion&quot;: null,&#10;  &quot;Script&quot;: null,&#10;  &quot;NoTrans&quot;: false,&#10;  &quot;IsInitialFinished&quot;: false,&#10;  &quot;IsTokenSource&quot;: false,&#10;  &quot;RepeatCounter&quot;: 1&#10;}"/>
+</p:tagLst>
+</file>
+
+<file path=ppt/tags/tag11.xml><?xml version="1.0" encoding="utf-8"?>
+<p:tagLst xmlns:a="http://schemas.openxmlformats.org/drawingml/2006/main" xmlns:r="http://schemas.openxmlformats.org/officeDocument/2006/relationships" xmlns:p="http://schemas.openxmlformats.org/presentationml/2006/main">
+  <p:tag name="PROPREAL" val="{&#10;  &quot;GoingTime&quot;: 0,&#10;  &quot;DelayTime&quot;: 0,&#10;  &quot;Motion&quot;: null,&#10;  &quot;Script&quot;: null,&#10;  &quot;NoTrans&quot;: false,&#10;  &quot;IsInitialFinished&quot;: false,&#10;  &quot;IsTokenSource&quot;: false,&#10;  &quot;RepeatCounter&quot;: 1&#10;}"/>
+</p:tagLst>
+</file>
+
+<file path=ppt/tags/tag12.xml><?xml version="1.0" encoding="utf-8"?>
+<p:tagLst xmlns:a="http://schemas.openxmlformats.org/drawingml/2006/main" xmlns:r="http://schemas.openxmlformats.org/officeDocument/2006/relationships" xmlns:p="http://schemas.openxmlformats.org/presentationml/2006/main">
+  <p:tag name="PROPREAL" val="{&#10;  &quot;GoingTime&quot;: 0,&#10;  &quot;DelayTime&quot;: 0,&#10;  &quot;Motion&quot;: null,&#10;  &quot;Script&quot;: null,&#10;  &quot;NoTrans&quot;: false,&#10;  &quot;IsInitialFinished&quot;: false,&#10;  &quot;IsTokenSource&quot;: false,&#10;  &quot;RepeatCounter&quot;: 1&#10;}"/>
+</p:tagLst>
+</file>
+
+<file path=ppt/tags/tag13.xml><?xml version="1.0" encoding="utf-8"?>
+<p:tagLst xmlns:a="http://schemas.openxmlformats.org/drawingml/2006/main" xmlns:r="http://schemas.openxmlformats.org/officeDocument/2006/relationships" xmlns:p="http://schemas.openxmlformats.org/presentationml/2006/main">
+  <p:tag name="PROPREAL" val="{&#10;  &quot;GoingTime&quot;: 0,&#10;  &quot;DelayTime&quot;: 0,&#10;  &quot;Motion&quot;: null,&#10;  &quot;Script&quot;: null,&#10;  &quot;NoTrans&quot;: false,&#10;  &quot;IsInitialFinished&quot;: false,&#10;  &quot;IsTokenSource&quot;: false,&#10;  &quot;RepeatCounter&quot;: 1&#10;}"/>
+</p:tagLst>
+</file>
+
+<file path=ppt/tags/tag14.xml><?xml version="1.0" encoding="utf-8"?>
+<p:tagLst xmlns:a="http://schemas.openxmlformats.org/drawingml/2006/main" xmlns:r="http://schemas.openxmlformats.org/officeDocument/2006/relationships" xmlns:p="http://schemas.openxmlformats.org/presentationml/2006/main">
+  <p:tag name="PROPREAL" val="{&#10;  &quot;GoingTime&quot;: 0,&#10;  &quot;DelayTime&quot;: 0,&#10;  &quot;Motion&quot;: null,&#10;  &quot;Script&quot;: null,&#10;  &quot;NoTrans&quot;: false,&#10;  &quot;IsInitialFinished&quot;: false,&#10;  &quot;IsTokenSource&quot;: false,&#10;  &quot;RepeatCounter&quot;: 1&#10;}"/>
+</p:tagLst>
+</file>
+
+<file path=ppt/tags/tag15.xml><?xml version="1.0" encoding="utf-8"?>
+<p:tagLst xmlns:a="http://schemas.openxmlformats.org/drawingml/2006/main" xmlns:r="http://schemas.openxmlformats.org/officeDocument/2006/relationships" xmlns:p="http://schemas.openxmlformats.org/presentationml/2006/main">
+  <p:tag name="PROPREAL" val="{&#10;  &quot;GoingTime&quot;: 0,&#10;  &quot;DelayTime&quot;: 0,&#10;  &quot;Motion&quot;: null,&#10;  &quot;Script&quot;: null,&#10;  &quot;NoTrans&quot;: false,&#10;  &quot;IsInitialFinished&quot;: false,&#10;  &quot;IsTokenSource&quot;: false,&#10;  &quot;RepeatCounter&quot;: 1&#10;}"/>
+</p:tagLst>
+</file>
+
+<file path=ppt/tags/tag16.xml><?xml version="1.0" encoding="utf-8"?>
+<p:tagLst xmlns:a="http://schemas.openxmlformats.org/drawingml/2006/main" xmlns:r="http://schemas.openxmlformats.org/officeDocument/2006/relationships" xmlns:p="http://schemas.openxmlformats.org/presentationml/2006/main">
+  <p:tag name="PROPREAL" val="{&#10;  &quot;GoingTime&quot;: 0,&#10;  &quot;DelayTime&quot;: 0,&#10;  &quot;Motion&quot;: null,&#10;  &quot;Script&quot;: null,&#10;  &quot;NoTrans&quot;: false,&#10;  &quot;IsInitialFinished&quot;: false,&#10;  &quot;IsTokenSource&quot;: false,&#10;  &quot;RepeatCounter&quot;: 1&#10;}"/>
+</p:tagLst>
+</file>
+
+<file path=ppt/tags/tag17.xml><?xml version="1.0" encoding="utf-8"?>
+<p:tagLst xmlns:a="http://schemas.openxmlformats.org/drawingml/2006/main" xmlns:r="http://schemas.openxmlformats.org/officeDocument/2006/relationships" xmlns:p="http://schemas.openxmlformats.org/presentationml/2006/main">
+  <p:tag name="PROPREAL" val="{&#10;  &quot;GoingTime&quot;: 0,&#10;  &quot;DelayTime&quot;: 0,&#10;  &quot;Motion&quot;: null,&#10;  &quot;Script&quot;: null,&#10;  &quot;NoTrans&quot;: false,&#10;  &quot;IsInitialFinished&quot;: false,&#10;  &quot;IsTokenSource&quot;: false,&#10;  &quot;RepeatCounter&quot;: 1&#10;}"/>
+</p:tagLst>
+</file>
+
+<file path=ppt/tags/tag18.xml><?xml version="1.0" encoding="utf-8"?>
+<p:tagLst xmlns:a="http://schemas.openxmlformats.org/drawingml/2006/main" xmlns:r="http://schemas.openxmlformats.org/officeDocument/2006/relationships" xmlns:p="http://schemas.openxmlformats.org/presentationml/2006/main">
+  <p:tag name="PROPREAL" val="{&#10;  &quot;GoingTime&quot;: 0,&#10;  &quot;DelayTime&quot;: 0,&#10;  &quot;Motion&quot;: null,&#10;  &quot;Script&quot;: null,&#10;  &quot;NoTrans&quot;: false,&#10;  &quot;IsInitialFinished&quot;: false,&#10;  &quot;IsTokenSource&quot;: false,&#10;  &quot;RepeatCounter&quot;: 1&#10;}"/>
+</p:tagLst>
+</file>
+
+<file path=ppt/tags/tag19.xml><?xml version="1.0" encoding="utf-8"?>
+<p:tagLst xmlns:a="http://schemas.openxmlformats.org/drawingml/2006/main" xmlns:r="http://schemas.openxmlformats.org/officeDocument/2006/relationships" xmlns:p="http://schemas.openxmlformats.org/presentationml/2006/main">
+  <p:tag name="PROPREAL" val="{&#10;  &quot;GoingTime&quot;: 0,&#10;  &quot;DelayTime&quot;: 0,&#10;  &quot;Motion&quot;: null,&#10;  &quot;Script&quot;: null,&#10;  &quot;NoTrans&quot;: false,&#10;  &quot;IsInitialFinished&quot;: false,&#10;  &quot;IsTokenSource&quot;: false,&#10;  &quot;RepeatCounter&quot;: 1&#10;}"/>
+</p:tagLst>
+</file>
+
+<file path=ppt/tags/tag2.xml><?xml version="1.0" encoding="utf-8"?>
+<p:tagLst xmlns:a="http://schemas.openxmlformats.org/drawingml/2006/main" xmlns:r="http://schemas.openxmlformats.org/officeDocument/2006/relationships" xmlns:p="http://schemas.openxmlformats.org/presentationml/2006/main">
+  <p:tag name="PROPSLIDE" val="{&#10;  &quot;ApiSpecs&quot;: {},&#10;  &quot;UserConfirmedLoadDevices&quot;: [],&#10;  &quot;GuessedLoadDevices&quot;: [],&#10;  &quot;UseMacroExapnsion&quot;: false,&#10;  &quot;MacroExpansions&quot;: {}&#10;}"/>
+</p:tagLst>
+</file>
+
+<file path=ppt/tags/tag20.xml><?xml version="1.0" encoding="utf-8"?>
+<p:tagLst xmlns:a="http://schemas.openxmlformats.org/drawingml/2006/main" xmlns:r="http://schemas.openxmlformats.org/officeDocument/2006/relationships" xmlns:p="http://schemas.openxmlformats.org/presentationml/2006/main">
+  <p:tag name="PROPREAL" val="{&#10;  &quot;GoingTime&quot;: 0,&#10;  &quot;DelayTime&quot;: 0,&#10;  &quot;Motion&quot;: null,&#10;  &quot;Script&quot;: null,&#10;  &quot;NoTrans&quot;: false,&#10;  &quot;IsInitialFinished&quot;: false,&#10;  &quot;IsTokenSource&quot;: false,&#10;  &quot;RepeatCounter&quot;: 1&#10;}"/>
+</p:tagLst>
+</file>
+
+<file path=ppt/tags/tag21.xml><?xml version="1.0" encoding="utf-8"?>
+<p:tagLst xmlns:a="http://schemas.openxmlformats.org/drawingml/2006/main" xmlns:r="http://schemas.openxmlformats.org/officeDocument/2006/relationships" xmlns:p="http://schemas.openxmlformats.org/presentationml/2006/main">
+  <p:tag name="PROPSLIDE" val="{&#10;  &quot;ApiSpecs&quot;: {},&#10;  &quot;UserConfirmedLoadDevices&quot;: [],&#10;  &quot;GuessedLoadDevices&quot;: [],&#10;  &quot;UseMacroExapnsion&quot;: false,&#10;  &quot;MacroExpansions&quot;: {}&#10;}"/>
+</p:tagLst>
+</file>
+
+<file path=ppt/tags/tag22.xml><?xml version="1.0" encoding="utf-8"?>
+<p:tagLst xmlns:a="http://schemas.openxmlformats.org/drawingml/2006/main" xmlns:r="http://schemas.openxmlformats.org/officeDocument/2006/relationships" xmlns:p="http://schemas.openxmlformats.org/presentationml/2006/main">
+  <p:tag name="PROPREAL" val="{&#10;  &quot;GoingTime&quot;: 0,&#10;  &quot;DelayTime&quot;: 0,&#10;  &quot;Motion&quot;: null,&#10;  &quot;Script&quot;: null,&#10;  &quot;NoTrans&quot;: false,&#10;  &quot;IsInitialFinished&quot;: false,&#10;  &quot;IsTokenSource&quot;: false,&#10;  &quot;RepeatCounter&quot;: 1&#10;}"/>
+</p:tagLst>
+</file>
+
+<file path=ppt/tags/tag23.xml><?xml version="1.0" encoding="utf-8"?>
+<p:tagLst xmlns:a="http://schemas.openxmlformats.org/drawingml/2006/main" xmlns:r="http://schemas.openxmlformats.org/officeDocument/2006/relationships" xmlns:p="http://schemas.openxmlformats.org/presentationml/2006/main">
+  <p:tag name="PROPREAL" val="{&#10;  &quot;GoingTime&quot;: 0,&#10;  &quot;DelayTime&quot;: 0,&#10;  &quot;Motion&quot;: null,&#10;  &quot;Script&quot;: null,&#10;  &quot;NoTrans&quot;: false,&#10;  &quot;IsInitialFinished&quot;: false,&#10;  &quot;IsTokenSource&quot;: false,&#10;  &quot;RepeatCounter&quot;: 1&#10;}"/>
+</p:tagLst>
+</file>
+
+<file path=ppt/tags/tag24.xml><?xml version="1.0" encoding="utf-8"?>
+<p:tagLst xmlns:a="http://schemas.openxmlformats.org/drawingml/2006/main" xmlns:r="http://schemas.openxmlformats.org/officeDocument/2006/relationships" xmlns:p="http://schemas.openxmlformats.org/presentationml/2006/main">
+  <p:tag name="PROPREAL" val="{&#10;  &quot;GoingTime&quot;: 0,&#10;  &quot;DelayTime&quot;: 0,&#10;  &quot;Motion&quot;: null,&#10;  &quot;Script&quot;: null,&#10;  &quot;NoTrans&quot;: false,&#10;  &quot;IsInitialFinished&quot;: false,&#10;  &quot;IsTokenSource&quot;: false,&#10;  &quot;RepeatCounter&quot;: 1&#10;}"/>
+</p:tagLst>
+</file>
+
+<file path=ppt/tags/tag25.xml><?xml version="1.0" encoding="utf-8"?>
+<p:tagLst xmlns:a="http://schemas.openxmlformats.org/drawingml/2006/main" xmlns:r="http://schemas.openxmlformats.org/officeDocument/2006/relationships" xmlns:p="http://schemas.openxmlformats.org/presentationml/2006/main">
+  <p:tag name="PROPREAL" val="{&#10;  &quot;GoingTime&quot;: 0,&#10;  &quot;DelayTime&quot;: 0,&#10;  &quot;Motion&quot;: null,&#10;  &quot;Script&quot;: null,&#10;  &quot;NoTrans&quot;: false,&#10;  &quot;IsInitialFinished&quot;: false,&#10;  &quot;IsTokenSource&quot;: false,&#10;  &quot;RepeatCounter&quot;: 1&#10;}"/>
+</p:tagLst>
+</file>
+
+<file path=ppt/tags/tag26.xml><?xml version="1.0" encoding="utf-8"?>
+<p:tagLst xmlns:a="http://schemas.openxmlformats.org/drawingml/2006/main" xmlns:r="http://schemas.openxmlformats.org/officeDocument/2006/relationships" xmlns:p="http://schemas.openxmlformats.org/presentationml/2006/main">
+  <p:tag name="PROPREAL" val="{&#10;  &quot;GoingTime&quot;: 0,&#10;  &quot;DelayTime&quot;: 0,&#10;  &quot;Motion&quot;: null,&#10;  &quot;Script&quot;: null,&#10;  &quot;NoTrans&quot;: false,&#10;  &quot;IsInitialFinished&quot;: false,&#10;  &quot;IsTokenSource&quot;: false,&#10;  &quot;RepeatCounter&quot;: 1&#10;}"/>
+</p:tagLst>
+</file>
+
+<file path=ppt/tags/tag27.xml><?xml version="1.0" encoding="utf-8"?>
+<p:tagLst xmlns:a="http://schemas.openxmlformats.org/drawingml/2006/main" xmlns:r="http://schemas.openxmlformats.org/officeDocument/2006/relationships" xmlns:p="http://schemas.openxmlformats.org/presentationml/2006/main">
+  <p:tag name="PROPREAL" val="{&#10;  &quot;GoingTime&quot;: 0,&#10;  &quot;DelayTime&quot;: 0,&#10;  &quot;Motion&quot;: null,&#10;  &quot;Script&quot;: null,&#10;  &quot;NoTrans&quot;: false,&#10;  &quot;IsInitialFinished&quot;: false,&#10;  &quot;IsTokenSource&quot;: false,&#10;  &quot;RepeatCounter&quot;: 1&#10;}"/>
+</p:tagLst>
+</file>
+
+<file path=ppt/tags/tag28.xml><?xml version="1.0" encoding="utf-8"?>
+<p:tagLst xmlns:a="http://schemas.openxmlformats.org/drawingml/2006/main" xmlns:r="http://schemas.openxmlformats.org/officeDocument/2006/relationships" xmlns:p="http://schemas.openxmlformats.org/presentationml/2006/main">
+  <p:tag name="PROPREAL" val="{&#10;  &quot;GoingTime&quot;: 0,&#10;  &quot;DelayTime&quot;: 0,&#10;  &quot;Motion&quot;: null,&#10;  &quot;Script&quot;: null,&#10;  &quot;NoTrans&quot;: false,&#10;  &quot;IsInitialFinished&quot;: false,&#10;  &quot;IsTokenSource&quot;: false,&#10;  &quot;RepeatCounter&quot;: 1&#10;}"/>
+</p:tagLst>
+</file>
+
+<file path=ppt/tags/tag29.xml><?xml version="1.0" encoding="utf-8"?>
+<p:tagLst xmlns:a="http://schemas.openxmlformats.org/drawingml/2006/main" xmlns:r="http://schemas.openxmlformats.org/officeDocument/2006/relationships" xmlns:p="http://schemas.openxmlformats.org/presentationml/2006/main">
+  <p:tag name="PROPREAL" val="{&#10;  &quot;GoingTime&quot;: 0,&#10;  &quot;DelayTime&quot;: 0,&#10;  &quot;Motion&quot;: null,&#10;  &quot;Script&quot;: null,&#10;  &quot;NoTrans&quot;: false,&#10;  &quot;IsInitialFinished&quot;: false,&#10;  &quot;IsTokenSource&quot;: false,&#10;  &quot;RepeatCounter&quot;: 1&#10;}"/>
+</p:tagLst>
+</file>
+
+<file path=ppt/tags/tag3.xml><?xml version="1.0" encoding="utf-8"?>
+<p:tagLst xmlns:a="http://schemas.openxmlformats.org/drawingml/2006/main" xmlns:r="http://schemas.openxmlformats.org/officeDocument/2006/relationships" xmlns:p="http://schemas.openxmlformats.org/presentationml/2006/main">
+  <p:tag name="PROPSLIDE" val="{&#10;  &quot;ApiSpecs&quot;: {},&#10;  &quot;UserConfirmedLoadDevices&quot;: [],&#10;  &quot;GuessedLoadDevices&quot;: [],&#10;  &quot;UseMacroExapnsion&quot;: false,&#10;  &quot;MacroExpansions&quot;: {}&#10;}"/>
+</p:tagLst>
+</file>
+
+<file path=ppt/tags/tag30.xml><?xml version="1.0" encoding="utf-8"?>
+<p:tagLst xmlns:a="http://schemas.openxmlformats.org/drawingml/2006/main" xmlns:r="http://schemas.openxmlformats.org/officeDocument/2006/relationships" xmlns:p="http://schemas.openxmlformats.org/presentationml/2006/main">
+  <p:tag name="PROPREAL" val="{&#10;  &quot;GoingTime&quot;: 0,&#10;  &quot;DelayTime&quot;: 0,&#10;  &quot;Motion&quot;: null,&#10;  &quot;Script&quot;: null,&#10;  &quot;NoTrans&quot;: false,&#10;  &quot;IsInitialFinished&quot;: false,&#10;  &quot;IsTokenSource&quot;: false,&#10;  &quot;RepeatCounter&quot;: 1&#10;}"/>
+</p:tagLst>
+</file>
+
+<file path=ppt/tags/tag31.xml><?xml version="1.0" encoding="utf-8"?>
+<p:tagLst xmlns:a="http://schemas.openxmlformats.org/drawingml/2006/main" xmlns:r="http://schemas.openxmlformats.org/officeDocument/2006/relationships" xmlns:p="http://schemas.openxmlformats.org/presentationml/2006/main">
+  <p:tag name="PROPREAL" val="{&#10;  &quot;GoingTime&quot;: 0,&#10;  &quot;DelayTime&quot;: 0,&#10;  &quot;Motion&quot;: null,&#10;  &quot;Script&quot;: null,&#10;  &quot;NoTrans&quot;: false,&#10;  &quot;IsInitialFinished&quot;: false,&#10;  &quot;IsTokenSource&quot;: false,&#10;  &quot;RepeatCounter&quot;: 1&#10;}"/>
+</p:tagLst>
+</file>
+
+<file path=ppt/tags/tag32.xml><?xml version="1.0" encoding="utf-8"?>
+<p:tagLst xmlns:a="http://schemas.openxmlformats.org/drawingml/2006/main" xmlns:r="http://schemas.openxmlformats.org/officeDocument/2006/relationships" xmlns:p="http://schemas.openxmlformats.org/presentationml/2006/main">
+  <p:tag name="PROPREAL" val="{&#10;  &quot;GoingTime&quot;: 0,&#10;  &quot;DelayTime&quot;: 0,&#10;  &quot;Motion&quot;: null,&#10;  &quot;Script&quot;: null,&#10;  &quot;NoTrans&quot;: false,&#10;  &quot;IsInitialFinished&quot;: false,&#10;  &quot;IsTokenSource&quot;: false,&#10;  &quot;RepeatCounter&quot;: 1&#10;}"/>
+</p:tagLst>
+</file>
+
+<file path=ppt/tags/tag33.xml><?xml version="1.0" encoding="utf-8"?>
+<p:tagLst xmlns:a="http://schemas.openxmlformats.org/drawingml/2006/main" xmlns:r="http://schemas.openxmlformats.org/officeDocument/2006/relationships" xmlns:p="http://schemas.openxmlformats.org/presentationml/2006/main">
+  <p:tag name="PROPREAL" val="{&#10;  &quot;GoingTime&quot;: 0,&#10;  &quot;DelayTime&quot;: 0,&#10;  &quot;Motion&quot;: null,&#10;  &quot;Script&quot;: null,&#10;  &quot;NoTrans&quot;: false,&#10;  &quot;IsInitialFinished&quot;: false,&#10;  &quot;IsTokenSource&quot;: false,&#10;  &quot;RepeatCounter&quot;: 1&#10;}"/>
+</p:tagLst>
+</file>
+
+<file path=ppt/tags/tag34.xml><?xml version="1.0" encoding="utf-8"?>
+<p:tagLst xmlns:a="http://schemas.openxmlformats.org/drawingml/2006/main" xmlns:r="http://schemas.openxmlformats.org/officeDocument/2006/relationships" xmlns:p="http://schemas.openxmlformats.org/presentationml/2006/main">
+  <p:tag name="PROPREAL" val="{&#10;  &quot;GoingTime&quot;: 0,&#10;  &quot;DelayTime&quot;: 0,&#10;  &quot;Motion&quot;: null,&#10;  &quot;Script&quot;: null,&#10;  &quot;NoTrans&quot;: false,&#10;  &quot;IsInitialFinished&quot;: false,&#10;  &quot;IsTokenSource&quot;: false,&#10;  &quot;RepeatCounter&quot;: 1&#10;}"/>
+</p:tagLst>
+</file>
+
+<file path=ppt/tags/tag35.xml><?xml version="1.0" encoding="utf-8"?>
+<p:tagLst xmlns:a="http://schemas.openxmlformats.org/drawingml/2006/main" xmlns:r="http://schemas.openxmlformats.org/officeDocument/2006/relationships" xmlns:p="http://schemas.openxmlformats.org/presentationml/2006/main">
+  <p:tag name="PROPREAL" val="{&#10;  &quot;GoingTime&quot;: 0,&#10;  &quot;DelayTime&quot;: 0,&#10;  &quot;Motion&quot;: null,&#10;  &quot;Script&quot;: null,&#10;  &quot;NoTrans&quot;: false,&#10;  &quot;IsInitialFinished&quot;: false,&#10;  &quot;IsTokenSource&quot;: false,&#10;  &quot;RepeatCounter&quot;: 1&#10;}"/>
+</p:tagLst>
+</file>
+
+<file path=ppt/tags/tag36.xml><?xml version="1.0" encoding="utf-8"?>
+<p:tagLst xmlns:a="http://schemas.openxmlformats.org/drawingml/2006/main" xmlns:r="http://schemas.openxmlformats.org/officeDocument/2006/relationships" xmlns:p="http://schemas.openxmlformats.org/presentationml/2006/main">
+  <p:tag name="PROPREAL" val="{&#10;  &quot;GoingTime&quot;: 0,&#10;  &quot;DelayTime&quot;: 0,&#10;  &quot;Motion&quot;: null,&#10;  &quot;Script&quot;: null,&#10;  &quot;NoTrans&quot;: false,&#10;  &quot;IsInitialFinished&quot;: false,&#10;  &quot;IsTokenSource&quot;: false,&#10;  &quot;RepeatCounter&quot;: 1&#10;}"/>
+</p:tagLst>
+</file>
+
+<file path=ppt/tags/tag37.xml><?xml version="1.0" encoding="utf-8"?>
+<p:tagLst xmlns:a="http://schemas.openxmlformats.org/drawingml/2006/main" xmlns:r="http://schemas.openxmlformats.org/officeDocument/2006/relationships" xmlns:p="http://schemas.openxmlformats.org/presentationml/2006/main">
+  <p:tag name="PROPREAL" val="{&#10;  &quot;GoingTime&quot;: 0,&#10;  &quot;DelayTime&quot;: 0,&#10;  &quot;Motion&quot;: null,&#10;  &quot;Script&quot;: null,&#10;  &quot;NoTrans&quot;: false,&#10;  &quot;IsInitialFinished&quot;: false,&#10;  &quot;IsTokenSource&quot;: false,&#10;  &quot;RepeatCounter&quot;: 1&#10;}"/>
+</p:tagLst>
+</file>
+
+<file path=ppt/tags/tag38.xml><?xml version="1.0" encoding="utf-8"?>
+<p:tagLst xmlns:a="http://schemas.openxmlformats.org/drawingml/2006/main" xmlns:r="http://schemas.openxmlformats.org/officeDocument/2006/relationships" xmlns:p="http://schemas.openxmlformats.org/presentationml/2006/main">
+  <p:tag name="PROPSLIDE" val="{&#10;  &quot;ApiSpecs&quot;: {},&#10;  &quot;UserConfirmedLoadDevices&quot;: [],&#10;  &quot;GuessedLoadDevices&quot;: [],&#10;  &quot;UseMacroExapnsion&quot;: false,&#10;  &quot;MacroExpansions&quot;: {}&#10;}"/>
+</p:tagLst>
+</file>
+
+<file path=ppt/tags/tag39.xml><?xml version="1.0" encoding="utf-8"?>
+<p:tagLst xmlns:a="http://schemas.openxmlformats.org/drawingml/2006/main" xmlns:r="http://schemas.openxmlformats.org/officeDocument/2006/relationships" xmlns:p="http://schemas.openxmlformats.org/presentationml/2006/main">
+  <p:tag name="PROPREAL" val="{&#10;  &quot;GoingTime&quot;: 0,&#10;  &quot;DelayTime&quot;: 0,&#10;  &quot;Motion&quot;: null,&#10;  &quot;Script&quot;: null,&#10;  &quot;NoTrans&quot;: false,&#10;  &quot;IsInitialFinished&quot;: false,&#10;  &quot;IsTokenSource&quot;: false,&#10;  &quot;RepeatCounter&quot;: 1&#10;}"/>
+</p:tagLst>
+</file>
+
+<file path=ppt/tags/tag4.xml><?xml version="1.0" encoding="utf-8"?>
+<p:tagLst xmlns:a="http://schemas.openxmlformats.org/drawingml/2006/main" xmlns:r="http://schemas.openxmlformats.org/officeDocument/2006/relationships" xmlns:p="http://schemas.openxmlformats.org/presentationml/2006/main">
+  <p:tag name="PROPREAL" val="{&#10;  &quot;GoingTime&quot;: 0,&#10;  &quot;DelayTime&quot;: 0,&#10;  &quot;Motion&quot;: null,&#10;  &quot;Script&quot;: null,&#10;  &quot;NoTrans&quot;: false,&#10;  &quot;IsInitialFinished&quot;: false,&#10;  &quot;IsTokenSource&quot;: false,&#10;  &quot;RepeatCounter&quot;: 1&#10;}"/>
+</p:tagLst>
+</file>
+
+<file path=ppt/tags/tag40.xml><?xml version="1.0" encoding="utf-8"?>
+<p:tagLst xmlns:a="http://schemas.openxmlformats.org/drawingml/2006/main" xmlns:r="http://schemas.openxmlformats.org/officeDocument/2006/relationships" xmlns:p="http://schemas.openxmlformats.org/presentationml/2006/main">
+  <p:tag name="PROPREAL" val="{&#10;  &quot;GoingTime&quot;: 0,&#10;  &quot;DelayTime&quot;: 0,&#10;  &quot;Motion&quot;: null,&#10;  &quot;Script&quot;: null,&#10;  &quot;NoTrans&quot;: false,&#10;  &quot;IsInitialFinished&quot;: false,&#10;  &quot;IsTokenSource&quot;: false,&#10;  &quot;RepeatCounter&quot;: 1&#10;}"/>
+</p:tagLst>
+</file>
+
+<file path=ppt/tags/tag41.xml><?xml version="1.0" encoding="utf-8"?>
+<p:tagLst xmlns:a="http://schemas.openxmlformats.org/drawingml/2006/main" xmlns:r="http://schemas.openxmlformats.org/officeDocument/2006/relationships" xmlns:p="http://schemas.openxmlformats.org/presentationml/2006/main">
+  <p:tag name="PROPREAL" val="{&#10;  &quot;GoingTime&quot;: 0,&#10;  &quot;DelayTime&quot;: 0,&#10;  &quot;Motion&quot;: null,&#10;  &quot;Script&quot;: null,&#10;  &quot;NoTrans&quot;: false,&#10;  &quot;IsInitialFinished&quot;: false,&#10;  &quot;IsTokenSource&quot;: false,&#10;  &quot;RepeatCounter&quot;: 1&#10;}"/>
+</p:tagLst>
+</file>
+
+<file path=ppt/tags/tag42.xml><?xml version="1.0" encoding="utf-8"?>
+<p:tagLst xmlns:a="http://schemas.openxmlformats.org/drawingml/2006/main" xmlns:r="http://schemas.openxmlformats.org/officeDocument/2006/relationships" xmlns:p="http://schemas.openxmlformats.org/presentationml/2006/main">
+  <p:tag name="PROPREAL" val="{&#10;  &quot;GoingTime&quot;: 0,&#10;  &quot;DelayTime&quot;: 0,&#10;  &quot;Motion&quot;: null,&#10;  &quot;Script&quot;: null,&#10;  &quot;NoTrans&quot;: false,&#10;  &quot;IsInitialFinished&quot;: false,&#10;  &quot;IsTokenSource&quot;: false,&#10;  &quot;RepeatCounter&quot;: 1&#10;}"/>
+</p:tagLst>
+</file>
+
+<file path=ppt/tags/tag43.xml><?xml version="1.0" encoding="utf-8"?>
+<p:tagLst xmlns:a="http://schemas.openxmlformats.org/drawingml/2006/main" xmlns:r="http://schemas.openxmlformats.org/officeDocument/2006/relationships" xmlns:p="http://schemas.openxmlformats.org/presentationml/2006/main">
+  <p:tag name="PROPREAL" val="{&#10;  &quot;GoingTime&quot;: 0,&#10;  &quot;DelayTime&quot;: 0,&#10;  &quot;Motion&quot;: null,&#10;  &quot;Script&quot;: null,&#10;  &quot;NoTrans&quot;: false,&#10;  &quot;IsInitialFinished&quot;: false,&#10;  &quot;IsTokenSource&quot;: false,&#10;  &quot;RepeatCounter&quot;: 1&#10;}"/>
+</p:tagLst>
+</file>
+
+<file path=ppt/tags/tag44.xml><?xml version="1.0" encoding="utf-8"?>
+<p:tagLst xmlns:a="http://schemas.openxmlformats.org/drawingml/2006/main" xmlns:r="http://schemas.openxmlformats.org/officeDocument/2006/relationships" xmlns:p="http://schemas.openxmlformats.org/presentationml/2006/main">
+  <p:tag name="PROPREAL" val="{&#10;  &quot;GoingTime&quot;: 0,&#10;  &quot;DelayTime&quot;: 0,&#10;  &quot;Motion&quot;: null,&#10;  &quot;Script&quot;: null,&#10;  &quot;NoTrans&quot;: false,&#10;  &quot;IsInitialFinished&quot;: false,&#10;  &quot;IsTokenSource&quot;: false,&#10;  &quot;RepeatCounter&quot;: 1&#10;}"/>
+</p:tagLst>
+</file>
+
+<file path=ppt/tags/tag45.xml><?xml version="1.0" encoding="utf-8"?>
+<p:tagLst xmlns:a="http://schemas.openxmlformats.org/drawingml/2006/main" xmlns:r="http://schemas.openxmlformats.org/officeDocument/2006/relationships" xmlns:p="http://schemas.openxmlformats.org/presentationml/2006/main">
+  <p:tag name="PROPREAL" val="{&#10;  &quot;GoingTime&quot;: 0,&#10;  &quot;DelayTime&quot;: 0,&#10;  &quot;Motion&quot;: null,&#10;  &quot;Script&quot;: null,&#10;  &quot;NoTrans&quot;: false,&#10;  &quot;IsInitialFinished&quot;: false,&#10;  &quot;IsTokenSource&quot;: false,&#10;  &quot;RepeatCounter&quot;: 1&#10;}"/>
+</p:tagLst>
+</file>
+
+<file path=ppt/tags/tag46.xml><?xml version="1.0" encoding="utf-8"?>
+<p:tagLst xmlns:a="http://schemas.openxmlformats.org/drawingml/2006/main" xmlns:r="http://schemas.openxmlformats.org/officeDocument/2006/relationships" xmlns:p="http://schemas.openxmlformats.org/presentationml/2006/main">
+  <p:tag name="PROPREAL" val="{&#10;  &quot;GoingTime&quot;: 0,&#10;  &quot;DelayTime&quot;: 0,&#10;  &quot;Motion&quot;: null,&#10;  &quot;Script&quot;: null,&#10;  &quot;NoTrans&quot;: false,&#10;  &quot;IsInitialFinished&quot;: false,&#10;  &quot;IsTokenSource&quot;: false,&#10;  &quot;RepeatCounter&quot;: 1&#10;}"/>
+</p:tagLst>
+</file>
+
+<file path=ppt/tags/tag47.xml><?xml version="1.0" encoding="utf-8"?>
+<p:tagLst xmlns:a="http://schemas.openxmlformats.org/drawingml/2006/main" xmlns:r="http://schemas.openxmlformats.org/officeDocument/2006/relationships" xmlns:p="http://schemas.openxmlformats.org/presentationml/2006/main">
+  <p:tag name="PROPREAL" val="{&#10;  &quot;GoingTime&quot;: 0,&#10;  &quot;DelayTime&quot;: 0,&#10;  &quot;Motion&quot;: null,&#10;  &quot;Script&quot;: null,&#10;  &quot;NoTrans&quot;: false,&#10;  &quot;IsInitialFinished&quot;: false,&#10;  &quot;IsTokenSource&quot;: false,&#10;  &quot;RepeatCounter&quot;: 1&#10;}"/>
+</p:tagLst>
+</file>
+
+<file path=ppt/tags/tag48.xml><?xml version="1.0" encoding="utf-8"?>
+<p:tagLst xmlns:a="http://schemas.openxmlformats.org/drawingml/2006/main" xmlns:r="http://schemas.openxmlformats.org/officeDocument/2006/relationships" xmlns:p="http://schemas.openxmlformats.org/presentationml/2006/main">
+  <p:tag name="PROPREAL" val="{&#10;  &quot;GoingTime&quot;: 0,&#10;  &quot;DelayTime&quot;: 0,&#10;  &quot;Motion&quot;: null,&#10;  &quot;Script&quot;: null,&#10;  &quot;NoTrans&quot;: false,&#10;  &quot;IsInitialFinished&quot;: false,&#10;  &quot;IsTokenSource&quot;: false,&#10;  &quot;RepeatCounter&quot;: 1&#10;}"/>
+</p:tagLst>
+</file>
+
+<file path=ppt/tags/tag49.xml><?xml version="1.0" encoding="utf-8"?>
+<p:tagLst xmlns:a="http://schemas.openxmlformats.org/drawingml/2006/main" xmlns:r="http://schemas.openxmlformats.org/officeDocument/2006/relationships" xmlns:p="http://schemas.openxmlformats.org/presentationml/2006/main">
+  <p:tag name="PROPREAL" val="{&#10;  &quot;GoingTime&quot;: 0,&#10;  &quot;DelayTime&quot;: 0,&#10;  &quot;Motion&quot;: null,&#10;  &quot;Script&quot;: null,&#10;  &quot;NoTrans&quot;: false,&#10;  &quot;IsInitialFinished&quot;: false,&#10;  &quot;IsTokenSource&quot;: false,&#10;  &quot;RepeatCounter&quot;: 1&#10;}"/>
+</p:tagLst>
+</file>
+
+<file path=ppt/tags/tag5.xml><?xml version="1.0" encoding="utf-8"?>
+<p:tagLst xmlns:a="http://schemas.openxmlformats.org/drawingml/2006/main" xmlns:r="http://schemas.openxmlformats.org/officeDocument/2006/relationships" xmlns:p="http://schemas.openxmlformats.org/presentationml/2006/main">
+  <p:tag name="PROPREAL" val="{&#10;  &quot;GoingTime&quot;: 0,&#10;  &quot;DelayTime&quot;: 0,&#10;  &quot;Motion&quot;: null,&#10;  &quot;Script&quot;: null,&#10;  &quot;NoTrans&quot;: false,&#10;  &quot;IsInitialFinished&quot;: false,&#10;  &quot;IsTokenSource&quot;: false,&#10;  &quot;RepeatCounter&quot;: 1&#10;}"/>
+</p:tagLst>
+</file>
+
+<file path=ppt/tags/tag50.xml><?xml version="1.0" encoding="utf-8"?>
+<p:tagLst xmlns:a="http://schemas.openxmlformats.org/drawingml/2006/main" xmlns:r="http://schemas.openxmlformats.org/officeDocument/2006/relationships" xmlns:p="http://schemas.openxmlformats.org/presentationml/2006/main">
+  <p:tag name="PROPREAL" val="{&#10;  &quot;GoingTime&quot;: 0,&#10;  &quot;DelayTime&quot;: 0,&#10;  &quot;Motion&quot;: null,&#10;  &quot;Script&quot;: null,&#10;  &quot;NoTrans&quot;: false,&#10;  &quot;IsInitialFinished&quot;: false,&#10;  &quot;IsTokenSource&quot;: false,&#10;  &quot;RepeatCounter&quot;: 1&#10;}"/>
+</p:tagLst>
+</file>
+
+<file path=ppt/tags/tag51.xml><?xml version="1.0" encoding="utf-8"?>
+<p:tagLst xmlns:a="http://schemas.openxmlformats.org/drawingml/2006/main" xmlns:r="http://schemas.openxmlformats.org/officeDocument/2006/relationships" xmlns:p="http://schemas.openxmlformats.org/presentationml/2006/main">
+  <p:tag name="PROPREAL" val="{&#10;  &quot;GoingTime&quot;: 0,&#10;  &quot;DelayTime&quot;: 0,&#10;  &quot;Motion&quot;: null,&#10;  &quot;Script&quot;: null,&#10;  &quot;NoTrans&quot;: false,&#10;  &quot;IsInitialFinished&quot;: false,&#10;  &quot;IsTokenSource&quot;: false,&#10;  &quot;RepeatCounter&quot;: 1&#10;}"/>
+</p:tagLst>
+</file>
+
+<file path=ppt/tags/tag52.xml><?xml version="1.0" encoding="utf-8"?>
+<p:tagLst xmlns:a="http://schemas.openxmlformats.org/drawingml/2006/main" xmlns:r="http://schemas.openxmlformats.org/officeDocument/2006/relationships" xmlns:p="http://schemas.openxmlformats.org/presentationml/2006/main">
+  <p:tag name="PROPREAL" val="{&#10;  &quot;GoingTime&quot;: 0,&#10;  &quot;DelayTime&quot;: 0,&#10;  &quot;Motion&quot;: null,&#10;  &quot;Script&quot;: null,&#10;  &quot;NoTrans&quot;: false,&#10;  &quot;IsInitialFinished&quot;: false,&#10;  &quot;IsTokenSource&quot;: false,&#10;  &quot;RepeatCounter&quot;: 1&#10;}"/>
+</p:tagLst>
+</file>
+
+<file path=ppt/tags/tag53.xml><?xml version="1.0" encoding="utf-8"?>
+<p:tagLst xmlns:a="http://schemas.openxmlformats.org/drawingml/2006/main" xmlns:r="http://schemas.openxmlformats.org/officeDocument/2006/relationships" xmlns:p="http://schemas.openxmlformats.org/presentationml/2006/main">
+  <p:tag name="PROPREAL" val="{&#10;  &quot;GoingTime&quot;: 0,&#10;  &quot;DelayTime&quot;: 0,&#10;  &quot;Motion&quot;: null,&#10;  &quot;Script&quot;: null,&#10;  &quot;NoTrans&quot;: false,&#10;  &quot;IsInitialFinished&quot;: false,&#10;  &quot;IsTokenSource&quot;: false,&#10;  &quot;RepeatCounter&quot;: 1&#10;}"/>
+</p:tagLst>
+</file>
+
+<file path=ppt/tags/tag54.xml><?xml version="1.0" encoding="utf-8"?>
+<p:tagLst xmlns:a="http://schemas.openxmlformats.org/drawingml/2006/main" xmlns:r="http://schemas.openxmlformats.org/officeDocument/2006/relationships" xmlns:p="http://schemas.openxmlformats.org/presentationml/2006/main">
+  <p:tag name="PROPREAL" val="{&#10;  &quot;GoingTime&quot;: 0,&#10;  &quot;DelayTime&quot;: 0,&#10;  &quot;Motion&quot;: null,&#10;  &quot;Script&quot;: null,&#10;  &quot;NoTrans&quot;: false,&#10;  &quot;IsInitialFinished&quot;: false,&#10;  &quot;IsTokenSource&quot;: false,&#10;  &quot;RepeatCounter&quot;: 1&#10;}"/>
+</p:tagLst>
+</file>
+
+<file path=ppt/tags/tag55.xml><?xml version="1.0" encoding="utf-8"?>
+<p:tagLst xmlns:a="http://schemas.openxmlformats.org/drawingml/2006/main" xmlns:r="http://schemas.openxmlformats.org/officeDocument/2006/relationships" xmlns:p="http://schemas.openxmlformats.org/presentationml/2006/main">
+  <p:tag name="PROPREAL" val="{&#10;  &quot;GoingTime&quot;: 0,&#10;  &quot;DelayTime&quot;: 0,&#10;  &quot;Motion&quot;: null,&#10;  &quot;Script&quot;: null,&#10;  &quot;NoTrans&quot;: false,&#10;  &quot;IsInitialFinished&quot;: false,&#10;  &quot;IsTokenSource&quot;: false,&#10;  &quot;RepeatCounter&quot;: 1&#10;}"/>
+</p:tagLst>
+</file>
+
+<file path=ppt/tags/tag56.xml><?xml version="1.0" encoding="utf-8"?>
+<p:tagLst xmlns:a="http://schemas.openxmlformats.org/drawingml/2006/main" xmlns:r="http://schemas.openxmlformats.org/officeDocument/2006/relationships" xmlns:p="http://schemas.openxmlformats.org/presentationml/2006/main">
+  <p:tag name="PROPREAL" val="{&#10;  &quot;GoingTime&quot;: 0,&#10;  &quot;DelayTime&quot;: 0,&#10;  &quot;Motion&quot;: null,&#10;  &quot;Script&quot;: null,&#10;  &quot;NoTrans&quot;: false,&#10;  &quot;IsInitialFinished&quot;: false,&#10;  &quot;IsTokenSource&quot;: false,&#10;  &quot;RepeatCounter&quot;: 1&#10;}"/>
+</p:tagLst>
+</file>
+
+<file path=ppt/tags/tag57.xml><?xml version="1.0" encoding="utf-8"?>
+<p:tagLst xmlns:a="http://schemas.openxmlformats.org/drawingml/2006/main" xmlns:r="http://schemas.openxmlformats.org/officeDocument/2006/relationships" xmlns:p="http://schemas.openxmlformats.org/presentationml/2006/main">
+  <p:tag name="PROPREAL" val="{&#10;  &quot;GoingTime&quot;: 0,&#10;  &quot;DelayTime&quot;: 0,&#10;  &quot;Motion&quot;: null,&#10;  &quot;Script&quot;: null,&#10;  &quot;NoTrans&quot;: false,&#10;  &quot;IsInitialFinished&quot;: false,&#10;  &quot;IsTokenSource&quot;: false,&#10;  &quot;RepeatCounter&quot;: 1&#10;}"/>
+</p:tagLst>
+</file>
+
+<file path=ppt/tags/tag58.xml><?xml version="1.0" encoding="utf-8"?>
+<p:tagLst xmlns:a="http://schemas.openxmlformats.org/drawingml/2006/main" xmlns:r="http://schemas.openxmlformats.org/officeDocument/2006/relationships" xmlns:p="http://schemas.openxmlformats.org/presentationml/2006/main">
+  <p:tag name="PROPREAL" val="{&#10;  &quot;GoingTime&quot;: 0,&#10;  &quot;DelayTime&quot;: 0,&#10;  &quot;Motion&quot;: null,&#10;  &quot;Script&quot;: null,&#10;  &quot;NoTrans&quot;: false,&#10;  &quot;IsInitialFinished&quot;: false,&#10;  &quot;IsTokenSource&quot;: false,&#10;  &quot;RepeatCounter&quot;: 1&#10;}"/>
+</p:tagLst>
+</file>
+
+<file path=ppt/tags/tag59.xml><?xml version="1.0" encoding="utf-8"?>
+<p:tagLst xmlns:a="http://schemas.openxmlformats.org/drawingml/2006/main" xmlns:r="http://schemas.openxmlformats.org/officeDocument/2006/relationships" xmlns:p="http://schemas.openxmlformats.org/presentationml/2006/main">
+  <p:tag name="PROPREAL" val="{&#10;  &quot;GoingTime&quot;: 0,&#10;  &quot;DelayTime&quot;: 0,&#10;  &quot;Motion&quot;: null,&#10;  &quot;Script&quot;: null,&#10;  &quot;NoTrans&quot;: false,&#10;  &quot;IsInitialFinished&quot;: false,&#10;  &quot;IsTokenSource&quot;: false,&#10;  &quot;RepeatCounter&quot;: 1&#10;}"/>
+</p:tagLst>
+</file>
+
+<file path=ppt/tags/tag6.xml><?xml version="1.0" encoding="utf-8"?>
+<p:tagLst xmlns:a="http://schemas.openxmlformats.org/drawingml/2006/main" xmlns:r="http://schemas.openxmlformats.org/officeDocument/2006/relationships" xmlns:p="http://schemas.openxmlformats.org/presentationml/2006/main">
+  <p:tag name="PROPREAL" val="{&#10;  &quot;GoingTime&quot;: 0,&#10;  &quot;DelayTime&quot;: 0,&#10;  &quot;Motion&quot;: null,&#10;  &quot;Script&quot;: null,&#10;  &quot;NoTrans&quot;: false,&#10;  &quot;IsInitialFinished&quot;: false,&#10;  &quot;IsTokenSource&quot;: false,&#10;  &quot;RepeatCounter&quot;: 1&#10;}"/>
+</p:tagLst>
+</file>
+
+<file path=ppt/tags/tag60.xml><?xml version="1.0" encoding="utf-8"?>
+<p:tagLst xmlns:a="http://schemas.openxmlformats.org/drawingml/2006/main" xmlns:r="http://schemas.openxmlformats.org/officeDocument/2006/relationships" xmlns:p="http://schemas.openxmlformats.org/presentationml/2006/main">
+  <p:tag name="PROPREAL" val="{&#10;  &quot;GoingTime&quot;: 0,&#10;  &quot;DelayTime&quot;: 0,&#10;  &quot;Motion&quot;: null,&#10;  &quot;Script&quot;: null,&#10;  &quot;NoTrans&quot;: false,&#10;  &quot;IsInitialFinished&quot;: false,&#10;  &quot;IsTokenSource&quot;: false,&#10;  &quot;RepeatCounter&quot;: 1&#10;}"/>
+</p:tagLst>
+</file>
+
+<file path=ppt/tags/tag61.xml><?xml version="1.0" encoding="utf-8"?>
+<p:tagLst xmlns:a="http://schemas.openxmlformats.org/drawingml/2006/main" xmlns:r="http://schemas.openxmlformats.org/officeDocument/2006/relationships" xmlns:p="http://schemas.openxmlformats.org/presentationml/2006/main">
+  <p:tag name="PROPREAL" val="{&#10;  &quot;GoingTime&quot;: 0,&#10;  &quot;DelayTime&quot;: 0,&#10;  &quot;Motion&quot;: null,&#10;  &quot;Script&quot;: null,&#10;  &quot;NoTrans&quot;: false,&#10;  &quot;IsInitialFinished&quot;: false,&#10;  &quot;IsTokenSource&quot;: false,&#10;  &quot;RepeatCounter&quot;: 1&#10;}"/>
+</p:tagLst>
+</file>
+
+<file path=ppt/tags/tag62.xml><?xml version="1.0" encoding="utf-8"?>
+<p:tagLst xmlns:a="http://schemas.openxmlformats.org/drawingml/2006/main" xmlns:r="http://schemas.openxmlformats.org/officeDocument/2006/relationships" xmlns:p="http://schemas.openxmlformats.org/presentationml/2006/main">
+  <p:tag name="PROPREAL" val="{&#10;  &quot;GoingTime&quot;: 0,&#10;  &quot;DelayTime&quot;: 0,&#10;  &quot;Motion&quot;: null,&#10;  &quot;Script&quot;: null,&#10;  &quot;NoTrans&quot;: false,&#10;  &quot;IsInitialFinished&quot;: false,&#10;  &quot;IsTokenSource&quot;: false,&#10;  &quot;RepeatCounter&quot;: 1&#10;}"/>
+</p:tagLst>
+</file>
+
+<file path=ppt/tags/tag63.xml><?xml version="1.0" encoding="utf-8"?>
+<p:tagLst xmlns:a="http://schemas.openxmlformats.org/drawingml/2006/main" xmlns:r="http://schemas.openxmlformats.org/officeDocument/2006/relationships" xmlns:p="http://schemas.openxmlformats.org/presentationml/2006/main">
+  <p:tag name="PROPREAL" val="{&#10;  &quot;GoingTime&quot;: 0,&#10;  &quot;DelayTime&quot;: 0,&#10;  &quot;Motion&quot;: null,&#10;  &quot;Script&quot;: null,&#10;  &quot;NoTrans&quot;: false,&#10;  &quot;IsInitialFinished&quot;: false,&#10;  &quot;IsTokenSource&quot;: false,&#10;  &quot;RepeatCounter&quot;: 1&#10;}"/>
+</p:tagLst>
+</file>
+
+<file path=ppt/tags/tag64.xml><?xml version="1.0" encoding="utf-8"?>
+<p:tagLst xmlns:a="http://schemas.openxmlformats.org/drawingml/2006/main" xmlns:r="http://schemas.openxmlformats.org/officeDocument/2006/relationships" xmlns:p="http://schemas.openxmlformats.org/presentationml/2006/main">
+  <p:tag name="PROPREAL" val="{&#10;  &quot;GoingTime&quot;: 0,&#10;  &quot;DelayTime&quot;: 0,&#10;  &quot;Motion&quot;: null,&#10;  &quot;Script&quot;: null,&#10;  &quot;NoTrans&quot;: false,&#10;  &quot;IsInitialFinished&quot;: false,&#10;  &quot;IsTokenSource&quot;: false,&#10;  &quot;RepeatCounter&quot;: 1&#10;}"/>
+</p:tagLst>
+</file>
+
+<file path=ppt/tags/tag65.xml><?xml version="1.0" encoding="utf-8"?>
+<p:tagLst xmlns:a="http://schemas.openxmlformats.org/drawingml/2006/main" xmlns:r="http://schemas.openxmlformats.org/officeDocument/2006/relationships" xmlns:p="http://schemas.openxmlformats.org/presentationml/2006/main">
+  <p:tag name="PROPREAL" val="{&#10;  &quot;GoingTime&quot;: 0,&#10;  &quot;DelayTime&quot;: 0,&#10;  &quot;Motion&quot;: null,&#10;  &quot;Script&quot;: null,&#10;  &quot;NoTrans&quot;: false,&#10;  &quot;IsInitialFinished&quot;: false,&#10;  &quot;IsTokenSource&quot;: false,&#10;  &quot;RepeatCounter&quot;: 1&#10;}"/>
+</p:tagLst>
+</file>
+
+<file path=ppt/tags/tag66.xml><?xml version="1.0" encoding="utf-8"?>
+<p:tagLst xmlns:a="http://schemas.openxmlformats.org/drawingml/2006/main" xmlns:r="http://schemas.openxmlformats.org/officeDocument/2006/relationships" xmlns:p="http://schemas.openxmlformats.org/presentationml/2006/main">
+  <p:tag name="PROPREAL" val="{&#10;  &quot;GoingTime&quot;: 0,&#10;  &quot;DelayTime&quot;: 0,&#10;  &quot;Motion&quot;: null,&#10;  &quot;Script&quot;: null,&#10;  &quot;NoTrans&quot;: false,&#10;  &quot;IsInitialFinished&quot;: false,&#10;  &quot;IsTokenSource&quot;: false,&#10;  &quot;RepeatCounter&quot;: 1&#10;}"/>
+</p:tagLst>
+</file>
+
+<file path=ppt/tags/tag67.xml><?xml version="1.0" encoding="utf-8"?>
+<p:tagLst xmlns:a="http://schemas.openxmlformats.org/drawingml/2006/main" xmlns:r="http://schemas.openxmlformats.org/officeDocument/2006/relationships" xmlns:p="http://schemas.openxmlformats.org/presentationml/2006/main">
+  <p:tag name="PROPREAL" val="{&#10;  &quot;GoingTime&quot;: 0,&#10;  &quot;DelayTime&quot;: 0,&#10;  &quot;Motion&quot;: null,&#10;  &quot;Script&quot;: null,&#10;  &quot;NoTrans&quot;: false,&#10;  &quot;IsInitialFinished&quot;: false,&#10;  &quot;IsTokenSource&quot;: false,&#10;  &quot;RepeatCounter&quot;: 1&#10;}"/>
+</p:tagLst>
+</file>
+
+<file path=ppt/tags/tag68.xml><?xml version="1.0" encoding="utf-8"?>
+<p:tagLst xmlns:a="http://schemas.openxmlformats.org/drawingml/2006/main" xmlns:r="http://schemas.openxmlformats.org/officeDocument/2006/relationships" xmlns:p="http://schemas.openxmlformats.org/presentationml/2006/main">
+  <p:tag name="PROPREAL" val="{&#10;  &quot;GoingTime&quot;: 0,&#10;  &quot;DelayTime&quot;: 0,&#10;  &quot;Motion&quot;: null,&#10;  &quot;Script&quot;: null,&#10;  &quot;NoTrans&quot;: false,&#10;  &quot;IsInitialFinished&quot;: false,&#10;  &quot;IsTokenSource&quot;: false,&#10;  &quot;RepeatCounter&quot;: 1&#10;}"/>
+</p:tagLst>
+</file>
+
+<file path=ppt/tags/tag69.xml><?xml version="1.0" encoding="utf-8"?>
+<p:tagLst xmlns:a="http://schemas.openxmlformats.org/drawingml/2006/main" xmlns:r="http://schemas.openxmlformats.org/officeDocument/2006/relationships" xmlns:p="http://schemas.openxmlformats.org/presentationml/2006/main">
+  <p:tag name="PROPREAL" val="{&#10;  &quot;GoingTime&quot;: 0,&#10;  &quot;DelayTime&quot;: 0,&#10;  &quot;Motion&quot;: null,&#10;  &quot;Script&quot;: null,&#10;  &quot;NoTrans&quot;: false,&#10;  &quot;IsInitialFinished&quot;: false,&#10;  &quot;IsTokenSource&quot;: false,&#10;  &quot;RepeatCounter&quot;: 1&#10;}"/>
+</p:tagLst>
+</file>
+
+<file path=ppt/tags/tag7.xml><?xml version="1.0" encoding="utf-8"?>
+<p:tagLst xmlns:a="http://schemas.openxmlformats.org/drawingml/2006/main" xmlns:r="http://schemas.openxmlformats.org/officeDocument/2006/relationships" xmlns:p="http://schemas.openxmlformats.org/presentationml/2006/main">
+  <p:tag name="PROPREAL" val="{&#10;  &quot;GoingTime&quot;: 0,&#10;  &quot;DelayTime&quot;: 0,&#10;  &quot;Motion&quot;: null,&#10;  &quot;Script&quot;: null,&#10;  &quot;NoTrans&quot;: false,&#10;  &quot;IsInitialFinished&quot;: false,&#10;  &quot;IsTokenSource&quot;: false,&#10;  &quot;RepeatCounter&quot;: 1&#10;}"/>
+</p:tagLst>
+</file>
+
+<file path=ppt/tags/tag70.xml><?xml version="1.0" encoding="utf-8"?>
+<p:tagLst xmlns:a="http://schemas.openxmlformats.org/drawingml/2006/main" xmlns:r="http://schemas.openxmlformats.org/officeDocument/2006/relationships" xmlns:p="http://schemas.openxmlformats.org/presentationml/2006/main">
+  <p:tag name="PROPREAL" val="{&#10;  &quot;GoingTime&quot;: 0,&#10;  &quot;DelayTime&quot;: 0,&#10;  &quot;Motion&quot;: null,&#10;  &quot;Script&quot;: null,&#10;  &quot;NoTrans&quot;: false,&#10;  &quot;IsInitialFinished&quot;: false,&#10;  &quot;IsTokenSource&quot;: false,&#10;  &quot;RepeatCounter&quot;: 1&#10;}"/>
+</p:tagLst>
+</file>
+
+<file path=ppt/tags/tag71.xml><?xml version="1.0" encoding="utf-8"?>
+<p:tagLst xmlns:a="http://schemas.openxmlformats.org/drawingml/2006/main" xmlns:r="http://schemas.openxmlformats.org/officeDocument/2006/relationships" xmlns:p="http://schemas.openxmlformats.org/presentationml/2006/main">
+  <p:tag name="PROPSLIDE" val="{&#10;  &quot;ApiSpecs&quot;: {},&#10;  &quot;UserConfirmedLoadDevices&quot;: [],&#10;  &quot;GuessedLoadDevices&quot;: [],&#10;  &quot;UseMacroExapnsion&quot;: false,&#10;  &quot;MacroExpansions&quot;: {}&#10;}"/>
+</p:tagLst>
+</file>
+
+<file path=ppt/tags/tag72.xml><?xml version="1.0" encoding="utf-8"?>
+<p:tagLst xmlns:a="http://schemas.openxmlformats.org/drawingml/2006/main" xmlns:r="http://schemas.openxmlformats.org/officeDocument/2006/relationships" xmlns:p="http://schemas.openxmlformats.org/presentationml/2006/main">
+  <p:tag name="PROPREAL" val="{&#10;  &quot;GoingTime&quot;: 0,&#10;  &quot;DelayTime&quot;: 0,&#10;  &quot;Motion&quot;: null,&#10;  &quot;Script&quot;: null,&#10;  &quot;NoTrans&quot;: false,&#10;  &quot;IsInitialFinished&quot;: false,&#10;  &quot;IsTokenSource&quot;: false,&#10;  &quot;RepeatCounter&quot;: 1&#10;}"/>
+</p:tagLst>
+</file>
+
+<file path=ppt/tags/tag73.xml><?xml version="1.0" encoding="utf-8"?>
+<p:tagLst xmlns:a="http://schemas.openxmlformats.org/drawingml/2006/main" xmlns:r="http://schemas.openxmlformats.org/officeDocument/2006/relationships" xmlns:p="http://schemas.openxmlformats.org/presentationml/2006/main">
+  <p:tag name="PROPREAL" val="{&#10;  &quot;GoingTime&quot;: 0,&#10;  &quot;DelayTime&quot;: 0,&#10;  &quot;Motion&quot;: null,&#10;  &quot;Script&quot;: null,&#10;  &quot;NoTrans&quot;: false,&#10;  &quot;IsInitialFinished&quot;: false,&#10;  &quot;IsTokenSource&quot;: false,&#10;  &quot;RepeatCounter&quot;: 1&#10;}"/>
+</p:tagLst>
+</file>
+
+<file path=ppt/tags/tag74.xml><?xml version="1.0" encoding="utf-8"?>
+<p:tagLst xmlns:a="http://schemas.openxmlformats.org/drawingml/2006/main" xmlns:r="http://schemas.openxmlformats.org/officeDocument/2006/relationships" xmlns:p="http://schemas.openxmlformats.org/presentationml/2006/main">
+  <p:tag name="PROPREAL" val="{&#10;  &quot;GoingTime&quot;: 0,&#10;  &quot;DelayTime&quot;: 0,&#10;  &quot;Motion&quot;: null,&#10;  &quot;Script&quot;: null,&#10;  &quot;NoTrans&quot;: false,&#10;  &quot;IsInitialFinished&quot;: false,&#10;  &quot;IsTokenSource&quot;: false,&#10;  &quot;RepeatCounter&quot;: 1&#10;}"/>
+</p:tagLst>
+</file>
+
+<file path=ppt/tags/tag75.xml><?xml version="1.0" encoding="utf-8"?>
+<p:tagLst xmlns:a="http://schemas.openxmlformats.org/drawingml/2006/main" xmlns:r="http://schemas.openxmlformats.org/officeDocument/2006/relationships" xmlns:p="http://schemas.openxmlformats.org/presentationml/2006/main">
+  <p:tag name="PROPREAL" val="{&#10;  &quot;GoingTime&quot;: 0,&#10;  &quot;DelayTime&quot;: 0,&#10;  &quot;Motion&quot;: null,&#10;  &quot;Script&quot;: null,&#10;  &quot;NoTrans&quot;: false,&#10;  &quot;IsInitialFinished&quot;: false,&#10;  &quot;IsTokenSource&quot;: false,&#10;  &quot;RepeatCounter&quot;: 1&#10;}"/>
+</p:tagLst>
+</file>
+
+<file path=ppt/tags/tag76.xml><?xml version="1.0" encoding="utf-8"?>
+<p:tagLst xmlns:a="http://schemas.openxmlformats.org/drawingml/2006/main" xmlns:r="http://schemas.openxmlformats.org/officeDocument/2006/relationships" xmlns:p="http://schemas.openxmlformats.org/presentationml/2006/main">
+  <p:tag name="PROPSLIDE" val="{&#10;  &quot;ApiSpecs&quot;: {},&#10;  &quot;UserConfirmedLoadDevices&quot;: [],&#10;  &quot;GuessedLoadDevices&quot;: [],&#10;  &quot;UseMacroExapnsion&quot;: false,&#10;  &quot;MacroExpansions&quot;: {}&#10;}"/>
+</p:tagLst>
+</file>
+
+<file path=ppt/tags/tag77.xml><?xml version="1.0" encoding="utf-8"?>
+<p:tagLst xmlns:a="http://schemas.openxmlformats.org/drawingml/2006/main" xmlns:r="http://schemas.openxmlformats.org/officeDocument/2006/relationships" xmlns:p="http://schemas.openxmlformats.org/presentationml/2006/main">
+  <p:tag name="PROPREAL" val="{&#10;  &quot;GoingTime&quot;: 0,&#10;  &quot;DelayTime&quot;: 0,&#10;  &quot;Motion&quot;: null,&#10;  &quot;Script&quot;: null,&#10;  &quot;NoTrans&quot;: false,&#10;  &quot;IsInitialFinished&quot;: false,&#10;  &quot;IsTokenSource&quot;: false,&#10;  &quot;RepeatCounter&quot;: 1&#10;}"/>
+</p:tagLst>
+</file>
+
+<file path=ppt/tags/tag78.xml><?xml version="1.0" encoding="utf-8"?>
+<p:tagLst xmlns:a="http://schemas.openxmlformats.org/drawingml/2006/main" xmlns:r="http://schemas.openxmlformats.org/officeDocument/2006/relationships" xmlns:p="http://schemas.openxmlformats.org/presentationml/2006/main">
+  <p:tag name="PROPREAL" val="{&#10;  &quot;GoingTime&quot;: 0,&#10;  &quot;DelayTime&quot;: 0,&#10;  &quot;Motion&quot;: null,&#10;  &quot;Script&quot;: null,&#10;  &quot;NoTrans&quot;: false,&#10;  &quot;IsInitialFinished&quot;: false,&#10;  &quot;IsTokenSource&quot;: false,&#10;  &quot;RepeatCounter&quot;: 1&#10;}"/>
+</p:tagLst>
+</file>
+
+<file path=ppt/tags/tag79.xml><?xml version="1.0" encoding="utf-8"?>
+<p:tagLst xmlns:a="http://schemas.openxmlformats.org/drawingml/2006/main" xmlns:r="http://schemas.openxmlformats.org/officeDocument/2006/relationships" xmlns:p="http://schemas.openxmlformats.org/presentationml/2006/main">
+  <p:tag name="PROPREAL" val="{&#10;  &quot;GoingTime&quot;: 0,&#10;  &quot;DelayTime&quot;: 0,&#10;  &quot;Motion&quot;: null,&#10;  &quot;Script&quot;: null,&#10;  &quot;NoTrans&quot;: false,&#10;  &quot;IsInitialFinished&quot;: false,&#10;  &quot;IsTokenSource&quot;: false,&#10;  &quot;RepeatCounter&quot;: 1&#10;}"/>
+</p:tagLst>
+</file>
+
+<file path=ppt/tags/tag8.xml><?xml version="1.0" encoding="utf-8"?>
+<p:tagLst xmlns:a="http://schemas.openxmlformats.org/drawingml/2006/main" xmlns:r="http://schemas.openxmlformats.org/officeDocument/2006/relationships" xmlns:p="http://schemas.openxmlformats.org/presentationml/2006/main">
+  <p:tag name="PROPREAL" val="{&#10;  &quot;GoingTime&quot;: 0,&#10;  &quot;DelayTime&quot;: 0,&#10;  &quot;Motion&quot;: null,&#10;  &quot;Script&quot;: null,&#10;  &quot;NoTrans&quot;: false,&#10;  &quot;IsInitialFinished&quot;: false,&#10;  &quot;IsTokenSource&quot;: false,&#10;  &quot;RepeatCounter&quot;: 1&#10;}"/>
+</p:tagLst>
+</file>
+
+<file path=ppt/tags/tag80.xml><?xml version="1.0" encoding="utf-8"?>
+<p:tagLst xmlns:a="http://schemas.openxmlformats.org/drawingml/2006/main" xmlns:r="http://schemas.openxmlformats.org/officeDocument/2006/relationships" xmlns:p="http://schemas.openxmlformats.org/presentationml/2006/main">
+  <p:tag name="PROPREAL" val="{&#10;  &quot;GoingTime&quot;: 0,&#10;  &quot;DelayTime&quot;: 0,&#10;  &quot;Motion&quot;: null,&#10;  &quot;Script&quot;: null,&#10;  &quot;NoTrans&quot;: false,&#10;  &quot;IsInitialFinished&quot;: false,&#10;  &quot;IsTokenSource&quot;: false,&#10;  &quot;RepeatCounter&quot;: 1&#10;}"/>
+</p:tagLst>
+</file>
+
+<file path=ppt/tags/tag81.xml><?xml version="1.0" encoding="utf-8"?>
+<p:tagLst xmlns:a="http://schemas.openxmlformats.org/drawingml/2006/main" xmlns:r="http://schemas.openxmlformats.org/officeDocument/2006/relationships" xmlns:p="http://schemas.openxmlformats.org/presentationml/2006/main">
+  <p:tag name="PROPSLIDE" val="{&#10;  &quot;ApiSpecs&quot;: {},&#10;  &quot;UserConfirmedLoadDevices&quot;: [],&#10;  &quot;GuessedLoadDevices&quot;: [],&#10;  &quot;UseMacroExapnsion&quot;: false,&#10;  &quot;MacroExpansions&quot;: {}&#10;}"/>
+</p:tagLst>
+</file>
+
+<file path=ppt/tags/tag82.xml><?xml version="1.0" encoding="utf-8"?>
+<p:tagLst xmlns:a="http://schemas.openxmlformats.org/drawingml/2006/main" xmlns:r="http://schemas.openxmlformats.org/officeDocument/2006/relationships" xmlns:p="http://schemas.openxmlformats.org/presentationml/2006/main">
+  <p:tag name="PROPREAL" val="{&#10;  &quot;GoingTime&quot;: 0,&#10;  &quot;DelayTime&quot;: 0,&#10;  &quot;Motion&quot;: null,&#10;  &quot;Script&quot;: null,&#10;  &quot;NoTrans&quot;: false,&#10;  &quot;IsInitialFinished&quot;: false,&#10;  &quot;IsTokenSource&quot;: false,&#10;  &quot;RepeatCounter&quot;: 1&#10;}"/>
+</p:tagLst>
+</file>
+
+<file path=ppt/tags/tag83.xml><?xml version="1.0" encoding="utf-8"?>
+<p:tagLst xmlns:a="http://schemas.openxmlformats.org/drawingml/2006/main" xmlns:r="http://schemas.openxmlformats.org/officeDocument/2006/relationships" xmlns:p="http://schemas.openxmlformats.org/presentationml/2006/main">
+  <p:tag name="PROPREAL" val="{&#10;  &quot;GoingTime&quot;: 0,&#10;  &quot;DelayTime&quot;: 0,&#10;  &quot;Motion&quot;: null,&#10;  &quot;Script&quot;: null,&#10;  &quot;NoTrans&quot;: false,&#10;  &quot;IsInitialFinished&quot;: false,&#10;  &quot;IsTokenSource&quot;: false,&#10;  &quot;RepeatCounter&quot;: 1&#10;}"/>
+</p:tagLst>
+</file>
+
+<file path=ppt/tags/tag84.xml><?xml version="1.0" encoding="utf-8"?>
+<p:tagLst xmlns:a="http://schemas.openxmlformats.org/drawingml/2006/main" xmlns:r="http://schemas.openxmlformats.org/officeDocument/2006/relationships" xmlns:p="http://schemas.openxmlformats.org/presentationml/2006/main">
+  <p:tag name="PROPREAL" val="{&#10;  &quot;GoingTime&quot;: 0,&#10;  &quot;DelayTime&quot;: 0,&#10;  &quot;Motion&quot;: null,&#10;  &quot;Script&quot;: null,&#10;  &quot;NoTrans&quot;: false,&#10;  &quot;IsInitialFinished&quot;: false,&#10;  &quot;IsTokenSource&quot;: false,&#10;  &quot;RepeatCounter&quot;: 1&#10;}"/>
+</p:tagLst>
+</file>
+
+<file path=ppt/tags/tag85.xml><?xml version="1.0" encoding="utf-8"?>
+<p:tagLst xmlns:a="http://schemas.openxmlformats.org/drawingml/2006/main" xmlns:r="http://schemas.openxmlformats.org/officeDocument/2006/relationships" xmlns:p="http://schemas.openxmlformats.org/presentationml/2006/main">
+  <p:tag name="PROPREAL" val="{&#10;  &quot;GoingTime&quot;: 0,&#10;  &quot;DelayTime&quot;: 0,&#10;  &quot;Motion&quot;: null,&#10;  &quot;Script&quot;: null,&#10;  &quot;NoTrans&quot;: false,&#10;  &quot;IsInitialFinished&quot;: false,&#10;  &quot;IsTokenSource&quot;: false,&#10;  &quot;RepeatCounter&quot;: 1&#10;}"/>
+</p:tagLst>
+</file>
+
+<file path=ppt/tags/tag86.xml><?xml version="1.0" encoding="utf-8"?>
+<p:tagLst xmlns:a="http://schemas.openxmlformats.org/drawingml/2006/main" xmlns:r="http://schemas.openxmlformats.org/officeDocument/2006/relationships" xmlns:p="http://schemas.openxmlformats.org/presentationml/2006/main">
+  <p:tag name="PROPREAL" val="{&#10;  &quot;GoingTime&quot;: 0,&#10;  &quot;DelayTime&quot;: 0,&#10;  &quot;Motion&quot;: null,&#10;  &quot;Script&quot;: null,&#10;  &quot;NoTrans&quot;: false,&#10;  &quot;IsInitialFinished&quot;: false,&#10;  &quot;IsTokenSource&quot;: false,&#10;  &quot;RepeatCounter&quot;: 1&#10;}"/>
+</p:tagLst>
+</file>
+
+<file path=ppt/tags/tag87.xml><?xml version="1.0" encoding="utf-8"?>
+<p:tagLst xmlns:a="http://schemas.openxmlformats.org/drawingml/2006/main" xmlns:r="http://schemas.openxmlformats.org/officeDocument/2006/relationships" xmlns:p="http://schemas.openxmlformats.org/presentationml/2006/main">
+  <p:tag name="PROPREAL" val="{&#10;  &quot;GoingTime&quot;: 0,&#10;  &quot;DelayTime&quot;: 0,&#10;  &quot;Motion&quot;: null,&#10;  &quot;Script&quot;: null,&#10;  &quot;NoTrans&quot;: false,&#10;  &quot;IsInitialFinished&quot;: false,&#10;  &quot;IsTokenSource&quot;: false,&#10;  &quot;RepeatCounter&quot;: 1&#10;}"/>
+</p:tagLst>
+</file>
+
+<file path=ppt/tags/tag88.xml><?xml version="1.0" encoding="utf-8"?>
+<p:tagLst xmlns:a="http://schemas.openxmlformats.org/drawingml/2006/main" xmlns:r="http://schemas.openxmlformats.org/officeDocument/2006/relationships" xmlns:p="http://schemas.openxmlformats.org/presentationml/2006/main">
+  <p:tag name="PROPREAL" val="{&#10;  &quot;GoingTime&quot;: 0,&#10;  &quot;DelayTime&quot;: 0,&#10;  &quot;Motion&quot;: null,&#10;  &quot;Script&quot;: null,&#10;  &quot;NoTrans&quot;: false,&#10;  &quot;IsInitialFinished&quot;: false,&#10;  &quot;IsTokenSource&quot;: false,&#10;  &quot;RepeatCounter&quot;: 1&#10;}"/>
+</p:tagLst>
+</file>
+
+<file path=ppt/tags/tag89.xml><?xml version="1.0" encoding="utf-8"?>
+<p:tagLst xmlns:a="http://schemas.openxmlformats.org/drawingml/2006/main" xmlns:r="http://schemas.openxmlformats.org/officeDocument/2006/relationships" xmlns:p="http://schemas.openxmlformats.org/presentationml/2006/main">
+  <p:tag name="PROPREAL" val="{&#10;  &quot;GoingTime&quot;: 0,&#10;  &quot;DelayTime&quot;: 0,&#10;  &quot;Motion&quot;: null,&#10;  &quot;Script&quot;: null,&#10;  &quot;NoTrans&quot;: false,&#10;  &quot;IsInitialFinished&quot;: false,&#10;  &quot;IsTokenSource&quot;: false,&#10;  &quot;RepeatCounter&quot;: 1&#10;}"/>
+</p:tagLst>
+</file>
+
+<file path=ppt/tags/tag9.xml><?xml version="1.0" encoding="utf-8"?>
+<p:tagLst xmlns:a="http://schemas.openxmlformats.org/drawingml/2006/main" xmlns:r="http://schemas.openxmlformats.org/officeDocument/2006/relationships" xmlns:p="http://schemas.openxmlformats.org/presentationml/2006/main">
+  <p:tag name="PROPREAL" val="{&#10;  &quot;GoingTime&quot;: 0,&#10;  &quot;DelayTime&quot;: 0,&#10;  &quot;Motion&quot;: null,&#10;  &quot;Script&quot;: null,&#10;  &quot;NoTrans&quot;: false,&#10;  &quot;IsInitialFinished&quot;: false,&#10;  &quot;IsTokenSource&quot;: false,&#10;  &quot;RepeatCounter&quot;: 1&#10;}"/>
+</p:tagLst>
+</file>
+
+<file path=ppt/tags/tag90.xml><?xml version="1.0" encoding="utf-8"?>
+<p:tagLst xmlns:a="http://schemas.openxmlformats.org/drawingml/2006/main" xmlns:r="http://schemas.openxmlformats.org/officeDocument/2006/relationships" xmlns:p="http://schemas.openxmlformats.org/presentationml/2006/main">
+  <p:tag name="PROPREAL" val="{&#10;  &quot;GoingTime&quot;: 0,&#10;  &quot;DelayTime&quot;: 0,&#10;  &quot;Motion&quot;: null,&#10;  &quot;Script&quot;: null,&#10;  &quot;NoTrans&quot;: false,&#10;  &quot;IsInitialFinished&quot;: false,&#10;  &quot;IsTokenSource&quot;: false,&#10;  &quot;RepeatCounter&quot;: 1&#10;}"/>
+</p:tagLst>
+</file>
+
+<file path=ppt/tags/tag91.xml><?xml version="1.0" encoding="utf-8"?>
+<p:tagLst xmlns:a="http://schemas.openxmlformats.org/drawingml/2006/main" xmlns:r="http://schemas.openxmlformats.org/officeDocument/2006/relationships" xmlns:p="http://schemas.openxmlformats.org/presentationml/2006/main">
+  <p:tag name="PROPREAL" val="{&#10;  &quot;GoingTime&quot;: 0,&#10;  &quot;DelayTime&quot;: 0,&#10;  &quot;Motion&quot;: null,&#10;  &quot;Script&quot;: null,&#10;  &quot;NoTrans&quot;: false,&#10;  &quot;IsInitialFinished&quot;: false,&#10;  &quot;IsTokenSource&quot;: false,&#10;  &quot;RepeatCounter&quot;: 1&#10;}"/>
+</p:tagLst>
 </file>
 
 <file path=ppt/theme/theme1.xml><?xml version="1.0" encoding="utf-8"?>

</xml_diff>